<commit_message>
Update to all seasons page and terminology(events -> festivals, all events -> all seasons)
</commit_message>
<xml_diff>
--- a/Powerpoints/BannerManagment.pptx
+++ b/Powerpoints/BannerManagment.pptx
@@ -5,7 +5,7 @@
     <p:sldMasterId id="2147483648" r:id="rId1"/>
   </p:sldMasterIdLst>
   <p:notesMasterIdLst>
-    <p:notesMasterId r:id="rId8"/>
+    <p:notesMasterId r:id="rId10"/>
   </p:notesMasterIdLst>
   <p:sldIdLst>
     <p:sldId id="257" r:id="rId2"/>
@@ -13,7 +13,9 @@
     <p:sldId id="261" r:id="rId4"/>
     <p:sldId id="262" r:id="rId5"/>
     <p:sldId id="258" r:id="rId6"/>
-    <p:sldId id="259" r:id="rId7"/>
+    <p:sldId id="263" r:id="rId7"/>
+    <p:sldId id="264" r:id="rId8"/>
+    <p:sldId id="259" r:id="rId9"/>
   </p:sldIdLst>
   <p:sldSz cx="12192000" cy="6858000"/>
   <p:notesSz cx="6858000" cy="9144000"/>
@@ -202,7 +204,7 @@
           <a:p>
             <a:fld id="{C6E956D7-A710-4769-B6DE-C39F782727B0}" type="datetimeFigureOut">
               <a:rPr lang="en-US" smtClean="0"/>
-              <a:t>6/17/2019</a:t>
+              <a:t>6/18/2019</a:t>
             </a:fld>
             <a:endParaRPr lang="en-US"/>
           </a:p>
@@ -703,7 +705,7 @@
           <a:p>
             <a:fld id="{62881ACC-2D14-4FEA-B766-B07C5C643364}" type="datetimeFigureOut">
               <a:rPr lang="en-US" smtClean="0"/>
-              <a:t>6/17/2019</a:t>
+              <a:t>6/18/2019</a:t>
             </a:fld>
             <a:endParaRPr lang="en-US"/>
           </a:p>
@@ -901,7 +903,7 @@
           <a:p>
             <a:fld id="{62881ACC-2D14-4FEA-B766-B07C5C643364}" type="datetimeFigureOut">
               <a:rPr lang="en-US" smtClean="0"/>
-              <a:t>6/17/2019</a:t>
+              <a:t>6/18/2019</a:t>
             </a:fld>
             <a:endParaRPr lang="en-US"/>
           </a:p>
@@ -1109,7 +1111,7 @@
           <a:p>
             <a:fld id="{62881ACC-2D14-4FEA-B766-B07C5C643364}" type="datetimeFigureOut">
               <a:rPr lang="en-US" smtClean="0"/>
-              <a:t>6/17/2019</a:t>
+              <a:t>6/18/2019</a:t>
             </a:fld>
             <a:endParaRPr lang="en-US"/>
           </a:p>
@@ -1307,7 +1309,7 @@
           <a:p>
             <a:fld id="{62881ACC-2D14-4FEA-B766-B07C5C643364}" type="datetimeFigureOut">
               <a:rPr lang="en-US" smtClean="0"/>
-              <a:t>6/17/2019</a:t>
+              <a:t>6/18/2019</a:t>
             </a:fld>
             <a:endParaRPr lang="en-US"/>
           </a:p>
@@ -1582,7 +1584,7 @@
           <a:p>
             <a:fld id="{62881ACC-2D14-4FEA-B766-B07C5C643364}" type="datetimeFigureOut">
               <a:rPr lang="en-US" smtClean="0"/>
-              <a:t>6/17/2019</a:t>
+              <a:t>6/18/2019</a:t>
             </a:fld>
             <a:endParaRPr lang="en-US"/>
           </a:p>
@@ -1847,7 +1849,7 @@
           <a:p>
             <a:fld id="{62881ACC-2D14-4FEA-B766-B07C5C643364}" type="datetimeFigureOut">
               <a:rPr lang="en-US" smtClean="0"/>
-              <a:t>6/17/2019</a:t>
+              <a:t>6/18/2019</a:t>
             </a:fld>
             <a:endParaRPr lang="en-US"/>
           </a:p>
@@ -2259,7 +2261,7 @@
           <a:p>
             <a:fld id="{62881ACC-2D14-4FEA-B766-B07C5C643364}" type="datetimeFigureOut">
               <a:rPr lang="en-US" smtClean="0"/>
-              <a:t>6/17/2019</a:t>
+              <a:t>6/18/2019</a:t>
             </a:fld>
             <a:endParaRPr lang="en-US"/>
           </a:p>
@@ -2400,7 +2402,7 @@
           <a:p>
             <a:fld id="{62881ACC-2D14-4FEA-B766-B07C5C643364}" type="datetimeFigureOut">
               <a:rPr lang="en-US" smtClean="0"/>
-              <a:t>6/17/2019</a:t>
+              <a:t>6/18/2019</a:t>
             </a:fld>
             <a:endParaRPr lang="en-US"/>
           </a:p>
@@ -2513,7 +2515,7 @@
           <a:p>
             <a:fld id="{62881ACC-2D14-4FEA-B766-B07C5C643364}" type="datetimeFigureOut">
               <a:rPr lang="en-US" smtClean="0"/>
-              <a:t>6/17/2019</a:t>
+              <a:t>6/18/2019</a:t>
             </a:fld>
             <a:endParaRPr lang="en-US"/>
           </a:p>
@@ -2824,7 +2826,7 @@
           <a:p>
             <a:fld id="{62881ACC-2D14-4FEA-B766-B07C5C643364}" type="datetimeFigureOut">
               <a:rPr lang="en-US" smtClean="0"/>
-              <a:t>6/17/2019</a:t>
+              <a:t>6/18/2019</a:t>
             </a:fld>
             <a:endParaRPr lang="en-US"/>
           </a:p>
@@ -3112,7 +3114,7 @@
           <a:p>
             <a:fld id="{62881ACC-2D14-4FEA-B766-B07C5C643364}" type="datetimeFigureOut">
               <a:rPr lang="en-US" smtClean="0"/>
-              <a:t>6/17/2019</a:t>
+              <a:t>6/18/2019</a:t>
             </a:fld>
             <a:endParaRPr lang="en-US"/>
           </a:p>
@@ -3353,7 +3355,7 @@
           <a:p>
             <a:fld id="{62881ACC-2D14-4FEA-B766-B07C5C643364}" type="datetimeFigureOut">
               <a:rPr lang="en-US" smtClean="0"/>
-              <a:t>6/17/2019</a:t>
+              <a:t>6/18/2019</a:t>
             </a:fld>
             <a:endParaRPr lang="en-US"/>
           </a:p>
@@ -4247,7 +4249,7 @@
         </p:nvSpPr>
         <p:spPr>
           <a:xfrm>
-            <a:off x="251791" y="221944"/>
+            <a:off x="251791" y="236012"/>
             <a:ext cx="11701670" cy="6198957"/>
           </a:xfrm>
           <a:prstGeom prst="rect">
@@ -4413,7 +4415,7 @@
                   <a:schemeClr val="tx1"/>
                 </a:solidFill>
               </a:rPr>
-              <a:t>ALL EVENTS</a:t>
+              <a:t>ALL SEASONS</a:t>
             </a:r>
           </a:p>
         </p:txBody>
@@ -4707,7 +4709,7 @@
           <a:p>
             <a:r>
               <a:rPr lang="en-US" dirty="0"/>
-              <a:t>NEXT EVENTS :</a:t>
+              <a:t>NEXT FESTIVALS :</a:t>
             </a:r>
           </a:p>
         </p:txBody>
@@ -5187,7 +5189,7 @@
                   </a:outerShdw>
                 </a:effectLst>
               </a:rPr>
-              <a:t>ALL EVENTS</a:t>
+              <a:t>ADVENT</a:t>
             </a:r>
           </a:p>
         </p:txBody>
@@ -5629,7 +5631,7 @@
                   <a:schemeClr val="tx1"/>
                 </a:solidFill>
               </a:rPr>
-              <a:t>CURRENT EVENT :                                                      -  NOV 28</a:t>
+              <a:t>CURRENT FESTIVAL :                                                      -  NOV 28</a:t>
             </a:r>
             <a:r>
               <a:rPr lang="en-US" baseline="30000" dirty="0">
@@ -5730,7 +5732,7 @@
         </p:nvSpPr>
         <p:spPr>
           <a:xfrm>
-            <a:off x="8209476" y="1270120"/>
+            <a:off x="8460420" y="1270120"/>
             <a:ext cx="501889" cy="337066"/>
           </a:xfrm>
           <a:prstGeom prst="rect">
@@ -5770,6 +5772,77 @@
           </a:p>
         </p:txBody>
       </p:sp>
+      <p:sp>
+        <p:nvSpPr>
+          <p:cNvPr id="11" name="TextBox 10">
+            <a:extLst>
+              <a:ext uri="{FF2B5EF4-FFF2-40B4-BE49-F238E27FC236}">
+                <a16:creationId xmlns:a16="http://schemas.microsoft.com/office/drawing/2014/main" id="{C9DE4DED-66D9-48F7-9030-A9C236F20F85}"/>
+              </a:ext>
+            </a:extLst>
+          </p:cNvPr>
+          <p:cNvSpPr txBox="1"/>
+          <p:nvPr/>
+        </p:nvSpPr>
+        <p:spPr>
+          <a:xfrm>
+            <a:off x="1417984" y="5458914"/>
+            <a:ext cx="1967033" cy="369332"/>
+          </a:xfrm>
+          <a:prstGeom prst="rect">
+            <a:avLst/>
+          </a:prstGeom>
+          <a:noFill/>
+        </p:spPr>
+        <p:txBody>
+          <a:bodyPr wrap="square" rtlCol="0">
+            <a:spAutoFit/>
+          </a:bodyPr>
+          <a:lstStyle/>
+          <a:p>
+            <a:pPr algn="ctr"/>
+            <a:r>
+              <a:rPr lang="en-US" dirty="0"/>
+              <a:t>DEC 2-23</a:t>
+            </a:r>
+          </a:p>
+        </p:txBody>
+      </p:sp>
+      <p:pic>
+        <p:nvPicPr>
+          <p:cNvPr id="31" name="Picture 30" descr="A close up of a device&#10;&#10;Description automatically generated">
+            <a:extLst>
+              <a:ext uri="{FF2B5EF4-FFF2-40B4-BE49-F238E27FC236}">
+                <a16:creationId xmlns:a16="http://schemas.microsoft.com/office/drawing/2014/main" id="{B34988EF-7F58-4C6B-B48B-1AB6603F6CF2}"/>
+              </a:ext>
+            </a:extLst>
+          </p:cNvPr>
+          <p:cNvPicPr>
+            <a:picLocks noChangeAspect="1"/>
+          </p:cNvPicPr>
+          <p:nvPr/>
+        </p:nvPicPr>
+        <p:blipFill rotWithShape="1">
+          <a:blip r:embed="rId3">
+            <a:extLst>
+              <a:ext uri="{28A0092B-C50C-407E-A947-70E740481C1C}">
+                <a14:useLocalDpi xmlns:a14="http://schemas.microsoft.com/office/drawing/2010/main" val="0"/>
+              </a:ext>
+            </a:extLst>
+          </a:blip>
+          <a:srcRect l="65760" t="12718" r="24721" b="21436"/>
+          <a:stretch/>
+        </p:blipFill>
+        <p:spPr>
+          <a:xfrm>
+            <a:off x="11743368" y="370971"/>
+            <a:ext cx="230536" cy="5931355"/>
+          </a:xfrm>
+          <a:prstGeom prst="rect">
+            <a:avLst/>
+          </a:prstGeom>
+        </p:spPr>
+      </p:pic>
     </p:spTree>
     <p:extLst>
       <p:ext uri="{BB962C8B-B14F-4D97-AF65-F5344CB8AC3E}">
@@ -5825,7 +5898,7 @@
         </p:nvSpPr>
         <p:spPr>
           <a:xfrm>
-            <a:off x="251791" y="239154"/>
+            <a:off x="251791" y="211019"/>
             <a:ext cx="11701670" cy="6198957"/>
           </a:xfrm>
           <a:prstGeom prst="rect">
@@ -5882,7 +5955,7 @@
         </p:nvSpPr>
         <p:spPr>
           <a:xfrm>
-            <a:off x="11005931" y="1975427"/>
+            <a:off x="10800520" y="1965849"/>
             <a:ext cx="583096" cy="473765"/>
           </a:xfrm>
           <a:prstGeom prst="rightArrow">
@@ -5934,7 +6007,7 @@
         </p:nvSpPr>
         <p:spPr>
           <a:xfrm flipH="1">
-            <a:off x="503583" y="1965849"/>
+            <a:off x="655984" y="1931817"/>
             <a:ext cx="583096" cy="473765"/>
           </a:xfrm>
           <a:prstGeom prst="rightArrow">
@@ -6272,6 +6345,41 @@
           </a:p>
         </p:txBody>
       </p:sp>
+      <p:pic>
+        <p:nvPicPr>
+          <p:cNvPr id="11" name="Picture 10" descr="A close up of a device&#10;&#10;Description automatically generated">
+            <a:extLst>
+              <a:ext uri="{FF2B5EF4-FFF2-40B4-BE49-F238E27FC236}">
+                <a16:creationId xmlns:a16="http://schemas.microsoft.com/office/drawing/2014/main" id="{C16438A3-7B0A-4C37-AD5E-5D366C06449D}"/>
+              </a:ext>
+            </a:extLst>
+          </p:cNvPr>
+          <p:cNvPicPr>
+            <a:picLocks noChangeAspect="1"/>
+          </p:cNvPicPr>
+          <p:nvPr/>
+        </p:nvPicPr>
+        <p:blipFill rotWithShape="1">
+          <a:blip r:embed="rId2">
+            <a:extLst>
+              <a:ext uri="{28A0092B-C50C-407E-A947-70E740481C1C}">
+                <a14:useLocalDpi xmlns:a14="http://schemas.microsoft.com/office/drawing/2010/main" val="0"/>
+              </a:ext>
+            </a:extLst>
+          </a:blip>
+          <a:srcRect l="65760" t="12718" r="24721" b="21436"/>
+          <a:stretch/>
+        </p:blipFill>
+        <p:spPr>
+          <a:xfrm>
+            <a:off x="11581582" y="370971"/>
+            <a:ext cx="392322" cy="5931355"/>
+          </a:xfrm>
+          <a:prstGeom prst="rect">
+            <a:avLst/>
+          </a:prstGeom>
+        </p:spPr>
+      </p:pic>
     </p:spTree>
     <p:extLst>
       <p:ext uri="{BB962C8B-B14F-4D97-AF65-F5344CB8AC3E}">
@@ -7079,10 +7187,10 @@
       </p:sp>
       <p:sp>
         <p:nvSpPr>
-          <p:cNvPr id="9" name="Rectangle 8">
-            <a:extLst>
-              <a:ext uri="{FF2B5EF4-FFF2-40B4-BE49-F238E27FC236}">
-                <a16:creationId xmlns:a16="http://schemas.microsoft.com/office/drawing/2014/main" id="{F178914A-F522-461A-92A4-4ACB360E299C}"/>
+          <p:cNvPr id="10" name="Arrow: Right 9">
+            <a:extLst>
+              <a:ext uri="{FF2B5EF4-FFF2-40B4-BE49-F238E27FC236}">
+                <a16:creationId xmlns:a16="http://schemas.microsoft.com/office/drawing/2014/main" id="{972AAEC2-1B95-4F42-9F7A-C4FBA0BC39D8}"/>
               </a:ext>
             </a:extLst>
           </p:cNvPr>
@@ -7091,14 +7199,17 @@
         </p:nvSpPr>
         <p:spPr>
           <a:xfrm>
-            <a:off x="3631973" y="1320408"/>
-            <a:ext cx="2059746" cy="166580"/>
-          </a:xfrm>
-          <a:prstGeom prst="rect">
+            <a:off x="10935593" y="3961401"/>
+            <a:ext cx="583096" cy="570964"/>
+          </a:xfrm>
+          <a:prstGeom prst="rightArrow">
             <a:avLst/>
           </a:prstGeom>
           <a:solidFill>
-            <a:schemeClr val="bg1"/>
+            <a:schemeClr val="accent6">
+              <a:lumMod val="60000"/>
+              <a:lumOff val="40000"/>
+            </a:schemeClr>
           </a:solidFill>
         </p:spPr>
         <p:style>
@@ -7128,10 +7239,10 @@
       </p:sp>
       <p:sp>
         <p:nvSpPr>
-          <p:cNvPr id="10" name="Arrow: Right 9">
-            <a:extLst>
-              <a:ext uri="{FF2B5EF4-FFF2-40B4-BE49-F238E27FC236}">
-                <a16:creationId xmlns:a16="http://schemas.microsoft.com/office/drawing/2014/main" id="{972AAEC2-1B95-4F42-9F7A-C4FBA0BC39D8}"/>
+          <p:cNvPr id="11" name="Arrow: Right 10">
+            <a:extLst>
+              <a:ext uri="{FF2B5EF4-FFF2-40B4-BE49-F238E27FC236}">
+                <a16:creationId xmlns:a16="http://schemas.microsoft.com/office/drawing/2014/main" id="{B08E8FAE-64B3-4CD2-BD0B-5A7085A0FACE}"/>
               </a:ext>
             </a:extLst>
           </p:cNvPr>
@@ -7139,8 +7250,8 @@
           <p:nvPr/>
         </p:nvSpPr>
         <p:spPr>
-          <a:xfrm>
-            <a:off x="10935593" y="3961401"/>
+          <a:xfrm flipH="1">
+            <a:off x="433245" y="3951823"/>
             <a:ext cx="583096" cy="570964"/>
           </a:xfrm>
           <a:prstGeom prst="rightArrow">
@@ -7180,10 +7291,10 @@
       </p:sp>
       <p:sp>
         <p:nvSpPr>
-          <p:cNvPr id="11" name="Arrow: Right 10">
-            <a:extLst>
-              <a:ext uri="{FF2B5EF4-FFF2-40B4-BE49-F238E27FC236}">
-                <a16:creationId xmlns:a16="http://schemas.microsoft.com/office/drawing/2014/main" id="{B08E8FAE-64B3-4CD2-BD0B-5A7085A0FACE}"/>
+          <p:cNvPr id="12" name="Rectangle 11">
+            <a:extLst>
+              <a:ext uri="{FF2B5EF4-FFF2-40B4-BE49-F238E27FC236}">
+                <a16:creationId xmlns:a16="http://schemas.microsoft.com/office/drawing/2014/main" id="{3E3C88A4-2301-4EE8-9077-84D99EC8A33F}"/>
               </a:ext>
             </a:extLst>
           </p:cNvPr>
@@ -7191,61 +7302,9 @@
           <p:nvPr/>
         </p:nvSpPr>
         <p:spPr>
-          <a:xfrm flipH="1">
-            <a:off x="433245" y="3951823"/>
-            <a:ext cx="583096" cy="570964"/>
-          </a:xfrm>
-          <a:prstGeom prst="rightArrow">
-            <a:avLst/>
-          </a:prstGeom>
-          <a:solidFill>
-            <a:schemeClr val="accent6">
-              <a:lumMod val="60000"/>
-              <a:lumOff val="40000"/>
-            </a:schemeClr>
-          </a:solidFill>
-        </p:spPr>
-        <p:style>
-          <a:lnRef idx="2">
-            <a:schemeClr val="accent1">
-              <a:shade val="50000"/>
-            </a:schemeClr>
-          </a:lnRef>
-          <a:fillRef idx="1">
-            <a:schemeClr val="accent1"/>
-          </a:fillRef>
-          <a:effectRef idx="0">
-            <a:schemeClr val="accent1"/>
-          </a:effectRef>
-          <a:fontRef idx="minor">
-            <a:schemeClr val="lt1"/>
-          </a:fontRef>
-        </p:style>
-        <p:txBody>
-          <a:bodyPr rtlCol="0" anchor="ctr"/>
-          <a:lstStyle/>
-          <a:p>
-            <a:pPr algn="ctr"/>
-            <a:endParaRPr lang="en-US"/>
-          </a:p>
-        </p:txBody>
-      </p:sp>
-      <p:sp>
-        <p:nvSpPr>
-          <p:cNvPr id="12" name="Rectangle 11">
-            <a:extLst>
-              <a:ext uri="{FF2B5EF4-FFF2-40B4-BE49-F238E27FC236}">
-                <a16:creationId xmlns:a16="http://schemas.microsoft.com/office/drawing/2014/main" id="{3E3C88A4-2301-4EE8-9077-84D99EC8A33F}"/>
-              </a:ext>
-            </a:extLst>
-          </p:cNvPr>
-          <p:cNvSpPr/>
-          <p:nvPr/>
-        </p:nvSpPr>
-        <p:spPr>
           <a:xfrm>
             <a:off x="1334394" y="3428999"/>
-            <a:ext cx="1957446" cy="3014003"/>
+            <a:ext cx="1957446" cy="2188653"/>
           </a:xfrm>
           <a:prstGeom prst="rect">
             <a:avLst/>
@@ -7302,7 +7361,7 @@
         <p:spPr>
           <a:xfrm>
             <a:off x="3743537" y="3400868"/>
-            <a:ext cx="1957446" cy="3042134"/>
+            <a:ext cx="1957446" cy="2192666"/>
           </a:xfrm>
           <a:prstGeom prst="rect">
             <a:avLst/>
@@ -7359,7 +7418,7 @@
         <p:spPr>
           <a:xfrm>
             <a:off x="6053004" y="3400867"/>
-            <a:ext cx="1957446" cy="3042134"/>
+            <a:ext cx="1957446" cy="2192666"/>
           </a:xfrm>
           <a:prstGeom prst="rect">
             <a:avLst/>
@@ -7415,8 +7474,8 @@
         </p:nvSpPr>
         <p:spPr>
           <a:xfrm>
-            <a:off x="8462147" y="3343614"/>
-            <a:ext cx="1957446" cy="3099387"/>
+            <a:off x="8462147" y="3343615"/>
+            <a:ext cx="1957446" cy="2274038"/>
           </a:xfrm>
           <a:prstGeom prst="rect">
             <a:avLst/>
@@ -7556,7 +7615,7 @@
         <p:spPr>
           <a:xfrm>
             <a:off x="6053004" y="3314451"/>
-            <a:ext cx="1970696" cy="2170574"/>
+            <a:ext cx="1970696" cy="2279082"/>
           </a:xfrm>
           <a:prstGeom prst="rect">
             <a:avLst/>
@@ -7590,8 +7649,8 @@
         </p:blipFill>
         <p:spPr>
           <a:xfrm>
-            <a:off x="8475397" y="3352161"/>
-            <a:ext cx="1951892" cy="2170574"/>
+            <a:off x="8475397" y="3352160"/>
+            <a:ext cx="1951892" cy="2265491"/>
           </a:xfrm>
           <a:prstGeom prst="rect">
             <a:avLst/>
@@ -7873,6 +7932,41 @@
           </a:graphicData>
         </a:graphic>
       </p:graphicFrame>
+      <p:sp>
+        <p:nvSpPr>
+          <p:cNvPr id="3" name="TextBox 2">
+            <a:extLst>
+              <a:ext uri="{FF2B5EF4-FFF2-40B4-BE49-F238E27FC236}">
+                <a16:creationId xmlns:a16="http://schemas.microsoft.com/office/drawing/2014/main" id="{61C161EA-3976-405B-8512-7FE789FAC7CB}"/>
+              </a:ext>
+            </a:extLst>
+          </p:cNvPr>
+          <p:cNvSpPr txBox="1"/>
+          <p:nvPr/>
+        </p:nvSpPr>
+        <p:spPr>
+          <a:xfrm>
+            <a:off x="3631973" y="1264466"/>
+            <a:ext cx="5561199" cy="400110"/>
+          </a:xfrm>
+          <a:prstGeom prst="rect">
+            <a:avLst/>
+          </a:prstGeom>
+          <a:noFill/>
+        </p:spPr>
+        <p:txBody>
+          <a:bodyPr wrap="square" rtlCol="0">
+            <a:spAutoFit/>
+          </a:bodyPr>
+          <a:lstStyle/>
+          <a:p>
+            <a:r>
+              <a:rPr lang="en-US" sz="2000" b="1" dirty="0"/>
+              <a:t>PARAMENT COLOR: WHITE</a:t>
+            </a:r>
+          </a:p>
+        </p:txBody>
+      </p:sp>
     </p:spTree>
     <p:extLst>
       <p:ext uri="{BB962C8B-B14F-4D97-AF65-F5344CB8AC3E}">
@@ -7887,6 +7981,1687 @@
 </file>
 
 <file path=ppt/slides/slide6.xml><?xml version="1.0" encoding="utf-8"?>
+<p:sld xmlns:a="http://schemas.openxmlformats.org/drawingml/2006/main" xmlns:r="http://schemas.openxmlformats.org/officeDocument/2006/relationships" xmlns:p="http://schemas.openxmlformats.org/presentationml/2006/main">
+  <p:cSld>
+    <p:spTree>
+      <p:nvGrpSpPr>
+        <p:cNvPr id="1" name=""/>
+        <p:cNvGrpSpPr/>
+        <p:nvPr/>
+      </p:nvGrpSpPr>
+      <p:grpSpPr>
+        <a:xfrm>
+          <a:off x="0" y="0"/>
+          <a:ext cx="0" cy="0"/>
+          <a:chOff x="0" y="0"/>
+          <a:chExt cx="0" cy="0"/>
+        </a:xfrm>
+      </p:grpSpPr>
+      <p:sp>
+        <p:nvSpPr>
+          <p:cNvPr id="4" name="Rectangle 3">
+            <a:extLst>
+              <a:ext uri="{FF2B5EF4-FFF2-40B4-BE49-F238E27FC236}">
+                <a16:creationId xmlns:a16="http://schemas.microsoft.com/office/drawing/2014/main" id="{E24CA4AB-AA54-4E15-B5AD-140548E89A63}"/>
+              </a:ext>
+            </a:extLst>
+          </p:cNvPr>
+          <p:cNvSpPr/>
+          <p:nvPr/>
+        </p:nvSpPr>
+        <p:spPr>
+          <a:xfrm>
+            <a:off x="98475" y="139875"/>
+            <a:ext cx="11901267" cy="6611816"/>
+          </a:xfrm>
+          <a:prstGeom prst="rect">
+            <a:avLst/>
+          </a:prstGeom>
+          <a:solidFill>
+            <a:schemeClr val="accent6">
+              <a:lumMod val="20000"/>
+              <a:lumOff val="80000"/>
+            </a:schemeClr>
+          </a:solidFill>
+          <a:ln>
+            <a:solidFill>
+              <a:schemeClr val="accent6">
+                <a:lumMod val="75000"/>
+              </a:schemeClr>
+            </a:solidFill>
+          </a:ln>
+        </p:spPr>
+        <p:style>
+          <a:lnRef idx="2">
+            <a:schemeClr val="accent1">
+              <a:shade val="50000"/>
+            </a:schemeClr>
+          </a:lnRef>
+          <a:fillRef idx="1">
+            <a:schemeClr val="accent1"/>
+          </a:fillRef>
+          <a:effectRef idx="0">
+            <a:schemeClr val="accent1"/>
+          </a:effectRef>
+          <a:fontRef idx="minor">
+            <a:schemeClr val="lt1"/>
+          </a:fontRef>
+        </p:style>
+        <p:txBody>
+          <a:bodyPr rtlCol="0" anchor="ctr"/>
+          <a:lstStyle/>
+          <a:p>
+            <a:pPr algn="ctr"/>
+            <a:endParaRPr lang="en-US"/>
+          </a:p>
+        </p:txBody>
+      </p:sp>
+      <p:sp>
+        <p:nvSpPr>
+          <p:cNvPr id="5" name="TextBox 4">
+            <a:extLst>
+              <a:ext uri="{FF2B5EF4-FFF2-40B4-BE49-F238E27FC236}">
+                <a16:creationId xmlns:a16="http://schemas.microsoft.com/office/drawing/2014/main" id="{54EF1D1F-6A1E-4898-8D8F-4B9BBBC9137D}"/>
+              </a:ext>
+            </a:extLst>
+          </p:cNvPr>
+          <p:cNvSpPr txBox="1"/>
+          <p:nvPr/>
+        </p:nvSpPr>
+        <p:spPr>
+          <a:xfrm>
+            <a:off x="192258" y="194465"/>
+            <a:ext cx="3395003" cy="523220"/>
+          </a:xfrm>
+          <a:prstGeom prst="rect">
+            <a:avLst/>
+          </a:prstGeom>
+          <a:noFill/>
+        </p:spPr>
+        <p:txBody>
+          <a:bodyPr wrap="square" rtlCol="0">
+            <a:spAutoFit/>
+          </a:bodyPr>
+          <a:lstStyle/>
+          <a:p>
+            <a:r>
+              <a:rPr lang="en-US" sz="2800" dirty="0"/>
+              <a:t>ALL SEASONS:</a:t>
+            </a:r>
+          </a:p>
+        </p:txBody>
+      </p:sp>
+      <p:sp>
+        <p:nvSpPr>
+          <p:cNvPr id="7" name="Rectangle 6">
+            <a:extLst>
+              <a:ext uri="{FF2B5EF4-FFF2-40B4-BE49-F238E27FC236}">
+                <a16:creationId xmlns:a16="http://schemas.microsoft.com/office/drawing/2014/main" id="{EC22135E-518E-4EA2-8C75-AA00B923308A}"/>
+              </a:ext>
+            </a:extLst>
+          </p:cNvPr>
+          <p:cNvSpPr/>
+          <p:nvPr/>
+        </p:nvSpPr>
+        <p:spPr>
+          <a:xfrm>
+            <a:off x="192258" y="692071"/>
+            <a:ext cx="1468222" cy="523220"/>
+          </a:xfrm>
+          <a:prstGeom prst="rect">
+            <a:avLst/>
+          </a:prstGeom>
+        </p:spPr>
+        <p:txBody>
+          <a:bodyPr wrap="none">
+            <a:spAutoFit/>
+          </a:bodyPr>
+          <a:lstStyle/>
+          <a:p>
+            <a:pPr algn="ctr"/>
+            <a:r>
+              <a:rPr lang="en-US" sz="2800" dirty="0">
+                <a:ln w="0"/>
+                <a:effectLst>
+                  <a:outerShdw blurRad="38100" dist="19050" dir="2700000" algn="tl" rotWithShape="0">
+                    <a:schemeClr val="dk1">
+                      <a:alpha val="40000"/>
+                    </a:schemeClr>
+                  </a:outerShdw>
+                </a:effectLst>
+              </a:rPr>
+              <a:t>ADVENT:</a:t>
+            </a:r>
+          </a:p>
+        </p:txBody>
+      </p:sp>
+      <p:pic>
+        <p:nvPicPr>
+          <p:cNvPr id="1028" name="Picture 4">
+            <a:extLst>
+              <a:ext uri="{FF2B5EF4-FFF2-40B4-BE49-F238E27FC236}">
+                <a16:creationId xmlns:a16="http://schemas.microsoft.com/office/drawing/2014/main" id="{27A4DDFD-5D9D-48F0-BFD1-1B30E7F21AA3}"/>
+              </a:ext>
+            </a:extLst>
+          </p:cNvPr>
+          <p:cNvPicPr>
+            <a:picLocks noChangeAspect="1" noChangeArrowheads="1"/>
+          </p:cNvPicPr>
+          <p:nvPr/>
+        </p:nvPicPr>
+        <p:blipFill>
+          <a:blip r:embed="rId3">
+            <a:extLst>
+              <a:ext uri="{28A0092B-C50C-407E-A947-70E740481C1C}">
+                <a14:useLocalDpi xmlns:a14="http://schemas.microsoft.com/office/drawing/2010/main" val="0"/>
+              </a:ext>
+            </a:extLst>
+          </a:blip>
+          <a:srcRect/>
+          <a:stretch>
+            <a:fillRect/>
+          </a:stretch>
+        </p:blipFill>
+        <p:spPr bwMode="auto">
+          <a:xfrm>
+            <a:off x="376752" y="1368605"/>
+            <a:ext cx="11158756" cy="2950178"/>
+          </a:xfrm>
+          <a:prstGeom prst="rect">
+            <a:avLst/>
+          </a:prstGeom>
+          <a:noFill/>
+          <a:extLst>
+            <a:ext uri="{909E8E84-426E-40DD-AFC4-6F175D3DCCD1}">
+              <a14:hiddenFill xmlns:a14="http://schemas.microsoft.com/office/drawing/2010/main">
+                <a:solidFill>
+                  <a:srgbClr val="FFFFFF"/>
+                </a:solidFill>
+              </a14:hiddenFill>
+            </a:ext>
+          </a:extLst>
+        </p:spPr>
+      </p:pic>
+      <p:sp>
+        <p:nvSpPr>
+          <p:cNvPr id="12" name="Arrow: Right 11">
+            <a:extLst>
+              <a:ext uri="{FF2B5EF4-FFF2-40B4-BE49-F238E27FC236}">
+                <a16:creationId xmlns:a16="http://schemas.microsoft.com/office/drawing/2014/main" id="{3D73DAF1-78B2-4DFE-B2C3-255C187675A9}"/>
+              </a:ext>
+            </a:extLst>
+          </p:cNvPr>
+          <p:cNvSpPr/>
+          <p:nvPr/>
+        </p:nvSpPr>
+        <p:spPr>
+          <a:xfrm>
+            <a:off x="10645853" y="4964696"/>
+            <a:ext cx="583096" cy="570964"/>
+          </a:xfrm>
+          <a:prstGeom prst="rightArrow">
+            <a:avLst/>
+          </a:prstGeom>
+          <a:solidFill>
+            <a:schemeClr val="accent6">
+              <a:lumMod val="60000"/>
+              <a:lumOff val="40000"/>
+            </a:schemeClr>
+          </a:solidFill>
+        </p:spPr>
+        <p:style>
+          <a:lnRef idx="2">
+            <a:schemeClr val="accent1">
+              <a:shade val="50000"/>
+            </a:schemeClr>
+          </a:lnRef>
+          <a:fillRef idx="1">
+            <a:schemeClr val="accent1"/>
+          </a:fillRef>
+          <a:effectRef idx="0">
+            <a:schemeClr val="accent1"/>
+          </a:effectRef>
+          <a:fontRef idx="minor">
+            <a:schemeClr val="lt1"/>
+          </a:fontRef>
+        </p:style>
+        <p:txBody>
+          <a:bodyPr rtlCol="0" anchor="ctr"/>
+          <a:lstStyle/>
+          <a:p>
+            <a:pPr algn="ctr"/>
+            <a:endParaRPr lang="en-US"/>
+          </a:p>
+        </p:txBody>
+      </p:sp>
+      <p:sp>
+        <p:nvSpPr>
+          <p:cNvPr id="13" name="Arrow: Right 12">
+            <a:extLst>
+              <a:ext uri="{FF2B5EF4-FFF2-40B4-BE49-F238E27FC236}">
+                <a16:creationId xmlns:a16="http://schemas.microsoft.com/office/drawing/2014/main" id="{BFC5630C-E3EC-48F2-945D-6C8517B9D7FE}"/>
+              </a:ext>
+            </a:extLst>
+          </p:cNvPr>
+          <p:cNvSpPr/>
+          <p:nvPr/>
+        </p:nvSpPr>
+        <p:spPr>
+          <a:xfrm flipH="1">
+            <a:off x="632944" y="4964696"/>
+            <a:ext cx="583096" cy="570964"/>
+          </a:xfrm>
+          <a:prstGeom prst="rightArrow">
+            <a:avLst/>
+          </a:prstGeom>
+          <a:solidFill>
+            <a:schemeClr val="accent6">
+              <a:lumMod val="60000"/>
+              <a:lumOff val="40000"/>
+            </a:schemeClr>
+          </a:solidFill>
+        </p:spPr>
+        <p:style>
+          <a:lnRef idx="2">
+            <a:schemeClr val="accent1">
+              <a:shade val="50000"/>
+            </a:schemeClr>
+          </a:lnRef>
+          <a:fillRef idx="1">
+            <a:schemeClr val="accent1"/>
+          </a:fillRef>
+          <a:effectRef idx="0">
+            <a:schemeClr val="accent1"/>
+          </a:effectRef>
+          <a:fontRef idx="minor">
+            <a:schemeClr val="lt1"/>
+          </a:fontRef>
+        </p:style>
+        <p:txBody>
+          <a:bodyPr rtlCol="0" anchor="ctr"/>
+          <a:lstStyle/>
+          <a:p>
+            <a:pPr algn="ctr"/>
+            <a:endParaRPr lang="en-US"/>
+          </a:p>
+        </p:txBody>
+      </p:sp>
+      <p:pic>
+        <p:nvPicPr>
+          <p:cNvPr id="9" name="Picture 8" descr="A lit candle&#10;&#10;Description automatically generated">
+            <a:extLst>
+              <a:ext uri="{FF2B5EF4-FFF2-40B4-BE49-F238E27FC236}">
+                <a16:creationId xmlns:a16="http://schemas.microsoft.com/office/drawing/2014/main" id="{190CE886-59E9-4143-9D1C-85E8231DE554}"/>
+              </a:ext>
+            </a:extLst>
+          </p:cNvPr>
+          <p:cNvPicPr>
+            <a:picLocks noChangeAspect="1"/>
+          </p:cNvPicPr>
+          <p:nvPr/>
+        </p:nvPicPr>
+        <p:blipFill rotWithShape="1">
+          <a:blip r:embed="rId4">
+            <a:extLst>
+              <a:ext uri="{28A0092B-C50C-407E-A947-70E740481C1C}">
+                <a14:useLocalDpi xmlns:a14="http://schemas.microsoft.com/office/drawing/2010/main" val="0"/>
+              </a:ext>
+            </a:extLst>
+          </a:blip>
+          <a:srcRect r="79201"/>
+          <a:stretch/>
+        </p:blipFill>
+        <p:spPr>
+          <a:xfrm>
+            <a:off x="1546147" y="4404108"/>
+            <a:ext cx="1957445" cy="2170574"/>
+          </a:xfrm>
+          <a:prstGeom prst="rect">
+            <a:avLst/>
+          </a:prstGeom>
+        </p:spPr>
+      </p:pic>
+      <p:pic>
+        <p:nvPicPr>
+          <p:cNvPr id="11" name="Picture 10" descr="A lit candle&#10;&#10;Description automatically generated">
+            <a:extLst>
+              <a:ext uri="{FF2B5EF4-FFF2-40B4-BE49-F238E27FC236}">
+                <a16:creationId xmlns:a16="http://schemas.microsoft.com/office/drawing/2014/main" id="{62914F3B-5AAD-4304-9500-C592581B6C13}"/>
+              </a:ext>
+            </a:extLst>
+          </p:cNvPr>
+          <p:cNvPicPr>
+            <a:picLocks noChangeAspect="1"/>
+          </p:cNvPicPr>
+          <p:nvPr/>
+        </p:nvPicPr>
+        <p:blipFill rotWithShape="1">
+          <a:blip r:embed="rId4">
+            <a:extLst>
+              <a:ext uri="{28A0092B-C50C-407E-A947-70E740481C1C}">
+                <a14:useLocalDpi xmlns:a14="http://schemas.microsoft.com/office/drawing/2010/main" val="0"/>
+              </a:ext>
+            </a:extLst>
+          </a:blip>
+          <a:srcRect l="19985" r="60002"/>
+          <a:stretch/>
+        </p:blipFill>
+        <p:spPr>
+          <a:xfrm>
+            <a:off x="3769344" y="4399355"/>
+            <a:ext cx="1957445" cy="2170574"/>
+          </a:xfrm>
+          <a:prstGeom prst="rect">
+            <a:avLst/>
+          </a:prstGeom>
+        </p:spPr>
+      </p:pic>
+      <p:pic>
+        <p:nvPicPr>
+          <p:cNvPr id="19" name="Picture 18" descr="A lit candle&#10;&#10;Description automatically generated">
+            <a:extLst>
+              <a:ext uri="{FF2B5EF4-FFF2-40B4-BE49-F238E27FC236}">
+                <a16:creationId xmlns:a16="http://schemas.microsoft.com/office/drawing/2014/main" id="{6C9DF943-0607-4A0D-B440-867AF4EDD463}"/>
+              </a:ext>
+            </a:extLst>
+          </p:cNvPr>
+          <p:cNvPicPr>
+            <a:picLocks noChangeAspect="1"/>
+          </p:cNvPicPr>
+          <p:nvPr/>
+        </p:nvPicPr>
+        <p:blipFill rotWithShape="1">
+          <a:blip r:embed="rId4">
+            <a:extLst>
+              <a:ext uri="{28A0092B-C50C-407E-A947-70E740481C1C}">
+                <a14:useLocalDpi xmlns:a14="http://schemas.microsoft.com/office/drawing/2010/main" val="0"/>
+              </a:ext>
+            </a:extLst>
+          </a:blip>
+          <a:srcRect l="39998" r="39819"/>
+          <a:stretch/>
+        </p:blipFill>
+        <p:spPr>
+          <a:xfrm>
+            <a:off x="5992541" y="4383505"/>
+            <a:ext cx="1943381" cy="2202274"/>
+          </a:xfrm>
+          <a:prstGeom prst="rect">
+            <a:avLst/>
+          </a:prstGeom>
+        </p:spPr>
+      </p:pic>
+      <p:pic>
+        <p:nvPicPr>
+          <p:cNvPr id="22" name="Picture 21" descr="A lit candle&#10;&#10;Description automatically generated">
+            <a:extLst>
+              <a:ext uri="{FF2B5EF4-FFF2-40B4-BE49-F238E27FC236}">
+                <a16:creationId xmlns:a16="http://schemas.microsoft.com/office/drawing/2014/main" id="{B0904620-40D6-46B3-A41F-02C2D03E1912}"/>
+              </a:ext>
+            </a:extLst>
+          </p:cNvPr>
+          <p:cNvPicPr>
+            <a:picLocks noChangeAspect="1"/>
+          </p:cNvPicPr>
+          <p:nvPr/>
+        </p:nvPicPr>
+        <p:blipFill rotWithShape="1">
+          <a:blip r:embed="rId4">
+            <a:extLst>
+              <a:ext uri="{28A0092B-C50C-407E-A947-70E740481C1C}">
+                <a14:useLocalDpi xmlns:a14="http://schemas.microsoft.com/office/drawing/2010/main" val="0"/>
+              </a:ext>
+            </a:extLst>
+          </a:blip>
+          <a:srcRect l="60181" r="19395"/>
+          <a:stretch/>
+        </p:blipFill>
+        <p:spPr>
+          <a:xfrm>
+            <a:off x="8192849" y="4383505"/>
+            <a:ext cx="1929317" cy="2186424"/>
+          </a:xfrm>
+          <a:prstGeom prst="rect">
+            <a:avLst/>
+          </a:prstGeom>
+        </p:spPr>
+      </p:pic>
+      <p:sp>
+        <p:nvSpPr>
+          <p:cNvPr id="23" name="TextBox 22">
+            <a:extLst>
+              <a:ext uri="{FF2B5EF4-FFF2-40B4-BE49-F238E27FC236}">
+                <a16:creationId xmlns:a16="http://schemas.microsoft.com/office/drawing/2014/main" id="{31C8947A-DFBD-40A9-BAE2-B29F3C839A3E}"/>
+              </a:ext>
+            </a:extLst>
+          </p:cNvPr>
+          <p:cNvSpPr txBox="1"/>
+          <p:nvPr/>
+        </p:nvSpPr>
+        <p:spPr>
+          <a:xfrm>
+            <a:off x="1827112" y="756251"/>
+            <a:ext cx="3019866" cy="369332"/>
+          </a:xfrm>
+          <a:prstGeom prst="rect">
+            <a:avLst/>
+          </a:prstGeom>
+          <a:noFill/>
+        </p:spPr>
+        <p:txBody>
+          <a:bodyPr wrap="square" rtlCol="0">
+            <a:spAutoFit/>
+          </a:bodyPr>
+          <a:lstStyle/>
+          <a:p>
+            <a:r>
+              <a:rPr lang="en-US" b="1" dirty="0"/>
+              <a:t>PARAMENT COLOR: BLUE</a:t>
+            </a:r>
+          </a:p>
+        </p:txBody>
+      </p:sp>
+      <p:pic>
+        <p:nvPicPr>
+          <p:cNvPr id="25" name="Picture 24" descr="A close up of a device&#10;&#10;Description automatically generated">
+            <a:extLst>
+              <a:ext uri="{FF2B5EF4-FFF2-40B4-BE49-F238E27FC236}">
+                <a16:creationId xmlns:a16="http://schemas.microsoft.com/office/drawing/2014/main" id="{7D489111-23FF-427E-B846-8A788216876F}"/>
+              </a:ext>
+            </a:extLst>
+          </p:cNvPr>
+          <p:cNvPicPr>
+            <a:picLocks noChangeAspect="1"/>
+          </p:cNvPicPr>
+          <p:nvPr/>
+        </p:nvPicPr>
+        <p:blipFill rotWithShape="1">
+          <a:blip r:embed="rId5">
+            <a:extLst>
+              <a:ext uri="{28A0092B-C50C-407E-A947-70E740481C1C}">
+                <a14:useLocalDpi xmlns:a14="http://schemas.microsoft.com/office/drawing/2010/main" val="0"/>
+              </a:ext>
+            </a:extLst>
+          </a:blip>
+          <a:srcRect l="65760" t="12718" r="24721" b="21436"/>
+          <a:stretch/>
+        </p:blipFill>
+        <p:spPr>
+          <a:xfrm>
+            <a:off x="11514391" y="194465"/>
+            <a:ext cx="476773" cy="6375464"/>
+          </a:xfrm>
+          <a:prstGeom prst="rect">
+            <a:avLst/>
+          </a:prstGeom>
+        </p:spPr>
+      </p:pic>
+      <p:sp>
+        <p:nvSpPr>
+          <p:cNvPr id="30" name="Rectangle 29">
+            <a:extLst>
+              <a:ext uri="{FF2B5EF4-FFF2-40B4-BE49-F238E27FC236}">
+                <a16:creationId xmlns:a16="http://schemas.microsoft.com/office/drawing/2014/main" id="{4333F612-4490-4EBA-BD85-6EF611A833C7}"/>
+              </a:ext>
+            </a:extLst>
+          </p:cNvPr>
+          <p:cNvSpPr/>
+          <p:nvPr/>
+        </p:nvSpPr>
+        <p:spPr>
+          <a:xfrm>
+            <a:off x="5566142" y="272221"/>
+            <a:ext cx="1815548" cy="530087"/>
+          </a:xfrm>
+          <a:prstGeom prst="rect">
+            <a:avLst/>
+          </a:prstGeom>
+          <a:solidFill>
+            <a:schemeClr val="accent6">
+              <a:lumMod val="20000"/>
+              <a:lumOff val="80000"/>
+            </a:schemeClr>
+          </a:solidFill>
+          <a:ln>
+            <a:solidFill>
+              <a:schemeClr val="accent6"/>
+            </a:solidFill>
+          </a:ln>
+        </p:spPr>
+        <p:style>
+          <a:lnRef idx="2">
+            <a:schemeClr val="accent1">
+              <a:shade val="50000"/>
+            </a:schemeClr>
+          </a:lnRef>
+          <a:fillRef idx="1">
+            <a:schemeClr val="accent1"/>
+          </a:fillRef>
+          <a:effectRef idx="0">
+            <a:schemeClr val="accent1"/>
+          </a:effectRef>
+          <a:fontRef idx="minor">
+            <a:schemeClr val="lt1"/>
+          </a:fontRef>
+        </p:style>
+        <p:txBody>
+          <a:bodyPr rtlCol="0" anchor="ctr"/>
+          <a:lstStyle/>
+          <a:p>
+            <a:pPr algn="ctr"/>
+            <a:r>
+              <a:rPr lang="en-US" dirty="0">
+                <a:solidFill>
+                  <a:schemeClr val="tx1"/>
+                </a:solidFill>
+              </a:rPr>
+              <a:t>HOME</a:t>
+            </a:r>
+          </a:p>
+        </p:txBody>
+      </p:sp>
+      <p:sp>
+        <p:nvSpPr>
+          <p:cNvPr id="31" name="Rectangle 30">
+            <a:extLst>
+              <a:ext uri="{FF2B5EF4-FFF2-40B4-BE49-F238E27FC236}">
+                <a16:creationId xmlns:a16="http://schemas.microsoft.com/office/drawing/2014/main" id="{3C601B48-6C7F-4BBD-87F0-51D9DB29FF8E}"/>
+              </a:ext>
+            </a:extLst>
+          </p:cNvPr>
+          <p:cNvSpPr/>
+          <p:nvPr/>
+        </p:nvSpPr>
+        <p:spPr>
+          <a:xfrm>
+            <a:off x="7557753" y="272221"/>
+            <a:ext cx="1815548" cy="530087"/>
+          </a:xfrm>
+          <a:prstGeom prst="rect">
+            <a:avLst/>
+          </a:prstGeom>
+          <a:solidFill>
+            <a:schemeClr val="accent6">
+              <a:lumMod val="20000"/>
+              <a:lumOff val="80000"/>
+            </a:schemeClr>
+          </a:solidFill>
+          <a:ln>
+            <a:solidFill>
+              <a:schemeClr val="accent6"/>
+            </a:solidFill>
+          </a:ln>
+        </p:spPr>
+        <p:style>
+          <a:lnRef idx="2">
+            <a:schemeClr val="accent1">
+              <a:shade val="50000"/>
+            </a:schemeClr>
+          </a:lnRef>
+          <a:fillRef idx="1">
+            <a:schemeClr val="accent1"/>
+          </a:fillRef>
+          <a:effectRef idx="0">
+            <a:schemeClr val="accent1"/>
+          </a:effectRef>
+          <a:fontRef idx="minor">
+            <a:schemeClr val="lt1"/>
+          </a:fontRef>
+        </p:style>
+        <p:txBody>
+          <a:bodyPr rtlCol="0" anchor="ctr"/>
+          <a:lstStyle/>
+          <a:p>
+            <a:pPr algn="ctr"/>
+            <a:r>
+              <a:rPr lang="en-US" dirty="0">
+                <a:solidFill>
+                  <a:schemeClr val="tx1"/>
+                </a:solidFill>
+              </a:rPr>
+              <a:t>ALL EVENTS</a:t>
+            </a:r>
+          </a:p>
+        </p:txBody>
+      </p:sp>
+      <p:sp>
+        <p:nvSpPr>
+          <p:cNvPr id="32" name="Rectangle 31">
+            <a:extLst>
+              <a:ext uri="{FF2B5EF4-FFF2-40B4-BE49-F238E27FC236}">
+                <a16:creationId xmlns:a16="http://schemas.microsoft.com/office/drawing/2014/main" id="{DCD9FBD5-9343-4AD8-ACF8-DF56B5D60EA8}"/>
+              </a:ext>
+            </a:extLst>
+          </p:cNvPr>
+          <p:cNvSpPr/>
+          <p:nvPr/>
+        </p:nvSpPr>
+        <p:spPr>
+          <a:xfrm>
+            <a:off x="9504929" y="288071"/>
+            <a:ext cx="1815548" cy="530087"/>
+          </a:xfrm>
+          <a:prstGeom prst="rect">
+            <a:avLst/>
+          </a:prstGeom>
+          <a:solidFill>
+            <a:schemeClr val="accent6">
+              <a:lumMod val="20000"/>
+              <a:lumOff val="80000"/>
+            </a:schemeClr>
+          </a:solidFill>
+          <a:ln>
+            <a:solidFill>
+              <a:schemeClr val="accent6"/>
+            </a:solidFill>
+          </a:ln>
+        </p:spPr>
+        <p:style>
+          <a:lnRef idx="2">
+            <a:schemeClr val="accent1">
+              <a:shade val="50000"/>
+            </a:schemeClr>
+          </a:lnRef>
+          <a:fillRef idx="1">
+            <a:schemeClr val="accent1"/>
+          </a:fillRef>
+          <a:effectRef idx="0">
+            <a:schemeClr val="accent1"/>
+          </a:effectRef>
+          <a:fontRef idx="minor">
+            <a:schemeClr val="lt1"/>
+          </a:fontRef>
+        </p:style>
+        <p:txBody>
+          <a:bodyPr rtlCol="0" anchor="ctr"/>
+          <a:lstStyle/>
+          <a:p>
+            <a:pPr algn="ctr"/>
+            <a:r>
+              <a:rPr lang="en-US" dirty="0">
+                <a:solidFill>
+                  <a:schemeClr val="tx1"/>
+                </a:solidFill>
+              </a:rPr>
+              <a:t>MEMEBERS INFO</a:t>
+            </a:r>
+          </a:p>
+        </p:txBody>
+      </p:sp>
+    </p:spTree>
+    <p:extLst>
+      <p:ext uri="{BB962C8B-B14F-4D97-AF65-F5344CB8AC3E}">
+        <p14:creationId xmlns:p14="http://schemas.microsoft.com/office/powerpoint/2010/main" val="4276775428"/>
+      </p:ext>
+    </p:extLst>
+  </p:cSld>
+  <p:clrMapOvr>
+    <a:masterClrMapping/>
+  </p:clrMapOvr>
+</p:sld>
+</file>
+
+<file path=ppt/slides/slide7.xml><?xml version="1.0" encoding="utf-8"?>
+<p:sld xmlns:a="http://schemas.openxmlformats.org/drawingml/2006/main" xmlns:r="http://schemas.openxmlformats.org/officeDocument/2006/relationships" xmlns:p="http://schemas.openxmlformats.org/presentationml/2006/main">
+  <p:cSld>
+    <p:bg>
+      <p:bgPr>
+        <a:solidFill>
+          <a:schemeClr val="accent6">
+            <a:lumMod val="60000"/>
+            <a:lumOff val="40000"/>
+          </a:schemeClr>
+        </a:solidFill>
+        <a:effectLst/>
+      </p:bgPr>
+    </p:bg>
+    <p:spTree>
+      <p:nvGrpSpPr>
+        <p:cNvPr id="1" name=""/>
+        <p:cNvGrpSpPr/>
+        <p:nvPr/>
+      </p:nvGrpSpPr>
+      <p:grpSpPr>
+        <a:xfrm>
+          <a:off x="0" y="0"/>
+          <a:ext cx="0" cy="0"/>
+          <a:chOff x="0" y="0"/>
+          <a:chExt cx="0" cy="0"/>
+        </a:xfrm>
+      </p:grpSpPr>
+      <p:sp>
+        <p:nvSpPr>
+          <p:cNvPr id="7" name="Rectangle 6">
+            <a:extLst>
+              <a:ext uri="{FF2B5EF4-FFF2-40B4-BE49-F238E27FC236}">
+                <a16:creationId xmlns:a16="http://schemas.microsoft.com/office/drawing/2014/main" id="{329D1DFC-0BDC-4C7F-93FB-3A5E3CFD32FE}"/>
+              </a:ext>
+            </a:extLst>
+          </p:cNvPr>
+          <p:cNvSpPr/>
+          <p:nvPr/>
+        </p:nvSpPr>
+        <p:spPr>
+          <a:xfrm>
+            <a:off x="192258" y="113074"/>
+            <a:ext cx="11807484" cy="6478172"/>
+          </a:xfrm>
+          <a:prstGeom prst="rect">
+            <a:avLst/>
+          </a:prstGeom>
+          <a:solidFill>
+            <a:schemeClr val="accent6">
+              <a:lumMod val="20000"/>
+              <a:lumOff val="80000"/>
+            </a:schemeClr>
+          </a:solidFill>
+          <a:ln>
+            <a:solidFill>
+              <a:schemeClr val="accent6">
+                <a:lumMod val="75000"/>
+              </a:schemeClr>
+            </a:solidFill>
+          </a:ln>
+        </p:spPr>
+        <p:style>
+          <a:lnRef idx="2">
+            <a:schemeClr val="accent1">
+              <a:shade val="50000"/>
+            </a:schemeClr>
+          </a:lnRef>
+          <a:fillRef idx="1">
+            <a:schemeClr val="accent1"/>
+          </a:fillRef>
+          <a:effectRef idx="0">
+            <a:schemeClr val="accent1"/>
+          </a:effectRef>
+          <a:fontRef idx="minor">
+            <a:schemeClr val="lt1"/>
+          </a:fontRef>
+        </p:style>
+        <p:txBody>
+          <a:bodyPr rtlCol="0" anchor="ctr"/>
+          <a:lstStyle/>
+          <a:p>
+            <a:pPr algn="ctr"/>
+            <a:endParaRPr lang="en-US" dirty="0"/>
+          </a:p>
+        </p:txBody>
+      </p:sp>
+      <p:sp>
+        <p:nvSpPr>
+          <p:cNvPr id="8" name="Rectangle 7">
+            <a:extLst>
+              <a:ext uri="{FF2B5EF4-FFF2-40B4-BE49-F238E27FC236}">
+                <a16:creationId xmlns:a16="http://schemas.microsoft.com/office/drawing/2014/main" id="{128312AA-5925-4A0B-B507-263A675E98BE}"/>
+              </a:ext>
+            </a:extLst>
+          </p:cNvPr>
+          <p:cNvSpPr/>
+          <p:nvPr/>
+        </p:nvSpPr>
+        <p:spPr>
+          <a:xfrm>
+            <a:off x="5647008" y="370958"/>
+            <a:ext cx="1815548" cy="530087"/>
+          </a:xfrm>
+          <a:prstGeom prst="rect">
+            <a:avLst/>
+          </a:prstGeom>
+          <a:solidFill>
+            <a:schemeClr val="accent6">
+              <a:lumMod val="20000"/>
+              <a:lumOff val="80000"/>
+            </a:schemeClr>
+          </a:solidFill>
+          <a:ln>
+            <a:solidFill>
+              <a:schemeClr val="accent6"/>
+            </a:solidFill>
+          </a:ln>
+        </p:spPr>
+        <p:style>
+          <a:lnRef idx="2">
+            <a:schemeClr val="accent1">
+              <a:shade val="50000"/>
+            </a:schemeClr>
+          </a:lnRef>
+          <a:fillRef idx="1">
+            <a:schemeClr val="accent1"/>
+          </a:fillRef>
+          <a:effectRef idx="0">
+            <a:schemeClr val="accent1"/>
+          </a:effectRef>
+          <a:fontRef idx="minor">
+            <a:schemeClr val="lt1"/>
+          </a:fontRef>
+        </p:style>
+        <p:txBody>
+          <a:bodyPr rtlCol="0" anchor="ctr"/>
+          <a:lstStyle/>
+          <a:p>
+            <a:pPr algn="ctr"/>
+            <a:r>
+              <a:rPr lang="en-US" dirty="0">
+                <a:solidFill>
+                  <a:schemeClr val="tx1"/>
+                </a:solidFill>
+              </a:rPr>
+              <a:t>HOME</a:t>
+            </a:r>
+          </a:p>
+        </p:txBody>
+      </p:sp>
+      <p:sp>
+        <p:nvSpPr>
+          <p:cNvPr id="9" name="Rectangle 8">
+            <a:extLst>
+              <a:ext uri="{FF2B5EF4-FFF2-40B4-BE49-F238E27FC236}">
+                <a16:creationId xmlns:a16="http://schemas.microsoft.com/office/drawing/2014/main" id="{31C9F227-E895-410B-A2EF-FE7D015E2DF9}"/>
+              </a:ext>
+            </a:extLst>
+          </p:cNvPr>
+          <p:cNvSpPr/>
+          <p:nvPr/>
+        </p:nvSpPr>
+        <p:spPr>
+          <a:xfrm>
+            <a:off x="7577179" y="362274"/>
+            <a:ext cx="1815548" cy="530087"/>
+          </a:xfrm>
+          <a:prstGeom prst="rect">
+            <a:avLst/>
+          </a:prstGeom>
+          <a:solidFill>
+            <a:schemeClr val="accent6">
+              <a:lumMod val="20000"/>
+              <a:lumOff val="80000"/>
+            </a:schemeClr>
+          </a:solidFill>
+          <a:ln>
+            <a:solidFill>
+              <a:schemeClr val="accent6"/>
+            </a:solidFill>
+          </a:ln>
+        </p:spPr>
+        <p:style>
+          <a:lnRef idx="2">
+            <a:schemeClr val="accent1">
+              <a:shade val="50000"/>
+            </a:schemeClr>
+          </a:lnRef>
+          <a:fillRef idx="1">
+            <a:schemeClr val="accent1"/>
+          </a:fillRef>
+          <a:effectRef idx="0">
+            <a:schemeClr val="accent1"/>
+          </a:effectRef>
+          <a:fontRef idx="minor">
+            <a:schemeClr val="lt1"/>
+          </a:fontRef>
+        </p:style>
+        <p:txBody>
+          <a:bodyPr rtlCol="0" anchor="ctr"/>
+          <a:lstStyle/>
+          <a:p>
+            <a:pPr algn="ctr"/>
+            <a:r>
+              <a:rPr lang="en-US" dirty="0">
+                <a:solidFill>
+                  <a:schemeClr val="tx1"/>
+                </a:solidFill>
+              </a:rPr>
+              <a:t>ALL EVENTS</a:t>
+            </a:r>
+          </a:p>
+        </p:txBody>
+      </p:sp>
+      <p:sp>
+        <p:nvSpPr>
+          <p:cNvPr id="10" name="Rectangle 9">
+            <a:extLst>
+              <a:ext uri="{FF2B5EF4-FFF2-40B4-BE49-F238E27FC236}">
+                <a16:creationId xmlns:a16="http://schemas.microsoft.com/office/drawing/2014/main" id="{F6D23995-D349-4CB0-A1B6-9EED5EC57B2E}"/>
+              </a:ext>
+            </a:extLst>
+          </p:cNvPr>
+          <p:cNvSpPr/>
+          <p:nvPr/>
+        </p:nvSpPr>
+        <p:spPr>
+          <a:xfrm>
+            <a:off x="9519515" y="370958"/>
+            <a:ext cx="1815548" cy="530087"/>
+          </a:xfrm>
+          <a:prstGeom prst="rect">
+            <a:avLst/>
+          </a:prstGeom>
+          <a:solidFill>
+            <a:schemeClr val="accent6">
+              <a:lumMod val="20000"/>
+              <a:lumOff val="80000"/>
+            </a:schemeClr>
+          </a:solidFill>
+          <a:ln>
+            <a:solidFill>
+              <a:schemeClr val="accent6"/>
+            </a:solidFill>
+          </a:ln>
+        </p:spPr>
+        <p:style>
+          <a:lnRef idx="2">
+            <a:schemeClr val="accent1">
+              <a:shade val="50000"/>
+            </a:schemeClr>
+          </a:lnRef>
+          <a:fillRef idx="1">
+            <a:schemeClr val="accent1"/>
+          </a:fillRef>
+          <a:effectRef idx="0">
+            <a:schemeClr val="accent1"/>
+          </a:effectRef>
+          <a:fontRef idx="minor">
+            <a:schemeClr val="lt1"/>
+          </a:fontRef>
+        </p:style>
+        <p:txBody>
+          <a:bodyPr rtlCol="0" anchor="ctr"/>
+          <a:lstStyle/>
+          <a:p>
+            <a:pPr algn="ctr"/>
+            <a:r>
+              <a:rPr lang="en-US" dirty="0">
+                <a:solidFill>
+                  <a:schemeClr val="tx1"/>
+                </a:solidFill>
+              </a:rPr>
+              <a:t>MEMEBERS INFO</a:t>
+            </a:r>
+          </a:p>
+        </p:txBody>
+      </p:sp>
+      <p:sp>
+        <p:nvSpPr>
+          <p:cNvPr id="11" name="Rectangle 10">
+            <a:extLst>
+              <a:ext uri="{FF2B5EF4-FFF2-40B4-BE49-F238E27FC236}">
+                <a16:creationId xmlns:a16="http://schemas.microsoft.com/office/drawing/2014/main" id="{612D8E3D-9A4E-4A6D-A8A7-6F79FC366AAE}"/>
+              </a:ext>
+            </a:extLst>
+          </p:cNvPr>
+          <p:cNvSpPr/>
+          <p:nvPr/>
+        </p:nvSpPr>
+        <p:spPr>
+          <a:xfrm>
+            <a:off x="334376" y="1168064"/>
+            <a:ext cx="2000035" cy="523220"/>
+          </a:xfrm>
+          <a:prstGeom prst="rect">
+            <a:avLst/>
+          </a:prstGeom>
+        </p:spPr>
+        <p:txBody>
+          <a:bodyPr wrap="none">
+            <a:spAutoFit/>
+          </a:bodyPr>
+          <a:lstStyle/>
+          <a:p>
+            <a:pPr algn="ctr"/>
+            <a:r>
+              <a:rPr lang="en-US" sz="2800" dirty="0">
+                <a:ln w="0"/>
+                <a:effectLst>
+                  <a:outerShdw blurRad="38100" dist="19050" dir="2700000" algn="tl" rotWithShape="0">
+                    <a:schemeClr val="dk1">
+                      <a:alpha val="40000"/>
+                    </a:schemeClr>
+                  </a:outerShdw>
+                </a:effectLst>
+              </a:rPr>
+              <a:t>CHRISTMAS:</a:t>
+            </a:r>
+          </a:p>
+        </p:txBody>
+      </p:sp>
+      <p:sp>
+        <p:nvSpPr>
+          <p:cNvPr id="12" name="Arrow: Right 11">
+            <a:extLst>
+              <a:ext uri="{FF2B5EF4-FFF2-40B4-BE49-F238E27FC236}">
+                <a16:creationId xmlns:a16="http://schemas.microsoft.com/office/drawing/2014/main" id="{DBA5F899-39F2-4980-B1A6-3E2E63788B2C}"/>
+              </a:ext>
+            </a:extLst>
+          </p:cNvPr>
+          <p:cNvSpPr/>
+          <p:nvPr/>
+        </p:nvSpPr>
+        <p:spPr>
+          <a:xfrm>
+            <a:off x="10803881" y="3902265"/>
+            <a:ext cx="583096" cy="570964"/>
+          </a:xfrm>
+          <a:prstGeom prst="rightArrow">
+            <a:avLst/>
+          </a:prstGeom>
+          <a:solidFill>
+            <a:schemeClr val="accent6">
+              <a:lumMod val="60000"/>
+              <a:lumOff val="40000"/>
+            </a:schemeClr>
+          </a:solidFill>
+        </p:spPr>
+        <p:style>
+          <a:lnRef idx="2">
+            <a:schemeClr val="accent1">
+              <a:shade val="50000"/>
+            </a:schemeClr>
+          </a:lnRef>
+          <a:fillRef idx="1">
+            <a:schemeClr val="accent1"/>
+          </a:fillRef>
+          <a:effectRef idx="0">
+            <a:schemeClr val="accent1"/>
+          </a:effectRef>
+          <a:fontRef idx="minor">
+            <a:schemeClr val="lt1"/>
+          </a:fontRef>
+        </p:style>
+        <p:txBody>
+          <a:bodyPr rtlCol="0" anchor="ctr"/>
+          <a:lstStyle/>
+          <a:p>
+            <a:pPr algn="ctr"/>
+            <a:endParaRPr lang="en-US"/>
+          </a:p>
+        </p:txBody>
+      </p:sp>
+      <p:sp>
+        <p:nvSpPr>
+          <p:cNvPr id="13" name="Arrow: Right 12">
+            <a:extLst>
+              <a:ext uri="{FF2B5EF4-FFF2-40B4-BE49-F238E27FC236}">
+                <a16:creationId xmlns:a16="http://schemas.microsoft.com/office/drawing/2014/main" id="{FA6FDF67-8880-4AF8-8BEC-5D836AB95550}"/>
+              </a:ext>
+            </a:extLst>
+          </p:cNvPr>
+          <p:cNvSpPr/>
+          <p:nvPr/>
+        </p:nvSpPr>
+        <p:spPr>
+          <a:xfrm flipH="1">
+            <a:off x="433245" y="3951823"/>
+            <a:ext cx="583096" cy="570964"/>
+          </a:xfrm>
+          <a:prstGeom prst="rightArrow">
+            <a:avLst/>
+          </a:prstGeom>
+          <a:solidFill>
+            <a:schemeClr val="accent6">
+              <a:lumMod val="60000"/>
+              <a:lumOff val="40000"/>
+            </a:schemeClr>
+          </a:solidFill>
+        </p:spPr>
+        <p:style>
+          <a:lnRef idx="2">
+            <a:schemeClr val="accent1">
+              <a:shade val="50000"/>
+            </a:schemeClr>
+          </a:lnRef>
+          <a:fillRef idx="1">
+            <a:schemeClr val="accent1"/>
+          </a:fillRef>
+          <a:effectRef idx="0">
+            <a:schemeClr val="accent1"/>
+          </a:effectRef>
+          <a:fontRef idx="minor">
+            <a:schemeClr val="lt1"/>
+          </a:fontRef>
+        </p:style>
+        <p:txBody>
+          <a:bodyPr rtlCol="0" anchor="ctr"/>
+          <a:lstStyle/>
+          <a:p>
+            <a:pPr algn="ctr"/>
+            <a:endParaRPr lang="en-US"/>
+          </a:p>
+        </p:txBody>
+      </p:sp>
+      <p:pic>
+        <p:nvPicPr>
+          <p:cNvPr id="14" name="Picture 13" descr="A close up of a sign&#10;&#10;Description automatically generated">
+            <a:extLst>
+              <a:ext uri="{FF2B5EF4-FFF2-40B4-BE49-F238E27FC236}">
+                <a16:creationId xmlns:a16="http://schemas.microsoft.com/office/drawing/2014/main" id="{EE5EF126-B4E0-48B7-B02B-9138070D8065}"/>
+              </a:ext>
+            </a:extLst>
+          </p:cNvPr>
+          <p:cNvPicPr>
+            <a:picLocks noChangeAspect="1"/>
+          </p:cNvPicPr>
+          <p:nvPr/>
+        </p:nvPicPr>
+        <p:blipFill rotWithShape="1">
+          <a:blip r:embed="rId2">
+            <a:extLst>
+              <a:ext uri="{28A0092B-C50C-407E-A947-70E740481C1C}">
+                <a14:useLocalDpi xmlns:a14="http://schemas.microsoft.com/office/drawing/2010/main" val="0"/>
+              </a:ext>
+            </a:extLst>
+          </a:blip>
+          <a:srcRect l="-206" t="230" r="56299" b="12962"/>
+          <a:stretch/>
+        </p:blipFill>
+        <p:spPr>
+          <a:xfrm>
+            <a:off x="1334394" y="3447078"/>
+            <a:ext cx="1957445" cy="2170574"/>
+          </a:xfrm>
+          <a:prstGeom prst="rect">
+            <a:avLst/>
+          </a:prstGeom>
+        </p:spPr>
+      </p:pic>
+      <p:pic>
+        <p:nvPicPr>
+          <p:cNvPr id="15" name="Picture 14" descr="A close up of a sign&#10;&#10;Description automatically generated">
+            <a:extLst>
+              <a:ext uri="{FF2B5EF4-FFF2-40B4-BE49-F238E27FC236}">
+                <a16:creationId xmlns:a16="http://schemas.microsoft.com/office/drawing/2014/main" id="{466A9B6C-3C1F-4A53-9002-45832CD7C680}"/>
+              </a:ext>
+            </a:extLst>
+          </p:cNvPr>
+          <p:cNvPicPr>
+            <a:picLocks noChangeAspect="1"/>
+          </p:cNvPicPr>
+          <p:nvPr/>
+        </p:nvPicPr>
+        <p:blipFill rotWithShape="1">
+          <a:blip r:embed="rId2">
+            <a:extLst>
+              <a:ext uri="{28A0092B-C50C-407E-A947-70E740481C1C}">
+                <a14:useLocalDpi xmlns:a14="http://schemas.microsoft.com/office/drawing/2010/main" val="0"/>
+              </a:ext>
+            </a:extLst>
+          </a:blip>
+          <a:srcRect l="58785" b="13885"/>
+          <a:stretch/>
+        </p:blipFill>
+        <p:spPr>
+          <a:xfrm>
+            <a:off x="3721022" y="3400867"/>
+            <a:ext cx="1970697" cy="2192800"/>
+          </a:xfrm>
+          <a:prstGeom prst="rect">
+            <a:avLst/>
+          </a:prstGeom>
+        </p:spPr>
+      </p:pic>
+      <p:pic>
+        <p:nvPicPr>
+          <p:cNvPr id="16" name="Picture 15" descr="A close up of a sign&#10;&#10;Description automatically generated">
+            <a:extLst>
+              <a:ext uri="{FF2B5EF4-FFF2-40B4-BE49-F238E27FC236}">
+                <a16:creationId xmlns:a16="http://schemas.microsoft.com/office/drawing/2014/main" id="{7E870CBB-039C-4FF7-BEC5-AEA116A50FAA}"/>
+              </a:ext>
+            </a:extLst>
+          </p:cNvPr>
+          <p:cNvPicPr>
+            <a:picLocks noChangeAspect="1"/>
+          </p:cNvPicPr>
+          <p:nvPr/>
+        </p:nvPicPr>
+        <p:blipFill rotWithShape="1">
+          <a:blip r:embed="rId3">
+            <a:extLst>
+              <a:ext uri="{28A0092B-C50C-407E-A947-70E740481C1C}">
+                <a14:useLocalDpi xmlns:a14="http://schemas.microsoft.com/office/drawing/2010/main" val="0"/>
+              </a:ext>
+            </a:extLst>
+          </a:blip>
+          <a:srcRect l="2229" r="66983"/>
+          <a:stretch/>
+        </p:blipFill>
+        <p:spPr>
+          <a:xfrm>
+            <a:off x="6053004" y="3314451"/>
+            <a:ext cx="1970696" cy="2279082"/>
+          </a:xfrm>
+          <a:prstGeom prst="rect">
+            <a:avLst/>
+          </a:prstGeom>
+        </p:spPr>
+      </p:pic>
+      <p:pic>
+        <p:nvPicPr>
+          <p:cNvPr id="17" name="Picture 16">
+            <a:extLst>
+              <a:ext uri="{FF2B5EF4-FFF2-40B4-BE49-F238E27FC236}">
+                <a16:creationId xmlns:a16="http://schemas.microsoft.com/office/drawing/2014/main" id="{E1D39AB0-3BAD-4890-9EF3-998BCCDBBDF7}"/>
+              </a:ext>
+            </a:extLst>
+          </p:cNvPr>
+          <p:cNvPicPr>
+            <a:picLocks noChangeAspect="1"/>
+          </p:cNvPicPr>
+          <p:nvPr/>
+        </p:nvPicPr>
+        <p:blipFill rotWithShape="1">
+          <a:blip r:embed="rId3">
+            <a:extLst>
+              <a:ext uri="{28A0092B-C50C-407E-A947-70E740481C1C}">
+                <a14:useLocalDpi xmlns:a14="http://schemas.microsoft.com/office/drawing/2010/main" val="0"/>
+              </a:ext>
+            </a:extLst>
+          </a:blip>
+          <a:srcRect l="34123" r="34740"/>
+          <a:stretch/>
+        </p:blipFill>
+        <p:spPr>
+          <a:xfrm>
+            <a:off x="8475397" y="3352160"/>
+            <a:ext cx="1951892" cy="2265491"/>
+          </a:xfrm>
+          <a:prstGeom prst="rect">
+            <a:avLst/>
+          </a:prstGeom>
+        </p:spPr>
+      </p:pic>
+      <p:graphicFrame>
+        <p:nvGraphicFramePr>
+          <p:cNvPr id="18" name="Table 17">
+            <a:extLst>
+              <a:ext uri="{FF2B5EF4-FFF2-40B4-BE49-F238E27FC236}">
+                <a16:creationId xmlns:a16="http://schemas.microsoft.com/office/drawing/2014/main" id="{6D4BED6D-B000-413F-B02D-F1EF60CCC779}"/>
+              </a:ext>
+            </a:extLst>
+          </p:cNvPr>
+          <p:cNvGraphicFramePr>
+            <a:graphicFrameLocks noGrp="1"/>
+          </p:cNvGraphicFramePr>
+          <p:nvPr>
+            <p:extLst>
+              <p:ext uri="{D42A27DB-BD31-4B8C-83A1-F6EECF244321}">
+                <p14:modId xmlns:p14="http://schemas.microsoft.com/office/powerpoint/2010/main" val="728742402"/>
+              </p:ext>
+            </p:extLst>
+          </p:nvPr>
+        </p:nvGraphicFramePr>
+        <p:xfrm>
+          <a:off x="547358" y="1834657"/>
+          <a:ext cx="10787705" cy="1112520"/>
+        </p:xfrm>
+        <a:graphic>
+          <a:graphicData uri="http://schemas.openxmlformats.org/drawingml/2006/table">
+            <a:tbl>
+              <a:tblPr firstRow="1" bandRow="1">
+                <a:tableStyleId>{5C22544A-7EE6-4342-B048-85BDC9FD1C3A}</a:tableStyleId>
+              </a:tblPr>
+              <a:tblGrid>
+                <a:gridCol w="2157541">
+                  <a:extLst>
+                    <a:ext uri="{9D8B030D-6E8A-4147-A177-3AD203B41FA5}">
+                      <a16:colId xmlns:a16="http://schemas.microsoft.com/office/drawing/2014/main" val="3238167903"/>
+                    </a:ext>
+                  </a:extLst>
+                </a:gridCol>
+                <a:gridCol w="2157541">
+                  <a:extLst>
+                    <a:ext uri="{9D8B030D-6E8A-4147-A177-3AD203B41FA5}">
+                      <a16:colId xmlns:a16="http://schemas.microsoft.com/office/drawing/2014/main" val="263153752"/>
+                    </a:ext>
+                  </a:extLst>
+                </a:gridCol>
+                <a:gridCol w="2157541">
+                  <a:extLst>
+                    <a:ext uri="{9D8B030D-6E8A-4147-A177-3AD203B41FA5}">
+                      <a16:colId xmlns:a16="http://schemas.microsoft.com/office/drawing/2014/main" val="694582284"/>
+                    </a:ext>
+                  </a:extLst>
+                </a:gridCol>
+                <a:gridCol w="2157541">
+                  <a:extLst>
+                    <a:ext uri="{9D8B030D-6E8A-4147-A177-3AD203B41FA5}">
+                      <a16:colId xmlns:a16="http://schemas.microsoft.com/office/drawing/2014/main" val="4271785852"/>
+                    </a:ext>
+                  </a:extLst>
+                </a:gridCol>
+                <a:gridCol w="2157541">
+                  <a:extLst>
+                    <a:ext uri="{9D8B030D-6E8A-4147-A177-3AD203B41FA5}">
+                      <a16:colId xmlns:a16="http://schemas.microsoft.com/office/drawing/2014/main" val="3739566414"/>
+                    </a:ext>
+                  </a:extLst>
+                </a:gridCol>
+              </a:tblGrid>
+              <a:tr h="370840">
+                <a:tc>
+                  <a:txBody>
+                    <a:bodyPr/>
+                    <a:lstStyle/>
+                    <a:p>
+                      <a:r>
+                        <a:rPr lang="en-US" dirty="0"/>
+                        <a:t>DATE</a:t>
+                      </a:r>
+                    </a:p>
+                  </a:txBody>
+                  <a:tcPr/>
+                </a:tc>
+                <a:tc>
+                  <a:txBody>
+                    <a:bodyPr/>
+                    <a:lstStyle/>
+                    <a:p>
+                      <a:r>
+                        <a:rPr lang="en-US" dirty="0"/>
+                        <a:t>FESTIVAL</a:t>
+                      </a:r>
+                    </a:p>
+                  </a:txBody>
+                  <a:tcPr/>
+                </a:tc>
+                <a:tc>
+                  <a:txBody>
+                    <a:bodyPr/>
+                    <a:lstStyle/>
+                    <a:p>
+                      <a:r>
+                        <a:rPr lang="en-US" dirty="0"/>
+                        <a:t>FIRST READING</a:t>
+                      </a:r>
+                    </a:p>
+                  </a:txBody>
+                  <a:tcPr/>
+                </a:tc>
+                <a:tc>
+                  <a:txBody>
+                    <a:bodyPr/>
+                    <a:lstStyle/>
+                    <a:p>
+                      <a:r>
+                        <a:rPr lang="en-US" dirty="0"/>
+                        <a:t>EPISTLE</a:t>
+                      </a:r>
+                    </a:p>
+                  </a:txBody>
+                  <a:tcPr/>
+                </a:tc>
+                <a:tc>
+                  <a:txBody>
+                    <a:bodyPr/>
+                    <a:lstStyle/>
+                    <a:p>
+                      <a:r>
+                        <a:rPr lang="en-US" dirty="0"/>
+                        <a:t>GOSPEL</a:t>
+                      </a:r>
+                    </a:p>
+                  </a:txBody>
+                  <a:tcPr/>
+                </a:tc>
+                <a:extLst>
+                  <a:ext uri="{0D108BD9-81ED-4DB2-BD59-A6C34878D82A}">
+                    <a16:rowId xmlns:a16="http://schemas.microsoft.com/office/drawing/2014/main" val="2348208358"/>
+                  </a:ext>
+                </a:extLst>
+              </a:tr>
+              <a:tr h="370840">
+                <a:tc>
+                  <a:txBody>
+                    <a:bodyPr/>
+                    <a:lstStyle/>
+                    <a:p>
+                      <a:r>
+                        <a:rPr lang="en-US" dirty="0"/>
+                        <a:t>DEC 25</a:t>
+                      </a:r>
+                    </a:p>
+                  </a:txBody>
+                  <a:tcPr/>
+                </a:tc>
+                <a:tc>
+                  <a:txBody>
+                    <a:bodyPr/>
+                    <a:lstStyle/>
+                    <a:p>
+                      <a:r>
+                        <a:rPr lang="en-US" dirty="0"/>
+                        <a:t>CHIRSTMAS DAY</a:t>
+                      </a:r>
+                    </a:p>
+                  </a:txBody>
+                  <a:tcPr/>
+                </a:tc>
+                <a:tc>
+                  <a:txBody>
+                    <a:bodyPr/>
+                    <a:lstStyle/>
+                    <a:p>
+                      <a:r>
+                        <a:rPr lang="en-US" dirty="0"/>
+                        <a:t>IS. 52:7-10</a:t>
+                      </a:r>
+                    </a:p>
+                  </a:txBody>
+                  <a:tcPr/>
+                </a:tc>
+                <a:tc>
+                  <a:txBody>
+                    <a:bodyPr/>
+                    <a:lstStyle/>
+                    <a:p>
+                      <a:r>
+                        <a:rPr lang="en-US" dirty="0"/>
+                        <a:t>Heb. 1:1-6(7-12)</a:t>
+                      </a:r>
+                    </a:p>
+                  </a:txBody>
+                  <a:tcPr/>
+                </a:tc>
+                <a:tc>
+                  <a:txBody>
+                    <a:bodyPr/>
+                    <a:lstStyle/>
+                    <a:p>
+                      <a:r>
+                        <a:rPr lang="en-US" dirty="0"/>
+                        <a:t>John 1:1-14(15-18)</a:t>
+                      </a:r>
+                    </a:p>
+                  </a:txBody>
+                  <a:tcPr/>
+                </a:tc>
+                <a:extLst>
+                  <a:ext uri="{0D108BD9-81ED-4DB2-BD59-A6C34878D82A}">
+                    <a16:rowId xmlns:a16="http://schemas.microsoft.com/office/drawing/2014/main" val="4208648788"/>
+                  </a:ext>
+                </a:extLst>
+              </a:tr>
+              <a:tr h="370840">
+                <a:tc>
+                  <a:txBody>
+                    <a:bodyPr/>
+                    <a:lstStyle/>
+                    <a:p>
+                      <a:r>
+                        <a:rPr lang="en-US" dirty="0"/>
+                        <a:t>DEC 30</a:t>
+                      </a:r>
+                    </a:p>
+                  </a:txBody>
+                  <a:tcPr/>
+                </a:tc>
+                <a:tc>
+                  <a:txBody>
+                    <a:bodyPr/>
+                    <a:lstStyle/>
+                    <a:p>
+                      <a:endParaRPr lang="en-US" dirty="0"/>
+                    </a:p>
+                  </a:txBody>
+                  <a:tcPr/>
+                </a:tc>
+                <a:tc>
+                  <a:txBody>
+                    <a:bodyPr/>
+                    <a:lstStyle/>
+                    <a:p>
+                      <a:endParaRPr lang="en-US"/>
+                    </a:p>
+                  </a:txBody>
+                  <a:tcPr/>
+                </a:tc>
+                <a:tc>
+                  <a:txBody>
+                    <a:bodyPr/>
+                    <a:lstStyle/>
+                    <a:p>
+                      <a:endParaRPr lang="en-US"/>
+                    </a:p>
+                  </a:txBody>
+                  <a:tcPr/>
+                </a:tc>
+                <a:tc>
+                  <a:txBody>
+                    <a:bodyPr/>
+                    <a:lstStyle/>
+                    <a:p>
+                      <a:endParaRPr lang="en-US" dirty="0"/>
+                    </a:p>
+                  </a:txBody>
+                  <a:tcPr/>
+                </a:tc>
+                <a:extLst>
+                  <a:ext uri="{0D108BD9-81ED-4DB2-BD59-A6C34878D82A}">
+                    <a16:rowId xmlns:a16="http://schemas.microsoft.com/office/drawing/2014/main" val="2050276933"/>
+                  </a:ext>
+                </a:extLst>
+              </a:tr>
+            </a:tbl>
+          </a:graphicData>
+        </a:graphic>
+      </p:graphicFrame>
+      <p:sp>
+        <p:nvSpPr>
+          <p:cNvPr id="19" name="TextBox 18">
+            <a:extLst>
+              <a:ext uri="{FF2B5EF4-FFF2-40B4-BE49-F238E27FC236}">
+                <a16:creationId xmlns:a16="http://schemas.microsoft.com/office/drawing/2014/main" id="{D5C75D91-B0AA-42DB-B021-D35FB139A524}"/>
+              </a:ext>
+            </a:extLst>
+          </p:cNvPr>
+          <p:cNvSpPr txBox="1"/>
+          <p:nvPr/>
+        </p:nvSpPr>
+        <p:spPr>
+          <a:xfrm>
+            <a:off x="2313116" y="1219773"/>
+            <a:ext cx="5561199" cy="400110"/>
+          </a:xfrm>
+          <a:prstGeom prst="rect">
+            <a:avLst/>
+          </a:prstGeom>
+          <a:noFill/>
+        </p:spPr>
+        <p:txBody>
+          <a:bodyPr wrap="square" rtlCol="0">
+            <a:spAutoFit/>
+          </a:bodyPr>
+          <a:lstStyle/>
+          <a:p>
+            <a:r>
+              <a:rPr lang="en-US" sz="2000" b="1" dirty="0"/>
+              <a:t>PARAMENT COLOR: WHITE</a:t>
+            </a:r>
+          </a:p>
+        </p:txBody>
+      </p:sp>
+      <p:pic>
+        <p:nvPicPr>
+          <p:cNvPr id="20" name="Picture 19" descr="A close up of a device&#10;&#10;Description automatically generated">
+            <a:extLst>
+              <a:ext uri="{FF2B5EF4-FFF2-40B4-BE49-F238E27FC236}">
+                <a16:creationId xmlns:a16="http://schemas.microsoft.com/office/drawing/2014/main" id="{0B28FB31-7C0D-4F1D-BEB8-B54D9BD317A7}"/>
+              </a:ext>
+            </a:extLst>
+          </p:cNvPr>
+          <p:cNvPicPr>
+            <a:picLocks noChangeAspect="1"/>
+          </p:cNvPicPr>
+          <p:nvPr/>
+        </p:nvPicPr>
+        <p:blipFill rotWithShape="1">
+          <a:blip r:embed="rId4">
+            <a:extLst>
+              <a:ext uri="{28A0092B-C50C-407E-A947-70E740481C1C}">
+                <a14:useLocalDpi xmlns:a14="http://schemas.microsoft.com/office/drawing/2010/main" val="0"/>
+              </a:ext>
+            </a:extLst>
+          </a:blip>
+          <a:srcRect l="65760" t="12718" r="24721" b="21436"/>
+          <a:stretch/>
+        </p:blipFill>
+        <p:spPr>
+          <a:xfrm>
+            <a:off x="11514391" y="194465"/>
+            <a:ext cx="476773" cy="6375464"/>
+          </a:xfrm>
+          <a:prstGeom prst="rect">
+            <a:avLst/>
+          </a:prstGeom>
+        </p:spPr>
+      </p:pic>
+      <p:sp>
+        <p:nvSpPr>
+          <p:cNvPr id="21" name="TextBox 20">
+            <a:extLst>
+              <a:ext uri="{FF2B5EF4-FFF2-40B4-BE49-F238E27FC236}">
+                <a16:creationId xmlns:a16="http://schemas.microsoft.com/office/drawing/2014/main" id="{C8444142-73C9-4C6B-8AEF-7995909C97B6}"/>
+              </a:ext>
+            </a:extLst>
+          </p:cNvPr>
+          <p:cNvSpPr txBox="1"/>
+          <p:nvPr/>
+        </p:nvSpPr>
+        <p:spPr>
+          <a:xfrm>
+            <a:off x="431967" y="504520"/>
+            <a:ext cx="3395003" cy="523220"/>
+          </a:xfrm>
+          <a:prstGeom prst="rect">
+            <a:avLst/>
+          </a:prstGeom>
+          <a:noFill/>
+        </p:spPr>
+        <p:txBody>
+          <a:bodyPr wrap="square" rtlCol="0">
+            <a:spAutoFit/>
+          </a:bodyPr>
+          <a:lstStyle/>
+          <a:p>
+            <a:r>
+              <a:rPr lang="en-US" sz="2800" dirty="0"/>
+              <a:t>ALL SEASONS:</a:t>
+            </a:r>
+          </a:p>
+        </p:txBody>
+      </p:sp>
+    </p:spTree>
+    <p:extLst>
+      <p:ext uri="{BB962C8B-B14F-4D97-AF65-F5344CB8AC3E}">
+        <p14:creationId xmlns:p14="http://schemas.microsoft.com/office/powerpoint/2010/main" val="3541158594"/>
+      </p:ext>
+    </p:extLst>
+  </p:cSld>
+  <p:clrMapOvr>
+    <a:masterClrMapping/>
+  </p:clrMapOvr>
+</p:sld>
+</file>
+
+<file path=ppt/slides/slide8.xml><?xml version="1.0" encoding="utf-8"?>
 <p:sld xmlns:a="http://schemas.openxmlformats.org/drawingml/2006/main" xmlns:r="http://schemas.openxmlformats.org/officeDocument/2006/relationships" xmlns:p="http://schemas.openxmlformats.org/presentationml/2006/main">
   <p:cSld>
     <p:bg>

</xml_diff>

<commit_message>
Power point prototype update with some of new requirements(select the church page, login page and home scroll functionality)
</commit_message>
<xml_diff>
--- a/Powerpoints/BannerManagment.pptx
+++ b/Powerpoints/BannerManagment.pptx
@@ -5,17 +5,18 @@
     <p:sldMasterId id="2147483648" r:id="rId1"/>
   </p:sldMasterIdLst>
   <p:notesMasterIdLst>
-    <p:notesMasterId r:id="rId10"/>
+    <p:notesMasterId r:id="rId11"/>
   </p:notesMasterIdLst>
   <p:sldIdLst>
-    <p:sldId id="257" r:id="rId2"/>
-    <p:sldId id="256" r:id="rId3"/>
-    <p:sldId id="261" r:id="rId4"/>
-    <p:sldId id="262" r:id="rId5"/>
-    <p:sldId id="258" r:id="rId6"/>
-    <p:sldId id="263" r:id="rId7"/>
-    <p:sldId id="264" r:id="rId8"/>
-    <p:sldId id="259" r:id="rId9"/>
+    <p:sldId id="265" r:id="rId2"/>
+    <p:sldId id="257" r:id="rId3"/>
+    <p:sldId id="256" r:id="rId4"/>
+    <p:sldId id="261" r:id="rId5"/>
+    <p:sldId id="262" r:id="rId6"/>
+    <p:sldId id="258" r:id="rId7"/>
+    <p:sldId id="263" r:id="rId8"/>
+    <p:sldId id="264" r:id="rId9"/>
+    <p:sldId id="259" r:id="rId10"/>
   </p:sldIdLst>
   <p:sldSz cx="12192000" cy="6858000"/>
   <p:notesSz cx="6858000" cy="9144000"/>
@@ -204,7 +205,7 @@
           <a:p>
             <a:fld id="{C6E956D7-A710-4769-B6DE-C39F782727B0}" type="datetimeFigureOut">
               <a:rPr lang="en-US" smtClean="0"/>
-              <a:t>6/19/2019</a:t>
+              <a:t>6/26/2019</a:t>
             </a:fld>
             <a:endParaRPr lang="en-US"/>
           </a:p>
@@ -539,7 +540,7 @@
           <a:p>
             <a:fld id="{72503EA9-976B-4FA9-888A-0FDD387A87E7}" type="slidenum">
               <a:rPr lang="en-US" smtClean="0"/>
-              <a:t>2</a:t>
+              <a:t>3</a:t>
             </a:fld>
             <a:endParaRPr lang="en-US"/>
           </a:p>
@@ -705,7 +706,7 @@
           <a:p>
             <a:fld id="{62881ACC-2D14-4FEA-B766-B07C5C643364}" type="datetimeFigureOut">
               <a:rPr lang="en-US" smtClean="0"/>
-              <a:t>6/19/2019</a:t>
+              <a:t>6/26/2019</a:t>
             </a:fld>
             <a:endParaRPr lang="en-US"/>
           </a:p>
@@ -903,7 +904,7 @@
           <a:p>
             <a:fld id="{62881ACC-2D14-4FEA-B766-B07C5C643364}" type="datetimeFigureOut">
               <a:rPr lang="en-US" smtClean="0"/>
-              <a:t>6/19/2019</a:t>
+              <a:t>6/26/2019</a:t>
             </a:fld>
             <a:endParaRPr lang="en-US"/>
           </a:p>
@@ -1111,7 +1112,7 @@
           <a:p>
             <a:fld id="{62881ACC-2D14-4FEA-B766-B07C5C643364}" type="datetimeFigureOut">
               <a:rPr lang="en-US" smtClean="0"/>
-              <a:t>6/19/2019</a:t>
+              <a:t>6/26/2019</a:t>
             </a:fld>
             <a:endParaRPr lang="en-US"/>
           </a:p>
@@ -1309,7 +1310,7 @@
           <a:p>
             <a:fld id="{62881ACC-2D14-4FEA-B766-B07C5C643364}" type="datetimeFigureOut">
               <a:rPr lang="en-US" smtClean="0"/>
-              <a:t>6/19/2019</a:t>
+              <a:t>6/26/2019</a:t>
             </a:fld>
             <a:endParaRPr lang="en-US"/>
           </a:p>
@@ -1584,7 +1585,7 @@
           <a:p>
             <a:fld id="{62881ACC-2D14-4FEA-B766-B07C5C643364}" type="datetimeFigureOut">
               <a:rPr lang="en-US" smtClean="0"/>
-              <a:t>6/19/2019</a:t>
+              <a:t>6/26/2019</a:t>
             </a:fld>
             <a:endParaRPr lang="en-US"/>
           </a:p>
@@ -1849,7 +1850,7 @@
           <a:p>
             <a:fld id="{62881ACC-2D14-4FEA-B766-B07C5C643364}" type="datetimeFigureOut">
               <a:rPr lang="en-US" smtClean="0"/>
-              <a:t>6/19/2019</a:t>
+              <a:t>6/26/2019</a:t>
             </a:fld>
             <a:endParaRPr lang="en-US"/>
           </a:p>
@@ -2261,7 +2262,7 @@
           <a:p>
             <a:fld id="{62881ACC-2D14-4FEA-B766-B07C5C643364}" type="datetimeFigureOut">
               <a:rPr lang="en-US" smtClean="0"/>
-              <a:t>6/19/2019</a:t>
+              <a:t>6/26/2019</a:t>
             </a:fld>
             <a:endParaRPr lang="en-US"/>
           </a:p>
@@ -2402,7 +2403,7 @@
           <a:p>
             <a:fld id="{62881ACC-2D14-4FEA-B766-B07C5C643364}" type="datetimeFigureOut">
               <a:rPr lang="en-US" smtClean="0"/>
-              <a:t>6/19/2019</a:t>
+              <a:t>6/26/2019</a:t>
             </a:fld>
             <a:endParaRPr lang="en-US"/>
           </a:p>
@@ -2515,7 +2516,7 @@
           <a:p>
             <a:fld id="{62881ACC-2D14-4FEA-B766-B07C5C643364}" type="datetimeFigureOut">
               <a:rPr lang="en-US" smtClean="0"/>
-              <a:t>6/19/2019</a:t>
+              <a:t>6/26/2019</a:t>
             </a:fld>
             <a:endParaRPr lang="en-US"/>
           </a:p>
@@ -2826,7 +2827,7 @@
           <a:p>
             <a:fld id="{62881ACC-2D14-4FEA-B766-B07C5C643364}" type="datetimeFigureOut">
               <a:rPr lang="en-US" smtClean="0"/>
-              <a:t>6/19/2019</a:t>
+              <a:t>6/26/2019</a:t>
             </a:fld>
             <a:endParaRPr lang="en-US"/>
           </a:p>
@@ -3114,7 +3115,7 @@
           <a:p>
             <a:fld id="{62881ACC-2D14-4FEA-B766-B07C5C643364}" type="datetimeFigureOut">
               <a:rPr lang="en-US" smtClean="0"/>
-              <a:t>6/19/2019</a:t>
+              <a:t>6/26/2019</a:t>
             </a:fld>
             <a:endParaRPr lang="en-US"/>
           </a:p>
@@ -3355,7 +3356,7 @@
           <a:p>
             <a:fld id="{62881ACC-2D14-4FEA-B766-B07C5C643364}" type="datetimeFigureOut">
               <a:rPr lang="en-US" smtClean="0"/>
-              <a:t>6/19/2019</a:t>
+              <a:t>6/26/2019</a:t>
             </a:fld>
             <a:endParaRPr lang="en-US"/>
           </a:p>
@@ -3758,6 +3759,16 @@
 <file path=ppt/slides/slide1.xml><?xml version="1.0" encoding="utf-8"?>
 <p:sld xmlns:a="http://schemas.openxmlformats.org/drawingml/2006/main" xmlns:r="http://schemas.openxmlformats.org/officeDocument/2006/relationships" xmlns:p="http://schemas.openxmlformats.org/presentationml/2006/main">
   <p:cSld>
+    <p:bg>
+      <p:bgPr>
+        <a:solidFill>
+          <a:schemeClr val="bg1">
+            <a:lumMod val="85000"/>
+          </a:schemeClr>
+        </a:solidFill>
+        <a:effectLst/>
+      </p:bgPr>
+    </p:bg>
     <p:spTree>
       <p:nvGrpSpPr>
         <p:cNvPr id="1" name=""/>
@@ -3774,6 +3785,419 @@
       </p:grpSpPr>
       <p:sp>
         <p:nvSpPr>
+          <p:cNvPr id="13" name="Rectangle 12">
+            <a:extLst>
+              <a:ext uri="{FF2B5EF4-FFF2-40B4-BE49-F238E27FC236}">
+                <a16:creationId xmlns:a16="http://schemas.microsoft.com/office/drawing/2014/main" id="{823AC064-BC96-4F32-8AE1-B2FD38754823}"/>
+              </a:ext>
+              <a:ext uri="{C183D7F6-B498-43B3-948B-1728B52AA6E4}">
+                <adec:decorative xmlns:adec="http://schemas.microsoft.com/office/drawing/2017/decorative" val="1"/>
+              </a:ext>
+            </a:extLst>
+          </p:cNvPr>
+          <p:cNvSpPr>
+            <a:spLocks noGrp="1" noRot="1" noChangeAspect="1" noMove="1" noResize="1" noEditPoints="1" noAdjustHandles="1" noChangeArrowheads="1" noChangeShapeType="1" noTextEdit="1"/>
+          </p:cNvSpPr>
+          <p:nvPr>
+            <p:extLst>
+              <p:ext uri="{386F3935-93C4-4BCD-93E2-E3B085C9AB24}">
+                <p16:designElem xmlns:p16="http://schemas.microsoft.com/office/powerpoint/2015/main" val="1"/>
+              </p:ext>
+            </p:extLst>
+          </p:nvPr>
+        </p:nvSpPr>
+        <p:spPr bwMode="ltGray">
+          <a:xfrm>
+            <a:off x="396882" y="280374"/>
+            <a:ext cx="11438793" cy="1844256"/>
+          </a:xfrm>
+          <a:prstGeom prst="rect">
+            <a:avLst/>
+          </a:prstGeom>
+          <a:solidFill>
+            <a:srgbClr val="404040"/>
+          </a:solidFill>
+          <a:ln w="127000" cap="sq" cmpd="thinThick">
+            <a:solidFill>
+              <a:srgbClr val="404040"/>
+            </a:solidFill>
+          </a:ln>
+        </p:spPr>
+        <p:style>
+          <a:lnRef idx="2">
+            <a:schemeClr val="accent1">
+              <a:shade val="50000"/>
+            </a:schemeClr>
+          </a:lnRef>
+          <a:fillRef idx="1">
+            <a:schemeClr val="accent1"/>
+          </a:fillRef>
+          <a:effectRef idx="0">
+            <a:schemeClr val="accent1"/>
+          </a:effectRef>
+          <a:fontRef idx="minor">
+            <a:schemeClr val="lt1"/>
+          </a:fontRef>
+        </p:style>
+        <p:txBody>
+          <a:bodyPr rtlCol="0" anchor="ctr"/>
+          <a:lstStyle/>
+          <a:p>
+            <a:pPr algn="ctr"/>
+            <a:endParaRPr lang="en-US"/>
+          </a:p>
+        </p:txBody>
+      </p:sp>
+      <p:sp>
+        <p:nvSpPr>
+          <p:cNvPr id="8" name="TextBox 7">
+            <a:extLst>
+              <a:ext uri="{FF2B5EF4-FFF2-40B4-BE49-F238E27FC236}">
+                <a16:creationId xmlns:a16="http://schemas.microsoft.com/office/drawing/2014/main" id="{C3996EAB-623F-4CF6-BED2-55F229F9EB8E}"/>
+              </a:ext>
+            </a:extLst>
+          </p:cNvPr>
+          <p:cNvSpPr txBox="1"/>
+          <p:nvPr/>
+        </p:nvSpPr>
+        <p:spPr>
+          <a:xfrm>
+            <a:off x="546351" y="433545"/>
+            <a:ext cx="11139854" cy="930447"/>
+          </a:xfrm>
+          <a:prstGeom prst="rect">
+            <a:avLst/>
+          </a:prstGeom>
+        </p:spPr>
+        <p:txBody>
+          <a:bodyPr vert="horz" lIns="91440" tIns="45720" rIns="91440" bIns="45720" rtlCol="0" anchor="b">
+            <a:normAutofit/>
+          </a:bodyPr>
+          <a:lstStyle/>
+          <a:p>
+            <a:pPr algn="ctr">
+              <a:lnSpc>
+                <a:spcPct val="90000"/>
+              </a:lnSpc>
+              <a:spcBef>
+                <a:spcPct val="0"/>
+              </a:spcBef>
+              <a:spcAft>
+                <a:spcPts val="600"/>
+              </a:spcAft>
+            </a:pPr>
+            <a:r>
+              <a:rPr lang="en-US" sz="5400" b="1">
+                <a:solidFill>
+                  <a:srgbClr val="FFFFFF"/>
+                </a:solidFill>
+                <a:latin typeface="+mj-lt"/>
+                <a:ea typeface="+mj-ea"/>
+                <a:cs typeface="+mj-cs"/>
+              </a:rPr>
+              <a:t>SELECT YOUR CHURCH</a:t>
+            </a:r>
+            <a:endParaRPr lang="en-US" sz="5400" b="1" dirty="0">
+              <a:solidFill>
+                <a:srgbClr val="FFFFFF"/>
+              </a:solidFill>
+              <a:latin typeface="+mj-lt"/>
+              <a:ea typeface="+mj-ea"/>
+              <a:cs typeface="+mj-cs"/>
+            </a:endParaRPr>
+          </a:p>
+        </p:txBody>
+      </p:sp>
+      <p:cxnSp>
+        <p:nvCxnSpPr>
+          <p:cNvPr id="15" name="Straight Connector 14">
+            <a:extLst>
+              <a:ext uri="{FF2B5EF4-FFF2-40B4-BE49-F238E27FC236}">
+                <a16:creationId xmlns:a16="http://schemas.microsoft.com/office/drawing/2014/main" id="{7E7C77BC-7138-40B1-A15B-20F57A494629}"/>
+              </a:ext>
+              <a:ext uri="{C183D7F6-B498-43B3-948B-1728B52AA6E4}">
+                <adec:decorative xmlns:adec="http://schemas.microsoft.com/office/drawing/2017/decorative" val="1"/>
+              </a:ext>
+            </a:extLst>
+          </p:cNvPr>
+          <p:cNvCxnSpPr>
+            <a:cxnSpLocks noGrp="1" noRot="1" noChangeAspect="1" noMove="1" noResize="1" noEditPoints="1" noAdjustHandles="1" noChangeArrowheads="1" noChangeShapeType="1"/>
+          </p:cNvCxnSpPr>
+          <p:nvPr>
+            <p:extLst>
+              <p:ext uri="{386F3935-93C4-4BCD-93E2-E3B085C9AB24}">
+                <p16:designElem xmlns:p16="http://schemas.microsoft.com/office/powerpoint/2015/main" val="1"/>
+              </p:ext>
+            </p:extLst>
+          </p:nvPr>
+        </p:nvCxnSpPr>
+        <p:spPr>
+          <a:xfrm>
+            <a:off x="2230078" y="1522292"/>
+            <a:ext cx="7772400" cy="0"/>
+          </a:xfrm>
+          <a:prstGeom prst="line">
+            <a:avLst/>
+          </a:prstGeom>
+          <a:ln w="22225">
+            <a:solidFill>
+              <a:srgbClr val="D9D9D9"/>
+            </a:solidFill>
+          </a:ln>
+        </p:spPr>
+        <p:style>
+          <a:lnRef idx="1">
+            <a:schemeClr val="accent1"/>
+          </a:lnRef>
+          <a:fillRef idx="0">
+            <a:schemeClr val="accent1"/>
+          </a:fillRef>
+          <a:effectRef idx="0">
+            <a:schemeClr val="accent1"/>
+          </a:effectRef>
+          <a:fontRef idx="minor">
+            <a:schemeClr val="tx1"/>
+          </a:fontRef>
+        </p:style>
+      </p:cxnSp>
+      <p:cxnSp>
+        <p:nvCxnSpPr>
+          <p:cNvPr id="17" name="Straight Connector 16">
+            <a:extLst>
+              <a:ext uri="{FF2B5EF4-FFF2-40B4-BE49-F238E27FC236}">
+                <a16:creationId xmlns:a16="http://schemas.microsoft.com/office/drawing/2014/main" id="{DB146403-F3D6-484B-B2ED-97F9565D0370}"/>
+              </a:ext>
+              <a:ext uri="{C183D7F6-B498-43B3-948B-1728B52AA6E4}">
+                <adec:decorative xmlns:adec="http://schemas.microsoft.com/office/drawing/2017/decorative" val="1"/>
+              </a:ext>
+            </a:extLst>
+          </p:cNvPr>
+          <p:cNvCxnSpPr>
+            <a:cxnSpLocks noGrp="1" noRot="1" noChangeAspect="1" noMove="1" noResize="1" noEditPoints="1" noAdjustHandles="1" noChangeArrowheads="1" noChangeShapeType="1"/>
+          </p:cNvCxnSpPr>
+          <p:nvPr>
+            <p:extLst>
+              <p:ext uri="{386F3935-93C4-4BCD-93E2-E3B085C9AB24}">
+                <p16:designElem xmlns:p16="http://schemas.microsoft.com/office/powerpoint/2015/main" val="1"/>
+              </p:ext>
+            </p:extLst>
+          </p:nvPr>
+        </p:nvCxnSpPr>
+        <p:spPr>
+          <a:xfrm>
+            <a:off x="6116278" y="2596836"/>
+            <a:ext cx="0" cy="3657600"/>
+          </a:xfrm>
+          <a:prstGeom prst="line">
+            <a:avLst/>
+          </a:prstGeom>
+          <a:ln w="101600" cmpd="dbl">
+            <a:solidFill>
+              <a:srgbClr val="595959"/>
+            </a:solidFill>
+          </a:ln>
+        </p:spPr>
+        <p:style>
+          <a:lnRef idx="1">
+            <a:schemeClr val="accent1"/>
+          </a:lnRef>
+          <a:fillRef idx="0">
+            <a:schemeClr val="accent1"/>
+          </a:fillRef>
+          <a:effectRef idx="0">
+            <a:schemeClr val="accent1"/>
+          </a:effectRef>
+          <a:fontRef idx="minor">
+            <a:schemeClr val="tx1"/>
+          </a:fontRef>
+        </p:style>
+      </p:cxnSp>
+      <p:pic>
+        <p:nvPicPr>
+          <p:cNvPr id="10" name="Picture 9" descr="A house with a lawn in front of a building&#10;&#10;Description automatically generated">
+            <a:extLst>
+              <a:ext uri="{FF2B5EF4-FFF2-40B4-BE49-F238E27FC236}">
+                <a16:creationId xmlns:a16="http://schemas.microsoft.com/office/drawing/2014/main" id="{E7391EC5-7F44-44A0-B0AF-7935FCF38C3F}"/>
+              </a:ext>
+            </a:extLst>
+          </p:cNvPr>
+          <p:cNvPicPr>
+            <a:picLocks noChangeAspect="1"/>
+          </p:cNvPicPr>
+          <p:nvPr/>
+        </p:nvPicPr>
+        <p:blipFill>
+          <a:blip r:embed="rId2">
+            <a:extLst>
+              <a:ext uri="{28A0092B-C50C-407E-A947-70E740481C1C}">
+                <a14:useLocalDpi xmlns:a14="http://schemas.microsoft.com/office/drawing/2010/main" val="0"/>
+              </a:ext>
+            </a:extLst>
+          </a:blip>
+          <a:stretch>
+            <a:fillRect/>
+          </a:stretch>
+        </p:blipFill>
+        <p:spPr>
+          <a:xfrm>
+            <a:off x="513475" y="2729193"/>
+            <a:ext cx="5089329" cy="3392886"/>
+          </a:xfrm>
+          <a:prstGeom prst="rect">
+            <a:avLst/>
+          </a:prstGeom>
+        </p:spPr>
+      </p:pic>
+      <p:pic>
+        <p:nvPicPr>
+          <p:cNvPr id="12" name="Picture 11" descr="A small clock tower in front of a building&#10;&#10;Description automatically generated">
+            <a:extLst>
+              <a:ext uri="{FF2B5EF4-FFF2-40B4-BE49-F238E27FC236}">
+                <a16:creationId xmlns:a16="http://schemas.microsoft.com/office/drawing/2014/main" id="{1AEA17CE-D4E6-47CD-A7F7-60D41565037E}"/>
+              </a:ext>
+            </a:extLst>
+          </p:cNvPr>
+          <p:cNvPicPr>
+            <a:picLocks noChangeAspect="1"/>
+          </p:cNvPicPr>
+          <p:nvPr/>
+        </p:nvPicPr>
+        <p:blipFill>
+          <a:blip r:embed="rId3">
+            <a:extLst>
+              <a:ext uri="{28A0092B-C50C-407E-A947-70E740481C1C}">
+                <a14:useLocalDpi xmlns:a14="http://schemas.microsoft.com/office/drawing/2010/main" val="0"/>
+              </a:ext>
+            </a:extLst>
+          </a:blip>
+          <a:stretch>
+            <a:fillRect/>
+          </a:stretch>
+        </p:blipFill>
+        <p:spPr>
+          <a:xfrm>
+            <a:off x="6629753" y="2729193"/>
+            <a:ext cx="5089328" cy="3392886"/>
+          </a:xfrm>
+          <a:prstGeom prst="rect">
+            <a:avLst/>
+          </a:prstGeom>
+        </p:spPr>
+      </p:pic>
+      <p:sp>
+        <p:nvSpPr>
+          <p:cNvPr id="14" name="TextBox 13">
+            <a:extLst>
+              <a:ext uri="{FF2B5EF4-FFF2-40B4-BE49-F238E27FC236}">
+                <a16:creationId xmlns:a16="http://schemas.microsoft.com/office/drawing/2014/main" id="{B3F21D2C-4A1A-4C1D-89CC-B6E87684BE9E}"/>
+              </a:ext>
+            </a:extLst>
+          </p:cNvPr>
+          <p:cNvSpPr txBox="1"/>
+          <p:nvPr/>
+        </p:nvSpPr>
+        <p:spPr>
+          <a:xfrm>
+            <a:off x="1589649" y="6239789"/>
+            <a:ext cx="2506840" cy="369332"/>
+          </a:xfrm>
+          <a:prstGeom prst="rect">
+            <a:avLst/>
+          </a:prstGeom>
+          <a:noFill/>
+        </p:spPr>
+        <p:txBody>
+          <a:bodyPr wrap="none" rtlCol="0">
+            <a:spAutoFit/>
+          </a:bodyPr>
+          <a:lstStyle/>
+          <a:p>
+            <a:r>
+              <a:rPr lang="en-US" dirty="0"/>
+              <a:t>HOPE LUTHERN CHURCH</a:t>
+            </a:r>
+          </a:p>
+        </p:txBody>
+      </p:sp>
+      <p:sp>
+        <p:nvSpPr>
+          <p:cNvPr id="16" name="TextBox 15">
+            <a:extLst>
+              <a:ext uri="{FF2B5EF4-FFF2-40B4-BE49-F238E27FC236}">
+                <a16:creationId xmlns:a16="http://schemas.microsoft.com/office/drawing/2014/main" id="{BAFE67E9-25CC-4C74-BFBD-3CFBFD7C9744}"/>
+              </a:ext>
+            </a:extLst>
+          </p:cNvPr>
+          <p:cNvSpPr txBox="1"/>
+          <p:nvPr/>
+        </p:nvSpPr>
+        <p:spPr>
+          <a:xfrm>
+            <a:off x="7469944" y="6239789"/>
+            <a:ext cx="3718617" cy="369332"/>
+          </a:xfrm>
+          <a:prstGeom prst="rect">
+            <a:avLst/>
+          </a:prstGeom>
+          <a:noFill/>
+        </p:spPr>
+        <p:txBody>
+          <a:bodyPr wrap="square" rtlCol="0">
+            <a:spAutoFit/>
+          </a:bodyPr>
+          <a:lstStyle/>
+          <a:p>
+            <a:r>
+              <a:rPr lang="en-US" dirty="0"/>
+              <a:t>HOLY TRINITY LUTHERN CHURCH</a:t>
+            </a:r>
+          </a:p>
+        </p:txBody>
+      </p:sp>
+    </p:spTree>
+    <p:extLst>
+      <p:ext uri="{BB962C8B-B14F-4D97-AF65-F5344CB8AC3E}">
+        <p14:creationId xmlns:p14="http://schemas.microsoft.com/office/powerpoint/2010/main" val="1727535966"/>
+      </p:ext>
+    </p:extLst>
+  </p:cSld>
+  <p:clrMapOvr>
+    <a:masterClrMapping/>
+  </p:clrMapOvr>
+  <mc:AlternateContent xmlns:mc="http://schemas.openxmlformats.org/markup-compatibility/2006">
+    <mc:Choice xmlns:p15="http://schemas.microsoft.com/office/powerpoint/2012/main" Requires="p15">
+      <p:transition xmlns:p14="http://schemas.microsoft.com/office/powerpoint/2010/main" spd="slow" p14:dur="6000">
+        <p15:prstTrans prst="curtains"/>
+      </p:transition>
+    </mc:Choice>
+    <mc:Fallback>
+      <p:transition spd="slow">
+        <p:fade/>
+      </p:transition>
+    </mc:Fallback>
+  </mc:AlternateContent>
+</p:sld>
+</file>
+
+<file path=ppt/slides/slide2.xml><?xml version="1.0" encoding="utf-8"?>
+<p:sld xmlns:a="http://schemas.openxmlformats.org/drawingml/2006/main" xmlns:r="http://schemas.openxmlformats.org/officeDocument/2006/relationships" xmlns:p="http://schemas.openxmlformats.org/presentationml/2006/main">
+  <p:cSld>
+    <p:spTree>
+      <p:nvGrpSpPr>
+        <p:cNvPr id="1" name=""/>
+        <p:cNvGrpSpPr/>
+        <p:nvPr/>
+      </p:nvGrpSpPr>
+      <p:grpSpPr>
+        <a:xfrm>
+          <a:off x="0" y="0"/>
+          <a:ext cx="0" cy="0"/>
+          <a:chOff x="0" y="0"/>
+          <a:chExt cx="0" cy="0"/>
+        </a:xfrm>
+      </p:grpSpPr>
+      <p:sp>
+        <p:nvSpPr>
           <p:cNvPr id="4" name="Rectangle 3">
             <a:extLst>
               <a:ext uri="{FF2B5EF4-FFF2-40B4-BE49-F238E27FC236}">
@@ -3828,10 +4252,10 @@
       </p:sp>
       <p:pic>
         <p:nvPicPr>
-          <p:cNvPr id="8" name="Picture 7" descr="A picture containing tree, building, sky, outdoor&#10;&#10;Description automatically generated">
-            <a:extLst>
-              <a:ext uri="{FF2B5EF4-FFF2-40B4-BE49-F238E27FC236}">
-                <a16:creationId xmlns:a16="http://schemas.microsoft.com/office/drawing/2014/main" id="{77F1D608-D367-43A6-8AEB-E7D19A86C96E}"/>
+          <p:cNvPr id="3" name="Picture 2" descr="A large clock tower in front of a building&#10;&#10;Description automatically generated">
+            <a:extLst>
+              <a:ext uri="{FF2B5EF4-FFF2-40B4-BE49-F238E27FC236}">
+                <a16:creationId xmlns:a16="http://schemas.microsoft.com/office/drawing/2014/main" id="{3E5C9A97-27E8-4C92-8C39-3B9177767A36}"/>
               </a:ext>
             </a:extLst>
           </p:cNvPr>
@@ -3842,7 +4266,7 @@
         </p:nvPicPr>
         <p:blipFill>
           <a:blip r:embed="rId2">
-            <a:alphaModFix amt="41000"/>
+            <a:alphaModFix amt="62000"/>
             <a:extLst>
               <a:ext uri="{28A0092B-C50C-407E-A947-70E740481C1C}">
                 <a14:useLocalDpi xmlns:a14="http://schemas.microsoft.com/office/drawing/2010/main" val="0"/>
@@ -3855,8 +4279,8 @@
         </p:blipFill>
         <p:spPr>
           <a:xfrm>
-            <a:off x="-1616" y="24184"/>
-            <a:ext cx="12191999" cy="6858000"/>
+            <a:off x="0" y="0"/>
+            <a:ext cx="12192000" cy="6858000"/>
           </a:xfrm>
           <a:prstGeom prst="rect">
             <a:avLst/>
@@ -4204,10 +4628,22 @@
   <p:clrMapOvr>
     <a:masterClrMapping/>
   </p:clrMapOvr>
+  <mc:AlternateContent xmlns:mc="http://schemas.openxmlformats.org/markup-compatibility/2006">
+    <mc:Choice xmlns:p14="http://schemas.microsoft.com/office/powerpoint/2010/main" Requires="p14">
+      <p:transition spd="slow" p14:dur="1400">
+        <p14:doors dir="vert"/>
+      </p:transition>
+    </mc:Choice>
+    <mc:Fallback>
+      <p:transition spd="slow">
+        <p:fade/>
+      </p:transition>
+    </mc:Fallback>
+  </mc:AlternateContent>
 </p:sld>
 </file>
 
-<file path=ppt/slides/slide2.xml><?xml version="1.0" encoding="utf-8"?>
+<file path=ppt/slides/slide3.xml><?xml version="1.0" encoding="utf-8"?>
 <p:sld xmlns:a="http://schemas.openxmlformats.org/drawingml/2006/main" xmlns:r="http://schemas.openxmlformats.org/officeDocument/2006/relationships" xmlns:p="http://schemas.openxmlformats.org/presentationml/2006/main">
   <p:cSld>
     <p:bg>
@@ -5853,543 +6289,18 @@
   <p:clrMapOvr>
     <a:masterClrMapping/>
   </p:clrMapOvr>
-</p:sld>
-</file>
-
-<file path=ppt/slides/slide3.xml><?xml version="1.0" encoding="utf-8"?>
-<p:sld xmlns:a="http://schemas.openxmlformats.org/drawingml/2006/main" xmlns:r="http://schemas.openxmlformats.org/officeDocument/2006/relationships" xmlns:p="http://schemas.openxmlformats.org/presentationml/2006/main">
-  <p:cSld>
-    <p:bg>
-      <p:bgPr>
-        <a:solidFill>
-          <a:schemeClr val="accent6">
-            <a:lumMod val="60000"/>
-            <a:lumOff val="40000"/>
-          </a:schemeClr>
-        </a:solidFill>
-        <a:effectLst/>
-      </p:bgPr>
-    </p:bg>
-    <p:spTree>
-      <p:nvGrpSpPr>
-        <p:cNvPr id="1" name=""/>
-        <p:cNvGrpSpPr/>
-        <p:nvPr/>
-      </p:nvGrpSpPr>
-      <p:grpSpPr>
-        <a:xfrm>
-          <a:off x="0" y="0"/>
-          <a:ext cx="0" cy="0"/>
-          <a:chOff x="0" y="0"/>
-          <a:chExt cx="0" cy="0"/>
-        </a:xfrm>
-      </p:grpSpPr>
-      <p:sp>
-        <p:nvSpPr>
-          <p:cNvPr id="4" name="Rectangle 3">
-            <a:extLst>
-              <a:ext uri="{FF2B5EF4-FFF2-40B4-BE49-F238E27FC236}">
-                <a16:creationId xmlns:a16="http://schemas.microsoft.com/office/drawing/2014/main" id="{E2DC6BC4-64DE-49B2-B234-FAE62A46CA23}"/>
-              </a:ext>
-            </a:extLst>
-          </p:cNvPr>
-          <p:cNvSpPr/>
-          <p:nvPr/>
-        </p:nvSpPr>
-        <p:spPr>
-          <a:xfrm>
-            <a:off x="251791" y="211019"/>
-            <a:ext cx="11701670" cy="6198957"/>
-          </a:xfrm>
-          <a:prstGeom prst="rect">
-            <a:avLst/>
-          </a:prstGeom>
-          <a:solidFill>
-            <a:schemeClr val="accent6">
-              <a:lumMod val="20000"/>
-              <a:lumOff val="80000"/>
-            </a:schemeClr>
-          </a:solidFill>
-          <a:ln>
-            <a:solidFill>
-              <a:schemeClr val="accent6"/>
-            </a:solidFill>
-          </a:ln>
-        </p:spPr>
-        <p:style>
-          <a:lnRef idx="2">
-            <a:schemeClr val="accent1">
-              <a:shade val="50000"/>
-            </a:schemeClr>
-          </a:lnRef>
-          <a:fillRef idx="1">
-            <a:schemeClr val="accent1"/>
-          </a:fillRef>
-          <a:effectRef idx="0">
-            <a:schemeClr val="accent1"/>
-          </a:effectRef>
-          <a:fontRef idx="minor">
-            <a:schemeClr val="lt1"/>
-          </a:fontRef>
-        </p:style>
-        <p:txBody>
-          <a:bodyPr rtlCol="0" anchor="ctr"/>
-          <a:lstStyle/>
-          <a:p>
-            <a:pPr algn="ctr"/>
-            <a:endParaRPr lang="en-US" dirty="0"/>
-          </a:p>
-        </p:txBody>
-      </p:sp>
-      <p:sp>
-        <p:nvSpPr>
-          <p:cNvPr id="5" name="Arrow: Right 4">
-            <a:extLst>
-              <a:ext uri="{FF2B5EF4-FFF2-40B4-BE49-F238E27FC236}">
-                <a16:creationId xmlns:a16="http://schemas.microsoft.com/office/drawing/2014/main" id="{A0A5EE30-1AF7-4225-B614-EF46C4BCA623}"/>
-              </a:ext>
-            </a:extLst>
-          </p:cNvPr>
-          <p:cNvSpPr/>
-          <p:nvPr/>
-        </p:nvSpPr>
-        <p:spPr>
-          <a:xfrm>
-            <a:off x="10800520" y="1965849"/>
-            <a:ext cx="583096" cy="473765"/>
-          </a:xfrm>
-          <a:prstGeom prst="rightArrow">
-            <a:avLst/>
-          </a:prstGeom>
-          <a:solidFill>
-            <a:schemeClr val="accent6">
-              <a:lumMod val="60000"/>
-              <a:lumOff val="40000"/>
-            </a:schemeClr>
-          </a:solidFill>
-        </p:spPr>
-        <p:style>
-          <a:lnRef idx="2">
-            <a:schemeClr val="accent1">
-              <a:shade val="50000"/>
-            </a:schemeClr>
-          </a:lnRef>
-          <a:fillRef idx="1">
-            <a:schemeClr val="accent1"/>
-          </a:fillRef>
-          <a:effectRef idx="0">
-            <a:schemeClr val="accent1"/>
-          </a:effectRef>
-          <a:fontRef idx="minor">
-            <a:schemeClr val="lt1"/>
-          </a:fontRef>
-        </p:style>
-        <p:txBody>
-          <a:bodyPr rtlCol="0" anchor="ctr"/>
-          <a:lstStyle/>
-          <a:p>
-            <a:pPr algn="ctr"/>
-            <a:endParaRPr lang="en-US"/>
-          </a:p>
-        </p:txBody>
-      </p:sp>
-      <p:sp>
-        <p:nvSpPr>
-          <p:cNvPr id="6" name="Arrow: Right 5">
-            <a:extLst>
-              <a:ext uri="{FF2B5EF4-FFF2-40B4-BE49-F238E27FC236}">
-                <a16:creationId xmlns:a16="http://schemas.microsoft.com/office/drawing/2014/main" id="{7C69FC31-40F4-4FA8-88BF-7200AA0C72B3}"/>
-              </a:ext>
-            </a:extLst>
-          </p:cNvPr>
-          <p:cNvSpPr/>
-          <p:nvPr/>
-        </p:nvSpPr>
-        <p:spPr>
-          <a:xfrm flipH="1">
-            <a:off x="655984" y="1931817"/>
-            <a:ext cx="583096" cy="473765"/>
-          </a:xfrm>
-          <a:prstGeom prst="rightArrow">
-            <a:avLst/>
-          </a:prstGeom>
-          <a:solidFill>
-            <a:schemeClr val="accent6">
-              <a:lumMod val="60000"/>
-              <a:lumOff val="40000"/>
-            </a:schemeClr>
-          </a:solidFill>
-        </p:spPr>
-        <p:style>
-          <a:lnRef idx="2">
-            <a:schemeClr val="accent1">
-              <a:shade val="50000"/>
-            </a:schemeClr>
-          </a:lnRef>
-          <a:fillRef idx="1">
-            <a:schemeClr val="accent1"/>
-          </a:fillRef>
-          <a:effectRef idx="0">
-            <a:schemeClr val="accent1"/>
-          </a:effectRef>
-          <a:fontRef idx="minor">
-            <a:schemeClr val="lt1"/>
-          </a:fontRef>
-        </p:style>
-        <p:txBody>
-          <a:bodyPr rtlCol="0" anchor="ctr"/>
-          <a:lstStyle/>
-          <a:p>
-            <a:pPr algn="ctr"/>
-            <a:endParaRPr lang="en-US"/>
-          </a:p>
-        </p:txBody>
-      </p:sp>
-      <p:sp>
-        <p:nvSpPr>
-          <p:cNvPr id="7" name="Rectangle 6">
-            <a:extLst>
-              <a:ext uri="{FF2B5EF4-FFF2-40B4-BE49-F238E27FC236}">
-                <a16:creationId xmlns:a16="http://schemas.microsoft.com/office/drawing/2014/main" id="{50AA5071-FB15-4F6B-A706-B634014859AD}"/>
-              </a:ext>
-            </a:extLst>
-          </p:cNvPr>
-          <p:cNvSpPr/>
-          <p:nvPr/>
-        </p:nvSpPr>
-        <p:spPr>
-          <a:xfrm>
-            <a:off x="1404732" y="1276011"/>
-            <a:ext cx="1957446" cy="2198705"/>
-          </a:xfrm>
-          <a:prstGeom prst="rect">
-            <a:avLst/>
-          </a:prstGeom>
-          <a:solidFill>
-            <a:schemeClr val="accent6">
-              <a:lumMod val="20000"/>
-              <a:lumOff val="80000"/>
-            </a:schemeClr>
-          </a:solidFill>
-          <a:ln>
-            <a:solidFill>
-              <a:schemeClr val="accent6"/>
-            </a:solidFill>
-          </a:ln>
-        </p:spPr>
-        <p:style>
-          <a:lnRef idx="2">
-            <a:schemeClr val="accent1">
-              <a:shade val="50000"/>
-            </a:schemeClr>
-          </a:lnRef>
-          <a:fillRef idx="1">
-            <a:schemeClr val="accent1"/>
-          </a:fillRef>
-          <a:effectRef idx="0">
-            <a:schemeClr val="accent1"/>
-          </a:effectRef>
-          <a:fontRef idx="minor">
-            <a:schemeClr val="lt1"/>
-          </a:fontRef>
-        </p:style>
-        <p:txBody>
-          <a:bodyPr rtlCol="0" anchor="ctr"/>
-          <a:lstStyle/>
-          <a:p>
-            <a:pPr algn="ctr"/>
-            <a:r>
-              <a:rPr lang="en-US" dirty="0">
-                <a:solidFill>
-                  <a:schemeClr val="tx1"/>
-                </a:solidFill>
-              </a:rPr>
-              <a:t>JAN</a:t>
-            </a:r>
-          </a:p>
-          <a:p>
-            <a:pPr algn="ctr"/>
-            <a:r>
-              <a:rPr lang="en-US" dirty="0">
-                <a:solidFill>
-                  <a:schemeClr val="tx1"/>
-                </a:solidFill>
-              </a:rPr>
-              <a:t>TWLYA AND MARIE</a:t>
-            </a:r>
-          </a:p>
-        </p:txBody>
-      </p:sp>
-      <p:sp>
-        <p:nvSpPr>
-          <p:cNvPr id="8" name="Rectangle 7">
-            <a:extLst>
-              <a:ext uri="{FF2B5EF4-FFF2-40B4-BE49-F238E27FC236}">
-                <a16:creationId xmlns:a16="http://schemas.microsoft.com/office/drawing/2014/main" id="{3280584F-3C23-4367-ABF2-818FEDF5E4F3}"/>
-              </a:ext>
-            </a:extLst>
-          </p:cNvPr>
-          <p:cNvSpPr/>
-          <p:nvPr/>
-        </p:nvSpPr>
-        <p:spPr>
-          <a:xfrm>
-            <a:off x="3813875" y="1291837"/>
-            <a:ext cx="1957446" cy="2198705"/>
-          </a:xfrm>
-          <a:prstGeom prst="rect">
-            <a:avLst/>
-          </a:prstGeom>
-          <a:solidFill>
-            <a:schemeClr val="accent6">
-              <a:lumMod val="20000"/>
-              <a:lumOff val="80000"/>
-            </a:schemeClr>
-          </a:solidFill>
-          <a:ln>
-            <a:solidFill>
-              <a:schemeClr val="accent6"/>
-            </a:solidFill>
-          </a:ln>
-        </p:spPr>
-        <p:style>
-          <a:lnRef idx="2">
-            <a:schemeClr val="accent1">
-              <a:shade val="50000"/>
-            </a:schemeClr>
-          </a:lnRef>
-          <a:fillRef idx="1">
-            <a:schemeClr val="accent1"/>
-          </a:fillRef>
-          <a:effectRef idx="0">
-            <a:schemeClr val="accent1"/>
-          </a:effectRef>
-          <a:fontRef idx="minor">
-            <a:schemeClr val="lt1"/>
-          </a:fontRef>
-        </p:style>
-        <p:txBody>
-          <a:bodyPr rtlCol="0" anchor="ctr"/>
-          <a:lstStyle/>
-          <a:p>
-            <a:pPr algn="ctr"/>
-            <a:r>
-              <a:rPr lang="en-US" dirty="0">
-                <a:solidFill>
-                  <a:schemeClr val="tx1"/>
-                </a:solidFill>
-              </a:rPr>
-              <a:t>FEB</a:t>
-            </a:r>
-          </a:p>
-          <a:p>
-            <a:pPr algn="ctr"/>
-            <a:r>
-              <a:rPr lang="en-US" dirty="0">
-                <a:solidFill>
-                  <a:schemeClr val="tx1"/>
-                </a:solidFill>
-              </a:rPr>
-              <a:t>KIM AND PHYLLIS</a:t>
-            </a:r>
-          </a:p>
-        </p:txBody>
-      </p:sp>
-      <p:sp>
-        <p:nvSpPr>
-          <p:cNvPr id="9" name="Rectangle 8">
-            <a:extLst>
-              <a:ext uri="{FF2B5EF4-FFF2-40B4-BE49-F238E27FC236}">
-                <a16:creationId xmlns:a16="http://schemas.microsoft.com/office/drawing/2014/main" id="{51B2E0A8-7827-455E-80A7-C8F7A088B986}"/>
-              </a:ext>
-            </a:extLst>
-          </p:cNvPr>
-          <p:cNvSpPr/>
-          <p:nvPr/>
-        </p:nvSpPr>
-        <p:spPr>
-          <a:xfrm>
-            <a:off x="6102626" y="1289211"/>
-            <a:ext cx="1957446" cy="2198705"/>
-          </a:xfrm>
-          <a:prstGeom prst="rect">
-            <a:avLst/>
-          </a:prstGeom>
-          <a:solidFill>
-            <a:schemeClr val="accent6">
-              <a:lumMod val="20000"/>
-              <a:lumOff val="80000"/>
-            </a:schemeClr>
-          </a:solidFill>
-          <a:ln>
-            <a:solidFill>
-              <a:schemeClr val="accent6"/>
-            </a:solidFill>
-          </a:ln>
-        </p:spPr>
-        <p:style>
-          <a:lnRef idx="2">
-            <a:schemeClr val="accent1">
-              <a:shade val="50000"/>
-            </a:schemeClr>
-          </a:lnRef>
-          <a:fillRef idx="1">
-            <a:schemeClr val="accent1"/>
-          </a:fillRef>
-          <a:effectRef idx="0">
-            <a:schemeClr val="accent1"/>
-          </a:effectRef>
-          <a:fontRef idx="minor">
-            <a:schemeClr val="lt1"/>
-          </a:fontRef>
-        </p:style>
-        <p:txBody>
-          <a:bodyPr rtlCol="0" anchor="ctr"/>
-          <a:lstStyle/>
-          <a:p>
-            <a:pPr algn="ctr"/>
-            <a:r>
-              <a:rPr lang="en-US" dirty="0">
-                <a:solidFill>
-                  <a:schemeClr val="tx1"/>
-                </a:solidFill>
-              </a:rPr>
-              <a:t>MAR</a:t>
-            </a:r>
-          </a:p>
-          <a:p>
-            <a:pPr algn="ctr"/>
-            <a:r>
-              <a:rPr lang="en-US" dirty="0">
-                <a:solidFill>
-                  <a:schemeClr val="tx1"/>
-                </a:solidFill>
-              </a:rPr>
-              <a:t>JEAN AND JAN</a:t>
-            </a:r>
-          </a:p>
-        </p:txBody>
-      </p:sp>
-      <p:sp>
-        <p:nvSpPr>
-          <p:cNvPr id="10" name="Rectangle 9">
-            <a:extLst>
-              <a:ext uri="{FF2B5EF4-FFF2-40B4-BE49-F238E27FC236}">
-                <a16:creationId xmlns:a16="http://schemas.microsoft.com/office/drawing/2014/main" id="{3CE14F38-FA51-47C1-901C-8A5DBB4893DC}"/>
-              </a:ext>
-            </a:extLst>
-          </p:cNvPr>
-          <p:cNvSpPr/>
-          <p:nvPr/>
-        </p:nvSpPr>
-        <p:spPr>
-          <a:xfrm>
-            <a:off x="8645108" y="1288150"/>
-            <a:ext cx="1957446" cy="2198705"/>
-          </a:xfrm>
-          <a:prstGeom prst="rect">
-            <a:avLst/>
-          </a:prstGeom>
-          <a:solidFill>
-            <a:schemeClr val="accent6">
-              <a:lumMod val="20000"/>
-              <a:lumOff val="80000"/>
-            </a:schemeClr>
-          </a:solidFill>
-          <a:ln>
-            <a:solidFill>
-              <a:schemeClr val="accent6"/>
-            </a:solidFill>
-          </a:ln>
-        </p:spPr>
-        <p:style>
-          <a:lnRef idx="2">
-            <a:schemeClr val="accent1">
-              <a:shade val="50000"/>
-            </a:schemeClr>
-          </a:lnRef>
-          <a:fillRef idx="1">
-            <a:schemeClr val="accent1"/>
-          </a:fillRef>
-          <a:effectRef idx="0">
-            <a:schemeClr val="accent1"/>
-          </a:effectRef>
-          <a:fontRef idx="minor">
-            <a:schemeClr val="lt1"/>
-          </a:fontRef>
-        </p:style>
-        <p:txBody>
-          <a:bodyPr rtlCol="0" anchor="ctr"/>
-          <a:lstStyle/>
-          <a:p>
-            <a:pPr algn="ctr"/>
-            <a:r>
-              <a:rPr lang="en-US" dirty="0">
-                <a:solidFill>
-                  <a:schemeClr val="tx1"/>
-                </a:solidFill>
-              </a:rPr>
-              <a:t>APR</a:t>
-            </a:r>
-          </a:p>
-          <a:p>
-            <a:pPr algn="ctr"/>
-            <a:r>
-              <a:rPr lang="en-US" dirty="0">
-                <a:solidFill>
-                  <a:schemeClr val="tx1"/>
-                </a:solidFill>
-              </a:rPr>
-              <a:t>PHYLLIS, MARIE AND MARY ANN</a:t>
-            </a:r>
-          </a:p>
-        </p:txBody>
-      </p:sp>
-      <p:pic>
-        <p:nvPicPr>
-          <p:cNvPr id="11" name="Picture 10" descr="A close up of a device&#10;&#10;Description automatically generated">
-            <a:extLst>
-              <a:ext uri="{FF2B5EF4-FFF2-40B4-BE49-F238E27FC236}">
-                <a16:creationId xmlns:a16="http://schemas.microsoft.com/office/drawing/2014/main" id="{C16438A3-7B0A-4C37-AD5E-5D366C06449D}"/>
-              </a:ext>
-            </a:extLst>
-          </p:cNvPr>
-          <p:cNvPicPr>
-            <a:picLocks noChangeAspect="1"/>
-          </p:cNvPicPr>
-          <p:nvPr/>
-        </p:nvPicPr>
-        <p:blipFill rotWithShape="1">
-          <a:blip r:embed="rId2">
-            <a:extLst>
-              <a:ext uri="{28A0092B-C50C-407E-A947-70E740481C1C}">
-                <a14:useLocalDpi xmlns:a14="http://schemas.microsoft.com/office/drawing/2010/main" val="0"/>
-              </a:ext>
-            </a:extLst>
-          </a:blip>
-          <a:srcRect l="65760" t="12718" r="24721" b="21436"/>
-          <a:stretch/>
-        </p:blipFill>
-        <p:spPr>
-          <a:xfrm>
-            <a:off x="11581582" y="370971"/>
-            <a:ext cx="392322" cy="5931355"/>
-          </a:xfrm>
-          <a:prstGeom prst="rect">
-            <a:avLst/>
-          </a:prstGeom>
-        </p:spPr>
-      </p:pic>
-    </p:spTree>
-    <p:extLst>
-      <p:ext uri="{BB962C8B-B14F-4D97-AF65-F5344CB8AC3E}">
-        <p14:creationId xmlns:p14="http://schemas.microsoft.com/office/powerpoint/2010/main" val="4231850664"/>
-      </p:ext>
-    </p:extLst>
-  </p:cSld>
-  <p:clrMapOvr>
-    <a:masterClrMapping/>
-  </p:clrMapOvr>
+  <mc:AlternateContent xmlns:mc="http://schemas.openxmlformats.org/markup-compatibility/2006">
+    <mc:Choice xmlns:p14="http://schemas.microsoft.com/office/powerpoint/2010/main" Requires="p14">
+      <p:transition spd="med" p14:dur="700">
+        <p:fade/>
+      </p:transition>
+    </mc:Choice>
+    <mc:Fallback>
+      <p:transition spd="med">
+        <p:fade/>
+      </p:transition>
+    </mc:Fallback>
+  </mc:AlternateContent>
 </p:sld>
 </file>
 
@@ -6426,6 +6337,546 @@
           <p:cNvPr id="4" name="Rectangle 3">
             <a:extLst>
               <a:ext uri="{FF2B5EF4-FFF2-40B4-BE49-F238E27FC236}">
+                <a16:creationId xmlns:a16="http://schemas.microsoft.com/office/drawing/2014/main" id="{E2DC6BC4-64DE-49B2-B234-FAE62A46CA23}"/>
+              </a:ext>
+            </a:extLst>
+          </p:cNvPr>
+          <p:cNvSpPr/>
+          <p:nvPr/>
+        </p:nvSpPr>
+        <p:spPr>
+          <a:xfrm>
+            <a:off x="251791" y="211019"/>
+            <a:ext cx="11701670" cy="6198957"/>
+          </a:xfrm>
+          <a:prstGeom prst="rect">
+            <a:avLst/>
+          </a:prstGeom>
+          <a:solidFill>
+            <a:schemeClr val="accent6">
+              <a:lumMod val="20000"/>
+              <a:lumOff val="80000"/>
+            </a:schemeClr>
+          </a:solidFill>
+          <a:ln>
+            <a:solidFill>
+              <a:schemeClr val="accent6"/>
+            </a:solidFill>
+          </a:ln>
+        </p:spPr>
+        <p:style>
+          <a:lnRef idx="2">
+            <a:schemeClr val="accent1">
+              <a:shade val="50000"/>
+            </a:schemeClr>
+          </a:lnRef>
+          <a:fillRef idx="1">
+            <a:schemeClr val="accent1"/>
+          </a:fillRef>
+          <a:effectRef idx="0">
+            <a:schemeClr val="accent1"/>
+          </a:effectRef>
+          <a:fontRef idx="minor">
+            <a:schemeClr val="lt1"/>
+          </a:fontRef>
+        </p:style>
+        <p:txBody>
+          <a:bodyPr rtlCol="0" anchor="ctr"/>
+          <a:lstStyle/>
+          <a:p>
+            <a:pPr algn="ctr"/>
+            <a:endParaRPr lang="en-US" dirty="0"/>
+          </a:p>
+        </p:txBody>
+      </p:sp>
+      <p:sp>
+        <p:nvSpPr>
+          <p:cNvPr id="5" name="Arrow: Right 4">
+            <a:extLst>
+              <a:ext uri="{FF2B5EF4-FFF2-40B4-BE49-F238E27FC236}">
+                <a16:creationId xmlns:a16="http://schemas.microsoft.com/office/drawing/2014/main" id="{A0A5EE30-1AF7-4225-B614-EF46C4BCA623}"/>
+              </a:ext>
+            </a:extLst>
+          </p:cNvPr>
+          <p:cNvSpPr/>
+          <p:nvPr/>
+        </p:nvSpPr>
+        <p:spPr>
+          <a:xfrm>
+            <a:off x="10800520" y="1965849"/>
+            <a:ext cx="583096" cy="473765"/>
+          </a:xfrm>
+          <a:prstGeom prst="rightArrow">
+            <a:avLst/>
+          </a:prstGeom>
+          <a:solidFill>
+            <a:schemeClr val="accent6">
+              <a:lumMod val="60000"/>
+              <a:lumOff val="40000"/>
+            </a:schemeClr>
+          </a:solidFill>
+        </p:spPr>
+        <p:style>
+          <a:lnRef idx="2">
+            <a:schemeClr val="accent1">
+              <a:shade val="50000"/>
+            </a:schemeClr>
+          </a:lnRef>
+          <a:fillRef idx="1">
+            <a:schemeClr val="accent1"/>
+          </a:fillRef>
+          <a:effectRef idx="0">
+            <a:schemeClr val="accent1"/>
+          </a:effectRef>
+          <a:fontRef idx="minor">
+            <a:schemeClr val="lt1"/>
+          </a:fontRef>
+        </p:style>
+        <p:txBody>
+          <a:bodyPr rtlCol="0" anchor="ctr"/>
+          <a:lstStyle/>
+          <a:p>
+            <a:pPr algn="ctr"/>
+            <a:endParaRPr lang="en-US"/>
+          </a:p>
+        </p:txBody>
+      </p:sp>
+      <p:sp>
+        <p:nvSpPr>
+          <p:cNvPr id="6" name="Arrow: Right 5">
+            <a:extLst>
+              <a:ext uri="{FF2B5EF4-FFF2-40B4-BE49-F238E27FC236}">
+                <a16:creationId xmlns:a16="http://schemas.microsoft.com/office/drawing/2014/main" id="{7C69FC31-40F4-4FA8-88BF-7200AA0C72B3}"/>
+              </a:ext>
+            </a:extLst>
+          </p:cNvPr>
+          <p:cNvSpPr/>
+          <p:nvPr/>
+        </p:nvSpPr>
+        <p:spPr>
+          <a:xfrm flipH="1">
+            <a:off x="655984" y="1931817"/>
+            <a:ext cx="583096" cy="473765"/>
+          </a:xfrm>
+          <a:prstGeom prst="rightArrow">
+            <a:avLst/>
+          </a:prstGeom>
+          <a:solidFill>
+            <a:schemeClr val="accent6">
+              <a:lumMod val="60000"/>
+              <a:lumOff val="40000"/>
+            </a:schemeClr>
+          </a:solidFill>
+        </p:spPr>
+        <p:style>
+          <a:lnRef idx="2">
+            <a:schemeClr val="accent1">
+              <a:shade val="50000"/>
+            </a:schemeClr>
+          </a:lnRef>
+          <a:fillRef idx="1">
+            <a:schemeClr val="accent1"/>
+          </a:fillRef>
+          <a:effectRef idx="0">
+            <a:schemeClr val="accent1"/>
+          </a:effectRef>
+          <a:fontRef idx="minor">
+            <a:schemeClr val="lt1"/>
+          </a:fontRef>
+        </p:style>
+        <p:txBody>
+          <a:bodyPr rtlCol="0" anchor="ctr"/>
+          <a:lstStyle/>
+          <a:p>
+            <a:pPr algn="ctr"/>
+            <a:endParaRPr lang="en-US"/>
+          </a:p>
+        </p:txBody>
+      </p:sp>
+      <p:sp>
+        <p:nvSpPr>
+          <p:cNvPr id="7" name="Rectangle 6">
+            <a:extLst>
+              <a:ext uri="{FF2B5EF4-FFF2-40B4-BE49-F238E27FC236}">
+                <a16:creationId xmlns:a16="http://schemas.microsoft.com/office/drawing/2014/main" id="{50AA5071-FB15-4F6B-A706-B634014859AD}"/>
+              </a:ext>
+            </a:extLst>
+          </p:cNvPr>
+          <p:cNvSpPr/>
+          <p:nvPr/>
+        </p:nvSpPr>
+        <p:spPr>
+          <a:xfrm>
+            <a:off x="1404732" y="1276011"/>
+            <a:ext cx="1957446" cy="2198705"/>
+          </a:xfrm>
+          <a:prstGeom prst="rect">
+            <a:avLst/>
+          </a:prstGeom>
+          <a:solidFill>
+            <a:schemeClr val="accent6">
+              <a:lumMod val="20000"/>
+              <a:lumOff val="80000"/>
+            </a:schemeClr>
+          </a:solidFill>
+          <a:ln>
+            <a:solidFill>
+              <a:schemeClr val="accent6"/>
+            </a:solidFill>
+          </a:ln>
+        </p:spPr>
+        <p:style>
+          <a:lnRef idx="2">
+            <a:schemeClr val="accent1">
+              <a:shade val="50000"/>
+            </a:schemeClr>
+          </a:lnRef>
+          <a:fillRef idx="1">
+            <a:schemeClr val="accent1"/>
+          </a:fillRef>
+          <a:effectRef idx="0">
+            <a:schemeClr val="accent1"/>
+          </a:effectRef>
+          <a:fontRef idx="minor">
+            <a:schemeClr val="lt1"/>
+          </a:fontRef>
+        </p:style>
+        <p:txBody>
+          <a:bodyPr rtlCol="0" anchor="ctr"/>
+          <a:lstStyle/>
+          <a:p>
+            <a:pPr algn="ctr"/>
+            <a:r>
+              <a:rPr lang="en-US" dirty="0">
+                <a:solidFill>
+                  <a:schemeClr val="tx1"/>
+                </a:solidFill>
+              </a:rPr>
+              <a:t>JAN</a:t>
+            </a:r>
+          </a:p>
+          <a:p>
+            <a:pPr algn="ctr"/>
+            <a:r>
+              <a:rPr lang="en-US" dirty="0">
+                <a:solidFill>
+                  <a:schemeClr val="tx1"/>
+                </a:solidFill>
+              </a:rPr>
+              <a:t>TWLYA AND MARIE</a:t>
+            </a:r>
+          </a:p>
+        </p:txBody>
+      </p:sp>
+      <p:sp>
+        <p:nvSpPr>
+          <p:cNvPr id="8" name="Rectangle 7">
+            <a:extLst>
+              <a:ext uri="{FF2B5EF4-FFF2-40B4-BE49-F238E27FC236}">
+                <a16:creationId xmlns:a16="http://schemas.microsoft.com/office/drawing/2014/main" id="{3280584F-3C23-4367-ABF2-818FEDF5E4F3}"/>
+              </a:ext>
+            </a:extLst>
+          </p:cNvPr>
+          <p:cNvSpPr/>
+          <p:nvPr/>
+        </p:nvSpPr>
+        <p:spPr>
+          <a:xfrm>
+            <a:off x="3813875" y="1291837"/>
+            <a:ext cx="1957446" cy="2198705"/>
+          </a:xfrm>
+          <a:prstGeom prst="rect">
+            <a:avLst/>
+          </a:prstGeom>
+          <a:solidFill>
+            <a:schemeClr val="accent6">
+              <a:lumMod val="20000"/>
+              <a:lumOff val="80000"/>
+            </a:schemeClr>
+          </a:solidFill>
+          <a:ln>
+            <a:solidFill>
+              <a:schemeClr val="accent6"/>
+            </a:solidFill>
+          </a:ln>
+        </p:spPr>
+        <p:style>
+          <a:lnRef idx="2">
+            <a:schemeClr val="accent1">
+              <a:shade val="50000"/>
+            </a:schemeClr>
+          </a:lnRef>
+          <a:fillRef idx="1">
+            <a:schemeClr val="accent1"/>
+          </a:fillRef>
+          <a:effectRef idx="0">
+            <a:schemeClr val="accent1"/>
+          </a:effectRef>
+          <a:fontRef idx="minor">
+            <a:schemeClr val="lt1"/>
+          </a:fontRef>
+        </p:style>
+        <p:txBody>
+          <a:bodyPr rtlCol="0" anchor="ctr"/>
+          <a:lstStyle/>
+          <a:p>
+            <a:pPr algn="ctr"/>
+            <a:r>
+              <a:rPr lang="en-US" dirty="0">
+                <a:solidFill>
+                  <a:schemeClr val="tx1"/>
+                </a:solidFill>
+              </a:rPr>
+              <a:t>FEB</a:t>
+            </a:r>
+          </a:p>
+          <a:p>
+            <a:pPr algn="ctr"/>
+            <a:r>
+              <a:rPr lang="en-US" dirty="0">
+                <a:solidFill>
+                  <a:schemeClr val="tx1"/>
+                </a:solidFill>
+              </a:rPr>
+              <a:t>KIM AND PHYLLIS</a:t>
+            </a:r>
+          </a:p>
+        </p:txBody>
+      </p:sp>
+      <p:sp>
+        <p:nvSpPr>
+          <p:cNvPr id="9" name="Rectangle 8">
+            <a:extLst>
+              <a:ext uri="{FF2B5EF4-FFF2-40B4-BE49-F238E27FC236}">
+                <a16:creationId xmlns:a16="http://schemas.microsoft.com/office/drawing/2014/main" id="{51B2E0A8-7827-455E-80A7-C8F7A088B986}"/>
+              </a:ext>
+            </a:extLst>
+          </p:cNvPr>
+          <p:cNvSpPr/>
+          <p:nvPr/>
+        </p:nvSpPr>
+        <p:spPr>
+          <a:xfrm>
+            <a:off x="6102626" y="1289211"/>
+            <a:ext cx="1957446" cy="2198705"/>
+          </a:xfrm>
+          <a:prstGeom prst="rect">
+            <a:avLst/>
+          </a:prstGeom>
+          <a:solidFill>
+            <a:schemeClr val="accent6">
+              <a:lumMod val="20000"/>
+              <a:lumOff val="80000"/>
+            </a:schemeClr>
+          </a:solidFill>
+          <a:ln>
+            <a:solidFill>
+              <a:schemeClr val="accent6"/>
+            </a:solidFill>
+          </a:ln>
+        </p:spPr>
+        <p:style>
+          <a:lnRef idx="2">
+            <a:schemeClr val="accent1">
+              <a:shade val="50000"/>
+            </a:schemeClr>
+          </a:lnRef>
+          <a:fillRef idx="1">
+            <a:schemeClr val="accent1"/>
+          </a:fillRef>
+          <a:effectRef idx="0">
+            <a:schemeClr val="accent1"/>
+          </a:effectRef>
+          <a:fontRef idx="minor">
+            <a:schemeClr val="lt1"/>
+          </a:fontRef>
+        </p:style>
+        <p:txBody>
+          <a:bodyPr rtlCol="0" anchor="ctr"/>
+          <a:lstStyle/>
+          <a:p>
+            <a:pPr algn="ctr"/>
+            <a:r>
+              <a:rPr lang="en-US" dirty="0">
+                <a:solidFill>
+                  <a:schemeClr val="tx1"/>
+                </a:solidFill>
+              </a:rPr>
+              <a:t>MAR</a:t>
+            </a:r>
+          </a:p>
+          <a:p>
+            <a:pPr algn="ctr"/>
+            <a:r>
+              <a:rPr lang="en-US" dirty="0">
+                <a:solidFill>
+                  <a:schemeClr val="tx1"/>
+                </a:solidFill>
+              </a:rPr>
+              <a:t>JEAN AND JAN</a:t>
+            </a:r>
+          </a:p>
+        </p:txBody>
+      </p:sp>
+      <p:sp>
+        <p:nvSpPr>
+          <p:cNvPr id="10" name="Rectangle 9">
+            <a:extLst>
+              <a:ext uri="{FF2B5EF4-FFF2-40B4-BE49-F238E27FC236}">
+                <a16:creationId xmlns:a16="http://schemas.microsoft.com/office/drawing/2014/main" id="{3CE14F38-FA51-47C1-901C-8A5DBB4893DC}"/>
+              </a:ext>
+            </a:extLst>
+          </p:cNvPr>
+          <p:cNvSpPr/>
+          <p:nvPr/>
+        </p:nvSpPr>
+        <p:spPr>
+          <a:xfrm>
+            <a:off x="8645108" y="1288150"/>
+            <a:ext cx="1957446" cy="2198705"/>
+          </a:xfrm>
+          <a:prstGeom prst="rect">
+            <a:avLst/>
+          </a:prstGeom>
+          <a:solidFill>
+            <a:schemeClr val="accent6">
+              <a:lumMod val="20000"/>
+              <a:lumOff val="80000"/>
+            </a:schemeClr>
+          </a:solidFill>
+          <a:ln>
+            <a:solidFill>
+              <a:schemeClr val="accent6"/>
+            </a:solidFill>
+          </a:ln>
+        </p:spPr>
+        <p:style>
+          <a:lnRef idx="2">
+            <a:schemeClr val="accent1">
+              <a:shade val="50000"/>
+            </a:schemeClr>
+          </a:lnRef>
+          <a:fillRef idx="1">
+            <a:schemeClr val="accent1"/>
+          </a:fillRef>
+          <a:effectRef idx="0">
+            <a:schemeClr val="accent1"/>
+          </a:effectRef>
+          <a:fontRef idx="minor">
+            <a:schemeClr val="lt1"/>
+          </a:fontRef>
+        </p:style>
+        <p:txBody>
+          <a:bodyPr rtlCol="0" anchor="ctr"/>
+          <a:lstStyle/>
+          <a:p>
+            <a:pPr algn="ctr"/>
+            <a:r>
+              <a:rPr lang="en-US" dirty="0">
+                <a:solidFill>
+                  <a:schemeClr val="tx1"/>
+                </a:solidFill>
+              </a:rPr>
+              <a:t>APR</a:t>
+            </a:r>
+          </a:p>
+          <a:p>
+            <a:pPr algn="ctr"/>
+            <a:r>
+              <a:rPr lang="en-US" dirty="0">
+                <a:solidFill>
+                  <a:schemeClr val="tx1"/>
+                </a:solidFill>
+              </a:rPr>
+              <a:t>PHYLLIS, MARIE AND MARY ANN</a:t>
+            </a:r>
+          </a:p>
+        </p:txBody>
+      </p:sp>
+      <p:pic>
+        <p:nvPicPr>
+          <p:cNvPr id="11" name="Picture 10" descr="A close up of a device&#10;&#10;Description automatically generated">
+            <a:extLst>
+              <a:ext uri="{FF2B5EF4-FFF2-40B4-BE49-F238E27FC236}">
+                <a16:creationId xmlns:a16="http://schemas.microsoft.com/office/drawing/2014/main" id="{C16438A3-7B0A-4C37-AD5E-5D366C06449D}"/>
+              </a:ext>
+            </a:extLst>
+          </p:cNvPr>
+          <p:cNvPicPr>
+            <a:picLocks noChangeAspect="1"/>
+          </p:cNvPicPr>
+          <p:nvPr/>
+        </p:nvPicPr>
+        <p:blipFill rotWithShape="1">
+          <a:blip r:embed="rId2">
+            <a:extLst>
+              <a:ext uri="{28A0092B-C50C-407E-A947-70E740481C1C}">
+                <a14:useLocalDpi xmlns:a14="http://schemas.microsoft.com/office/drawing/2010/main" val="0"/>
+              </a:ext>
+            </a:extLst>
+          </a:blip>
+          <a:srcRect l="65760" t="12718" r="24721" b="21436"/>
+          <a:stretch/>
+        </p:blipFill>
+        <p:spPr>
+          <a:xfrm>
+            <a:off x="11581582" y="370971"/>
+            <a:ext cx="392322" cy="5931355"/>
+          </a:xfrm>
+          <a:prstGeom prst="rect">
+            <a:avLst/>
+          </a:prstGeom>
+        </p:spPr>
+      </p:pic>
+    </p:spTree>
+    <p:extLst>
+      <p:ext uri="{BB962C8B-B14F-4D97-AF65-F5344CB8AC3E}">
+        <p14:creationId xmlns:p14="http://schemas.microsoft.com/office/powerpoint/2010/main" val="4231850664"/>
+      </p:ext>
+    </p:extLst>
+  </p:cSld>
+  <p:clrMapOvr>
+    <a:masterClrMapping/>
+  </p:clrMapOvr>
+  <p:transition spd="slow">
+    <p:push dir="u"/>
+  </p:transition>
+</p:sld>
+</file>
+
+<file path=ppt/slides/slide5.xml><?xml version="1.0" encoding="utf-8"?>
+<p:sld xmlns:a="http://schemas.openxmlformats.org/drawingml/2006/main" xmlns:r="http://schemas.openxmlformats.org/officeDocument/2006/relationships" xmlns:p="http://schemas.openxmlformats.org/presentationml/2006/main">
+  <p:cSld>
+    <p:bg>
+      <p:bgPr>
+        <a:solidFill>
+          <a:schemeClr val="accent6">
+            <a:lumMod val="60000"/>
+            <a:lumOff val="40000"/>
+          </a:schemeClr>
+        </a:solidFill>
+        <a:effectLst/>
+      </p:bgPr>
+    </p:bg>
+    <p:spTree>
+      <p:nvGrpSpPr>
+        <p:cNvPr id="1" name=""/>
+        <p:cNvGrpSpPr/>
+        <p:nvPr/>
+      </p:nvGrpSpPr>
+      <p:grpSpPr>
+        <a:xfrm>
+          <a:off x="0" y="0"/>
+          <a:ext cx="0" cy="0"/>
+          <a:chOff x="0" y="0"/>
+          <a:chExt cx="0" cy="0"/>
+        </a:xfrm>
+      </p:grpSpPr>
+      <p:sp>
+        <p:nvSpPr>
+          <p:cNvPr id="4" name="Rectangle 3">
+            <a:extLst>
+              <a:ext uri="{FF2B5EF4-FFF2-40B4-BE49-F238E27FC236}">
                 <a16:creationId xmlns:a16="http://schemas.microsoft.com/office/drawing/2014/main" id="{010246EA-E72E-45C3-916A-E1D62D465FB7}"/>
               </a:ext>
             </a:extLst>
@@ -6869,7 +7320,7 @@
 </p:sld>
 </file>
 
-<file path=ppt/slides/slide5.xml><?xml version="1.0" encoding="utf-8"?>
+<file path=ppt/slides/slide6.xml><?xml version="1.0" encoding="utf-8"?>
 <p:sld xmlns:a="http://schemas.openxmlformats.org/drawingml/2006/main" xmlns:r="http://schemas.openxmlformats.org/officeDocument/2006/relationships" xmlns:p="http://schemas.openxmlformats.org/presentationml/2006/main">
   <p:cSld>
     <p:bg>
@@ -7980,7 +8431,7 @@
 </p:sld>
 </file>
 
-<file path=ppt/slides/slide6.xml><?xml version="1.0" encoding="utf-8"?>
+<file path=ppt/slides/slide7.xml><?xml version="1.0" encoding="utf-8"?>
 <p:sld xmlns:a="http://schemas.openxmlformats.org/drawingml/2006/main" xmlns:r="http://schemas.openxmlformats.org/officeDocument/2006/relationships" xmlns:p="http://schemas.openxmlformats.org/presentationml/2006/main">
   <p:cSld>
     <p:spTree>
@@ -8701,7 +9152,7 @@
 </p:sld>
 </file>
 
-<file path=ppt/slides/slide7.xml><?xml version="1.0" encoding="utf-8"?>
+<file path=ppt/slides/slide8.xml><?xml version="1.0" encoding="utf-8"?>
 <p:sld xmlns:a="http://schemas.openxmlformats.org/drawingml/2006/main" xmlns:r="http://schemas.openxmlformats.org/officeDocument/2006/relationships" xmlns:p="http://schemas.openxmlformats.org/presentationml/2006/main">
   <p:cSld>
     <p:bg>
@@ -9661,7 +10112,7 @@
 </p:sld>
 </file>
 
-<file path=ppt/slides/slide8.xml><?xml version="1.0" encoding="utf-8"?>
+<file path=ppt/slides/slide9.xml><?xml version="1.0" encoding="utf-8"?>
 <p:sld xmlns:a="http://schemas.openxmlformats.org/drawingml/2006/main" xmlns:r="http://schemas.openxmlformats.org/officeDocument/2006/relationships" xmlns:p="http://schemas.openxmlformats.org/presentationml/2006/main">
   <p:cSld>
     <p:bg>

</xml_diff>

<commit_message>
update all seasons page
</commit_message>
<xml_diff>
--- a/Powerpoints/BannerManagment.pptx
+++ b/Powerpoints/BannerManagment.pptx
@@ -4561,7 +4561,7 @@
         </p:nvSpPr>
         <p:spPr>
           <a:xfrm>
-            <a:off x="334376" y="1168064"/>
+            <a:off x="313081" y="888815"/>
             <a:ext cx="2000035" cy="523220"/>
           </a:xfrm>
           <a:prstGeom prst="rect">
@@ -4605,7 +4605,7 @@
         </p:nvSpPr>
         <p:spPr>
           <a:xfrm>
-            <a:off x="10803881" y="3902265"/>
+            <a:off x="10803881" y="3494299"/>
             <a:ext cx="583096" cy="570964"/>
           </a:xfrm>
           <a:prstGeom prst="rightArrow">
@@ -4657,7 +4657,7 @@
         </p:nvSpPr>
         <p:spPr>
           <a:xfrm flipH="1">
-            <a:off x="433245" y="3951823"/>
+            <a:off x="433245" y="3543857"/>
             <a:ext cx="583096" cy="570964"/>
           </a:xfrm>
           <a:prstGeom prst="rightArrow">
@@ -4722,7 +4722,7 @@
         </p:blipFill>
         <p:spPr>
           <a:xfrm>
-            <a:off x="1334394" y="3447078"/>
+            <a:off x="1334394" y="3039112"/>
             <a:ext cx="1957445" cy="2170574"/>
           </a:xfrm>
           <a:prstGeom prst="rect">
@@ -4757,7 +4757,7 @@
         </p:blipFill>
         <p:spPr>
           <a:xfrm>
-            <a:off x="3721022" y="3400867"/>
+            <a:off x="3721022" y="2992901"/>
             <a:ext cx="1970697" cy="2192800"/>
           </a:xfrm>
           <a:prstGeom prst="rect">
@@ -4792,7 +4792,7 @@
         </p:blipFill>
         <p:spPr>
           <a:xfrm>
-            <a:off x="6053004" y="3314451"/>
+            <a:off x="6053004" y="2906485"/>
             <a:ext cx="1970696" cy="2279082"/>
           </a:xfrm>
           <a:prstGeom prst="rect">
@@ -4827,7 +4827,7 @@
         </p:blipFill>
         <p:spPr>
           <a:xfrm>
-            <a:off x="8475397" y="3352160"/>
+            <a:off x="8475397" y="2944194"/>
             <a:ext cx="1951892" cy="2265491"/>
           </a:xfrm>
           <a:prstGeom prst="rect">
@@ -4850,13 +4850,13 @@
           <p:nvPr>
             <p:extLst>
               <p:ext uri="{D42A27DB-BD31-4B8C-83A1-F6EECF244321}">
-                <p14:modId xmlns:p14="http://schemas.microsoft.com/office/powerpoint/2010/main" val="728742402"/>
+                <p14:modId xmlns:p14="http://schemas.microsoft.com/office/powerpoint/2010/main" val="262425608"/>
               </p:ext>
             </p:extLst>
           </p:nvPr>
         </p:nvGraphicFramePr>
         <p:xfrm>
-          <a:off x="547358" y="1834657"/>
+          <a:off x="547358" y="1548705"/>
           <a:ext cx="10787705" cy="1112520"/>
         </p:xfrm>
         <a:graphic>
@@ -5124,7 +5124,7 @@
         </p:nvSpPr>
         <p:spPr>
           <a:xfrm>
-            <a:off x="2313116" y="1219773"/>
+            <a:off x="2313116" y="937037"/>
             <a:ext cx="5561199" cy="400110"/>
           </a:xfrm>
           <a:prstGeom prst="rect">
@@ -5194,7 +5194,7 @@
         </p:nvSpPr>
         <p:spPr>
           <a:xfrm>
-            <a:off x="431967" y="504520"/>
+            <a:off x="309914" y="239861"/>
             <a:ext cx="3395003" cy="523220"/>
           </a:xfrm>
           <a:prstGeom prst="rect">
@@ -5225,6 +5225,9 @@
   <p:clrMapOvr>
     <a:masterClrMapping/>
   </p:clrMapOvr>
+  <p:transition spd="slow">
+    <p:push dir="u"/>
+  </p:transition>
 </p:sld>
 </file>
 

</xml_diff>

<commit_message>
updated all pages navigation bar and banner info page
</commit_message>
<xml_diff>
--- a/Powerpoints/BannerManagment.pptx
+++ b/Powerpoints/BannerManagment.pptx
@@ -5,7 +5,7 @@
     <p:sldMasterId id="2147483648" r:id="rId1"/>
   </p:sldMasterIdLst>
   <p:notesMasterIdLst>
-    <p:notesMasterId r:id="rId13"/>
+    <p:notesMasterId r:id="rId14"/>
   </p:notesMasterIdLst>
   <p:sldIdLst>
     <p:sldId id="265" r:id="rId2"/>
@@ -19,6 +19,7 @@
     <p:sldId id="263" r:id="rId10"/>
     <p:sldId id="264" r:id="rId11"/>
     <p:sldId id="259" r:id="rId12"/>
+    <p:sldId id="268" r:id="rId13"/>
   </p:sldIdLst>
   <p:sldSz cx="12192000" cy="6858000"/>
   <p:notesSz cx="6858000" cy="9144000"/>
@@ -207,7 +208,7 @@
           <a:p>
             <a:fld id="{C6E956D7-A710-4769-B6DE-C39F782727B0}" type="datetimeFigureOut">
               <a:rPr lang="en-US" smtClean="0"/>
-              <a:t>6/26/2019</a:t>
+              <a:t>6/27/2019</a:t>
             </a:fld>
             <a:endParaRPr lang="en-US"/>
           </a:p>
@@ -795,7 +796,7 @@
           <a:p>
             <a:fld id="{62881ACC-2D14-4FEA-B766-B07C5C643364}" type="datetimeFigureOut">
               <a:rPr lang="en-US" smtClean="0"/>
-              <a:t>6/26/2019</a:t>
+              <a:t>6/27/2019</a:t>
             </a:fld>
             <a:endParaRPr lang="en-US"/>
           </a:p>
@@ -993,7 +994,7 @@
           <a:p>
             <a:fld id="{62881ACC-2D14-4FEA-B766-B07C5C643364}" type="datetimeFigureOut">
               <a:rPr lang="en-US" smtClean="0"/>
-              <a:t>6/26/2019</a:t>
+              <a:t>6/27/2019</a:t>
             </a:fld>
             <a:endParaRPr lang="en-US"/>
           </a:p>
@@ -1201,7 +1202,7 @@
           <a:p>
             <a:fld id="{62881ACC-2D14-4FEA-B766-B07C5C643364}" type="datetimeFigureOut">
               <a:rPr lang="en-US" smtClean="0"/>
-              <a:t>6/26/2019</a:t>
+              <a:t>6/27/2019</a:t>
             </a:fld>
             <a:endParaRPr lang="en-US"/>
           </a:p>
@@ -1399,7 +1400,7 @@
           <a:p>
             <a:fld id="{62881ACC-2D14-4FEA-B766-B07C5C643364}" type="datetimeFigureOut">
               <a:rPr lang="en-US" smtClean="0"/>
-              <a:t>6/26/2019</a:t>
+              <a:t>6/27/2019</a:t>
             </a:fld>
             <a:endParaRPr lang="en-US"/>
           </a:p>
@@ -1674,7 +1675,7 @@
           <a:p>
             <a:fld id="{62881ACC-2D14-4FEA-B766-B07C5C643364}" type="datetimeFigureOut">
               <a:rPr lang="en-US" smtClean="0"/>
-              <a:t>6/26/2019</a:t>
+              <a:t>6/27/2019</a:t>
             </a:fld>
             <a:endParaRPr lang="en-US"/>
           </a:p>
@@ -1939,7 +1940,7 @@
           <a:p>
             <a:fld id="{62881ACC-2D14-4FEA-B766-B07C5C643364}" type="datetimeFigureOut">
               <a:rPr lang="en-US" smtClean="0"/>
-              <a:t>6/26/2019</a:t>
+              <a:t>6/27/2019</a:t>
             </a:fld>
             <a:endParaRPr lang="en-US"/>
           </a:p>
@@ -2351,7 +2352,7 @@
           <a:p>
             <a:fld id="{62881ACC-2D14-4FEA-B766-B07C5C643364}" type="datetimeFigureOut">
               <a:rPr lang="en-US" smtClean="0"/>
-              <a:t>6/26/2019</a:t>
+              <a:t>6/27/2019</a:t>
             </a:fld>
             <a:endParaRPr lang="en-US"/>
           </a:p>
@@ -2492,7 +2493,7 @@
           <a:p>
             <a:fld id="{62881ACC-2D14-4FEA-B766-B07C5C643364}" type="datetimeFigureOut">
               <a:rPr lang="en-US" smtClean="0"/>
-              <a:t>6/26/2019</a:t>
+              <a:t>6/27/2019</a:t>
             </a:fld>
             <a:endParaRPr lang="en-US"/>
           </a:p>
@@ -2605,7 +2606,7 @@
           <a:p>
             <a:fld id="{62881ACC-2D14-4FEA-B766-B07C5C643364}" type="datetimeFigureOut">
               <a:rPr lang="en-US" smtClean="0"/>
-              <a:t>6/26/2019</a:t>
+              <a:t>6/27/2019</a:t>
             </a:fld>
             <a:endParaRPr lang="en-US"/>
           </a:p>
@@ -2916,7 +2917,7 @@
           <a:p>
             <a:fld id="{62881ACC-2D14-4FEA-B766-B07C5C643364}" type="datetimeFigureOut">
               <a:rPr lang="en-US" smtClean="0"/>
-              <a:t>6/26/2019</a:t>
+              <a:t>6/27/2019</a:t>
             </a:fld>
             <a:endParaRPr lang="en-US"/>
           </a:p>
@@ -3204,7 +3205,7 @@
           <a:p>
             <a:fld id="{62881ACC-2D14-4FEA-B766-B07C5C643364}" type="datetimeFigureOut">
               <a:rPr lang="en-US" smtClean="0"/>
-              <a:t>6/26/2019</a:t>
+              <a:t>6/27/2019</a:t>
             </a:fld>
             <a:endParaRPr lang="en-US"/>
           </a:p>
@@ -3445,7 +3446,7 @@
           <a:p>
             <a:fld id="{62881ACC-2D14-4FEA-B766-B07C5C643364}" type="datetimeFigureOut">
               <a:rPr lang="en-US" smtClean="0"/>
-              <a:t>6/26/2019</a:t>
+              <a:t>6/27/2019</a:t>
             </a:fld>
             <a:endParaRPr lang="en-US"/>
           </a:p>
@@ -4253,13 +4254,13 @@
   <p:clrMapOvr>
     <a:masterClrMapping/>
   </p:clrMapOvr>
-  <mc:AlternateContent xmlns:mc="http://schemas.openxmlformats.org/markup-compatibility/2006">
-    <mc:Choice xmlns:p15="http://schemas.microsoft.com/office/powerpoint/2012/main" Requires="p15">
+  <mc:AlternateContent xmlns:mc="http://schemas.openxmlformats.org/markup-compatibility/2006" xmlns:p15="http://schemas.microsoft.com/office/powerpoint/2012/main">
+    <mc:Choice Requires="p15">
       <p:transition xmlns:p14="http://schemas.microsoft.com/office/powerpoint/2010/main" spd="slow" p14:dur="6000">
         <p15:prstTrans prst="curtains"/>
       </p:transition>
     </mc:Choice>
-    <mc:Fallback>
+    <mc:Fallback xmlns="">
       <p:transition spd="slow">
         <p:fade/>
       </p:transition>
@@ -5273,7 +5274,7 @@
         </p:nvSpPr>
         <p:spPr>
           <a:xfrm>
-            <a:off x="225668" y="189914"/>
+            <a:off x="225668" y="105509"/>
             <a:ext cx="11807484" cy="6421902"/>
           </a:xfrm>
           <a:prstGeom prst="rect">
@@ -5793,6 +5794,70 @@
           </a:prstGeom>
         </p:spPr>
       </p:pic>
+      <p:sp>
+        <p:nvSpPr>
+          <p:cNvPr id="12" name="Rectangle 11">
+            <a:extLst>
+              <a:ext uri="{FF2B5EF4-FFF2-40B4-BE49-F238E27FC236}">
+                <a16:creationId xmlns:a16="http://schemas.microsoft.com/office/drawing/2014/main" id="{8ADF4291-93A3-4500-9E11-931E2A20C286}"/>
+              </a:ext>
+            </a:extLst>
+          </p:cNvPr>
+          <p:cNvSpPr/>
+          <p:nvPr/>
+        </p:nvSpPr>
+        <p:spPr>
+          <a:xfrm>
+            <a:off x="647114" y="5050302"/>
+            <a:ext cx="4093698" cy="464234"/>
+          </a:xfrm>
+          <a:prstGeom prst="rect">
+            <a:avLst/>
+          </a:prstGeom>
+          <a:solidFill>
+            <a:schemeClr val="accent6">
+              <a:lumMod val="20000"/>
+              <a:lumOff val="80000"/>
+            </a:schemeClr>
+          </a:solidFill>
+          <a:ln>
+            <a:solidFill>
+              <a:schemeClr val="tx1"/>
+            </a:solidFill>
+          </a:ln>
+        </p:spPr>
+        <p:style>
+          <a:lnRef idx="2">
+            <a:schemeClr val="accent1">
+              <a:shade val="50000"/>
+            </a:schemeClr>
+          </a:lnRef>
+          <a:fillRef idx="1">
+            <a:schemeClr val="accent1"/>
+          </a:fillRef>
+          <a:effectRef idx="0">
+            <a:schemeClr val="accent1"/>
+          </a:effectRef>
+          <a:fontRef idx="minor">
+            <a:schemeClr val="lt1"/>
+          </a:fontRef>
+        </p:style>
+        <p:txBody>
+          <a:bodyPr rtlCol="0" anchor="ctr"/>
+          <a:lstStyle/>
+          <a:p>
+            <a:pPr algn="ctr"/>
+            <a:r>
+              <a:rPr lang="en-US" dirty="0">
+                <a:solidFill>
+                  <a:schemeClr val="tx1"/>
+                </a:solidFill>
+              </a:rPr>
+              <a:t>CLICK ME WHEN YOU USE THIS BANNER</a:t>
+            </a:r>
+          </a:p>
+        </p:txBody>
+      </p:sp>
     </p:spTree>
     <p:extLst>
       <p:ext uri="{BB962C8B-B14F-4D97-AF65-F5344CB8AC3E}">
@@ -5803,18 +5868,703 @@
   <p:clrMapOvr>
     <a:masterClrMapping/>
   </p:clrMapOvr>
-  <mc:AlternateContent xmlns:mc="http://schemas.openxmlformats.org/markup-compatibility/2006">
-    <mc:Choice xmlns:p15="http://schemas.microsoft.com/office/powerpoint/2012/main" Requires="p15">
+  <mc:AlternateContent xmlns:mc="http://schemas.openxmlformats.org/markup-compatibility/2006" xmlns:p15="http://schemas.microsoft.com/office/powerpoint/2012/main">
+    <mc:Choice Requires="p15">
       <p:transition xmlns:p14="http://schemas.microsoft.com/office/powerpoint/2010/main" spd="slow" p14:dur="2000">
         <p15:prstTrans prst="drape"/>
       </p:transition>
     </mc:Choice>
-    <mc:Fallback>
+    <mc:Fallback xmlns="">
       <p:transition spd="slow">
         <p:fade/>
       </p:transition>
     </mc:Fallback>
   </mc:AlternateContent>
+</p:sld>
+</file>
+
+<file path=ppt/slides/slide12.xml><?xml version="1.0" encoding="utf-8"?>
+<p:sld xmlns:a="http://schemas.openxmlformats.org/drawingml/2006/main" xmlns:r="http://schemas.openxmlformats.org/officeDocument/2006/relationships" xmlns:p="http://schemas.openxmlformats.org/presentationml/2006/main">
+  <p:cSld>
+    <p:bg>
+      <p:bgPr>
+        <a:solidFill>
+          <a:schemeClr val="accent6">
+            <a:lumMod val="60000"/>
+            <a:lumOff val="40000"/>
+          </a:schemeClr>
+        </a:solidFill>
+        <a:effectLst/>
+      </p:bgPr>
+    </p:bg>
+    <p:spTree>
+      <p:nvGrpSpPr>
+        <p:cNvPr id="1" name=""/>
+        <p:cNvGrpSpPr/>
+        <p:nvPr/>
+      </p:nvGrpSpPr>
+      <p:grpSpPr>
+        <a:xfrm>
+          <a:off x="0" y="0"/>
+          <a:ext cx="0" cy="0"/>
+          <a:chOff x="0" y="0"/>
+          <a:chExt cx="0" cy="0"/>
+        </a:xfrm>
+      </p:grpSpPr>
+      <p:sp>
+        <p:nvSpPr>
+          <p:cNvPr id="4" name="Rectangle 3">
+            <a:extLst>
+              <a:ext uri="{FF2B5EF4-FFF2-40B4-BE49-F238E27FC236}">
+                <a16:creationId xmlns:a16="http://schemas.microsoft.com/office/drawing/2014/main" id="{56611CA0-EBE0-4B6E-9EF3-66E2B0CD7394}"/>
+              </a:ext>
+            </a:extLst>
+          </p:cNvPr>
+          <p:cNvSpPr/>
+          <p:nvPr/>
+        </p:nvSpPr>
+        <p:spPr>
+          <a:xfrm>
+            <a:off x="197532" y="119580"/>
+            <a:ext cx="11807484" cy="6421902"/>
+          </a:xfrm>
+          <a:prstGeom prst="rect">
+            <a:avLst/>
+          </a:prstGeom>
+          <a:solidFill>
+            <a:schemeClr val="accent6">
+              <a:lumMod val="40000"/>
+              <a:lumOff val="60000"/>
+            </a:schemeClr>
+          </a:solidFill>
+          <a:ln>
+            <a:solidFill>
+              <a:schemeClr val="tx1"/>
+            </a:solidFill>
+          </a:ln>
+        </p:spPr>
+        <p:style>
+          <a:lnRef idx="2">
+            <a:schemeClr val="accent1">
+              <a:shade val="50000"/>
+            </a:schemeClr>
+          </a:lnRef>
+          <a:fillRef idx="1">
+            <a:schemeClr val="accent1"/>
+          </a:fillRef>
+          <a:effectRef idx="0">
+            <a:schemeClr val="accent1"/>
+          </a:effectRef>
+          <a:fontRef idx="minor">
+            <a:schemeClr val="lt1"/>
+          </a:fontRef>
+        </p:style>
+        <p:txBody>
+          <a:bodyPr rtlCol="0" anchor="ctr"/>
+          <a:lstStyle/>
+          <a:p>
+            <a:pPr algn="ctr"/>
+            <a:endParaRPr lang="en-US"/>
+          </a:p>
+        </p:txBody>
+      </p:sp>
+      <p:sp>
+        <p:nvSpPr>
+          <p:cNvPr id="5" name="Rectangle 4">
+            <a:extLst>
+              <a:ext uri="{FF2B5EF4-FFF2-40B4-BE49-F238E27FC236}">
+                <a16:creationId xmlns:a16="http://schemas.microsoft.com/office/drawing/2014/main" id="{02C84823-3F7D-40E0-B99C-54220487708F}"/>
+              </a:ext>
+            </a:extLst>
+          </p:cNvPr>
+          <p:cNvSpPr/>
+          <p:nvPr/>
+        </p:nvSpPr>
+        <p:spPr>
+          <a:xfrm>
+            <a:off x="520504" y="562707"/>
+            <a:ext cx="2616591" cy="3516923"/>
+          </a:xfrm>
+          <a:prstGeom prst="rect">
+            <a:avLst/>
+          </a:prstGeom>
+          <a:solidFill>
+            <a:schemeClr val="bg1"/>
+          </a:solidFill>
+        </p:spPr>
+        <p:style>
+          <a:lnRef idx="2">
+            <a:schemeClr val="accent1">
+              <a:shade val="50000"/>
+            </a:schemeClr>
+          </a:lnRef>
+          <a:fillRef idx="1">
+            <a:schemeClr val="accent1"/>
+          </a:fillRef>
+          <a:effectRef idx="0">
+            <a:schemeClr val="accent1"/>
+          </a:effectRef>
+          <a:fontRef idx="minor">
+            <a:schemeClr val="lt1"/>
+          </a:fontRef>
+        </p:style>
+        <p:txBody>
+          <a:bodyPr rtlCol="0" anchor="ctr"/>
+          <a:lstStyle/>
+          <a:p>
+            <a:pPr algn="ctr"/>
+            <a:endParaRPr lang="en-US"/>
+          </a:p>
+        </p:txBody>
+      </p:sp>
+      <p:pic>
+        <p:nvPicPr>
+          <p:cNvPr id="6" name="Picture 5" descr="A close up of a sign&#10;&#10;Description automatically generated">
+            <a:extLst>
+              <a:ext uri="{FF2B5EF4-FFF2-40B4-BE49-F238E27FC236}">
+                <a16:creationId xmlns:a16="http://schemas.microsoft.com/office/drawing/2014/main" id="{3C18DFD9-DB1D-47EA-92DE-C431DB9D86F7}"/>
+              </a:ext>
+            </a:extLst>
+          </p:cNvPr>
+          <p:cNvPicPr>
+            <a:picLocks noChangeAspect="1"/>
+          </p:cNvPicPr>
+          <p:nvPr/>
+        </p:nvPicPr>
+        <p:blipFill rotWithShape="1">
+          <a:blip r:embed="rId2">
+            <a:extLst>
+              <a:ext uri="{28A0092B-C50C-407E-A947-70E740481C1C}">
+                <a14:useLocalDpi xmlns:a14="http://schemas.microsoft.com/office/drawing/2010/main" val="0"/>
+              </a:ext>
+            </a:extLst>
+          </a:blip>
+          <a:srcRect l="-206" t="230" r="56299" b="12962"/>
+          <a:stretch/>
+        </p:blipFill>
+        <p:spPr>
+          <a:xfrm>
+            <a:off x="520504" y="549455"/>
+            <a:ext cx="2616591" cy="3516922"/>
+          </a:xfrm>
+          <a:prstGeom prst="rect">
+            <a:avLst/>
+          </a:prstGeom>
+        </p:spPr>
+      </p:pic>
+      <p:sp>
+        <p:nvSpPr>
+          <p:cNvPr id="7" name="TextBox 6">
+            <a:extLst>
+              <a:ext uri="{FF2B5EF4-FFF2-40B4-BE49-F238E27FC236}">
+                <a16:creationId xmlns:a16="http://schemas.microsoft.com/office/drawing/2014/main" id="{F3536080-835F-4D0D-9ADA-134EC71B0281}"/>
+              </a:ext>
+            </a:extLst>
+          </p:cNvPr>
+          <p:cNvSpPr txBox="1"/>
+          <p:nvPr/>
+        </p:nvSpPr>
+        <p:spPr>
+          <a:xfrm flipH="1">
+            <a:off x="3479408" y="562707"/>
+            <a:ext cx="5300004" cy="461665"/>
+          </a:xfrm>
+          <a:prstGeom prst="rect">
+            <a:avLst/>
+          </a:prstGeom>
+          <a:noFill/>
+        </p:spPr>
+        <p:txBody>
+          <a:bodyPr wrap="square" rtlCol="0">
+            <a:spAutoFit/>
+          </a:bodyPr>
+          <a:lstStyle/>
+          <a:p>
+            <a:r>
+              <a:rPr lang="en-US" sz="2400" b="1" dirty="0"/>
+              <a:t>BANNER HISTORY:</a:t>
+            </a:r>
+          </a:p>
+        </p:txBody>
+      </p:sp>
+      <p:sp>
+        <p:nvSpPr>
+          <p:cNvPr id="8" name="TextBox 7">
+            <a:extLst>
+              <a:ext uri="{FF2B5EF4-FFF2-40B4-BE49-F238E27FC236}">
+                <a16:creationId xmlns:a16="http://schemas.microsoft.com/office/drawing/2014/main" id="{F9B138AE-FAFF-4317-8B72-ED1B34E424B7}"/>
+              </a:ext>
+            </a:extLst>
+          </p:cNvPr>
+          <p:cNvSpPr txBox="1"/>
+          <p:nvPr/>
+        </p:nvSpPr>
+        <p:spPr>
+          <a:xfrm flipH="1">
+            <a:off x="3479408" y="2136502"/>
+            <a:ext cx="5300004" cy="461665"/>
+          </a:xfrm>
+          <a:prstGeom prst="rect">
+            <a:avLst/>
+          </a:prstGeom>
+          <a:noFill/>
+        </p:spPr>
+        <p:txBody>
+          <a:bodyPr wrap="square" rtlCol="0">
+            <a:spAutoFit/>
+          </a:bodyPr>
+          <a:lstStyle/>
+          <a:p>
+            <a:r>
+              <a:rPr lang="en-US" sz="2400" b="1" dirty="0"/>
+              <a:t>WHERE TO FIND:</a:t>
+            </a:r>
+          </a:p>
+        </p:txBody>
+      </p:sp>
+      <p:sp>
+        <p:nvSpPr>
+          <p:cNvPr id="9" name="TextBox 8">
+            <a:extLst>
+              <a:ext uri="{FF2B5EF4-FFF2-40B4-BE49-F238E27FC236}">
+                <a16:creationId xmlns:a16="http://schemas.microsoft.com/office/drawing/2014/main" id="{E349BF97-0F75-4AAD-AA83-49266779BF34}"/>
+              </a:ext>
+            </a:extLst>
+          </p:cNvPr>
+          <p:cNvSpPr txBox="1"/>
+          <p:nvPr/>
+        </p:nvSpPr>
+        <p:spPr>
+          <a:xfrm flipH="1">
+            <a:off x="3479408" y="1294228"/>
+            <a:ext cx="7535595" cy="923330"/>
+          </a:xfrm>
+          <a:prstGeom prst="rect">
+            <a:avLst/>
+          </a:prstGeom>
+          <a:noFill/>
+        </p:spPr>
+        <p:txBody>
+          <a:bodyPr wrap="square" rtlCol="0">
+            <a:spAutoFit/>
+          </a:bodyPr>
+          <a:lstStyle/>
+          <a:p>
+            <a:pPr marL="285750" indent="-285750">
+              <a:buFont typeface="Arial" panose="020B0604020202020204" pitchFamily="34" charset="0"/>
+              <a:buChar char="•"/>
+            </a:pPr>
+            <a:r>
+              <a:rPr lang="en-US" dirty="0"/>
+              <a:t>IT WAS PRINTED IN THE YEAR 2016</a:t>
+            </a:r>
+          </a:p>
+          <a:p>
+            <a:pPr marL="285750" indent="-285750">
+              <a:buFont typeface="Arial" panose="020B0604020202020204" pitchFamily="34" charset="0"/>
+              <a:buChar char="•"/>
+            </a:pPr>
+            <a:r>
+              <a:rPr lang="en-US" dirty="0"/>
+              <a:t>12*16*19</a:t>
+            </a:r>
+          </a:p>
+          <a:p>
+            <a:endParaRPr lang="en-US" dirty="0"/>
+          </a:p>
+        </p:txBody>
+      </p:sp>
+      <p:sp>
+        <p:nvSpPr>
+          <p:cNvPr id="10" name="TextBox 9">
+            <a:extLst>
+              <a:ext uri="{FF2B5EF4-FFF2-40B4-BE49-F238E27FC236}">
+                <a16:creationId xmlns:a16="http://schemas.microsoft.com/office/drawing/2014/main" id="{CA8F4907-FB0F-44AC-AE31-A98258052CE4}"/>
+              </a:ext>
+            </a:extLst>
+          </p:cNvPr>
+          <p:cNvSpPr txBox="1"/>
+          <p:nvPr/>
+        </p:nvSpPr>
+        <p:spPr>
+          <a:xfrm>
+            <a:off x="3479409" y="2827606"/>
+            <a:ext cx="8192088" cy="923330"/>
+          </a:xfrm>
+          <a:prstGeom prst="rect">
+            <a:avLst/>
+          </a:prstGeom>
+          <a:noFill/>
+        </p:spPr>
+        <p:txBody>
+          <a:bodyPr wrap="square" rtlCol="0">
+            <a:spAutoFit/>
+          </a:bodyPr>
+          <a:lstStyle/>
+          <a:p>
+            <a:pPr marL="285750" indent="-285750">
+              <a:buFont typeface="Arial" panose="020B0604020202020204" pitchFamily="34" charset="0"/>
+              <a:buChar char="•"/>
+            </a:pPr>
+            <a:r>
+              <a:rPr lang="en-US" dirty="0"/>
+              <a:t>3</a:t>
+            </a:r>
+            <a:r>
+              <a:rPr lang="en-US" baseline="30000" dirty="0"/>
+              <a:t>RD</a:t>
+            </a:r>
+            <a:r>
+              <a:rPr lang="en-US" dirty="0"/>
+              <a:t> RACK IN THE BASEMENT</a:t>
+            </a:r>
+          </a:p>
+          <a:p>
+            <a:pPr marL="285750" indent="-285750">
+              <a:buFont typeface="Arial" panose="020B0604020202020204" pitchFamily="34" charset="0"/>
+              <a:buChar char="•"/>
+            </a:pPr>
+            <a:r>
+              <a:rPr lang="en-US" dirty="0"/>
+              <a:t>TOP SHELF</a:t>
+            </a:r>
+          </a:p>
+          <a:p>
+            <a:pPr marL="285750" indent="-285750">
+              <a:buFont typeface="Arial" panose="020B0604020202020204" pitchFamily="34" charset="0"/>
+              <a:buChar char="•"/>
+            </a:pPr>
+            <a:r>
+              <a:rPr lang="en-US" dirty="0"/>
+              <a:t>IN THE BLUE ROUND ROLL</a:t>
+            </a:r>
+          </a:p>
+        </p:txBody>
+      </p:sp>
+      <p:sp>
+        <p:nvSpPr>
+          <p:cNvPr id="11" name="Rectangle 10">
+            <a:extLst>
+              <a:ext uri="{FF2B5EF4-FFF2-40B4-BE49-F238E27FC236}">
+                <a16:creationId xmlns:a16="http://schemas.microsoft.com/office/drawing/2014/main" id="{F137E050-0695-43F9-B99F-5EB8A098B4AF}"/>
+              </a:ext>
+            </a:extLst>
+          </p:cNvPr>
+          <p:cNvSpPr/>
+          <p:nvPr/>
+        </p:nvSpPr>
+        <p:spPr>
+          <a:xfrm>
+            <a:off x="647114" y="4403188"/>
+            <a:ext cx="2321169" cy="464234"/>
+          </a:xfrm>
+          <a:prstGeom prst="rect">
+            <a:avLst/>
+          </a:prstGeom>
+          <a:solidFill>
+            <a:schemeClr val="accent6">
+              <a:lumMod val="20000"/>
+              <a:lumOff val="80000"/>
+            </a:schemeClr>
+          </a:solidFill>
+        </p:spPr>
+        <p:style>
+          <a:lnRef idx="2">
+            <a:schemeClr val="accent1">
+              <a:shade val="50000"/>
+            </a:schemeClr>
+          </a:lnRef>
+          <a:fillRef idx="1">
+            <a:schemeClr val="accent1"/>
+          </a:fillRef>
+          <a:effectRef idx="0">
+            <a:schemeClr val="accent1"/>
+          </a:effectRef>
+          <a:fontRef idx="minor">
+            <a:schemeClr val="lt1"/>
+          </a:fontRef>
+        </p:style>
+        <p:txBody>
+          <a:bodyPr rtlCol="0" anchor="ctr"/>
+          <a:lstStyle/>
+          <a:p>
+            <a:pPr algn="ctr"/>
+            <a:r>
+              <a:rPr lang="en-US" dirty="0">
+                <a:solidFill>
+                  <a:schemeClr val="tx1"/>
+                </a:solidFill>
+              </a:rPr>
+              <a:t>BANNER CODE : 3TBR</a:t>
+            </a:r>
+          </a:p>
+        </p:txBody>
+      </p:sp>
+      <p:sp>
+        <p:nvSpPr>
+          <p:cNvPr id="12" name="Rectangle 11">
+            <a:extLst>
+              <a:ext uri="{FF2B5EF4-FFF2-40B4-BE49-F238E27FC236}">
+                <a16:creationId xmlns:a16="http://schemas.microsoft.com/office/drawing/2014/main" id="{76CDFF0B-AF2F-471A-9D66-00FF04F0E6D1}"/>
+              </a:ext>
+            </a:extLst>
+          </p:cNvPr>
+          <p:cNvSpPr/>
+          <p:nvPr/>
+        </p:nvSpPr>
+        <p:spPr>
+          <a:xfrm>
+            <a:off x="3479408" y="3804515"/>
+            <a:ext cx="3177858" cy="461665"/>
+          </a:xfrm>
+          <a:prstGeom prst="rect">
+            <a:avLst/>
+          </a:prstGeom>
+          <a:noFill/>
+        </p:spPr>
+        <p:txBody>
+          <a:bodyPr wrap="none" lIns="91440" tIns="45720" rIns="91440" bIns="45720">
+            <a:spAutoFit/>
+          </a:bodyPr>
+          <a:lstStyle/>
+          <a:p>
+            <a:pPr algn="ctr"/>
+            <a:r>
+              <a:rPr lang="en-US" sz="2400" b="1" cap="none" spc="0" dirty="0">
+                <a:ln w="0"/>
+                <a:solidFill>
+                  <a:schemeClr val="tx1"/>
+                </a:solidFill>
+                <a:effectLst>
+                  <a:outerShdw blurRad="38100" dist="19050" dir="2700000" algn="tl" rotWithShape="0">
+                    <a:schemeClr val="dk1">
+                      <a:alpha val="40000"/>
+                    </a:schemeClr>
+                  </a:outerShdw>
+                </a:effectLst>
+              </a:rPr>
+              <a:t>SPECIAL INSTRUCTIONS</a:t>
+            </a:r>
+          </a:p>
+        </p:txBody>
+      </p:sp>
+      <p:sp>
+        <p:nvSpPr>
+          <p:cNvPr id="13" name="Rectangle 12">
+            <a:extLst>
+              <a:ext uri="{FF2B5EF4-FFF2-40B4-BE49-F238E27FC236}">
+                <a16:creationId xmlns:a16="http://schemas.microsoft.com/office/drawing/2014/main" id="{EFD4CA1E-AA1E-4DD1-95AA-250B791134F5}"/>
+              </a:ext>
+            </a:extLst>
+          </p:cNvPr>
+          <p:cNvSpPr/>
+          <p:nvPr/>
+        </p:nvSpPr>
+        <p:spPr>
+          <a:xfrm>
+            <a:off x="9468730" y="387170"/>
+            <a:ext cx="1546273" cy="461665"/>
+          </a:xfrm>
+          <a:prstGeom prst="rect">
+            <a:avLst/>
+          </a:prstGeom>
+          <a:solidFill>
+            <a:schemeClr val="accent6">
+              <a:lumMod val="40000"/>
+              <a:lumOff val="60000"/>
+            </a:schemeClr>
+          </a:solidFill>
+          <a:ln>
+            <a:solidFill>
+              <a:schemeClr val="accent6">
+                <a:lumMod val="50000"/>
+              </a:schemeClr>
+            </a:solidFill>
+          </a:ln>
+        </p:spPr>
+        <p:style>
+          <a:lnRef idx="2">
+            <a:schemeClr val="accent1">
+              <a:shade val="50000"/>
+            </a:schemeClr>
+          </a:lnRef>
+          <a:fillRef idx="1">
+            <a:schemeClr val="accent1"/>
+          </a:fillRef>
+          <a:effectRef idx="0">
+            <a:schemeClr val="accent1"/>
+          </a:effectRef>
+          <a:fontRef idx="minor">
+            <a:schemeClr val="lt1"/>
+          </a:fontRef>
+        </p:style>
+        <p:txBody>
+          <a:bodyPr rtlCol="0" anchor="ctr"/>
+          <a:lstStyle/>
+          <a:p>
+            <a:pPr algn="ctr"/>
+            <a:r>
+              <a:rPr lang="en-US" b="1" dirty="0">
+                <a:solidFill>
+                  <a:schemeClr val="tx1"/>
+                </a:solidFill>
+              </a:rPr>
+              <a:t>DELETE</a:t>
+            </a:r>
+          </a:p>
+        </p:txBody>
+      </p:sp>
+      <p:pic>
+        <p:nvPicPr>
+          <p:cNvPr id="14" name="Picture 13">
+            <a:extLst>
+              <a:ext uri="{FF2B5EF4-FFF2-40B4-BE49-F238E27FC236}">
+                <a16:creationId xmlns:a16="http://schemas.microsoft.com/office/drawing/2014/main" id="{5EBF6DE6-0C48-4491-B737-DCEEAF307834}"/>
+              </a:ext>
+            </a:extLst>
+          </p:cNvPr>
+          <p:cNvPicPr>
+            <a:picLocks noChangeAspect="1"/>
+          </p:cNvPicPr>
+          <p:nvPr/>
+        </p:nvPicPr>
+        <p:blipFill>
+          <a:blip r:embed="rId3">
+            <a:extLst>
+              <a:ext uri="{28A0092B-C50C-407E-A947-70E740481C1C}">
+                <a14:useLocalDpi xmlns:a14="http://schemas.microsoft.com/office/drawing/2010/main" val="0"/>
+              </a:ext>
+            </a:extLst>
+          </a:blip>
+          <a:stretch>
+            <a:fillRect/>
+          </a:stretch>
+        </p:blipFill>
+        <p:spPr>
+          <a:xfrm>
+            <a:off x="11207262" y="426805"/>
+            <a:ext cx="464234" cy="464234"/>
+          </a:xfrm>
+          <a:prstGeom prst="rect">
+            <a:avLst/>
+          </a:prstGeom>
+        </p:spPr>
+      </p:pic>
+      <p:sp>
+        <p:nvSpPr>
+          <p:cNvPr id="15" name="Rectangle 14">
+            <a:extLst>
+              <a:ext uri="{FF2B5EF4-FFF2-40B4-BE49-F238E27FC236}">
+                <a16:creationId xmlns:a16="http://schemas.microsoft.com/office/drawing/2014/main" id="{AC48BB5B-A217-420A-B19A-77697A4058F5}"/>
+              </a:ext>
+            </a:extLst>
+          </p:cNvPr>
+          <p:cNvSpPr/>
+          <p:nvPr/>
+        </p:nvSpPr>
+        <p:spPr>
+          <a:xfrm>
+            <a:off x="647114" y="5050302"/>
+            <a:ext cx="4093698" cy="464234"/>
+          </a:xfrm>
+          <a:prstGeom prst="rect">
+            <a:avLst/>
+          </a:prstGeom>
+          <a:solidFill>
+            <a:schemeClr val="accent6">
+              <a:lumMod val="20000"/>
+              <a:lumOff val="80000"/>
+            </a:schemeClr>
+          </a:solidFill>
+          <a:ln>
+            <a:solidFill>
+              <a:schemeClr val="tx1"/>
+            </a:solidFill>
+          </a:ln>
+        </p:spPr>
+        <p:style>
+          <a:lnRef idx="2">
+            <a:schemeClr val="accent1">
+              <a:shade val="50000"/>
+            </a:schemeClr>
+          </a:lnRef>
+          <a:fillRef idx="1">
+            <a:schemeClr val="accent1"/>
+          </a:fillRef>
+          <a:effectRef idx="0">
+            <a:schemeClr val="accent1"/>
+          </a:effectRef>
+          <a:fontRef idx="minor">
+            <a:schemeClr val="lt1"/>
+          </a:fontRef>
+        </p:style>
+        <p:txBody>
+          <a:bodyPr rtlCol="0" anchor="ctr"/>
+          <a:lstStyle/>
+          <a:p>
+            <a:pPr algn="ctr"/>
+            <a:r>
+              <a:rPr lang="en-US" dirty="0">
+                <a:solidFill>
+                  <a:schemeClr val="tx1"/>
+                </a:solidFill>
+              </a:rPr>
+              <a:t>CLICK ME WHEN YOU USE THIS BANNER</a:t>
+            </a:r>
+          </a:p>
+        </p:txBody>
+      </p:sp>
+      <p:sp>
+        <p:nvSpPr>
+          <p:cNvPr id="16" name="TextBox 15">
+            <a:extLst>
+              <a:ext uri="{FF2B5EF4-FFF2-40B4-BE49-F238E27FC236}">
+                <a16:creationId xmlns:a16="http://schemas.microsoft.com/office/drawing/2014/main" id="{E603B82A-D891-4F78-8459-D42A266B22D6}"/>
+              </a:ext>
+            </a:extLst>
+          </p:cNvPr>
+          <p:cNvSpPr txBox="1"/>
+          <p:nvPr/>
+        </p:nvSpPr>
+        <p:spPr>
+          <a:xfrm>
+            <a:off x="773722" y="5714840"/>
+            <a:ext cx="3967089" cy="646331"/>
+          </a:xfrm>
+          <a:prstGeom prst="rect">
+            <a:avLst/>
+          </a:prstGeom>
+          <a:noFill/>
+        </p:spPr>
+        <p:txBody>
+          <a:bodyPr wrap="square" rtlCol="0">
+            <a:spAutoFit/>
+          </a:bodyPr>
+          <a:lstStyle/>
+          <a:p>
+            <a:r>
+              <a:rPr lang="en-US" dirty="0"/>
+              <a:t>Used this banner for 3 times</a:t>
+            </a:r>
+          </a:p>
+          <a:p>
+            <a:r>
+              <a:rPr lang="en-US" dirty="0"/>
+              <a:t>Last used on 07/03/2019</a:t>
+            </a:r>
+          </a:p>
+        </p:txBody>
+      </p:sp>
+    </p:spTree>
+    <p:extLst>
+      <p:ext uri="{BB962C8B-B14F-4D97-AF65-F5344CB8AC3E}">
+        <p14:creationId xmlns:p14="http://schemas.microsoft.com/office/powerpoint/2010/main" val="43252568"/>
+      </p:ext>
+    </p:extLst>
+  </p:cSld>
+  <p:clrMapOvr>
+    <a:masterClrMapping/>
+  </p:clrMapOvr>
 </p:sld>
 </file>
 
@@ -9591,13 +10341,13 @@
   <p:clrMapOvr>
     <a:masterClrMapping/>
   </p:clrMapOvr>
-  <mc:AlternateContent xmlns:mc="http://schemas.openxmlformats.org/markup-compatibility/2006">
-    <mc:Choice xmlns:p14="http://schemas.microsoft.com/office/powerpoint/2010/main" Requires="p14">
+  <mc:AlternateContent xmlns:mc="http://schemas.openxmlformats.org/markup-compatibility/2006" xmlns:p14="http://schemas.microsoft.com/office/powerpoint/2010/main">
+    <mc:Choice Requires="p14">
       <p:transition spd="slow" p14:dur="1250">
         <p14:flip dir="r"/>
       </p:transition>
     </mc:Choice>
-    <mc:Fallback>
+    <mc:Fallback xmlns="">
       <p:transition spd="slow">
         <p:fade/>
       </p:transition>
@@ -9609,6 +10359,17 @@
 <file path=ppt/slides/slide6.xml><?xml version="1.0" encoding="utf-8"?>
 <p:sld xmlns:a="http://schemas.openxmlformats.org/drawingml/2006/main" xmlns:r="http://schemas.openxmlformats.org/officeDocument/2006/relationships" xmlns:p="http://schemas.openxmlformats.org/presentationml/2006/main">
   <p:cSld>
+    <p:bg>
+      <p:bgPr>
+        <a:solidFill>
+          <a:schemeClr val="accent6">
+            <a:lumMod val="60000"/>
+            <a:lumOff val="40000"/>
+          </a:schemeClr>
+        </a:solidFill>
+        <a:effectLst/>
+      </p:bgPr>
+    </p:bg>
     <p:spTree>
       <p:nvGrpSpPr>
         <p:cNvPr id="1" name=""/>
@@ -11250,6 +12011,17 @@
 <file path=ppt/slides/slide7.xml><?xml version="1.0" encoding="utf-8"?>
 <p:sld xmlns:a="http://schemas.openxmlformats.org/drawingml/2006/main" xmlns:r="http://schemas.openxmlformats.org/officeDocument/2006/relationships" xmlns:p="http://schemas.openxmlformats.org/presentationml/2006/main">
   <p:cSld>
+    <p:bg>
+      <p:bgPr>
+        <a:solidFill>
+          <a:schemeClr val="accent6">
+            <a:lumMod val="60000"/>
+            <a:lumOff val="40000"/>
+          </a:schemeClr>
+        </a:solidFill>
+        <a:effectLst/>
+      </p:bgPr>
+    </p:bg>
     <p:spTree>
       <p:nvGrpSpPr>
         <p:cNvPr id="1" name=""/>
@@ -12249,13 +13021,13 @@
   <p:clrMapOvr>
     <a:masterClrMapping/>
   </p:clrMapOvr>
-  <mc:AlternateContent xmlns:mc="http://schemas.openxmlformats.org/markup-compatibility/2006">
-    <mc:Choice xmlns:p14="http://schemas.microsoft.com/office/powerpoint/2010/main" Requires="p14">
+  <mc:AlternateContent xmlns:mc="http://schemas.openxmlformats.org/markup-compatibility/2006" xmlns:p14="http://schemas.microsoft.com/office/powerpoint/2010/main">
+    <mc:Choice Requires="p14">
       <p:transition spd="slow" p14:dur="1250">
         <p14:flip dir="r"/>
       </p:transition>
     </mc:Choice>
-    <mc:Fallback>
+    <mc:Fallback xmlns="">
       <p:transition spd="slow">
         <p:fade/>
       </p:transition>

</xml_diff>

<commit_message>
Updated Banner Information page with button and history tracking button
</commit_message>
<xml_diff>
--- a/Powerpoints/BannerManagment.pptx
+++ b/Powerpoints/BannerManagment.pptx
@@ -18,7 +18,7 @@
     <p:sldId id="262" r:id="rId9"/>
     <p:sldId id="263" r:id="rId10"/>
     <p:sldId id="264" r:id="rId11"/>
-    <p:sldId id="259" r:id="rId12"/>
+    <p:sldId id="269" r:id="rId12"/>
     <p:sldId id="268" r:id="rId13"/>
   </p:sldIdLst>
   <p:sldSz cx="12192000" cy="6858000"/>
@@ -4358,198 +4358,6 @@
       </p:sp>
       <p:sp>
         <p:nvSpPr>
-          <p:cNvPr id="8" name="Rectangle 7">
-            <a:extLst>
-              <a:ext uri="{FF2B5EF4-FFF2-40B4-BE49-F238E27FC236}">
-                <a16:creationId xmlns:a16="http://schemas.microsoft.com/office/drawing/2014/main" id="{128312AA-5925-4A0B-B507-263A675E98BE}"/>
-              </a:ext>
-            </a:extLst>
-          </p:cNvPr>
-          <p:cNvSpPr/>
-          <p:nvPr/>
-        </p:nvSpPr>
-        <p:spPr>
-          <a:xfrm>
-            <a:off x="5647008" y="370958"/>
-            <a:ext cx="1815548" cy="530087"/>
-          </a:xfrm>
-          <a:prstGeom prst="rect">
-            <a:avLst/>
-          </a:prstGeom>
-          <a:solidFill>
-            <a:schemeClr val="accent6">
-              <a:lumMod val="20000"/>
-              <a:lumOff val="80000"/>
-            </a:schemeClr>
-          </a:solidFill>
-          <a:ln>
-            <a:solidFill>
-              <a:schemeClr val="accent6"/>
-            </a:solidFill>
-          </a:ln>
-        </p:spPr>
-        <p:style>
-          <a:lnRef idx="2">
-            <a:schemeClr val="accent1">
-              <a:shade val="50000"/>
-            </a:schemeClr>
-          </a:lnRef>
-          <a:fillRef idx="1">
-            <a:schemeClr val="accent1"/>
-          </a:fillRef>
-          <a:effectRef idx="0">
-            <a:schemeClr val="accent1"/>
-          </a:effectRef>
-          <a:fontRef idx="minor">
-            <a:schemeClr val="lt1"/>
-          </a:fontRef>
-        </p:style>
-        <p:txBody>
-          <a:bodyPr rtlCol="0" anchor="ctr"/>
-          <a:lstStyle/>
-          <a:p>
-            <a:pPr algn="ctr"/>
-            <a:r>
-              <a:rPr lang="en-US" dirty="0">
-                <a:solidFill>
-                  <a:schemeClr val="tx1"/>
-                </a:solidFill>
-              </a:rPr>
-              <a:t>HOME</a:t>
-            </a:r>
-          </a:p>
-        </p:txBody>
-      </p:sp>
-      <p:sp>
-        <p:nvSpPr>
-          <p:cNvPr id="9" name="Rectangle 8">
-            <a:extLst>
-              <a:ext uri="{FF2B5EF4-FFF2-40B4-BE49-F238E27FC236}">
-                <a16:creationId xmlns:a16="http://schemas.microsoft.com/office/drawing/2014/main" id="{31C9F227-E895-410B-A2EF-FE7D015E2DF9}"/>
-              </a:ext>
-            </a:extLst>
-          </p:cNvPr>
-          <p:cNvSpPr/>
-          <p:nvPr/>
-        </p:nvSpPr>
-        <p:spPr>
-          <a:xfrm>
-            <a:off x="7577179" y="362274"/>
-            <a:ext cx="1815548" cy="530087"/>
-          </a:xfrm>
-          <a:prstGeom prst="rect">
-            <a:avLst/>
-          </a:prstGeom>
-          <a:solidFill>
-            <a:schemeClr val="accent6">
-              <a:lumMod val="20000"/>
-              <a:lumOff val="80000"/>
-            </a:schemeClr>
-          </a:solidFill>
-          <a:ln>
-            <a:solidFill>
-              <a:schemeClr val="accent6"/>
-            </a:solidFill>
-          </a:ln>
-        </p:spPr>
-        <p:style>
-          <a:lnRef idx="2">
-            <a:schemeClr val="accent1">
-              <a:shade val="50000"/>
-            </a:schemeClr>
-          </a:lnRef>
-          <a:fillRef idx="1">
-            <a:schemeClr val="accent1"/>
-          </a:fillRef>
-          <a:effectRef idx="0">
-            <a:schemeClr val="accent1"/>
-          </a:effectRef>
-          <a:fontRef idx="minor">
-            <a:schemeClr val="lt1"/>
-          </a:fontRef>
-        </p:style>
-        <p:txBody>
-          <a:bodyPr rtlCol="0" anchor="ctr"/>
-          <a:lstStyle/>
-          <a:p>
-            <a:pPr algn="ctr"/>
-            <a:r>
-              <a:rPr lang="en-US" dirty="0">
-                <a:solidFill>
-                  <a:schemeClr val="tx1"/>
-                </a:solidFill>
-              </a:rPr>
-              <a:t>ALL EVENTS</a:t>
-            </a:r>
-          </a:p>
-        </p:txBody>
-      </p:sp>
-      <p:sp>
-        <p:nvSpPr>
-          <p:cNvPr id="10" name="Rectangle 9">
-            <a:extLst>
-              <a:ext uri="{FF2B5EF4-FFF2-40B4-BE49-F238E27FC236}">
-                <a16:creationId xmlns:a16="http://schemas.microsoft.com/office/drawing/2014/main" id="{F6D23995-D349-4CB0-A1B6-9EED5EC57B2E}"/>
-              </a:ext>
-            </a:extLst>
-          </p:cNvPr>
-          <p:cNvSpPr/>
-          <p:nvPr/>
-        </p:nvSpPr>
-        <p:spPr>
-          <a:xfrm>
-            <a:off x="9519515" y="370958"/>
-            <a:ext cx="1815548" cy="530087"/>
-          </a:xfrm>
-          <a:prstGeom prst="rect">
-            <a:avLst/>
-          </a:prstGeom>
-          <a:solidFill>
-            <a:schemeClr val="accent6">
-              <a:lumMod val="20000"/>
-              <a:lumOff val="80000"/>
-            </a:schemeClr>
-          </a:solidFill>
-          <a:ln>
-            <a:solidFill>
-              <a:schemeClr val="accent6"/>
-            </a:solidFill>
-          </a:ln>
-        </p:spPr>
-        <p:style>
-          <a:lnRef idx="2">
-            <a:schemeClr val="accent1">
-              <a:shade val="50000"/>
-            </a:schemeClr>
-          </a:lnRef>
-          <a:fillRef idx="1">
-            <a:schemeClr val="accent1"/>
-          </a:fillRef>
-          <a:effectRef idx="0">
-            <a:schemeClr val="accent1"/>
-          </a:effectRef>
-          <a:fontRef idx="minor">
-            <a:schemeClr val="lt1"/>
-          </a:fontRef>
-        </p:style>
-        <p:txBody>
-          <a:bodyPr rtlCol="0" anchor="ctr"/>
-          <a:lstStyle/>
-          <a:p>
-            <a:pPr algn="ctr"/>
-            <a:r>
-              <a:rPr lang="en-US" dirty="0">
-                <a:solidFill>
-                  <a:schemeClr val="tx1"/>
-                </a:solidFill>
-              </a:rPr>
-              <a:t>MEMEBERS INFO</a:t>
-            </a:r>
-          </a:p>
-        </p:txBody>
-      </p:sp>
-      <p:sp>
-        <p:nvSpPr>
           <p:cNvPr id="11" name="Rectangle 10">
             <a:extLst>
               <a:ext uri="{FF2B5EF4-FFF2-40B4-BE49-F238E27FC236}">
@@ -5216,6 +5024,262 @@
           </a:p>
         </p:txBody>
       </p:sp>
+      <p:sp>
+        <p:nvSpPr>
+          <p:cNvPr id="22" name="Rectangle 21">
+            <a:extLst>
+              <a:ext uri="{FF2B5EF4-FFF2-40B4-BE49-F238E27FC236}">
+                <a16:creationId xmlns:a16="http://schemas.microsoft.com/office/drawing/2014/main" id="{E1C993A9-182D-4EFC-A979-BA9A6D286300}"/>
+              </a:ext>
+            </a:extLst>
+          </p:cNvPr>
+          <p:cNvSpPr/>
+          <p:nvPr/>
+        </p:nvSpPr>
+        <p:spPr>
+          <a:xfrm>
+            <a:off x="5585941" y="274446"/>
+            <a:ext cx="1815548" cy="530087"/>
+          </a:xfrm>
+          <a:prstGeom prst="rect">
+            <a:avLst/>
+          </a:prstGeom>
+          <a:solidFill>
+            <a:schemeClr val="accent6">
+              <a:lumMod val="20000"/>
+              <a:lumOff val="80000"/>
+            </a:schemeClr>
+          </a:solidFill>
+          <a:ln>
+            <a:solidFill>
+              <a:schemeClr val="accent6"/>
+            </a:solidFill>
+          </a:ln>
+        </p:spPr>
+        <p:style>
+          <a:lnRef idx="2">
+            <a:schemeClr val="accent1">
+              <a:shade val="50000"/>
+            </a:schemeClr>
+          </a:lnRef>
+          <a:fillRef idx="1">
+            <a:schemeClr val="accent1"/>
+          </a:fillRef>
+          <a:effectRef idx="0">
+            <a:schemeClr val="accent1"/>
+          </a:effectRef>
+          <a:fontRef idx="minor">
+            <a:schemeClr val="lt1"/>
+          </a:fontRef>
+        </p:style>
+        <p:txBody>
+          <a:bodyPr rtlCol="0" anchor="ctr"/>
+          <a:lstStyle/>
+          <a:p>
+            <a:pPr algn="ctr"/>
+            <a:r>
+              <a:rPr lang="en-US" dirty="0">
+                <a:solidFill>
+                  <a:schemeClr val="tx1"/>
+                </a:solidFill>
+              </a:rPr>
+              <a:t>ALL SEASONS</a:t>
+            </a:r>
+          </a:p>
+        </p:txBody>
+      </p:sp>
+      <p:sp>
+        <p:nvSpPr>
+          <p:cNvPr id="23" name="Rectangle 22">
+            <a:extLst>
+              <a:ext uri="{FF2B5EF4-FFF2-40B4-BE49-F238E27FC236}">
+                <a16:creationId xmlns:a16="http://schemas.microsoft.com/office/drawing/2014/main" id="{67D8346F-E123-4738-AABE-D18DE1ECD2FD}"/>
+              </a:ext>
+            </a:extLst>
+          </p:cNvPr>
+          <p:cNvSpPr/>
+          <p:nvPr/>
+        </p:nvSpPr>
+        <p:spPr>
+          <a:xfrm>
+            <a:off x="7555829" y="277121"/>
+            <a:ext cx="1815548" cy="530087"/>
+          </a:xfrm>
+          <a:prstGeom prst="rect">
+            <a:avLst/>
+          </a:prstGeom>
+          <a:solidFill>
+            <a:schemeClr val="accent6">
+              <a:lumMod val="20000"/>
+              <a:lumOff val="80000"/>
+            </a:schemeClr>
+          </a:solidFill>
+          <a:ln>
+            <a:solidFill>
+              <a:schemeClr val="accent6"/>
+            </a:solidFill>
+          </a:ln>
+        </p:spPr>
+        <p:style>
+          <a:lnRef idx="2">
+            <a:schemeClr val="accent1">
+              <a:shade val="50000"/>
+            </a:schemeClr>
+          </a:lnRef>
+          <a:fillRef idx="1">
+            <a:schemeClr val="accent1"/>
+          </a:fillRef>
+          <a:effectRef idx="0">
+            <a:schemeClr val="accent1"/>
+          </a:effectRef>
+          <a:fontRef idx="minor">
+            <a:schemeClr val="lt1"/>
+          </a:fontRef>
+        </p:style>
+        <p:txBody>
+          <a:bodyPr rtlCol="0" anchor="ctr"/>
+          <a:lstStyle/>
+          <a:p>
+            <a:pPr algn="ctr"/>
+            <a:r>
+              <a:rPr lang="en-US" dirty="0">
+                <a:solidFill>
+                  <a:schemeClr val="tx1"/>
+                </a:solidFill>
+              </a:rPr>
+              <a:t>MEMEBERS INFO</a:t>
+            </a:r>
+          </a:p>
+        </p:txBody>
+      </p:sp>
+      <p:sp>
+        <p:nvSpPr>
+          <p:cNvPr id="24" name="Rectangle 23">
+            <a:extLst>
+              <a:ext uri="{FF2B5EF4-FFF2-40B4-BE49-F238E27FC236}">
+                <a16:creationId xmlns:a16="http://schemas.microsoft.com/office/drawing/2014/main" id="{349FEB91-3F9A-46E1-8CBB-730807A85114}"/>
+              </a:ext>
+            </a:extLst>
+          </p:cNvPr>
+          <p:cNvSpPr/>
+          <p:nvPr/>
+        </p:nvSpPr>
+        <p:spPr>
+          <a:xfrm>
+            <a:off x="9522962" y="260705"/>
+            <a:ext cx="1815548" cy="530087"/>
+          </a:xfrm>
+          <a:prstGeom prst="rect">
+            <a:avLst/>
+          </a:prstGeom>
+          <a:solidFill>
+            <a:schemeClr val="accent6">
+              <a:lumMod val="20000"/>
+              <a:lumOff val="80000"/>
+            </a:schemeClr>
+          </a:solidFill>
+          <a:ln>
+            <a:solidFill>
+              <a:schemeClr val="accent6"/>
+            </a:solidFill>
+          </a:ln>
+        </p:spPr>
+        <p:style>
+          <a:lnRef idx="2">
+            <a:schemeClr val="accent1">
+              <a:shade val="50000"/>
+            </a:schemeClr>
+          </a:lnRef>
+          <a:fillRef idx="1">
+            <a:schemeClr val="accent1"/>
+          </a:fillRef>
+          <a:effectRef idx="0">
+            <a:schemeClr val="accent1"/>
+          </a:effectRef>
+          <a:fontRef idx="minor">
+            <a:schemeClr val="lt1"/>
+          </a:fontRef>
+        </p:style>
+        <p:txBody>
+          <a:bodyPr rtlCol="0" anchor="ctr"/>
+          <a:lstStyle/>
+          <a:p>
+            <a:pPr algn="ctr"/>
+            <a:r>
+              <a:rPr lang="en-US" dirty="0">
+                <a:solidFill>
+                  <a:schemeClr val="tx1"/>
+                </a:solidFill>
+              </a:rPr>
+              <a:t>ADMIN PAGE</a:t>
+            </a:r>
+          </a:p>
+        </p:txBody>
+      </p:sp>
+      <p:sp>
+        <p:nvSpPr>
+          <p:cNvPr id="25" name="Rectangle 24">
+            <a:extLst>
+              <a:ext uri="{FF2B5EF4-FFF2-40B4-BE49-F238E27FC236}">
+                <a16:creationId xmlns:a16="http://schemas.microsoft.com/office/drawing/2014/main" id="{22B836E9-1A6E-4F55-8C57-F45EF1E4635E}"/>
+              </a:ext>
+            </a:extLst>
+          </p:cNvPr>
+          <p:cNvSpPr/>
+          <p:nvPr/>
+        </p:nvSpPr>
+        <p:spPr>
+          <a:xfrm>
+            <a:off x="3610040" y="253810"/>
+            <a:ext cx="1815548" cy="530087"/>
+          </a:xfrm>
+          <a:prstGeom prst="rect">
+            <a:avLst/>
+          </a:prstGeom>
+          <a:solidFill>
+            <a:schemeClr val="accent6">
+              <a:lumMod val="20000"/>
+              <a:lumOff val="80000"/>
+            </a:schemeClr>
+          </a:solidFill>
+          <a:ln>
+            <a:solidFill>
+              <a:schemeClr val="accent6"/>
+            </a:solidFill>
+          </a:ln>
+        </p:spPr>
+        <p:style>
+          <a:lnRef idx="2">
+            <a:schemeClr val="accent1">
+              <a:shade val="50000"/>
+            </a:schemeClr>
+          </a:lnRef>
+          <a:fillRef idx="1">
+            <a:schemeClr val="accent1"/>
+          </a:fillRef>
+          <a:effectRef idx="0">
+            <a:schemeClr val="accent1"/>
+          </a:effectRef>
+          <a:fontRef idx="minor">
+            <a:schemeClr val="lt1"/>
+          </a:fontRef>
+        </p:style>
+        <p:txBody>
+          <a:bodyPr rtlCol="0" anchor="ctr"/>
+          <a:lstStyle/>
+          <a:p>
+            <a:pPr algn="ctr"/>
+            <a:r>
+              <a:rPr lang="en-US" dirty="0">
+                <a:solidFill>
+                  <a:schemeClr val="tx1"/>
+                </a:solidFill>
+              </a:rPr>
+              <a:t>HOME</a:t>
+            </a:r>
+          </a:p>
+        </p:txBody>
+      </p:sp>
     </p:spTree>
     <p:extLst>
       <p:ext uri="{BB962C8B-B14F-4D97-AF65-F5344CB8AC3E}">
@@ -5262,10 +5326,60 @@
       </p:grpSpPr>
       <p:sp>
         <p:nvSpPr>
+          <p:cNvPr id="2" name="Title 1">
+            <a:extLst>
+              <a:ext uri="{FF2B5EF4-FFF2-40B4-BE49-F238E27FC236}">
+                <a16:creationId xmlns:a16="http://schemas.microsoft.com/office/drawing/2014/main" id="{2ECD397F-68AF-495A-9586-EB61618490ED}"/>
+              </a:ext>
+            </a:extLst>
+          </p:cNvPr>
+          <p:cNvSpPr>
+            <a:spLocks noGrp="1"/>
+          </p:cNvSpPr>
+          <p:nvPr>
+            <p:ph type="title"/>
+          </p:nvPr>
+        </p:nvSpPr>
+        <p:spPr/>
+        <p:txBody>
+          <a:bodyPr/>
+          <a:lstStyle/>
+          <a:p>
+            <a:endParaRPr lang="en-US"/>
+          </a:p>
+        </p:txBody>
+      </p:sp>
+      <p:sp>
+        <p:nvSpPr>
+          <p:cNvPr id="3" name="Content Placeholder 2">
+            <a:extLst>
+              <a:ext uri="{FF2B5EF4-FFF2-40B4-BE49-F238E27FC236}">
+                <a16:creationId xmlns:a16="http://schemas.microsoft.com/office/drawing/2014/main" id="{18D7E4E8-725E-4560-9CFB-AD2362BE4C68}"/>
+              </a:ext>
+            </a:extLst>
+          </p:cNvPr>
+          <p:cNvSpPr>
+            <a:spLocks noGrp="1"/>
+          </p:cNvSpPr>
+          <p:nvPr>
+            <p:ph idx="1"/>
+          </p:nvPr>
+        </p:nvSpPr>
+        <p:spPr/>
+        <p:txBody>
+          <a:bodyPr/>
+          <a:lstStyle/>
+          <a:p>
+            <a:endParaRPr lang="en-US"/>
+          </a:p>
+        </p:txBody>
+      </p:sp>
+      <p:sp>
+        <p:nvSpPr>
           <p:cNvPr id="4" name="Rectangle 3">
             <a:extLst>
               <a:ext uri="{FF2B5EF4-FFF2-40B4-BE49-F238E27FC236}">
-                <a16:creationId xmlns:a16="http://schemas.microsoft.com/office/drawing/2014/main" id="{7E4A6DE9-CF04-4E06-876B-6A0A86B0F017}"/>
+                <a16:creationId xmlns:a16="http://schemas.microsoft.com/office/drawing/2014/main" id="{BB14C61E-F8AC-4217-89A1-1215FD78FD59}"/>
               </a:ext>
             </a:extLst>
           </p:cNvPr>
@@ -5274,7 +5388,7 @@
         </p:nvSpPr>
         <p:spPr>
           <a:xfrm>
-            <a:off x="225668" y="105509"/>
+            <a:off x="192258" y="175845"/>
             <a:ext cx="11807484" cy="6421902"/>
           </a:xfrm>
           <a:prstGeom prst="rect">
@@ -5286,6 +5400,11 @@
               <a:lumOff val="60000"/>
             </a:schemeClr>
           </a:solidFill>
+          <a:ln>
+            <a:solidFill>
+              <a:schemeClr val="tx1"/>
+            </a:solidFill>
+          </a:ln>
         </p:spPr>
         <p:style>
           <a:lnRef idx="2">
@@ -5308,7 +5427,7 @@
           <a:lstStyle/>
           <a:p>
             <a:pPr algn="ctr"/>
-            <a:endParaRPr lang="en-US"/>
+            <a:endParaRPr lang="en-US" dirty="0"/>
           </a:p>
         </p:txBody>
       </p:sp>
@@ -5317,7 +5436,7 @@
           <p:cNvPr id="5" name="Rectangle 4">
             <a:extLst>
               <a:ext uri="{FF2B5EF4-FFF2-40B4-BE49-F238E27FC236}">
-                <a16:creationId xmlns:a16="http://schemas.microsoft.com/office/drawing/2014/main" id="{75A3F53E-816D-4926-8F85-934BFD820A5E}"/>
+                <a16:creationId xmlns:a16="http://schemas.microsoft.com/office/drawing/2014/main" id="{85B79A35-6410-4A77-B539-0F8ED3A5A770}"/>
               </a:ext>
             </a:extLst>
           </p:cNvPr>
@@ -5326,8 +5445,8 @@
         </p:nvSpPr>
         <p:spPr>
           <a:xfrm>
-            <a:off x="520504" y="562707"/>
-            <a:ext cx="2616591" cy="3516923"/>
+            <a:off x="520504" y="959458"/>
+            <a:ext cx="2616591" cy="3092037"/>
           </a:xfrm>
           <a:prstGeom prst="rect">
             <a:avLst/>
@@ -5366,7 +5485,7 @@
           <p:cNvPr id="6" name="Picture 5" descr="A close up of a sign&#10;&#10;Description automatically generated">
             <a:extLst>
               <a:ext uri="{FF2B5EF4-FFF2-40B4-BE49-F238E27FC236}">
-                <a16:creationId xmlns:a16="http://schemas.microsoft.com/office/drawing/2014/main" id="{B9D64A20-EFA7-48C3-A490-89F62AEF1C01}"/>
+                <a16:creationId xmlns:a16="http://schemas.microsoft.com/office/drawing/2014/main" id="{B0A1FF74-2664-4C2A-AC19-8E7C42278495}"/>
               </a:ext>
             </a:extLst>
           </p:cNvPr>
@@ -5388,8 +5507,8 @@
         </p:blipFill>
         <p:spPr>
           <a:xfrm>
-            <a:off x="520504" y="549455"/>
-            <a:ext cx="2616591" cy="3516922"/>
+            <a:off x="520504" y="959458"/>
+            <a:ext cx="2616591" cy="3306722"/>
           </a:xfrm>
           <a:prstGeom prst="rect">
             <a:avLst/>
@@ -5401,7 +5520,7 @@
           <p:cNvPr id="7" name="TextBox 6">
             <a:extLst>
               <a:ext uri="{FF2B5EF4-FFF2-40B4-BE49-F238E27FC236}">
-                <a16:creationId xmlns:a16="http://schemas.microsoft.com/office/drawing/2014/main" id="{8727272F-20E3-4476-85B1-C65C9C3CC329}"/>
+                <a16:creationId xmlns:a16="http://schemas.microsoft.com/office/drawing/2014/main" id="{5D00A79F-D3C8-4E45-AC4B-F8CC2A98045D}"/>
               </a:ext>
             </a:extLst>
           </p:cNvPr>
@@ -5410,7 +5529,7 @@
         </p:nvSpPr>
         <p:spPr>
           <a:xfrm flipH="1">
-            <a:off x="3479408" y="562707"/>
+            <a:off x="3479408" y="1237958"/>
             <a:ext cx="5300004" cy="461665"/>
           </a:xfrm>
           <a:prstGeom prst="rect">
@@ -5436,7 +5555,7 @@
           <p:cNvPr id="8" name="TextBox 7">
             <a:extLst>
               <a:ext uri="{FF2B5EF4-FFF2-40B4-BE49-F238E27FC236}">
-                <a16:creationId xmlns:a16="http://schemas.microsoft.com/office/drawing/2014/main" id="{964B341F-0957-475E-8B97-C928ECC99F3A}"/>
+                <a16:creationId xmlns:a16="http://schemas.microsoft.com/office/drawing/2014/main" id="{CCFEE2BA-CB98-4C39-853A-AB4D4F280715}"/>
               </a:ext>
             </a:extLst>
           </p:cNvPr>
@@ -5445,7 +5564,7 @@
         </p:nvSpPr>
         <p:spPr>
           <a:xfrm flipH="1">
-            <a:off x="3479408" y="2136502"/>
+            <a:off x="3445998" y="2450152"/>
             <a:ext cx="5300004" cy="461665"/>
           </a:xfrm>
           <a:prstGeom prst="rect">
@@ -5471,7 +5590,7 @@
           <p:cNvPr id="9" name="TextBox 8">
             <a:extLst>
               <a:ext uri="{FF2B5EF4-FFF2-40B4-BE49-F238E27FC236}">
-                <a16:creationId xmlns:a16="http://schemas.microsoft.com/office/drawing/2014/main" id="{8F45B210-4937-4301-B3B6-E521D87667A3}"/>
+                <a16:creationId xmlns:a16="http://schemas.microsoft.com/office/drawing/2014/main" id="{FEBB2248-343C-447C-BE65-86761D420470}"/>
               </a:ext>
             </a:extLst>
           </p:cNvPr>
@@ -5480,7 +5599,7 @@
         </p:nvSpPr>
         <p:spPr>
           <a:xfrm flipH="1">
-            <a:off x="3479408" y="1294228"/>
+            <a:off x="3460067" y="1730865"/>
             <a:ext cx="7535595" cy="923330"/>
           </a:xfrm>
           <a:prstGeom prst="rect">
@@ -5523,7 +5642,7 @@
           <p:cNvPr id="10" name="TextBox 9">
             <a:extLst>
               <a:ext uri="{FF2B5EF4-FFF2-40B4-BE49-F238E27FC236}">
-                <a16:creationId xmlns:a16="http://schemas.microsoft.com/office/drawing/2014/main" id="{96F9492C-7649-4BAB-AB3E-BC5C84DE68E0}"/>
+                <a16:creationId xmlns:a16="http://schemas.microsoft.com/office/drawing/2014/main" id="{E7774734-AB5D-4DA1-B875-C8718F61D36C}"/>
               </a:ext>
             </a:extLst>
           </p:cNvPr>
@@ -5532,7 +5651,7 @@
         </p:nvSpPr>
         <p:spPr>
           <a:xfrm>
-            <a:off x="3479409" y="2827606"/>
+            <a:off x="3479408" y="2957370"/>
             <a:ext cx="8192088" cy="923330"/>
           </a:xfrm>
           <a:prstGeom prst="rect">
@@ -5590,7 +5709,7 @@
           <p:cNvPr id="11" name="Rectangle 10">
             <a:extLst>
               <a:ext uri="{FF2B5EF4-FFF2-40B4-BE49-F238E27FC236}">
-                <a16:creationId xmlns:a16="http://schemas.microsoft.com/office/drawing/2014/main" id="{74FBBCA2-D58F-4240-A803-679F57F45401}"/>
+                <a16:creationId xmlns:a16="http://schemas.microsoft.com/office/drawing/2014/main" id="{023EADE4-E7CC-43D3-BAEE-4101D2477768}"/>
               </a:ext>
             </a:extLst>
           </p:cNvPr>
@@ -5599,8 +5718,8 @@
         </p:nvSpPr>
         <p:spPr>
           <a:xfrm>
-            <a:off x="647114" y="4403188"/>
-            <a:ext cx="2321169" cy="464234"/>
+            <a:off x="520504" y="4266180"/>
+            <a:ext cx="2616591" cy="348819"/>
           </a:xfrm>
           <a:prstGeom prst="rect">
             <a:avLst/>
@@ -5646,10 +5765,10 @@
       </p:sp>
       <p:sp>
         <p:nvSpPr>
-          <p:cNvPr id="2" name="Rectangle 1">
-            <a:extLst>
-              <a:ext uri="{FF2B5EF4-FFF2-40B4-BE49-F238E27FC236}">
-                <a16:creationId xmlns:a16="http://schemas.microsoft.com/office/drawing/2014/main" id="{780A42FE-091F-4CF4-ACE9-FE33C747FC5A}"/>
+          <p:cNvPr id="12" name="Rectangle 11">
+            <a:extLst>
+              <a:ext uri="{FF2B5EF4-FFF2-40B4-BE49-F238E27FC236}">
+                <a16:creationId xmlns:a16="http://schemas.microsoft.com/office/drawing/2014/main" id="{6AC9F29A-4F99-4825-A3E5-2189E59F10C6}"/>
               </a:ext>
             </a:extLst>
           </p:cNvPr>
@@ -5658,7 +5777,7 @@
         </p:nvSpPr>
         <p:spPr>
           <a:xfrm>
-            <a:off x="3479408" y="3804515"/>
+            <a:off x="3460067" y="3946184"/>
             <a:ext cx="3177858" cy="461665"/>
           </a:xfrm>
           <a:prstGeom prst="rect">
@@ -5694,10 +5813,10 @@
       </p:sp>
       <p:sp>
         <p:nvSpPr>
-          <p:cNvPr id="3" name="Rectangle 2">
-            <a:extLst>
-              <a:ext uri="{FF2B5EF4-FFF2-40B4-BE49-F238E27FC236}">
-                <a16:creationId xmlns:a16="http://schemas.microsoft.com/office/drawing/2014/main" id="{79C2EC7C-B0C1-4467-83C0-10B78926FD31}"/>
+          <p:cNvPr id="13" name="Rectangle 12">
+            <a:extLst>
+              <a:ext uri="{FF2B5EF4-FFF2-40B4-BE49-F238E27FC236}">
+                <a16:creationId xmlns:a16="http://schemas.microsoft.com/office/drawing/2014/main" id="{544D79AE-4A78-4952-8607-A417CA1810FB}"/>
               </a:ext>
             </a:extLst>
           </p:cNvPr>
@@ -5706,7 +5825,7 @@
         </p:nvSpPr>
         <p:spPr>
           <a:xfrm>
-            <a:off x="9468730" y="387170"/>
+            <a:off x="10125223" y="1651313"/>
             <a:ext cx="1546273" cy="461665"/>
           </a:xfrm>
           <a:prstGeom prst="rect">
@@ -5758,48 +5877,12 @@
           </a:p>
         </p:txBody>
       </p:sp>
-      <p:pic>
-        <p:nvPicPr>
-          <p:cNvPr id="13" name="Picture 12">
-            <a:extLst>
-              <a:ext uri="{FF2B5EF4-FFF2-40B4-BE49-F238E27FC236}">
-                <a16:creationId xmlns:a16="http://schemas.microsoft.com/office/drawing/2014/main" id="{35E76772-BFB3-432C-99DA-C8B1C60C07C5}"/>
-              </a:ext>
-            </a:extLst>
-          </p:cNvPr>
-          <p:cNvPicPr>
-            <a:picLocks noChangeAspect="1"/>
-          </p:cNvPicPr>
-          <p:nvPr/>
-        </p:nvPicPr>
-        <p:blipFill>
-          <a:blip r:embed="rId3">
-            <a:extLst>
-              <a:ext uri="{28A0092B-C50C-407E-A947-70E740481C1C}">
-                <a14:useLocalDpi xmlns:a14="http://schemas.microsoft.com/office/drawing/2010/main" val="0"/>
-              </a:ext>
-            </a:extLst>
-          </a:blip>
-          <a:stretch>
-            <a:fillRect/>
-          </a:stretch>
-        </p:blipFill>
-        <p:spPr>
-          <a:xfrm>
-            <a:off x="11207262" y="426805"/>
-            <a:ext cx="464234" cy="464234"/>
-          </a:xfrm>
-          <a:prstGeom prst="rect">
-            <a:avLst/>
-          </a:prstGeom>
-        </p:spPr>
-      </p:pic>
-      <p:sp>
-        <p:nvSpPr>
-          <p:cNvPr id="12" name="Rectangle 11">
-            <a:extLst>
-              <a:ext uri="{FF2B5EF4-FFF2-40B4-BE49-F238E27FC236}">
-                <a16:creationId xmlns:a16="http://schemas.microsoft.com/office/drawing/2014/main" id="{8ADF4291-93A3-4500-9E11-931E2A20C286}"/>
+      <p:sp>
+        <p:nvSpPr>
+          <p:cNvPr id="14" name="Rectangle 13">
+            <a:extLst>
+              <a:ext uri="{FF2B5EF4-FFF2-40B4-BE49-F238E27FC236}">
+                <a16:creationId xmlns:a16="http://schemas.microsoft.com/office/drawing/2014/main" id="{C45ADF14-A237-4D54-AEAB-D91349108520}"/>
               </a:ext>
             </a:extLst>
           </p:cNvPr>
@@ -5808,8 +5891,8 @@
         </p:nvSpPr>
         <p:spPr>
           <a:xfrm>
-            <a:off x="647114" y="5050302"/>
-            <a:ext cx="4093698" cy="464234"/>
+            <a:off x="10139291" y="2858119"/>
+            <a:ext cx="1556822" cy="1163352"/>
           </a:xfrm>
           <a:prstGeom prst="rect">
             <a:avLst/>
@@ -5858,28 +5941,338 @@
           </a:p>
         </p:txBody>
       </p:sp>
+      <p:sp>
+        <p:nvSpPr>
+          <p:cNvPr id="16" name="Rectangle 15">
+            <a:extLst>
+              <a:ext uri="{FF2B5EF4-FFF2-40B4-BE49-F238E27FC236}">
+                <a16:creationId xmlns:a16="http://schemas.microsoft.com/office/drawing/2014/main" id="{49740F65-FC95-4718-AE39-429421DE80B2}"/>
+              </a:ext>
+            </a:extLst>
+          </p:cNvPr>
+          <p:cNvSpPr/>
+          <p:nvPr/>
+        </p:nvSpPr>
+        <p:spPr>
+          <a:xfrm>
+            <a:off x="5932583" y="344468"/>
+            <a:ext cx="1815548" cy="530087"/>
+          </a:xfrm>
+          <a:prstGeom prst="rect">
+            <a:avLst/>
+          </a:prstGeom>
+          <a:solidFill>
+            <a:schemeClr val="accent6">
+              <a:lumMod val="20000"/>
+              <a:lumOff val="80000"/>
+            </a:schemeClr>
+          </a:solidFill>
+          <a:ln>
+            <a:solidFill>
+              <a:schemeClr val="accent6"/>
+            </a:solidFill>
+          </a:ln>
+        </p:spPr>
+        <p:style>
+          <a:lnRef idx="2">
+            <a:schemeClr val="accent1">
+              <a:shade val="50000"/>
+            </a:schemeClr>
+          </a:lnRef>
+          <a:fillRef idx="1">
+            <a:schemeClr val="accent1"/>
+          </a:fillRef>
+          <a:effectRef idx="0">
+            <a:schemeClr val="accent1"/>
+          </a:effectRef>
+          <a:fontRef idx="minor">
+            <a:schemeClr val="lt1"/>
+          </a:fontRef>
+        </p:style>
+        <p:txBody>
+          <a:bodyPr rtlCol="0" anchor="ctr"/>
+          <a:lstStyle/>
+          <a:p>
+            <a:pPr algn="ctr"/>
+            <a:r>
+              <a:rPr lang="en-US" dirty="0">
+                <a:solidFill>
+                  <a:schemeClr val="tx1"/>
+                </a:solidFill>
+              </a:rPr>
+              <a:t>ALL SEASONS</a:t>
+            </a:r>
+          </a:p>
+        </p:txBody>
+      </p:sp>
+      <p:sp>
+        <p:nvSpPr>
+          <p:cNvPr id="17" name="Rectangle 16">
+            <a:extLst>
+              <a:ext uri="{FF2B5EF4-FFF2-40B4-BE49-F238E27FC236}">
+                <a16:creationId xmlns:a16="http://schemas.microsoft.com/office/drawing/2014/main" id="{AF596BF2-1A1F-4141-B3B2-3004550C87F8}"/>
+              </a:ext>
+            </a:extLst>
+          </p:cNvPr>
+          <p:cNvSpPr/>
+          <p:nvPr/>
+        </p:nvSpPr>
+        <p:spPr>
+          <a:xfrm>
+            <a:off x="7902471" y="347143"/>
+            <a:ext cx="1815548" cy="530087"/>
+          </a:xfrm>
+          <a:prstGeom prst="rect">
+            <a:avLst/>
+          </a:prstGeom>
+          <a:solidFill>
+            <a:schemeClr val="accent6">
+              <a:lumMod val="20000"/>
+              <a:lumOff val="80000"/>
+            </a:schemeClr>
+          </a:solidFill>
+          <a:ln>
+            <a:solidFill>
+              <a:schemeClr val="accent6"/>
+            </a:solidFill>
+          </a:ln>
+        </p:spPr>
+        <p:style>
+          <a:lnRef idx="2">
+            <a:schemeClr val="accent1">
+              <a:shade val="50000"/>
+            </a:schemeClr>
+          </a:lnRef>
+          <a:fillRef idx="1">
+            <a:schemeClr val="accent1"/>
+          </a:fillRef>
+          <a:effectRef idx="0">
+            <a:schemeClr val="accent1"/>
+          </a:effectRef>
+          <a:fontRef idx="minor">
+            <a:schemeClr val="lt1"/>
+          </a:fontRef>
+        </p:style>
+        <p:txBody>
+          <a:bodyPr rtlCol="0" anchor="ctr"/>
+          <a:lstStyle/>
+          <a:p>
+            <a:pPr algn="ctr"/>
+            <a:r>
+              <a:rPr lang="en-US" dirty="0">
+                <a:solidFill>
+                  <a:schemeClr val="tx1"/>
+                </a:solidFill>
+              </a:rPr>
+              <a:t>MEMEBERS INFO</a:t>
+            </a:r>
+          </a:p>
+        </p:txBody>
+      </p:sp>
+      <p:sp>
+        <p:nvSpPr>
+          <p:cNvPr id="18" name="Rectangle 17">
+            <a:extLst>
+              <a:ext uri="{FF2B5EF4-FFF2-40B4-BE49-F238E27FC236}">
+                <a16:creationId xmlns:a16="http://schemas.microsoft.com/office/drawing/2014/main" id="{BF9D795C-EA6D-4FBA-A27C-A1CDCCEDBABA}"/>
+              </a:ext>
+            </a:extLst>
+          </p:cNvPr>
+          <p:cNvSpPr/>
+          <p:nvPr/>
+        </p:nvSpPr>
+        <p:spPr>
+          <a:xfrm>
+            <a:off x="9869604" y="330727"/>
+            <a:ext cx="1815548" cy="530087"/>
+          </a:xfrm>
+          <a:prstGeom prst="rect">
+            <a:avLst/>
+          </a:prstGeom>
+          <a:solidFill>
+            <a:schemeClr val="accent6">
+              <a:lumMod val="20000"/>
+              <a:lumOff val="80000"/>
+            </a:schemeClr>
+          </a:solidFill>
+          <a:ln>
+            <a:solidFill>
+              <a:schemeClr val="accent6"/>
+            </a:solidFill>
+          </a:ln>
+        </p:spPr>
+        <p:style>
+          <a:lnRef idx="2">
+            <a:schemeClr val="accent1">
+              <a:shade val="50000"/>
+            </a:schemeClr>
+          </a:lnRef>
+          <a:fillRef idx="1">
+            <a:schemeClr val="accent1"/>
+          </a:fillRef>
+          <a:effectRef idx="0">
+            <a:schemeClr val="accent1"/>
+          </a:effectRef>
+          <a:fontRef idx="minor">
+            <a:schemeClr val="lt1"/>
+          </a:fontRef>
+        </p:style>
+        <p:txBody>
+          <a:bodyPr rtlCol="0" anchor="ctr"/>
+          <a:lstStyle/>
+          <a:p>
+            <a:pPr algn="ctr"/>
+            <a:r>
+              <a:rPr lang="en-US" dirty="0">
+                <a:solidFill>
+                  <a:schemeClr val="tx1"/>
+                </a:solidFill>
+              </a:rPr>
+              <a:t>ADMIN PAGE</a:t>
+            </a:r>
+          </a:p>
+        </p:txBody>
+      </p:sp>
+      <p:sp>
+        <p:nvSpPr>
+          <p:cNvPr id="19" name="Rectangle 18">
+            <a:extLst>
+              <a:ext uri="{FF2B5EF4-FFF2-40B4-BE49-F238E27FC236}">
+                <a16:creationId xmlns:a16="http://schemas.microsoft.com/office/drawing/2014/main" id="{9477E371-4A9E-4208-B01E-0E1B2DF147C7}"/>
+              </a:ext>
+            </a:extLst>
+          </p:cNvPr>
+          <p:cNvSpPr/>
+          <p:nvPr/>
+        </p:nvSpPr>
+        <p:spPr>
+          <a:xfrm>
+            <a:off x="3956682" y="323832"/>
+            <a:ext cx="1815548" cy="530087"/>
+          </a:xfrm>
+          <a:prstGeom prst="rect">
+            <a:avLst/>
+          </a:prstGeom>
+          <a:solidFill>
+            <a:schemeClr val="accent6">
+              <a:lumMod val="20000"/>
+              <a:lumOff val="80000"/>
+            </a:schemeClr>
+          </a:solidFill>
+          <a:ln>
+            <a:solidFill>
+              <a:schemeClr val="accent6"/>
+            </a:solidFill>
+          </a:ln>
+        </p:spPr>
+        <p:style>
+          <a:lnRef idx="2">
+            <a:schemeClr val="accent1">
+              <a:shade val="50000"/>
+            </a:schemeClr>
+          </a:lnRef>
+          <a:fillRef idx="1">
+            <a:schemeClr val="accent1"/>
+          </a:fillRef>
+          <a:effectRef idx="0">
+            <a:schemeClr val="accent1"/>
+          </a:effectRef>
+          <a:fontRef idx="minor">
+            <a:schemeClr val="lt1"/>
+          </a:fontRef>
+        </p:style>
+        <p:txBody>
+          <a:bodyPr rtlCol="0" anchor="ctr"/>
+          <a:lstStyle/>
+          <a:p>
+            <a:pPr algn="ctr"/>
+            <a:r>
+              <a:rPr lang="en-US" dirty="0">
+                <a:solidFill>
+                  <a:schemeClr val="tx1"/>
+                </a:solidFill>
+              </a:rPr>
+              <a:t>HOME</a:t>
+            </a:r>
+          </a:p>
+        </p:txBody>
+      </p:sp>
+      <p:sp>
+        <p:nvSpPr>
+          <p:cNvPr id="20" name="Rectangle 19">
+            <a:extLst>
+              <a:ext uri="{FF2B5EF4-FFF2-40B4-BE49-F238E27FC236}">
+                <a16:creationId xmlns:a16="http://schemas.microsoft.com/office/drawing/2014/main" id="{A9BE95E5-AB44-42E0-B2EE-C879A19C4F76}"/>
+              </a:ext>
+            </a:extLst>
+          </p:cNvPr>
+          <p:cNvSpPr/>
+          <p:nvPr/>
+        </p:nvSpPr>
+        <p:spPr>
+          <a:xfrm>
+            <a:off x="10139291" y="2228090"/>
+            <a:ext cx="1546273" cy="461665"/>
+          </a:xfrm>
+          <a:prstGeom prst="rect">
+            <a:avLst/>
+          </a:prstGeom>
+          <a:solidFill>
+            <a:schemeClr val="accent6">
+              <a:lumMod val="40000"/>
+              <a:lumOff val="60000"/>
+            </a:schemeClr>
+          </a:solidFill>
+          <a:ln>
+            <a:solidFill>
+              <a:schemeClr val="accent6">
+                <a:lumMod val="50000"/>
+              </a:schemeClr>
+            </a:solidFill>
+          </a:ln>
+        </p:spPr>
+        <p:style>
+          <a:lnRef idx="2">
+            <a:schemeClr val="accent1">
+              <a:shade val="50000"/>
+            </a:schemeClr>
+          </a:lnRef>
+          <a:fillRef idx="1">
+            <a:schemeClr val="accent1"/>
+          </a:fillRef>
+          <a:effectRef idx="0">
+            <a:schemeClr val="accent1"/>
+          </a:effectRef>
+          <a:fontRef idx="minor">
+            <a:schemeClr val="lt1"/>
+          </a:fontRef>
+        </p:style>
+        <p:txBody>
+          <a:bodyPr rtlCol="0" anchor="ctr"/>
+          <a:lstStyle/>
+          <a:p>
+            <a:pPr algn="ctr"/>
+            <a:r>
+              <a:rPr lang="en-US" b="1" dirty="0">
+                <a:solidFill>
+                  <a:schemeClr val="tx1"/>
+                </a:solidFill>
+              </a:rPr>
+              <a:t>EDIT INFO</a:t>
+            </a:r>
+          </a:p>
+        </p:txBody>
+      </p:sp>
     </p:spTree>
     <p:extLst>
       <p:ext uri="{BB962C8B-B14F-4D97-AF65-F5344CB8AC3E}">
-        <p14:creationId xmlns:p14="http://schemas.microsoft.com/office/powerpoint/2010/main" val="777789905"/>
+        <p14:creationId xmlns:p14="http://schemas.microsoft.com/office/powerpoint/2010/main" val="3076569332"/>
       </p:ext>
     </p:extLst>
   </p:cSld>
   <p:clrMapOvr>
     <a:masterClrMapping/>
   </p:clrMapOvr>
-  <mc:AlternateContent xmlns:mc="http://schemas.openxmlformats.org/markup-compatibility/2006" xmlns:p15="http://schemas.microsoft.com/office/powerpoint/2012/main">
-    <mc:Choice Requires="p15">
-      <p:transition xmlns:p14="http://schemas.microsoft.com/office/powerpoint/2010/main" spd="slow" p14:dur="2000">
-        <p15:prstTrans prst="drape"/>
-      </p:transition>
-    </mc:Choice>
-    <mc:Fallback xmlns="">
-      <p:transition spd="slow">
-        <p:fade/>
-      </p:transition>
-    </mc:Fallback>
-  </mc:AlternateContent>
 </p:sld>
 </file>
 
@@ -5925,7 +6318,7 @@
         </p:nvSpPr>
         <p:spPr>
           <a:xfrm>
-            <a:off x="197532" y="119580"/>
+            <a:off x="197532" y="105510"/>
             <a:ext cx="11807484" cy="6421902"/>
           </a:xfrm>
           <a:prstGeom prst="rect">
@@ -5964,7 +6357,7 @@
           <a:lstStyle/>
           <a:p>
             <a:pPr algn="ctr"/>
-            <a:endParaRPr lang="en-US"/>
+            <a:endParaRPr lang="en-US" dirty="0"/>
           </a:p>
         </p:txBody>
       </p:sp>
@@ -5982,8 +6375,8 @@
         </p:nvSpPr>
         <p:spPr>
           <a:xfrm>
-            <a:off x="520504" y="562707"/>
-            <a:ext cx="2616591" cy="3516923"/>
+            <a:off x="520504" y="959458"/>
+            <a:ext cx="2616591" cy="3092037"/>
           </a:xfrm>
           <a:prstGeom prst="rect">
             <a:avLst/>
@@ -6044,8 +6437,8 @@
         </p:blipFill>
         <p:spPr>
           <a:xfrm>
-            <a:off x="520504" y="549455"/>
-            <a:ext cx="2616591" cy="3516922"/>
+            <a:off x="520504" y="959458"/>
+            <a:ext cx="2616591" cy="3306722"/>
           </a:xfrm>
           <a:prstGeom prst="rect">
             <a:avLst/>
@@ -6066,7 +6459,7 @@
         </p:nvSpPr>
         <p:spPr>
           <a:xfrm flipH="1">
-            <a:off x="3479408" y="562707"/>
+            <a:off x="3479408" y="1237958"/>
             <a:ext cx="5300004" cy="461665"/>
           </a:xfrm>
           <a:prstGeom prst="rect">
@@ -6101,7 +6494,7 @@
         </p:nvSpPr>
         <p:spPr>
           <a:xfrm flipH="1">
-            <a:off x="3479408" y="2136502"/>
+            <a:off x="3445998" y="2450152"/>
             <a:ext cx="5300004" cy="461665"/>
           </a:xfrm>
           <a:prstGeom prst="rect">
@@ -6136,7 +6529,7 @@
         </p:nvSpPr>
         <p:spPr>
           <a:xfrm flipH="1">
-            <a:off x="3479408" y="1294228"/>
+            <a:off x="3460067" y="1730865"/>
             <a:ext cx="7535595" cy="923330"/>
           </a:xfrm>
           <a:prstGeom prst="rect">
@@ -6188,7 +6581,7 @@
         </p:nvSpPr>
         <p:spPr>
           <a:xfrm>
-            <a:off x="3479409" y="2827606"/>
+            <a:off x="3479408" y="2957370"/>
             <a:ext cx="8192088" cy="923330"/>
           </a:xfrm>
           <a:prstGeom prst="rect">
@@ -6255,8 +6648,8 @@
         </p:nvSpPr>
         <p:spPr>
           <a:xfrm>
-            <a:off x="647114" y="4403188"/>
-            <a:ext cx="2321169" cy="464234"/>
+            <a:off x="520504" y="4266180"/>
+            <a:ext cx="2616591" cy="348819"/>
           </a:xfrm>
           <a:prstGeom prst="rect">
             <a:avLst/>
@@ -6314,7 +6707,7 @@
         </p:nvSpPr>
         <p:spPr>
           <a:xfrm>
-            <a:off x="3479408" y="3804515"/>
+            <a:off x="3460067" y="3946184"/>
             <a:ext cx="3177858" cy="461665"/>
           </a:xfrm>
           <a:prstGeom prst="rect">
@@ -6362,7 +6755,7 @@
         </p:nvSpPr>
         <p:spPr>
           <a:xfrm>
-            <a:off x="9468730" y="387170"/>
+            <a:off x="10125223" y="1651313"/>
             <a:ext cx="1546273" cy="461665"/>
           </a:xfrm>
           <a:prstGeom prst="rect">
@@ -6414,48 +6807,61 @@
           </a:p>
         </p:txBody>
       </p:sp>
-      <p:pic>
-        <p:nvPicPr>
-          <p:cNvPr id="14" name="Picture 13">
-            <a:extLst>
-              <a:ext uri="{FF2B5EF4-FFF2-40B4-BE49-F238E27FC236}">
-                <a16:creationId xmlns:a16="http://schemas.microsoft.com/office/drawing/2014/main" id="{5EBF6DE6-0C48-4491-B737-DCEEAF307834}"/>
-              </a:ext>
-            </a:extLst>
-          </p:cNvPr>
-          <p:cNvPicPr>
-            <a:picLocks noChangeAspect="1"/>
-          </p:cNvPicPr>
-          <p:nvPr/>
-        </p:nvPicPr>
-        <p:blipFill>
-          <a:blip r:embed="rId3">
-            <a:extLst>
-              <a:ext uri="{28A0092B-C50C-407E-A947-70E740481C1C}">
-                <a14:useLocalDpi xmlns:a14="http://schemas.microsoft.com/office/drawing/2010/main" val="0"/>
-              </a:ext>
-            </a:extLst>
-          </a:blip>
-          <a:stretch>
-            <a:fillRect/>
-          </a:stretch>
-        </p:blipFill>
-        <p:spPr>
-          <a:xfrm>
-            <a:off x="11207262" y="426805"/>
-            <a:ext cx="464234" cy="464234"/>
-          </a:xfrm>
-          <a:prstGeom prst="rect">
-            <a:avLst/>
-          </a:prstGeom>
-        </p:spPr>
-      </p:pic>
-      <p:sp>
-        <p:nvSpPr>
-          <p:cNvPr id="15" name="Rectangle 14">
-            <a:extLst>
-              <a:ext uri="{FF2B5EF4-FFF2-40B4-BE49-F238E27FC236}">
-                <a16:creationId xmlns:a16="http://schemas.microsoft.com/office/drawing/2014/main" id="{AC48BB5B-A217-420A-B19A-77697A4058F5}"/>
+      <p:sp>
+        <p:nvSpPr>
+          <p:cNvPr id="16" name="TextBox 15">
+            <a:extLst>
+              <a:ext uri="{FF2B5EF4-FFF2-40B4-BE49-F238E27FC236}">
+                <a16:creationId xmlns:a16="http://schemas.microsoft.com/office/drawing/2014/main" id="{E603B82A-D891-4F78-8459-D42A266B22D6}"/>
+              </a:ext>
+            </a:extLst>
+          </p:cNvPr>
+          <p:cNvSpPr txBox="1"/>
+          <p:nvPr/>
+        </p:nvSpPr>
+        <p:spPr>
+          <a:xfrm>
+            <a:off x="432580" y="4721992"/>
+            <a:ext cx="2792438" cy="923330"/>
+          </a:xfrm>
+          <a:prstGeom prst="rect">
+            <a:avLst/>
+          </a:prstGeom>
+          <a:noFill/>
+        </p:spPr>
+        <p:txBody>
+          <a:bodyPr wrap="square" rtlCol="0">
+            <a:spAutoFit/>
+          </a:bodyPr>
+          <a:lstStyle/>
+          <a:p>
+            <a:pPr marL="285750" indent="-285750">
+              <a:buFont typeface="Wingdings" panose="05000000000000000000" pitchFamily="2" charset="2"/>
+              <a:buChar char="§"/>
+            </a:pPr>
+            <a:r>
+              <a:rPr lang="en-US" dirty="0"/>
+              <a:t>Used this banner for 3 times </a:t>
+            </a:r>
+          </a:p>
+          <a:p>
+            <a:pPr marL="285750" indent="-285750">
+              <a:buFont typeface="Wingdings" panose="05000000000000000000" pitchFamily="2" charset="2"/>
+              <a:buChar char="§"/>
+            </a:pPr>
+            <a:r>
+              <a:rPr lang="en-US" dirty="0"/>
+              <a:t>Last used on 07/03/2019</a:t>
+            </a:r>
+          </a:p>
+        </p:txBody>
+      </p:sp>
+      <p:sp>
+        <p:nvSpPr>
+          <p:cNvPr id="18" name="Rectangle 17">
+            <a:extLst>
+              <a:ext uri="{FF2B5EF4-FFF2-40B4-BE49-F238E27FC236}">
+                <a16:creationId xmlns:a16="http://schemas.microsoft.com/office/drawing/2014/main" id="{BE094A64-3638-4C66-A783-0DD68822F278}"/>
               </a:ext>
             </a:extLst>
           </p:cNvPr>
@@ -6464,8 +6870,330 @@
         </p:nvSpPr>
         <p:spPr>
           <a:xfrm>
-            <a:off x="647114" y="5050302"/>
-            <a:ext cx="4093698" cy="464234"/>
+            <a:off x="5932583" y="344468"/>
+            <a:ext cx="1815548" cy="530087"/>
+          </a:xfrm>
+          <a:prstGeom prst="rect">
+            <a:avLst/>
+          </a:prstGeom>
+          <a:solidFill>
+            <a:schemeClr val="accent6">
+              <a:lumMod val="20000"/>
+              <a:lumOff val="80000"/>
+            </a:schemeClr>
+          </a:solidFill>
+          <a:ln>
+            <a:solidFill>
+              <a:schemeClr val="accent6"/>
+            </a:solidFill>
+          </a:ln>
+        </p:spPr>
+        <p:style>
+          <a:lnRef idx="2">
+            <a:schemeClr val="accent1">
+              <a:shade val="50000"/>
+            </a:schemeClr>
+          </a:lnRef>
+          <a:fillRef idx="1">
+            <a:schemeClr val="accent1"/>
+          </a:fillRef>
+          <a:effectRef idx="0">
+            <a:schemeClr val="accent1"/>
+          </a:effectRef>
+          <a:fontRef idx="minor">
+            <a:schemeClr val="lt1"/>
+          </a:fontRef>
+        </p:style>
+        <p:txBody>
+          <a:bodyPr rtlCol="0" anchor="ctr"/>
+          <a:lstStyle/>
+          <a:p>
+            <a:pPr algn="ctr"/>
+            <a:r>
+              <a:rPr lang="en-US" dirty="0">
+                <a:solidFill>
+                  <a:schemeClr val="tx1"/>
+                </a:solidFill>
+              </a:rPr>
+              <a:t>ALL SEASONS</a:t>
+            </a:r>
+          </a:p>
+        </p:txBody>
+      </p:sp>
+      <p:sp>
+        <p:nvSpPr>
+          <p:cNvPr id="19" name="Rectangle 18">
+            <a:extLst>
+              <a:ext uri="{FF2B5EF4-FFF2-40B4-BE49-F238E27FC236}">
+                <a16:creationId xmlns:a16="http://schemas.microsoft.com/office/drawing/2014/main" id="{97767237-87FC-46CB-B438-099F16359FCF}"/>
+              </a:ext>
+            </a:extLst>
+          </p:cNvPr>
+          <p:cNvSpPr/>
+          <p:nvPr/>
+        </p:nvSpPr>
+        <p:spPr>
+          <a:xfrm>
+            <a:off x="7902471" y="347143"/>
+            <a:ext cx="1815548" cy="530087"/>
+          </a:xfrm>
+          <a:prstGeom prst="rect">
+            <a:avLst/>
+          </a:prstGeom>
+          <a:solidFill>
+            <a:schemeClr val="accent6">
+              <a:lumMod val="20000"/>
+              <a:lumOff val="80000"/>
+            </a:schemeClr>
+          </a:solidFill>
+          <a:ln>
+            <a:solidFill>
+              <a:schemeClr val="accent6"/>
+            </a:solidFill>
+          </a:ln>
+        </p:spPr>
+        <p:style>
+          <a:lnRef idx="2">
+            <a:schemeClr val="accent1">
+              <a:shade val="50000"/>
+            </a:schemeClr>
+          </a:lnRef>
+          <a:fillRef idx="1">
+            <a:schemeClr val="accent1"/>
+          </a:fillRef>
+          <a:effectRef idx="0">
+            <a:schemeClr val="accent1"/>
+          </a:effectRef>
+          <a:fontRef idx="minor">
+            <a:schemeClr val="lt1"/>
+          </a:fontRef>
+        </p:style>
+        <p:txBody>
+          <a:bodyPr rtlCol="0" anchor="ctr"/>
+          <a:lstStyle/>
+          <a:p>
+            <a:pPr algn="ctr"/>
+            <a:r>
+              <a:rPr lang="en-US" dirty="0">
+                <a:solidFill>
+                  <a:schemeClr val="tx1"/>
+                </a:solidFill>
+              </a:rPr>
+              <a:t>MEMEBERS INFO</a:t>
+            </a:r>
+          </a:p>
+        </p:txBody>
+      </p:sp>
+      <p:sp>
+        <p:nvSpPr>
+          <p:cNvPr id="20" name="Rectangle 19">
+            <a:extLst>
+              <a:ext uri="{FF2B5EF4-FFF2-40B4-BE49-F238E27FC236}">
+                <a16:creationId xmlns:a16="http://schemas.microsoft.com/office/drawing/2014/main" id="{A399E9DA-4C48-42D1-91FE-E45CC2848EBA}"/>
+              </a:ext>
+            </a:extLst>
+          </p:cNvPr>
+          <p:cNvSpPr/>
+          <p:nvPr/>
+        </p:nvSpPr>
+        <p:spPr>
+          <a:xfrm>
+            <a:off x="9869604" y="330727"/>
+            <a:ext cx="1815548" cy="530087"/>
+          </a:xfrm>
+          <a:prstGeom prst="rect">
+            <a:avLst/>
+          </a:prstGeom>
+          <a:solidFill>
+            <a:schemeClr val="accent6">
+              <a:lumMod val="20000"/>
+              <a:lumOff val="80000"/>
+            </a:schemeClr>
+          </a:solidFill>
+          <a:ln>
+            <a:solidFill>
+              <a:schemeClr val="accent6"/>
+            </a:solidFill>
+          </a:ln>
+        </p:spPr>
+        <p:style>
+          <a:lnRef idx="2">
+            <a:schemeClr val="accent1">
+              <a:shade val="50000"/>
+            </a:schemeClr>
+          </a:lnRef>
+          <a:fillRef idx="1">
+            <a:schemeClr val="accent1"/>
+          </a:fillRef>
+          <a:effectRef idx="0">
+            <a:schemeClr val="accent1"/>
+          </a:effectRef>
+          <a:fontRef idx="minor">
+            <a:schemeClr val="lt1"/>
+          </a:fontRef>
+        </p:style>
+        <p:txBody>
+          <a:bodyPr rtlCol="0" anchor="ctr"/>
+          <a:lstStyle/>
+          <a:p>
+            <a:pPr algn="ctr"/>
+            <a:r>
+              <a:rPr lang="en-US" dirty="0">
+                <a:solidFill>
+                  <a:schemeClr val="tx1"/>
+                </a:solidFill>
+              </a:rPr>
+              <a:t>ADMIN PAGE</a:t>
+            </a:r>
+          </a:p>
+        </p:txBody>
+      </p:sp>
+      <p:sp>
+        <p:nvSpPr>
+          <p:cNvPr id="21" name="Rectangle 20">
+            <a:extLst>
+              <a:ext uri="{FF2B5EF4-FFF2-40B4-BE49-F238E27FC236}">
+                <a16:creationId xmlns:a16="http://schemas.microsoft.com/office/drawing/2014/main" id="{07D742E0-6F6A-406A-B388-F57074A34989}"/>
+              </a:ext>
+            </a:extLst>
+          </p:cNvPr>
+          <p:cNvSpPr/>
+          <p:nvPr/>
+        </p:nvSpPr>
+        <p:spPr>
+          <a:xfrm>
+            <a:off x="3956682" y="323832"/>
+            <a:ext cx="1815548" cy="530087"/>
+          </a:xfrm>
+          <a:prstGeom prst="rect">
+            <a:avLst/>
+          </a:prstGeom>
+          <a:solidFill>
+            <a:schemeClr val="accent6">
+              <a:lumMod val="20000"/>
+              <a:lumOff val="80000"/>
+            </a:schemeClr>
+          </a:solidFill>
+          <a:ln>
+            <a:solidFill>
+              <a:schemeClr val="accent6"/>
+            </a:solidFill>
+          </a:ln>
+        </p:spPr>
+        <p:style>
+          <a:lnRef idx="2">
+            <a:schemeClr val="accent1">
+              <a:shade val="50000"/>
+            </a:schemeClr>
+          </a:lnRef>
+          <a:fillRef idx="1">
+            <a:schemeClr val="accent1"/>
+          </a:fillRef>
+          <a:effectRef idx="0">
+            <a:schemeClr val="accent1"/>
+          </a:effectRef>
+          <a:fontRef idx="minor">
+            <a:schemeClr val="lt1"/>
+          </a:fontRef>
+        </p:style>
+        <p:txBody>
+          <a:bodyPr rtlCol="0" anchor="ctr"/>
+          <a:lstStyle/>
+          <a:p>
+            <a:pPr algn="ctr"/>
+            <a:r>
+              <a:rPr lang="en-US" dirty="0">
+                <a:solidFill>
+                  <a:schemeClr val="tx1"/>
+                </a:solidFill>
+              </a:rPr>
+              <a:t>HOME</a:t>
+            </a:r>
+          </a:p>
+        </p:txBody>
+      </p:sp>
+      <p:sp>
+        <p:nvSpPr>
+          <p:cNvPr id="23" name="Rectangle 22">
+            <a:extLst>
+              <a:ext uri="{FF2B5EF4-FFF2-40B4-BE49-F238E27FC236}">
+                <a16:creationId xmlns:a16="http://schemas.microsoft.com/office/drawing/2014/main" id="{E8257804-5C97-4804-BE8E-91AA09134C4C}"/>
+              </a:ext>
+            </a:extLst>
+          </p:cNvPr>
+          <p:cNvSpPr/>
+          <p:nvPr/>
+        </p:nvSpPr>
+        <p:spPr>
+          <a:xfrm>
+            <a:off x="10139291" y="2228090"/>
+            <a:ext cx="1546273" cy="461665"/>
+          </a:xfrm>
+          <a:prstGeom prst="rect">
+            <a:avLst/>
+          </a:prstGeom>
+          <a:solidFill>
+            <a:schemeClr val="accent6">
+              <a:lumMod val="40000"/>
+              <a:lumOff val="60000"/>
+            </a:schemeClr>
+          </a:solidFill>
+          <a:ln>
+            <a:solidFill>
+              <a:schemeClr val="accent6">
+                <a:lumMod val="50000"/>
+              </a:schemeClr>
+            </a:solidFill>
+          </a:ln>
+        </p:spPr>
+        <p:style>
+          <a:lnRef idx="2">
+            <a:schemeClr val="accent1">
+              <a:shade val="50000"/>
+            </a:schemeClr>
+          </a:lnRef>
+          <a:fillRef idx="1">
+            <a:schemeClr val="accent1"/>
+          </a:fillRef>
+          <a:effectRef idx="0">
+            <a:schemeClr val="accent1"/>
+          </a:effectRef>
+          <a:fontRef idx="minor">
+            <a:schemeClr val="lt1"/>
+          </a:fontRef>
+        </p:style>
+        <p:txBody>
+          <a:bodyPr rtlCol="0" anchor="ctr"/>
+          <a:lstStyle/>
+          <a:p>
+            <a:pPr algn="ctr"/>
+            <a:r>
+              <a:rPr lang="en-US" b="1" dirty="0">
+                <a:solidFill>
+                  <a:schemeClr val="tx1"/>
+                </a:solidFill>
+              </a:rPr>
+              <a:t>EDIT INFO</a:t>
+            </a:r>
+          </a:p>
+        </p:txBody>
+      </p:sp>
+      <p:sp>
+        <p:nvSpPr>
+          <p:cNvPr id="24" name="Rectangle 23">
+            <a:extLst>
+              <a:ext uri="{FF2B5EF4-FFF2-40B4-BE49-F238E27FC236}">
+                <a16:creationId xmlns:a16="http://schemas.microsoft.com/office/drawing/2014/main" id="{B5C8BCBB-4BB9-45ED-AF6E-5528160F7F17}"/>
+              </a:ext>
+            </a:extLst>
+          </p:cNvPr>
+          <p:cNvSpPr/>
+          <p:nvPr/>
+        </p:nvSpPr>
+        <p:spPr>
+          <a:xfrm>
+            <a:off x="10139291" y="2858119"/>
+            <a:ext cx="1556822" cy="1193376"/>
           </a:xfrm>
           <a:prstGeom prst="rect">
             <a:avLst/>
@@ -6510,47 +7238,6 @@
                 </a:solidFill>
               </a:rPr>
               <a:t>CLICK ME WHEN YOU USE THIS BANNER</a:t>
-            </a:r>
-          </a:p>
-        </p:txBody>
-      </p:sp>
-      <p:sp>
-        <p:nvSpPr>
-          <p:cNvPr id="16" name="TextBox 15">
-            <a:extLst>
-              <a:ext uri="{FF2B5EF4-FFF2-40B4-BE49-F238E27FC236}">
-                <a16:creationId xmlns:a16="http://schemas.microsoft.com/office/drawing/2014/main" id="{E603B82A-D891-4F78-8459-D42A266B22D6}"/>
-              </a:ext>
-            </a:extLst>
-          </p:cNvPr>
-          <p:cNvSpPr txBox="1"/>
-          <p:nvPr/>
-        </p:nvSpPr>
-        <p:spPr>
-          <a:xfrm>
-            <a:off x="773722" y="5714840"/>
-            <a:ext cx="3967089" cy="646331"/>
-          </a:xfrm>
-          <a:prstGeom prst="rect">
-            <a:avLst/>
-          </a:prstGeom>
-          <a:noFill/>
-        </p:spPr>
-        <p:txBody>
-          <a:bodyPr wrap="square" rtlCol="0">
-            <a:spAutoFit/>
-          </a:bodyPr>
-          <a:lstStyle/>
-          <a:p>
-            <a:r>
-              <a:rPr lang="en-US" dirty="0"/>
-              <a:t>Used this banner for 3 times</a:t>
-            </a:r>
-          </a:p>
-          <a:p>
-            <a:r>
-              <a:rPr lang="en-US" dirty="0"/>
-              <a:t>Last used on 07/03/2019</a:t>
             </a:r>
           </a:p>
         </p:txBody>
@@ -7131,7 +7818,7 @@
         </p:nvSpPr>
         <p:spPr>
           <a:xfrm>
-            <a:off x="5771321" y="473141"/>
+            <a:off x="3886245" y="445006"/>
             <a:ext cx="1815548" cy="530087"/>
           </a:xfrm>
           <a:prstGeom prst="rect">
@@ -7195,7 +7882,7 @@
         </p:nvSpPr>
         <p:spPr>
           <a:xfrm>
-            <a:off x="7803591" y="491722"/>
+            <a:off x="5890379" y="449518"/>
             <a:ext cx="1815548" cy="530087"/>
           </a:xfrm>
           <a:prstGeom prst="rect">
@@ -7259,7 +7946,7 @@
         </p:nvSpPr>
         <p:spPr>
           <a:xfrm>
-            <a:off x="9773479" y="508465"/>
+            <a:off x="7860267" y="452193"/>
             <a:ext cx="1815548" cy="530087"/>
           </a:xfrm>
           <a:prstGeom prst="rect">
@@ -8668,6 +9355,70 @@
           </a:prstGeom>
         </p:spPr>
       </p:pic>
+      <p:sp>
+        <p:nvSpPr>
+          <p:cNvPr id="32" name="Rectangle 31">
+            <a:extLst>
+              <a:ext uri="{FF2B5EF4-FFF2-40B4-BE49-F238E27FC236}">
+                <a16:creationId xmlns:a16="http://schemas.microsoft.com/office/drawing/2014/main" id="{F65128E6-0C11-4D5A-A7F5-CC9EFA57BD8E}"/>
+              </a:ext>
+            </a:extLst>
+          </p:cNvPr>
+          <p:cNvSpPr/>
+          <p:nvPr/>
+        </p:nvSpPr>
+        <p:spPr>
+          <a:xfrm>
+            <a:off x="9827400" y="435777"/>
+            <a:ext cx="1815548" cy="530087"/>
+          </a:xfrm>
+          <a:prstGeom prst="rect">
+            <a:avLst/>
+          </a:prstGeom>
+          <a:solidFill>
+            <a:schemeClr val="accent6">
+              <a:lumMod val="20000"/>
+              <a:lumOff val="80000"/>
+            </a:schemeClr>
+          </a:solidFill>
+          <a:ln>
+            <a:solidFill>
+              <a:schemeClr val="accent6"/>
+            </a:solidFill>
+          </a:ln>
+        </p:spPr>
+        <p:style>
+          <a:lnRef idx="2">
+            <a:schemeClr val="accent1">
+              <a:shade val="50000"/>
+            </a:schemeClr>
+          </a:lnRef>
+          <a:fillRef idx="1">
+            <a:schemeClr val="accent1"/>
+          </a:fillRef>
+          <a:effectRef idx="0">
+            <a:schemeClr val="accent1"/>
+          </a:effectRef>
+          <a:fontRef idx="minor">
+            <a:schemeClr val="lt1"/>
+          </a:fontRef>
+        </p:style>
+        <p:txBody>
+          <a:bodyPr rtlCol="0" anchor="ctr"/>
+          <a:lstStyle/>
+          <a:p>
+            <a:pPr algn="ctr"/>
+            <a:r>
+              <a:rPr lang="en-US" dirty="0">
+                <a:solidFill>
+                  <a:schemeClr val="tx1"/>
+                </a:solidFill>
+              </a:rPr>
+              <a:t>ADMIN PAGE</a:t>
+            </a:r>
+          </a:p>
+        </p:txBody>
+      </p:sp>
     </p:spTree>
     <p:extLst>
       <p:ext uri="{BB962C8B-B14F-4D97-AF65-F5344CB8AC3E}">
@@ -9310,198 +10061,6 @@
           <a:p>
             <a:pPr algn="ctr"/>
             <a:endParaRPr lang="en-US" dirty="0"/>
-          </a:p>
-        </p:txBody>
-      </p:sp>
-      <p:sp>
-        <p:nvSpPr>
-          <p:cNvPr id="5" name="Rectangle 4">
-            <a:extLst>
-              <a:ext uri="{FF2B5EF4-FFF2-40B4-BE49-F238E27FC236}">
-                <a16:creationId xmlns:a16="http://schemas.microsoft.com/office/drawing/2014/main" id="{DB54AE6A-9F44-4799-80D4-34A1AE1F7173}"/>
-              </a:ext>
-            </a:extLst>
-          </p:cNvPr>
-          <p:cNvSpPr/>
-          <p:nvPr/>
-        </p:nvSpPr>
-        <p:spPr>
-          <a:xfrm>
-            <a:off x="5787684" y="650021"/>
-            <a:ext cx="1815548" cy="530087"/>
-          </a:xfrm>
-          <a:prstGeom prst="rect">
-            <a:avLst/>
-          </a:prstGeom>
-          <a:solidFill>
-            <a:schemeClr val="accent6">
-              <a:lumMod val="20000"/>
-              <a:lumOff val="80000"/>
-            </a:schemeClr>
-          </a:solidFill>
-          <a:ln>
-            <a:solidFill>
-              <a:schemeClr val="accent6"/>
-            </a:solidFill>
-          </a:ln>
-        </p:spPr>
-        <p:style>
-          <a:lnRef idx="2">
-            <a:schemeClr val="accent1">
-              <a:shade val="50000"/>
-            </a:schemeClr>
-          </a:lnRef>
-          <a:fillRef idx="1">
-            <a:schemeClr val="accent1"/>
-          </a:fillRef>
-          <a:effectRef idx="0">
-            <a:schemeClr val="accent1"/>
-          </a:effectRef>
-          <a:fontRef idx="minor">
-            <a:schemeClr val="lt1"/>
-          </a:fontRef>
-        </p:style>
-        <p:txBody>
-          <a:bodyPr rtlCol="0" anchor="ctr"/>
-          <a:lstStyle/>
-          <a:p>
-            <a:pPr algn="ctr"/>
-            <a:r>
-              <a:rPr lang="en-US" dirty="0">
-                <a:solidFill>
-                  <a:schemeClr val="tx1"/>
-                </a:solidFill>
-              </a:rPr>
-              <a:t>HOME</a:t>
-            </a:r>
-          </a:p>
-        </p:txBody>
-      </p:sp>
-      <p:sp>
-        <p:nvSpPr>
-          <p:cNvPr id="6" name="Rectangle 5">
-            <a:extLst>
-              <a:ext uri="{FF2B5EF4-FFF2-40B4-BE49-F238E27FC236}">
-                <a16:creationId xmlns:a16="http://schemas.microsoft.com/office/drawing/2014/main" id="{93EBC223-2265-4D96-B30E-56604A61401A}"/>
-              </a:ext>
-            </a:extLst>
-          </p:cNvPr>
-          <p:cNvSpPr/>
-          <p:nvPr/>
-        </p:nvSpPr>
-        <p:spPr>
-          <a:xfrm>
-            <a:off x="7797146" y="630565"/>
-            <a:ext cx="1815548" cy="530087"/>
-          </a:xfrm>
-          <a:prstGeom prst="rect">
-            <a:avLst/>
-          </a:prstGeom>
-          <a:solidFill>
-            <a:schemeClr val="accent6">
-              <a:lumMod val="20000"/>
-              <a:lumOff val="80000"/>
-            </a:schemeClr>
-          </a:solidFill>
-          <a:ln>
-            <a:solidFill>
-              <a:schemeClr val="accent6"/>
-            </a:solidFill>
-          </a:ln>
-        </p:spPr>
-        <p:style>
-          <a:lnRef idx="2">
-            <a:schemeClr val="accent1">
-              <a:shade val="50000"/>
-            </a:schemeClr>
-          </a:lnRef>
-          <a:fillRef idx="1">
-            <a:schemeClr val="accent1"/>
-          </a:fillRef>
-          <a:effectRef idx="0">
-            <a:schemeClr val="accent1"/>
-          </a:effectRef>
-          <a:fontRef idx="minor">
-            <a:schemeClr val="lt1"/>
-          </a:fontRef>
-        </p:style>
-        <p:txBody>
-          <a:bodyPr rtlCol="0" anchor="ctr"/>
-          <a:lstStyle/>
-          <a:p>
-            <a:pPr algn="ctr"/>
-            <a:r>
-              <a:rPr lang="en-US" dirty="0">
-                <a:solidFill>
-                  <a:schemeClr val="tx1"/>
-                </a:solidFill>
-              </a:rPr>
-              <a:t>ALL EVENTS</a:t>
-            </a:r>
-          </a:p>
-        </p:txBody>
-      </p:sp>
-      <p:sp>
-        <p:nvSpPr>
-          <p:cNvPr id="7" name="Rectangle 6">
-            <a:extLst>
-              <a:ext uri="{FF2B5EF4-FFF2-40B4-BE49-F238E27FC236}">
-                <a16:creationId xmlns:a16="http://schemas.microsoft.com/office/drawing/2014/main" id="{2665FB25-1597-4D41-99D9-26A0F4818536}"/>
-              </a:ext>
-            </a:extLst>
-          </p:cNvPr>
-          <p:cNvSpPr/>
-          <p:nvPr/>
-        </p:nvSpPr>
-        <p:spPr>
-          <a:xfrm>
-            <a:off x="9806608" y="618426"/>
-            <a:ext cx="1815548" cy="530087"/>
-          </a:xfrm>
-          <a:prstGeom prst="rect">
-            <a:avLst/>
-          </a:prstGeom>
-          <a:solidFill>
-            <a:schemeClr val="accent6">
-              <a:lumMod val="20000"/>
-              <a:lumOff val="80000"/>
-            </a:schemeClr>
-          </a:solidFill>
-          <a:ln>
-            <a:solidFill>
-              <a:schemeClr val="accent6"/>
-            </a:solidFill>
-          </a:ln>
-        </p:spPr>
-        <p:style>
-          <a:lnRef idx="2">
-            <a:schemeClr val="accent1">
-              <a:shade val="50000"/>
-            </a:schemeClr>
-          </a:lnRef>
-          <a:fillRef idx="1">
-            <a:schemeClr val="accent1"/>
-          </a:fillRef>
-          <a:effectRef idx="0">
-            <a:schemeClr val="accent1"/>
-          </a:effectRef>
-          <a:fontRef idx="minor">
-            <a:schemeClr val="lt1"/>
-          </a:fontRef>
-        </p:style>
-        <p:txBody>
-          <a:bodyPr rtlCol="0" anchor="ctr"/>
-          <a:lstStyle/>
-          <a:p>
-            <a:pPr algn="ctr"/>
-            <a:r>
-              <a:rPr lang="en-US" dirty="0">
-                <a:solidFill>
-                  <a:schemeClr val="tx1"/>
-                </a:solidFill>
-              </a:rPr>
-              <a:t>MEMEBERS INFO</a:t>
-            </a:r>
           </a:p>
         </p:txBody>
       </p:sp>
@@ -10331,6 +10890,262 @@
           </a:p>
         </p:txBody>
       </p:sp>
+      <p:sp>
+        <p:nvSpPr>
+          <p:cNvPr id="27" name="Rectangle 26">
+            <a:extLst>
+              <a:ext uri="{FF2B5EF4-FFF2-40B4-BE49-F238E27FC236}">
+                <a16:creationId xmlns:a16="http://schemas.microsoft.com/office/drawing/2014/main" id="{8C0BA2D3-66A5-487D-8C43-81F7F2B3CEAA}"/>
+              </a:ext>
+            </a:extLst>
+          </p:cNvPr>
+          <p:cNvSpPr/>
+          <p:nvPr/>
+        </p:nvSpPr>
+        <p:spPr>
+          <a:xfrm>
+            <a:off x="5880305" y="380931"/>
+            <a:ext cx="1815548" cy="530087"/>
+          </a:xfrm>
+          <a:prstGeom prst="rect">
+            <a:avLst/>
+          </a:prstGeom>
+          <a:solidFill>
+            <a:schemeClr val="accent6">
+              <a:lumMod val="20000"/>
+              <a:lumOff val="80000"/>
+            </a:schemeClr>
+          </a:solidFill>
+          <a:ln>
+            <a:solidFill>
+              <a:schemeClr val="accent6"/>
+            </a:solidFill>
+          </a:ln>
+        </p:spPr>
+        <p:style>
+          <a:lnRef idx="2">
+            <a:schemeClr val="accent1">
+              <a:shade val="50000"/>
+            </a:schemeClr>
+          </a:lnRef>
+          <a:fillRef idx="1">
+            <a:schemeClr val="accent1"/>
+          </a:fillRef>
+          <a:effectRef idx="0">
+            <a:schemeClr val="accent1"/>
+          </a:effectRef>
+          <a:fontRef idx="minor">
+            <a:schemeClr val="lt1"/>
+          </a:fontRef>
+        </p:style>
+        <p:txBody>
+          <a:bodyPr rtlCol="0" anchor="ctr"/>
+          <a:lstStyle/>
+          <a:p>
+            <a:pPr algn="ctr"/>
+            <a:r>
+              <a:rPr lang="en-US" dirty="0">
+                <a:solidFill>
+                  <a:schemeClr val="tx1"/>
+                </a:solidFill>
+              </a:rPr>
+              <a:t>ALL SEASONS</a:t>
+            </a:r>
+          </a:p>
+        </p:txBody>
+      </p:sp>
+      <p:sp>
+        <p:nvSpPr>
+          <p:cNvPr id="28" name="Rectangle 27">
+            <a:extLst>
+              <a:ext uri="{FF2B5EF4-FFF2-40B4-BE49-F238E27FC236}">
+                <a16:creationId xmlns:a16="http://schemas.microsoft.com/office/drawing/2014/main" id="{9C7463B6-7C54-44EB-ACCD-F76411BE9B57}"/>
+              </a:ext>
+            </a:extLst>
+          </p:cNvPr>
+          <p:cNvSpPr/>
+          <p:nvPr/>
+        </p:nvSpPr>
+        <p:spPr>
+          <a:xfrm>
+            <a:off x="7850193" y="383606"/>
+            <a:ext cx="1815548" cy="530087"/>
+          </a:xfrm>
+          <a:prstGeom prst="rect">
+            <a:avLst/>
+          </a:prstGeom>
+          <a:solidFill>
+            <a:schemeClr val="accent6">
+              <a:lumMod val="20000"/>
+              <a:lumOff val="80000"/>
+            </a:schemeClr>
+          </a:solidFill>
+          <a:ln>
+            <a:solidFill>
+              <a:schemeClr val="accent6"/>
+            </a:solidFill>
+          </a:ln>
+        </p:spPr>
+        <p:style>
+          <a:lnRef idx="2">
+            <a:schemeClr val="accent1">
+              <a:shade val="50000"/>
+            </a:schemeClr>
+          </a:lnRef>
+          <a:fillRef idx="1">
+            <a:schemeClr val="accent1"/>
+          </a:fillRef>
+          <a:effectRef idx="0">
+            <a:schemeClr val="accent1"/>
+          </a:effectRef>
+          <a:fontRef idx="minor">
+            <a:schemeClr val="lt1"/>
+          </a:fontRef>
+        </p:style>
+        <p:txBody>
+          <a:bodyPr rtlCol="0" anchor="ctr"/>
+          <a:lstStyle/>
+          <a:p>
+            <a:pPr algn="ctr"/>
+            <a:r>
+              <a:rPr lang="en-US" dirty="0">
+                <a:solidFill>
+                  <a:schemeClr val="tx1"/>
+                </a:solidFill>
+              </a:rPr>
+              <a:t>MEMEBERS INFO</a:t>
+            </a:r>
+          </a:p>
+        </p:txBody>
+      </p:sp>
+      <p:sp>
+        <p:nvSpPr>
+          <p:cNvPr id="29" name="Rectangle 28">
+            <a:extLst>
+              <a:ext uri="{FF2B5EF4-FFF2-40B4-BE49-F238E27FC236}">
+                <a16:creationId xmlns:a16="http://schemas.microsoft.com/office/drawing/2014/main" id="{883A1258-DB8E-4265-8773-9677602B1EFD}"/>
+              </a:ext>
+            </a:extLst>
+          </p:cNvPr>
+          <p:cNvSpPr/>
+          <p:nvPr/>
+        </p:nvSpPr>
+        <p:spPr>
+          <a:xfrm>
+            <a:off x="9817326" y="367190"/>
+            <a:ext cx="1815548" cy="530087"/>
+          </a:xfrm>
+          <a:prstGeom prst="rect">
+            <a:avLst/>
+          </a:prstGeom>
+          <a:solidFill>
+            <a:schemeClr val="accent6">
+              <a:lumMod val="20000"/>
+              <a:lumOff val="80000"/>
+            </a:schemeClr>
+          </a:solidFill>
+          <a:ln>
+            <a:solidFill>
+              <a:schemeClr val="accent6"/>
+            </a:solidFill>
+          </a:ln>
+        </p:spPr>
+        <p:style>
+          <a:lnRef idx="2">
+            <a:schemeClr val="accent1">
+              <a:shade val="50000"/>
+            </a:schemeClr>
+          </a:lnRef>
+          <a:fillRef idx="1">
+            <a:schemeClr val="accent1"/>
+          </a:fillRef>
+          <a:effectRef idx="0">
+            <a:schemeClr val="accent1"/>
+          </a:effectRef>
+          <a:fontRef idx="minor">
+            <a:schemeClr val="lt1"/>
+          </a:fontRef>
+        </p:style>
+        <p:txBody>
+          <a:bodyPr rtlCol="0" anchor="ctr"/>
+          <a:lstStyle/>
+          <a:p>
+            <a:pPr algn="ctr"/>
+            <a:r>
+              <a:rPr lang="en-US" dirty="0">
+                <a:solidFill>
+                  <a:schemeClr val="tx1"/>
+                </a:solidFill>
+              </a:rPr>
+              <a:t>ADMIN PAGE</a:t>
+            </a:r>
+          </a:p>
+        </p:txBody>
+      </p:sp>
+      <p:sp>
+        <p:nvSpPr>
+          <p:cNvPr id="30" name="Rectangle 29">
+            <a:extLst>
+              <a:ext uri="{FF2B5EF4-FFF2-40B4-BE49-F238E27FC236}">
+                <a16:creationId xmlns:a16="http://schemas.microsoft.com/office/drawing/2014/main" id="{B9D9C6A5-5F03-4209-A35E-A8AB288C8FCA}"/>
+              </a:ext>
+            </a:extLst>
+          </p:cNvPr>
+          <p:cNvSpPr/>
+          <p:nvPr/>
+        </p:nvSpPr>
+        <p:spPr>
+          <a:xfrm>
+            <a:off x="3876171" y="376420"/>
+            <a:ext cx="1815548" cy="530087"/>
+          </a:xfrm>
+          <a:prstGeom prst="rect">
+            <a:avLst/>
+          </a:prstGeom>
+          <a:solidFill>
+            <a:schemeClr val="accent6">
+              <a:lumMod val="20000"/>
+              <a:lumOff val="80000"/>
+            </a:schemeClr>
+          </a:solidFill>
+          <a:ln>
+            <a:solidFill>
+              <a:schemeClr val="accent6"/>
+            </a:solidFill>
+          </a:ln>
+        </p:spPr>
+        <p:style>
+          <a:lnRef idx="2">
+            <a:schemeClr val="accent1">
+              <a:shade val="50000"/>
+            </a:schemeClr>
+          </a:lnRef>
+          <a:fillRef idx="1">
+            <a:schemeClr val="accent1"/>
+          </a:fillRef>
+          <a:effectRef idx="0">
+            <a:schemeClr val="accent1"/>
+          </a:effectRef>
+          <a:fontRef idx="minor">
+            <a:schemeClr val="lt1"/>
+          </a:fontRef>
+        </p:style>
+        <p:txBody>
+          <a:bodyPr rtlCol="0" anchor="ctr"/>
+          <a:lstStyle/>
+          <a:p>
+            <a:pPr algn="ctr"/>
+            <a:r>
+              <a:rPr lang="en-US" dirty="0">
+                <a:solidFill>
+                  <a:schemeClr val="tx1"/>
+                </a:solidFill>
+              </a:rPr>
+              <a:t>HOME</a:t>
+            </a:r>
+          </a:p>
+        </p:txBody>
+      </p:sp>
     </p:spTree>
     <p:extLst>
       <p:ext uri="{BB962C8B-B14F-4D97-AF65-F5344CB8AC3E}">
@@ -10398,7 +11213,7 @@
         </p:nvSpPr>
         <p:spPr>
           <a:xfrm>
-            <a:off x="251791" y="236012"/>
+            <a:off x="251791" y="207877"/>
             <a:ext cx="11701670" cy="6198957"/>
           </a:xfrm>
           <a:prstGeom prst="rect">
@@ -10438,198 +11253,6 @@
           <a:p>
             <a:pPr algn="ctr"/>
             <a:endParaRPr lang="en-US" dirty="0"/>
-          </a:p>
-        </p:txBody>
-      </p:sp>
-      <p:sp>
-        <p:nvSpPr>
-          <p:cNvPr id="5" name="Rectangle 4">
-            <a:extLst>
-              <a:ext uri="{FF2B5EF4-FFF2-40B4-BE49-F238E27FC236}">
-                <a16:creationId xmlns:a16="http://schemas.microsoft.com/office/drawing/2014/main" id="{B7475E86-CCFE-4047-9CE7-957194F637E3}"/>
-              </a:ext>
-            </a:extLst>
-          </p:cNvPr>
-          <p:cNvSpPr/>
-          <p:nvPr/>
-        </p:nvSpPr>
-        <p:spPr>
-          <a:xfrm>
-            <a:off x="5771321" y="473141"/>
-            <a:ext cx="1815548" cy="530087"/>
-          </a:xfrm>
-          <a:prstGeom prst="rect">
-            <a:avLst/>
-          </a:prstGeom>
-          <a:solidFill>
-            <a:schemeClr val="accent6">
-              <a:lumMod val="20000"/>
-              <a:lumOff val="80000"/>
-            </a:schemeClr>
-          </a:solidFill>
-          <a:ln>
-            <a:solidFill>
-              <a:schemeClr val="accent6"/>
-            </a:solidFill>
-          </a:ln>
-        </p:spPr>
-        <p:style>
-          <a:lnRef idx="2">
-            <a:schemeClr val="accent1">
-              <a:shade val="50000"/>
-            </a:schemeClr>
-          </a:lnRef>
-          <a:fillRef idx="1">
-            <a:schemeClr val="accent1"/>
-          </a:fillRef>
-          <a:effectRef idx="0">
-            <a:schemeClr val="accent1"/>
-          </a:effectRef>
-          <a:fontRef idx="minor">
-            <a:schemeClr val="lt1"/>
-          </a:fontRef>
-        </p:style>
-        <p:txBody>
-          <a:bodyPr rtlCol="0" anchor="ctr"/>
-          <a:lstStyle/>
-          <a:p>
-            <a:pPr algn="ctr"/>
-            <a:r>
-              <a:rPr lang="en-US" dirty="0">
-                <a:solidFill>
-                  <a:schemeClr val="tx1"/>
-                </a:solidFill>
-              </a:rPr>
-              <a:t>HOME</a:t>
-            </a:r>
-          </a:p>
-        </p:txBody>
-      </p:sp>
-      <p:sp>
-        <p:nvSpPr>
-          <p:cNvPr id="6" name="Rectangle 5">
-            <a:extLst>
-              <a:ext uri="{FF2B5EF4-FFF2-40B4-BE49-F238E27FC236}">
-                <a16:creationId xmlns:a16="http://schemas.microsoft.com/office/drawing/2014/main" id="{583C2705-AE7B-49BD-B5CC-6576B3A3FFB2}"/>
-              </a:ext>
-            </a:extLst>
-          </p:cNvPr>
-          <p:cNvSpPr/>
-          <p:nvPr/>
-        </p:nvSpPr>
-        <p:spPr>
-          <a:xfrm>
-            <a:off x="7803591" y="491722"/>
-            <a:ext cx="1815548" cy="530087"/>
-          </a:xfrm>
-          <a:prstGeom prst="rect">
-            <a:avLst/>
-          </a:prstGeom>
-          <a:solidFill>
-            <a:schemeClr val="accent6">
-              <a:lumMod val="20000"/>
-              <a:lumOff val="80000"/>
-            </a:schemeClr>
-          </a:solidFill>
-          <a:ln>
-            <a:solidFill>
-              <a:schemeClr val="accent6"/>
-            </a:solidFill>
-          </a:ln>
-        </p:spPr>
-        <p:style>
-          <a:lnRef idx="2">
-            <a:schemeClr val="accent1">
-              <a:shade val="50000"/>
-            </a:schemeClr>
-          </a:lnRef>
-          <a:fillRef idx="1">
-            <a:schemeClr val="accent1"/>
-          </a:fillRef>
-          <a:effectRef idx="0">
-            <a:schemeClr val="accent1"/>
-          </a:effectRef>
-          <a:fontRef idx="minor">
-            <a:schemeClr val="lt1"/>
-          </a:fontRef>
-        </p:style>
-        <p:txBody>
-          <a:bodyPr rtlCol="0" anchor="ctr"/>
-          <a:lstStyle/>
-          <a:p>
-            <a:pPr algn="ctr"/>
-            <a:r>
-              <a:rPr lang="en-US" dirty="0">
-                <a:solidFill>
-                  <a:schemeClr val="tx1"/>
-                </a:solidFill>
-              </a:rPr>
-              <a:t>ALL SEASONS</a:t>
-            </a:r>
-          </a:p>
-        </p:txBody>
-      </p:sp>
-      <p:sp>
-        <p:nvSpPr>
-          <p:cNvPr id="7" name="Rectangle 6">
-            <a:extLst>
-              <a:ext uri="{FF2B5EF4-FFF2-40B4-BE49-F238E27FC236}">
-                <a16:creationId xmlns:a16="http://schemas.microsoft.com/office/drawing/2014/main" id="{E6B7F966-D466-4D10-AA75-F214562624D1}"/>
-              </a:ext>
-            </a:extLst>
-          </p:cNvPr>
-          <p:cNvSpPr/>
-          <p:nvPr/>
-        </p:nvSpPr>
-        <p:spPr>
-          <a:xfrm>
-            <a:off x="9773479" y="508465"/>
-            <a:ext cx="1815548" cy="530087"/>
-          </a:xfrm>
-          <a:prstGeom prst="rect">
-            <a:avLst/>
-          </a:prstGeom>
-          <a:solidFill>
-            <a:schemeClr val="accent6">
-              <a:lumMod val="20000"/>
-              <a:lumOff val="80000"/>
-            </a:schemeClr>
-          </a:solidFill>
-          <a:ln>
-            <a:solidFill>
-              <a:schemeClr val="accent6"/>
-            </a:solidFill>
-          </a:ln>
-        </p:spPr>
-        <p:style>
-          <a:lnRef idx="2">
-            <a:schemeClr val="accent1">
-              <a:shade val="50000"/>
-            </a:schemeClr>
-          </a:lnRef>
-          <a:fillRef idx="1">
-            <a:schemeClr val="accent1"/>
-          </a:fillRef>
-          <a:effectRef idx="0">
-            <a:schemeClr val="accent1"/>
-          </a:effectRef>
-          <a:fontRef idx="minor">
-            <a:schemeClr val="lt1"/>
-          </a:fontRef>
-        </p:style>
-        <p:txBody>
-          <a:bodyPr rtlCol="0" anchor="ctr"/>
-          <a:lstStyle/>
-          <a:p>
-            <a:pPr algn="ctr"/>
-            <a:r>
-              <a:rPr lang="en-US" dirty="0">
-                <a:solidFill>
-                  <a:schemeClr val="tx1"/>
-                </a:solidFill>
-              </a:rPr>
-              <a:t>MEMEBERS INFO</a:t>
-            </a:r>
           </a:p>
         </p:txBody>
       </p:sp>
@@ -11992,6 +12615,262 @@
           </a:prstGeom>
         </p:spPr>
       </p:pic>
+      <p:sp>
+        <p:nvSpPr>
+          <p:cNvPr id="32" name="Rectangle 31">
+            <a:extLst>
+              <a:ext uri="{FF2B5EF4-FFF2-40B4-BE49-F238E27FC236}">
+                <a16:creationId xmlns:a16="http://schemas.microsoft.com/office/drawing/2014/main" id="{E9D77AC8-8EF7-4854-97AF-B792A5DBDBBD}"/>
+              </a:ext>
+            </a:extLst>
+          </p:cNvPr>
+          <p:cNvSpPr/>
+          <p:nvPr/>
+        </p:nvSpPr>
+        <p:spPr>
+          <a:xfrm>
+            <a:off x="5890379" y="449518"/>
+            <a:ext cx="1815548" cy="530087"/>
+          </a:xfrm>
+          <a:prstGeom prst="rect">
+            <a:avLst/>
+          </a:prstGeom>
+          <a:solidFill>
+            <a:schemeClr val="accent6">
+              <a:lumMod val="20000"/>
+              <a:lumOff val="80000"/>
+            </a:schemeClr>
+          </a:solidFill>
+          <a:ln>
+            <a:solidFill>
+              <a:schemeClr val="accent6"/>
+            </a:solidFill>
+          </a:ln>
+        </p:spPr>
+        <p:style>
+          <a:lnRef idx="2">
+            <a:schemeClr val="accent1">
+              <a:shade val="50000"/>
+            </a:schemeClr>
+          </a:lnRef>
+          <a:fillRef idx="1">
+            <a:schemeClr val="accent1"/>
+          </a:fillRef>
+          <a:effectRef idx="0">
+            <a:schemeClr val="accent1"/>
+          </a:effectRef>
+          <a:fontRef idx="minor">
+            <a:schemeClr val="lt1"/>
+          </a:fontRef>
+        </p:style>
+        <p:txBody>
+          <a:bodyPr rtlCol="0" anchor="ctr"/>
+          <a:lstStyle/>
+          <a:p>
+            <a:pPr algn="ctr"/>
+            <a:r>
+              <a:rPr lang="en-US" dirty="0">
+                <a:solidFill>
+                  <a:schemeClr val="tx1"/>
+                </a:solidFill>
+              </a:rPr>
+              <a:t>ALL SEASONS</a:t>
+            </a:r>
+          </a:p>
+        </p:txBody>
+      </p:sp>
+      <p:sp>
+        <p:nvSpPr>
+          <p:cNvPr id="33" name="Rectangle 32">
+            <a:extLst>
+              <a:ext uri="{FF2B5EF4-FFF2-40B4-BE49-F238E27FC236}">
+                <a16:creationId xmlns:a16="http://schemas.microsoft.com/office/drawing/2014/main" id="{482B90EC-B8A8-49AF-88D1-88DC16A3E9EF}"/>
+              </a:ext>
+            </a:extLst>
+          </p:cNvPr>
+          <p:cNvSpPr/>
+          <p:nvPr/>
+        </p:nvSpPr>
+        <p:spPr>
+          <a:xfrm>
+            <a:off x="7860267" y="452193"/>
+            <a:ext cx="1815548" cy="530087"/>
+          </a:xfrm>
+          <a:prstGeom prst="rect">
+            <a:avLst/>
+          </a:prstGeom>
+          <a:solidFill>
+            <a:schemeClr val="accent6">
+              <a:lumMod val="20000"/>
+              <a:lumOff val="80000"/>
+            </a:schemeClr>
+          </a:solidFill>
+          <a:ln>
+            <a:solidFill>
+              <a:schemeClr val="accent6"/>
+            </a:solidFill>
+          </a:ln>
+        </p:spPr>
+        <p:style>
+          <a:lnRef idx="2">
+            <a:schemeClr val="accent1">
+              <a:shade val="50000"/>
+            </a:schemeClr>
+          </a:lnRef>
+          <a:fillRef idx="1">
+            <a:schemeClr val="accent1"/>
+          </a:fillRef>
+          <a:effectRef idx="0">
+            <a:schemeClr val="accent1"/>
+          </a:effectRef>
+          <a:fontRef idx="minor">
+            <a:schemeClr val="lt1"/>
+          </a:fontRef>
+        </p:style>
+        <p:txBody>
+          <a:bodyPr rtlCol="0" anchor="ctr"/>
+          <a:lstStyle/>
+          <a:p>
+            <a:pPr algn="ctr"/>
+            <a:r>
+              <a:rPr lang="en-US" dirty="0">
+                <a:solidFill>
+                  <a:schemeClr val="tx1"/>
+                </a:solidFill>
+              </a:rPr>
+              <a:t>MEMEBERS INFO</a:t>
+            </a:r>
+          </a:p>
+        </p:txBody>
+      </p:sp>
+      <p:sp>
+        <p:nvSpPr>
+          <p:cNvPr id="34" name="Rectangle 33">
+            <a:extLst>
+              <a:ext uri="{FF2B5EF4-FFF2-40B4-BE49-F238E27FC236}">
+                <a16:creationId xmlns:a16="http://schemas.microsoft.com/office/drawing/2014/main" id="{89BA4C55-422A-4F27-9B7D-6099FA19B92A}"/>
+              </a:ext>
+            </a:extLst>
+          </p:cNvPr>
+          <p:cNvSpPr/>
+          <p:nvPr/>
+        </p:nvSpPr>
+        <p:spPr>
+          <a:xfrm>
+            <a:off x="9827400" y="435777"/>
+            <a:ext cx="1815548" cy="530087"/>
+          </a:xfrm>
+          <a:prstGeom prst="rect">
+            <a:avLst/>
+          </a:prstGeom>
+          <a:solidFill>
+            <a:schemeClr val="accent6">
+              <a:lumMod val="20000"/>
+              <a:lumOff val="80000"/>
+            </a:schemeClr>
+          </a:solidFill>
+          <a:ln>
+            <a:solidFill>
+              <a:schemeClr val="accent6"/>
+            </a:solidFill>
+          </a:ln>
+        </p:spPr>
+        <p:style>
+          <a:lnRef idx="2">
+            <a:schemeClr val="accent1">
+              <a:shade val="50000"/>
+            </a:schemeClr>
+          </a:lnRef>
+          <a:fillRef idx="1">
+            <a:schemeClr val="accent1"/>
+          </a:fillRef>
+          <a:effectRef idx="0">
+            <a:schemeClr val="accent1"/>
+          </a:effectRef>
+          <a:fontRef idx="minor">
+            <a:schemeClr val="lt1"/>
+          </a:fontRef>
+        </p:style>
+        <p:txBody>
+          <a:bodyPr rtlCol="0" anchor="ctr"/>
+          <a:lstStyle/>
+          <a:p>
+            <a:pPr algn="ctr"/>
+            <a:r>
+              <a:rPr lang="en-US" dirty="0">
+                <a:solidFill>
+                  <a:schemeClr val="tx1"/>
+                </a:solidFill>
+              </a:rPr>
+              <a:t>ADMIN PAGE</a:t>
+            </a:r>
+          </a:p>
+        </p:txBody>
+      </p:sp>
+      <p:sp>
+        <p:nvSpPr>
+          <p:cNvPr id="35" name="Rectangle 34">
+            <a:extLst>
+              <a:ext uri="{FF2B5EF4-FFF2-40B4-BE49-F238E27FC236}">
+                <a16:creationId xmlns:a16="http://schemas.microsoft.com/office/drawing/2014/main" id="{EFEB3EC6-026C-417B-9BCA-BF8CEF95350A}"/>
+              </a:ext>
+            </a:extLst>
+          </p:cNvPr>
+          <p:cNvSpPr/>
+          <p:nvPr/>
+        </p:nvSpPr>
+        <p:spPr>
+          <a:xfrm>
+            <a:off x="3914381" y="430938"/>
+            <a:ext cx="1815548" cy="530087"/>
+          </a:xfrm>
+          <a:prstGeom prst="rect">
+            <a:avLst/>
+          </a:prstGeom>
+          <a:solidFill>
+            <a:schemeClr val="accent6">
+              <a:lumMod val="20000"/>
+              <a:lumOff val="80000"/>
+            </a:schemeClr>
+          </a:solidFill>
+          <a:ln>
+            <a:solidFill>
+              <a:schemeClr val="accent6"/>
+            </a:solidFill>
+          </a:ln>
+        </p:spPr>
+        <p:style>
+          <a:lnRef idx="2">
+            <a:schemeClr val="accent1">
+              <a:shade val="50000"/>
+            </a:schemeClr>
+          </a:lnRef>
+          <a:fillRef idx="1">
+            <a:schemeClr val="accent1"/>
+          </a:fillRef>
+          <a:effectRef idx="0">
+            <a:schemeClr val="accent1"/>
+          </a:effectRef>
+          <a:fontRef idx="minor">
+            <a:schemeClr val="lt1"/>
+          </a:fontRef>
+        </p:style>
+        <p:txBody>
+          <a:bodyPr rtlCol="0" anchor="ctr"/>
+          <a:lstStyle/>
+          <a:p>
+            <a:pPr algn="ctr"/>
+            <a:r>
+              <a:rPr lang="en-US" dirty="0">
+                <a:solidFill>
+                  <a:schemeClr val="tx1"/>
+                </a:solidFill>
+              </a:rPr>
+              <a:t>HOME</a:t>
+            </a:r>
+          </a:p>
+        </p:txBody>
+      </p:sp>
     </p:spTree>
     <p:extLst>
       <p:ext uri="{BB962C8B-B14F-4D97-AF65-F5344CB8AC3E}">
@@ -12590,7 +13469,7 @@
         </p:nvSpPr>
         <p:spPr>
           <a:xfrm>
-            <a:off x="245165" y="211019"/>
+            <a:off x="245165" y="317541"/>
             <a:ext cx="11701670" cy="6198957"/>
           </a:xfrm>
           <a:prstGeom prst="rect">
@@ -12647,7 +13526,7 @@
         </p:nvSpPr>
         <p:spPr>
           <a:xfrm>
-            <a:off x="231564" y="211019"/>
+            <a:off x="245165" y="1030436"/>
             <a:ext cx="3119445" cy="923330"/>
           </a:xfrm>
           <a:prstGeom prst="rect">
@@ -12695,7 +13574,7 @@
         </p:nvSpPr>
         <p:spPr>
           <a:xfrm>
-            <a:off x="440788" y="1364565"/>
+            <a:off x="374552" y="2099578"/>
             <a:ext cx="2414954" cy="687889"/>
           </a:xfrm>
           <a:prstGeom prst="rect">
@@ -12767,7 +13646,7 @@
         </p:nvSpPr>
         <p:spPr>
           <a:xfrm>
-            <a:off x="3051365" y="1364564"/>
+            <a:off x="2993921" y="2084475"/>
             <a:ext cx="2414954" cy="687889"/>
           </a:xfrm>
           <a:prstGeom prst="rect">
@@ -12857,7 +13736,7 @@
         </p:nvSpPr>
         <p:spPr>
           <a:xfrm flipH="1">
-            <a:off x="374552" y="2282668"/>
+            <a:off x="374552" y="3154863"/>
             <a:ext cx="4962380" cy="461665"/>
           </a:xfrm>
           <a:prstGeom prst="rect">
@@ -12892,7 +13771,7 @@
         </p:nvSpPr>
         <p:spPr>
           <a:xfrm>
-            <a:off x="440788" y="2751124"/>
+            <a:off x="440788" y="3623319"/>
             <a:ext cx="8646941" cy="646331"/>
           </a:xfrm>
           <a:prstGeom prst="rect">
@@ -12941,7 +13820,7 @@
         </p:nvSpPr>
         <p:spPr>
           <a:xfrm flipH="1">
-            <a:off x="374552" y="3404246"/>
+            <a:off x="374552" y="4276441"/>
             <a:ext cx="4962380" cy="461665"/>
           </a:xfrm>
           <a:prstGeom prst="rect">
@@ -12976,7 +13855,7 @@
         </p:nvSpPr>
         <p:spPr>
           <a:xfrm>
-            <a:off x="440788" y="4360390"/>
+            <a:off x="440788" y="4764847"/>
             <a:ext cx="6555544" cy="646331"/>
           </a:xfrm>
           <a:prstGeom prst="rect">
@@ -13007,6 +13886,262 @@
             <a:r>
               <a:rPr lang="en-US" dirty="0"/>
               <a:t>ONE BANNER CHANGE</a:t>
+            </a:r>
+          </a:p>
+        </p:txBody>
+      </p:sp>
+      <p:sp>
+        <p:nvSpPr>
+          <p:cNvPr id="14" name="Rectangle 13">
+            <a:extLst>
+              <a:ext uri="{FF2B5EF4-FFF2-40B4-BE49-F238E27FC236}">
+                <a16:creationId xmlns:a16="http://schemas.microsoft.com/office/drawing/2014/main" id="{71EB14A1-A2F4-4223-A300-6CC3F0699333}"/>
+              </a:ext>
+            </a:extLst>
+          </p:cNvPr>
+          <p:cNvSpPr/>
+          <p:nvPr/>
+        </p:nvSpPr>
+        <p:spPr>
+          <a:xfrm>
+            <a:off x="5904447" y="471079"/>
+            <a:ext cx="1815548" cy="530087"/>
+          </a:xfrm>
+          <a:prstGeom prst="rect">
+            <a:avLst/>
+          </a:prstGeom>
+          <a:solidFill>
+            <a:schemeClr val="accent6">
+              <a:lumMod val="20000"/>
+              <a:lumOff val="80000"/>
+            </a:schemeClr>
+          </a:solidFill>
+          <a:ln>
+            <a:solidFill>
+              <a:schemeClr val="accent6"/>
+            </a:solidFill>
+          </a:ln>
+        </p:spPr>
+        <p:style>
+          <a:lnRef idx="2">
+            <a:schemeClr val="accent1">
+              <a:shade val="50000"/>
+            </a:schemeClr>
+          </a:lnRef>
+          <a:fillRef idx="1">
+            <a:schemeClr val="accent1"/>
+          </a:fillRef>
+          <a:effectRef idx="0">
+            <a:schemeClr val="accent1"/>
+          </a:effectRef>
+          <a:fontRef idx="minor">
+            <a:schemeClr val="lt1"/>
+          </a:fontRef>
+        </p:style>
+        <p:txBody>
+          <a:bodyPr rtlCol="0" anchor="ctr"/>
+          <a:lstStyle/>
+          <a:p>
+            <a:pPr algn="ctr"/>
+            <a:r>
+              <a:rPr lang="en-US" dirty="0">
+                <a:solidFill>
+                  <a:schemeClr val="tx1"/>
+                </a:solidFill>
+              </a:rPr>
+              <a:t>ALL SEASONS</a:t>
+            </a:r>
+          </a:p>
+        </p:txBody>
+      </p:sp>
+      <p:sp>
+        <p:nvSpPr>
+          <p:cNvPr id="15" name="Rectangle 14">
+            <a:extLst>
+              <a:ext uri="{FF2B5EF4-FFF2-40B4-BE49-F238E27FC236}">
+                <a16:creationId xmlns:a16="http://schemas.microsoft.com/office/drawing/2014/main" id="{0B0500CB-2332-46CA-859C-892DB1D5C678}"/>
+              </a:ext>
+            </a:extLst>
+          </p:cNvPr>
+          <p:cNvSpPr/>
+          <p:nvPr/>
+        </p:nvSpPr>
+        <p:spPr>
+          <a:xfrm>
+            <a:off x="7874335" y="473754"/>
+            <a:ext cx="1815548" cy="530087"/>
+          </a:xfrm>
+          <a:prstGeom prst="rect">
+            <a:avLst/>
+          </a:prstGeom>
+          <a:solidFill>
+            <a:schemeClr val="accent6">
+              <a:lumMod val="20000"/>
+              <a:lumOff val="80000"/>
+            </a:schemeClr>
+          </a:solidFill>
+          <a:ln>
+            <a:solidFill>
+              <a:schemeClr val="accent6"/>
+            </a:solidFill>
+          </a:ln>
+        </p:spPr>
+        <p:style>
+          <a:lnRef idx="2">
+            <a:schemeClr val="accent1">
+              <a:shade val="50000"/>
+            </a:schemeClr>
+          </a:lnRef>
+          <a:fillRef idx="1">
+            <a:schemeClr val="accent1"/>
+          </a:fillRef>
+          <a:effectRef idx="0">
+            <a:schemeClr val="accent1"/>
+          </a:effectRef>
+          <a:fontRef idx="minor">
+            <a:schemeClr val="lt1"/>
+          </a:fontRef>
+        </p:style>
+        <p:txBody>
+          <a:bodyPr rtlCol="0" anchor="ctr"/>
+          <a:lstStyle/>
+          <a:p>
+            <a:pPr algn="ctr"/>
+            <a:r>
+              <a:rPr lang="en-US" dirty="0">
+                <a:solidFill>
+                  <a:schemeClr val="tx1"/>
+                </a:solidFill>
+              </a:rPr>
+              <a:t>MEMEBERS INFO</a:t>
+            </a:r>
+          </a:p>
+        </p:txBody>
+      </p:sp>
+      <p:sp>
+        <p:nvSpPr>
+          <p:cNvPr id="16" name="Rectangle 15">
+            <a:extLst>
+              <a:ext uri="{FF2B5EF4-FFF2-40B4-BE49-F238E27FC236}">
+                <a16:creationId xmlns:a16="http://schemas.microsoft.com/office/drawing/2014/main" id="{3E2A610F-7C25-4C3C-99F9-5888C069523F}"/>
+              </a:ext>
+            </a:extLst>
+          </p:cNvPr>
+          <p:cNvSpPr/>
+          <p:nvPr/>
+        </p:nvSpPr>
+        <p:spPr>
+          <a:xfrm>
+            <a:off x="9841468" y="457338"/>
+            <a:ext cx="1815548" cy="530087"/>
+          </a:xfrm>
+          <a:prstGeom prst="rect">
+            <a:avLst/>
+          </a:prstGeom>
+          <a:solidFill>
+            <a:schemeClr val="accent6">
+              <a:lumMod val="20000"/>
+              <a:lumOff val="80000"/>
+            </a:schemeClr>
+          </a:solidFill>
+          <a:ln>
+            <a:solidFill>
+              <a:schemeClr val="accent6"/>
+            </a:solidFill>
+          </a:ln>
+        </p:spPr>
+        <p:style>
+          <a:lnRef idx="2">
+            <a:schemeClr val="accent1">
+              <a:shade val="50000"/>
+            </a:schemeClr>
+          </a:lnRef>
+          <a:fillRef idx="1">
+            <a:schemeClr val="accent1"/>
+          </a:fillRef>
+          <a:effectRef idx="0">
+            <a:schemeClr val="accent1"/>
+          </a:effectRef>
+          <a:fontRef idx="minor">
+            <a:schemeClr val="lt1"/>
+          </a:fontRef>
+        </p:style>
+        <p:txBody>
+          <a:bodyPr rtlCol="0" anchor="ctr"/>
+          <a:lstStyle/>
+          <a:p>
+            <a:pPr algn="ctr"/>
+            <a:r>
+              <a:rPr lang="en-US" dirty="0">
+                <a:solidFill>
+                  <a:schemeClr val="tx1"/>
+                </a:solidFill>
+              </a:rPr>
+              <a:t>ADMIN PAGE</a:t>
+            </a:r>
+          </a:p>
+        </p:txBody>
+      </p:sp>
+      <p:sp>
+        <p:nvSpPr>
+          <p:cNvPr id="17" name="Rectangle 16">
+            <a:extLst>
+              <a:ext uri="{FF2B5EF4-FFF2-40B4-BE49-F238E27FC236}">
+                <a16:creationId xmlns:a16="http://schemas.microsoft.com/office/drawing/2014/main" id="{A686BB96-45C2-4E98-AF2C-26A7B50F8E1D}"/>
+              </a:ext>
+            </a:extLst>
+          </p:cNvPr>
+          <p:cNvSpPr/>
+          <p:nvPr/>
+        </p:nvSpPr>
+        <p:spPr>
+          <a:xfrm>
+            <a:off x="3928546" y="450443"/>
+            <a:ext cx="1815548" cy="530087"/>
+          </a:xfrm>
+          <a:prstGeom prst="rect">
+            <a:avLst/>
+          </a:prstGeom>
+          <a:solidFill>
+            <a:schemeClr val="accent6">
+              <a:lumMod val="20000"/>
+              <a:lumOff val="80000"/>
+            </a:schemeClr>
+          </a:solidFill>
+          <a:ln>
+            <a:solidFill>
+              <a:schemeClr val="accent6"/>
+            </a:solidFill>
+          </a:ln>
+        </p:spPr>
+        <p:style>
+          <a:lnRef idx="2">
+            <a:schemeClr val="accent1">
+              <a:shade val="50000"/>
+            </a:schemeClr>
+          </a:lnRef>
+          <a:fillRef idx="1">
+            <a:schemeClr val="accent1"/>
+          </a:fillRef>
+          <a:effectRef idx="0">
+            <a:schemeClr val="accent1"/>
+          </a:effectRef>
+          <a:fontRef idx="minor">
+            <a:schemeClr val="lt1"/>
+          </a:fontRef>
+        </p:style>
+        <p:txBody>
+          <a:bodyPr rtlCol="0" anchor="ctr"/>
+          <a:lstStyle/>
+          <a:p>
+            <a:pPr algn="ctr"/>
+            <a:r>
+              <a:rPr lang="en-US" dirty="0">
+                <a:solidFill>
+                  <a:schemeClr val="tx1"/>
+                </a:solidFill>
+              </a:rPr>
+              <a:t>HOME</a:t>
             </a:r>
           </a:p>
         </p:txBody>
@@ -13554,10 +14689,10 @@
       </p:pic>
       <p:sp>
         <p:nvSpPr>
-          <p:cNvPr id="30" name="Rectangle 29">
-            <a:extLst>
-              <a:ext uri="{FF2B5EF4-FFF2-40B4-BE49-F238E27FC236}">
-                <a16:creationId xmlns:a16="http://schemas.microsoft.com/office/drawing/2014/main" id="{4333F612-4490-4EBA-BD85-6EF611A833C7}"/>
+          <p:cNvPr id="17" name="Rectangle 16">
+            <a:extLst>
+              <a:ext uri="{FF2B5EF4-FFF2-40B4-BE49-F238E27FC236}">
+                <a16:creationId xmlns:a16="http://schemas.microsoft.com/office/drawing/2014/main" id="{B2400A3A-CF96-409A-BA82-6BDC6937EC2D}"/>
               </a:ext>
             </a:extLst>
           </p:cNvPr>
@@ -13566,7 +14701,7 @@
         </p:nvSpPr>
         <p:spPr>
           <a:xfrm>
-            <a:off x="5566142" y="272221"/>
+            <a:off x="5655221" y="240254"/>
             <a:ext cx="1815548" cy="530087"/>
           </a:xfrm>
           <a:prstGeom prst="rect">
@@ -13611,17 +14746,17 @@
                   <a:schemeClr val="tx1"/>
                 </a:solidFill>
               </a:rPr>
-              <a:t>HOME</a:t>
-            </a:r>
-          </a:p>
-        </p:txBody>
-      </p:sp>
-      <p:sp>
-        <p:nvSpPr>
-          <p:cNvPr id="31" name="Rectangle 30">
-            <a:extLst>
-              <a:ext uri="{FF2B5EF4-FFF2-40B4-BE49-F238E27FC236}">
-                <a16:creationId xmlns:a16="http://schemas.microsoft.com/office/drawing/2014/main" id="{3C601B48-6C7F-4BBD-87F0-51D9DB29FF8E}"/>
+              <a:t>ALL SEASONS</a:t>
+            </a:r>
+          </a:p>
+        </p:txBody>
+      </p:sp>
+      <p:sp>
+        <p:nvSpPr>
+          <p:cNvPr id="18" name="Rectangle 17">
+            <a:extLst>
+              <a:ext uri="{FF2B5EF4-FFF2-40B4-BE49-F238E27FC236}">
+                <a16:creationId xmlns:a16="http://schemas.microsoft.com/office/drawing/2014/main" id="{74E2018B-C3DE-408C-961C-EFE0473A081A}"/>
               </a:ext>
             </a:extLst>
           </p:cNvPr>
@@ -13630,7 +14765,7 @@
         </p:nvSpPr>
         <p:spPr>
           <a:xfrm>
-            <a:off x="7557753" y="272221"/>
+            <a:off x="7625109" y="242929"/>
             <a:ext cx="1815548" cy="530087"/>
           </a:xfrm>
           <a:prstGeom prst="rect">
@@ -13675,17 +14810,17 @@
                   <a:schemeClr val="tx1"/>
                 </a:solidFill>
               </a:rPr>
-              <a:t>ALL EVENTS</a:t>
-            </a:r>
-          </a:p>
-        </p:txBody>
-      </p:sp>
-      <p:sp>
-        <p:nvSpPr>
-          <p:cNvPr id="32" name="Rectangle 31">
-            <a:extLst>
-              <a:ext uri="{FF2B5EF4-FFF2-40B4-BE49-F238E27FC236}">
-                <a16:creationId xmlns:a16="http://schemas.microsoft.com/office/drawing/2014/main" id="{DCD9FBD5-9343-4AD8-ACF8-DF56B5D60EA8}"/>
+              <a:t>MEMEBERS INFO</a:t>
+            </a:r>
+          </a:p>
+        </p:txBody>
+      </p:sp>
+      <p:sp>
+        <p:nvSpPr>
+          <p:cNvPr id="20" name="Rectangle 19">
+            <a:extLst>
+              <a:ext uri="{FF2B5EF4-FFF2-40B4-BE49-F238E27FC236}">
+                <a16:creationId xmlns:a16="http://schemas.microsoft.com/office/drawing/2014/main" id="{BF88FE66-1C7B-43C5-BC1E-B1E7B59C735D}"/>
               </a:ext>
             </a:extLst>
           </p:cNvPr>
@@ -13694,7 +14829,7 @@
         </p:nvSpPr>
         <p:spPr>
           <a:xfrm>
-            <a:off x="9504929" y="288071"/>
+            <a:off x="9592242" y="226513"/>
             <a:ext cx="1815548" cy="530087"/>
           </a:xfrm>
           <a:prstGeom prst="rect">
@@ -13739,7 +14874,71 @@
                   <a:schemeClr val="tx1"/>
                 </a:solidFill>
               </a:rPr>
-              <a:t>MEMEBERS INFO</a:t>
+              <a:t>ADMIN PAGE</a:t>
+            </a:r>
+          </a:p>
+        </p:txBody>
+      </p:sp>
+      <p:sp>
+        <p:nvSpPr>
+          <p:cNvPr id="21" name="Rectangle 20">
+            <a:extLst>
+              <a:ext uri="{FF2B5EF4-FFF2-40B4-BE49-F238E27FC236}">
+                <a16:creationId xmlns:a16="http://schemas.microsoft.com/office/drawing/2014/main" id="{94E6178A-419A-4A2F-BF9B-295C98672BDE}"/>
+              </a:ext>
+            </a:extLst>
+          </p:cNvPr>
+          <p:cNvSpPr/>
+          <p:nvPr/>
+        </p:nvSpPr>
+        <p:spPr>
+          <a:xfrm>
+            <a:off x="3651087" y="235743"/>
+            <a:ext cx="1815548" cy="530087"/>
+          </a:xfrm>
+          <a:prstGeom prst="rect">
+            <a:avLst/>
+          </a:prstGeom>
+          <a:solidFill>
+            <a:schemeClr val="accent6">
+              <a:lumMod val="20000"/>
+              <a:lumOff val="80000"/>
+            </a:schemeClr>
+          </a:solidFill>
+          <a:ln>
+            <a:solidFill>
+              <a:schemeClr val="accent6"/>
+            </a:solidFill>
+          </a:ln>
+        </p:spPr>
+        <p:style>
+          <a:lnRef idx="2">
+            <a:schemeClr val="accent1">
+              <a:shade val="50000"/>
+            </a:schemeClr>
+          </a:lnRef>
+          <a:fillRef idx="1">
+            <a:schemeClr val="accent1"/>
+          </a:fillRef>
+          <a:effectRef idx="0">
+            <a:schemeClr val="accent1"/>
+          </a:effectRef>
+          <a:fontRef idx="minor">
+            <a:schemeClr val="lt1"/>
+          </a:fontRef>
+        </p:style>
+        <p:txBody>
+          <a:bodyPr rtlCol="0" anchor="ctr"/>
+          <a:lstStyle/>
+          <a:p>
+            <a:pPr algn="ctr"/>
+            <a:r>
+              <a:rPr lang="en-US" dirty="0">
+                <a:solidFill>
+                  <a:schemeClr val="tx1"/>
+                </a:solidFill>
+              </a:rPr>
+              <a:t>HOME</a:t>
             </a:r>
           </a:p>
         </p:txBody>

</xml_diff>

<commit_message>
UPDATE WITH SOME TYPO CORRECTIONS
</commit_message>
<xml_diff>
--- a/Powerpoints/BannerManagment.pptx
+++ b/Powerpoints/BannerManagment.pptx
@@ -5,7 +5,7 @@
     <p:sldMasterId id="2147483648" r:id="rId1"/>
   </p:sldMasterIdLst>
   <p:notesMasterIdLst>
-    <p:notesMasterId r:id="rId14"/>
+    <p:notesMasterId r:id="rId15"/>
   </p:notesMasterIdLst>
   <p:sldIdLst>
     <p:sldId id="265" r:id="rId2"/>
@@ -20,6 +20,7 @@
     <p:sldId id="264" r:id="rId11"/>
     <p:sldId id="269" r:id="rId12"/>
     <p:sldId id="268" r:id="rId13"/>
+    <p:sldId id="270" r:id="rId14"/>
   </p:sldIdLst>
   <p:sldSz cx="12192000" cy="6858000"/>
   <p:notesSz cx="6858000" cy="9144000"/>
@@ -3977,7 +3978,7 @@
               </a:spcAft>
             </a:pPr>
             <a:r>
-              <a:rPr lang="en-US" sz="5400" b="1">
+              <a:rPr lang="en-US" sz="5400" b="1" dirty="0">
                 <a:solidFill>
                   <a:srgbClr val="FFFFFF"/>
                 </a:solidFill>
@@ -3985,16 +3986,8 @@
                 <a:ea typeface="+mj-ea"/>
                 <a:cs typeface="+mj-cs"/>
               </a:rPr>
-              <a:t>SELECT YOUR CHURCH</a:t>
-            </a:r>
-            <a:endParaRPr lang="en-US" sz="5400" b="1" dirty="0">
-              <a:solidFill>
-                <a:srgbClr val="FFFFFF"/>
-              </a:solidFill>
-              <a:latin typeface="+mj-lt"/>
-              <a:ea typeface="+mj-ea"/>
-              <a:cs typeface="+mj-cs"/>
-            </a:endParaRPr>
+              <a:t>ALTAR GUILD PROJECT</a:t>
+            </a:r>
           </a:p>
         </p:txBody>
       </p:sp>
@@ -4130,7 +4123,7 @@
         </p:blipFill>
         <p:spPr>
           <a:xfrm>
-            <a:off x="513475" y="2729193"/>
+            <a:off x="513475" y="2490041"/>
             <a:ext cx="5089329" cy="3392886"/>
           </a:xfrm>
           <a:prstGeom prst="rect">
@@ -4166,7 +4159,7 @@
         </p:blipFill>
         <p:spPr>
           <a:xfrm>
-            <a:off x="6629753" y="2729193"/>
+            <a:off x="6629753" y="2475974"/>
             <a:ext cx="5089328" cy="3392886"/>
           </a:xfrm>
           <a:prstGeom prst="rect">
@@ -4188,8 +4181,8 @@
         </p:nvSpPr>
         <p:spPr>
           <a:xfrm>
-            <a:off x="1589649" y="6239789"/>
-            <a:ext cx="2506840" cy="369332"/>
+            <a:off x="1603717" y="6035538"/>
+            <a:ext cx="2639890" cy="369332"/>
           </a:xfrm>
           <a:prstGeom prst="rect">
             <a:avLst/>
@@ -4204,7 +4197,7 @@
           <a:p>
             <a:r>
               <a:rPr lang="en-US" dirty="0"/>
-              <a:t>HOPE LUTHERN CHURCH</a:t>
+              <a:t>HOPE LUTHERAN CHURCH</a:t>
             </a:r>
           </a:p>
         </p:txBody>
@@ -4223,7 +4216,7 @@
         </p:nvSpPr>
         <p:spPr>
           <a:xfrm>
-            <a:off x="7469944" y="6239789"/>
+            <a:off x="7441809" y="6035538"/>
             <a:ext cx="3718617" cy="369332"/>
           </a:xfrm>
           <a:prstGeom prst="rect">
@@ -4239,7 +4232,7 @@
           <a:p>
             <a:r>
               <a:rPr lang="en-US" dirty="0"/>
-              <a:t>HOLY TRINITY LUTHERN CHURCH</a:t>
+              <a:t>HOLY TRINITY LUTHERAN CHURCH</a:t>
             </a:r>
           </a:p>
         </p:txBody>
@@ -4659,7 +4652,7 @@
           <p:nvPr>
             <p:extLst>
               <p:ext uri="{D42A27DB-BD31-4B8C-83A1-F6EECF244321}">
-                <p14:modId xmlns:p14="http://schemas.microsoft.com/office/powerpoint/2010/main" val="262425608"/>
+                <p14:modId xmlns:p14="http://schemas.microsoft.com/office/powerpoint/2010/main" val="1318720372"/>
               </p:ext>
             </p:extLst>
           </p:nvPr>
@@ -4804,7 +4797,7 @@
                     <a:p>
                       <a:r>
                         <a:rPr lang="en-US" dirty="0"/>
-                        <a:t>CHIRSTMAS DAY</a:t>
+                        <a:t>CHRISTMAS DAY</a:t>
                       </a:r>
                     </a:p>
                   </a:txBody>
@@ -4991,41 +4984,6 @@
       </p:pic>
       <p:sp>
         <p:nvSpPr>
-          <p:cNvPr id="21" name="TextBox 20">
-            <a:extLst>
-              <a:ext uri="{FF2B5EF4-FFF2-40B4-BE49-F238E27FC236}">
-                <a16:creationId xmlns:a16="http://schemas.microsoft.com/office/drawing/2014/main" id="{C8444142-73C9-4C6B-8AEF-7995909C97B6}"/>
-              </a:ext>
-            </a:extLst>
-          </p:cNvPr>
-          <p:cNvSpPr txBox="1"/>
-          <p:nvPr/>
-        </p:nvSpPr>
-        <p:spPr>
-          <a:xfrm>
-            <a:off x="309914" y="239861"/>
-            <a:ext cx="3395003" cy="523220"/>
-          </a:xfrm>
-          <a:prstGeom prst="rect">
-            <a:avLst/>
-          </a:prstGeom>
-          <a:noFill/>
-        </p:spPr>
-        <p:txBody>
-          <a:bodyPr wrap="square" rtlCol="0">
-            <a:spAutoFit/>
-          </a:bodyPr>
-          <a:lstStyle/>
-          <a:p>
-            <a:r>
-              <a:rPr lang="en-US" sz="2800" dirty="0"/>
-              <a:t>ALL SEASONS:</a:t>
-            </a:r>
-          </a:p>
-        </p:txBody>
-      </p:sp>
-      <p:sp>
-        <p:nvSpPr>
           <p:cNvPr id="22" name="Rectangle 21">
             <a:extLst>
               <a:ext uri="{FF2B5EF4-FFF2-40B4-BE49-F238E27FC236}">
@@ -6318,7 +6276,7 @@
         </p:nvSpPr>
         <p:spPr>
           <a:xfrm>
-            <a:off x="197532" y="105510"/>
+            <a:off x="197532" y="105509"/>
             <a:ext cx="11807484" cy="6421902"/>
           </a:xfrm>
           <a:prstGeom prst="rect">
@@ -6821,8 +6779,8 @@
         </p:nvSpPr>
         <p:spPr>
           <a:xfrm>
-            <a:off x="432580" y="4721992"/>
-            <a:ext cx="2792438" cy="923330"/>
+            <a:off x="301550" y="4721992"/>
+            <a:ext cx="3177858" cy="707886"/>
           </a:xfrm>
           <a:prstGeom prst="rect">
             <a:avLst/>
@@ -6840,8 +6798,8 @@
               <a:buChar char="§"/>
             </a:pPr>
             <a:r>
-              <a:rPr lang="en-US" dirty="0"/>
-              <a:t>Used this banner for 3 times </a:t>
+              <a:rPr lang="en-US" sz="2000" b="1" dirty="0"/>
+              <a:t>Used this banner 3 times </a:t>
             </a:r>
           </a:p>
           <a:p>
@@ -6850,7 +6808,7 @@
               <a:buChar char="§"/>
             </a:pPr>
             <a:r>
-              <a:rPr lang="en-US" dirty="0"/>
+              <a:rPr lang="en-US" sz="2000" b="1" dirty="0"/>
               <a:t>Last used on 07/03/2019</a:t>
             </a:r>
           </a:p>
@@ -7246,6 +7204,372 @@
     <p:extLst>
       <p:ext uri="{BB962C8B-B14F-4D97-AF65-F5344CB8AC3E}">
         <p14:creationId xmlns:p14="http://schemas.microsoft.com/office/powerpoint/2010/main" val="43252568"/>
+      </p:ext>
+    </p:extLst>
+  </p:cSld>
+  <p:clrMapOvr>
+    <a:masterClrMapping/>
+  </p:clrMapOvr>
+  <mc:AlternateContent xmlns:mc="http://schemas.openxmlformats.org/markup-compatibility/2006">
+    <mc:Choice xmlns:p14="http://schemas.microsoft.com/office/powerpoint/2010/main" Requires="p14">
+      <p:transition p14:dur="100">
+        <p:cut/>
+      </p:transition>
+    </mc:Choice>
+    <mc:Fallback>
+      <p:transition>
+        <p:cut/>
+      </p:transition>
+    </mc:Fallback>
+  </mc:AlternateContent>
+</p:sld>
+</file>
+
+<file path=ppt/slides/slide13.xml><?xml version="1.0" encoding="utf-8"?>
+<p:sld xmlns:a="http://schemas.openxmlformats.org/drawingml/2006/main" xmlns:r="http://schemas.openxmlformats.org/officeDocument/2006/relationships" xmlns:p="http://schemas.openxmlformats.org/presentationml/2006/main">
+  <p:cSld>
+    <p:bg>
+      <p:bgPr>
+        <a:solidFill>
+          <a:schemeClr val="accent6">
+            <a:lumMod val="60000"/>
+            <a:lumOff val="40000"/>
+          </a:schemeClr>
+        </a:solidFill>
+        <a:effectLst/>
+      </p:bgPr>
+    </p:bg>
+    <p:spTree>
+      <p:nvGrpSpPr>
+        <p:cNvPr id="1" name=""/>
+        <p:cNvGrpSpPr/>
+        <p:nvPr/>
+      </p:nvGrpSpPr>
+      <p:grpSpPr>
+        <a:xfrm>
+          <a:off x="0" y="0"/>
+          <a:ext cx="0" cy="0"/>
+          <a:chOff x="0" y="0"/>
+          <a:chExt cx="0" cy="0"/>
+        </a:xfrm>
+      </p:grpSpPr>
+      <p:sp>
+        <p:nvSpPr>
+          <p:cNvPr id="4" name="Rectangle 3">
+            <a:extLst>
+              <a:ext uri="{FF2B5EF4-FFF2-40B4-BE49-F238E27FC236}">
+                <a16:creationId xmlns:a16="http://schemas.microsoft.com/office/drawing/2014/main" id="{48B82DAB-24DB-4CDE-AECF-03F63ACD3A32}"/>
+              </a:ext>
+            </a:extLst>
+          </p:cNvPr>
+          <p:cNvSpPr/>
+          <p:nvPr/>
+        </p:nvSpPr>
+        <p:spPr>
+          <a:xfrm>
+            <a:off x="196948" y="126608"/>
+            <a:ext cx="11788726" cy="6541477"/>
+          </a:xfrm>
+          <a:prstGeom prst="rect">
+            <a:avLst/>
+          </a:prstGeom>
+          <a:solidFill>
+            <a:schemeClr val="accent6">
+              <a:lumMod val="40000"/>
+              <a:lumOff val="60000"/>
+            </a:schemeClr>
+          </a:solidFill>
+          <a:ln>
+            <a:solidFill>
+              <a:schemeClr val="tx1"/>
+            </a:solidFill>
+          </a:ln>
+        </p:spPr>
+        <p:style>
+          <a:lnRef idx="2">
+            <a:schemeClr val="accent1">
+              <a:shade val="50000"/>
+            </a:schemeClr>
+          </a:lnRef>
+          <a:fillRef idx="1">
+            <a:schemeClr val="accent1"/>
+          </a:fillRef>
+          <a:effectRef idx="0">
+            <a:schemeClr val="accent1"/>
+          </a:effectRef>
+          <a:fontRef idx="minor">
+            <a:schemeClr val="lt1"/>
+          </a:fontRef>
+        </p:style>
+        <p:txBody>
+          <a:bodyPr rtlCol="0" anchor="ctr"/>
+          <a:lstStyle/>
+          <a:p>
+            <a:pPr algn="ctr"/>
+            <a:endParaRPr lang="en-US"/>
+          </a:p>
+        </p:txBody>
+      </p:sp>
+      <p:sp>
+        <p:nvSpPr>
+          <p:cNvPr id="5" name="Rectangle 4">
+            <a:extLst>
+              <a:ext uri="{FF2B5EF4-FFF2-40B4-BE49-F238E27FC236}">
+                <a16:creationId xmlns:a16="http://schemas.microsoft.com/office/drawing/2014/main" id="{55A237D0-D07A-43D1-BBCA-45CD6EEADDB3}"/>
+              </a:ext>
+            </a:extLst>
+          </p:cNvPr>
+          <p:cNvSpPr/>
+          <p:nvPr/>
+        </p:nvSpPr>
+        <p:spPr>
+          <a:xfrm>
+            <a:off x="5932583" y="344468"/>
+            <a:ext cx="1815548" cy="530087"/>
+          </a:xfrm>
+          <a:prstGeom prst="rect">
+            <a:avLst/>
+          </a:prstGeom>
+          <a:solidFill>
+            <a:schemeClr val="accent6">
+              <a:lumMod val="20000"/>
+              <a:lumOff val="80000"/>
+            </a:schemeClr>
+          </a:solidFill>
+          <a:ln>
+            <a:solidFill>
+              <a:schemeClr val="accent6"/>
+            </a:solidFill>
+          </a:ln>
+        </p:spPr>
+        <p:style>
+          <a:lnRef idx="2">
+            <a:schemeClr val="accent1">
+              <a:shade val="50000"/>
+            </a:schemeClr>
+          </a:lnRef>
+          <a:fillRef idx="1">
+            <a:schemeClr val="accent1"/>
+          </a:fillRef>
+          <a:effectRef idx="0">
+            <a:schemeClr val="accent1"/>
+          </a:effectRef>
+          <a:fontRef idx="minor">
+            <a:schemeClr val="lt1"/>
+          </a:fontRef>
+        </p:style>
+        <p:txBody>
+          <a:bodyPr rtlCol="0" anchor="ctr"/>
+          <a:lstStyle/>
+          <a:p>
+            <a:pPr algn="ctr"/>
+            <a:r>
+              <a:rPr lang="en-US" dirty="0">
+                <a:solidFill>
+                  <a:schemeClr val="tx1"/>
+                </a:solidFill>
+              </a:rPr>
+              <a:t>ALL SEASONS</a:t>
+            </a:r>
+          </a:p>
+        </p:txBody>
+      </p:sp>
+      <p:sp>
+        <p:nvSpPr>
+          <p:cNvPr id="6" name="Rectangle 5">
+            <a:extLst>
+              <a:ext uri="{FF2B5EF4-FFF2-40B4-BE49-F238E27FC236}">
+                <a16:creationId xmlns:a16="http://schemas.microsoft.com/office/drawing/2014/main" id="{9D4B7AB7-88FF-48DF-88BC-0BCDD397E83E}"/>
+              </a:ext>
+            </a:extLst>
+          </p:cNvPr>
+          <p:cNvSpPr/>
+          <p:nvPr/>
+        </p:nvSpPr>
+        <p:spPr>
+          <a:xfrm>
+            <a:off x="7902471" y="347143"/>
+            <a:ext cx="1815548" cy="530087"/>
+          </a:xfrm>
+          <a:prstGeom prst="rect">
+            <a:avLst/>
+          </a:prstGeom>
+          <a:solidFill>
+            <a:schemeClr val="accent6">
+              <a:lumMod val="20000"/>
+              <a:lumOff val="80000"/>
+            </a:schemeClr>
+          </a:solidFill>
+          <a:ln>
+            <a:solidFill>
+              <a:schemeClr val="accent6"/>
+            </a:solidFill>
+          </a:ln>
+        </p:spPr>
+        <p:style>
+          <a:lnRef idx="2">
+            <a:schemeClr val="accent1">
+              <a:shade val="50000"/>
+            </a:schemeClr>
+          </a:lnRef>
+          <a:fillRef idx="1">
+            <a:schemeClr val="accent1"/>
+          </a:fillRef>
+          <a:effectRef idx="0">
+            <a:schemeClr val="accent1"/>
+          </a:effectRef>
+          <a:fontRef idx="minor">
+            <a:schemeClr val="lt1"/>
+          </a:fontRef>
+        </p:style>
+        <p:txBody>
+          <a:bodyPr rtlCol="0" anchor="ctr"/>
+          <a:lstStyle/>
+          <a:p>
+            <a:pPr algn="ctr"/>
+            <a:r>
+              <a:rPr lang="en-US" dirty="0">
+                <a:solidFill>
+                  <a:schemeClr val="tx1"/>
+                </a:solidFill>
+              </a:rPr>
+              <a:t>MEMEBERS INFO</a:t>
+            </a:r>
+          </a:p>
+        </p:txBody>
+      </p:sp>
+      <p:sp>
+        <p:nvSpPr>
+          <p:cNvPr id="7" name="Rectangle 6">
+            <a:extLst>
+              <a:ext uri="{FF2B5EF4-FFF2-40B4-BE49-F238E27FC236}">
+                <a16:creationId xmlns:a16="http://schemas.microsoft.com/office/drawing/2014/main" id="{243D271E-8633-4BAF-BE8E-02BC83A09D25}"/>
+              </a:ext>
+            </a:extLst>
+          </p:cNvPr>
+          <p:cNvSpPr/>
+          <p:nvPr/>
+        </p:nvSpPr>
+        <p:spPr>
+          <a:xfrm>
+            <a:off x="9869604" y="330727"/>
+            <a:ext cx="1815548" cy="530087"/>
+          </a:xfrm>
+          <a:prstGeom prst="rect">
+            <a:avLst/>
+          </a:prstGeom>
+          <a:solidFill>
+            <a:schemeClr val="accent6">
+              <a:lumMod val="20000"/>
+              <a:lumOff val="80000"/>
+            </a:schemeClr>
+          </a:solidFill>
+          <a:ln>
+            <a:solidFill>
+              <a:schemeClr val="accent6"/>
+            </a:solidFill>
+          </a:ln>
+        </p:spPr>
+        <p:style>
+          <a:lnRef idx="2">
+            <a:schemeClr val="accent1">
+              <a:shade val="50000"/>
+            </a:schemeClr>
+          </a:lnRef>
+          <a:fillRef idx="1">
+            <a:schemeClr val="accent1"/>
+          </a:fillRef>
+          <a:effectRef idx="0">
+            <a:schemeClr val="accent1"/>
+          </a:effectRef>
+          <a:fontRef idx="minor">
+            <a:schemeClr val="lt1"/>
+          </a:fontRef>
+        </p:style>
+        <p:txBody>
+          <a:bodyPr rtlCol="0" anchor="ctr"/>
+          <a:lstStyle/>
+          <a:p>
+            <a:pPr algn="ctr"/>
+            <a:r>
+              <a:rPr lang="en-US" dirty="0">
+                <a:solidFill>
+                  <a:schemeClr val="tx1"/>
+                </a:solidFill>
+              </a:rPr>
+              <a:t>ADMIN PAGE</a:t>
+            </a:r>
+          </a:p>
+        </p:txBody>
+      </p:sp>
+      <p:sp>
+        <p:nvSpPr>
+          <p:cNvPr id="8" name="Rectangle 7">
+            <a:extLst>
+              <a:ext uri="{FF2B5EF4-FFF2-40B4-BE49-F238E27FC236}">
+                <a16:creationId xmlns:a16="http://schemas.microsoft.com/office/drawing/2014/main" id="{30FBA051-3437-480C-9EEB-4133C6832307}"/>
+              </a:ext>
+            </a:extLst>
+          </p:cNvPr>
+          <p:cNvSpPr/>
+          <p:nvPr/>
+        </p:nvSpPr>
+        <p:spPr>
+          <a:xfrm>
+            <a:off x="3956682" y="337900"/>
+            <a:ext cx="1815548" cy="530087"/>
+          </a:xfrm>
+          <a:prstGeom prst="rect">
+            <a:avLst/>
+          </a:prstGeom>
+          <a:solidFill>
+            <a:schemeClr val="accent6">
+              <a:lumMod val="20000"/>
+              <a:lumOff val="80000"/>
+            </a:schemeClr>
+          </a:solidFill>
+          <a:ln>
+            <a:solidFill>
+              <a:schemeClr val="accent6"/>
+            </a:solidFill>
+          </a:ln>
+        </p:spPr>
+        <p:style>
+          <a:lnRef idx="2">
+            <a:schemeClr val="accent1">
+              <a:shade val="50000"/>
+            </a:schemeClr>
+          </a:lnRef>
+          <a:fillRef idx="1">
+            <a:schemeClr val="accent1"/>
+          </a:fillRef>
+          <a:effectRef idx="0">
+            <a:schemeClr val="accent1"/>
+          </a:effectRef>
+          <a:fontRef idx="minor">
+            <a:schemeClr val="lt1"/>
+          </a:fontRef>
+        </p:style>
+        <p:txBody>
+          <a:bodyPr rtlCol="0" anchor="ctr"/>
+          <a:lstStyle/>
+          <a:p>
+            <a:pPr algn="ctr"/>
+            <a:r>
+              <a:rPr lang="en-US" dirty="0">
+                <a:solidFill>
+                  <a:schemeClr val="tx1"/>
+                </a:solidFill>
+              </a:rPr>
+              <a:t>HOME</a:t>
+            </a:r>
+          </a:p>
+        </p:txBody>
+      </p:sp>
+    </p:spTree>
+    <p:extLst>
+      <p:ext uri="{BB962C8B-B14F-4D97-AF65-F5344CB8AC3E}">
+        <p14:creationId xmlns:p14="http://schemas.microsoft.com/office/powerpoint/2010/main" val="1810223288"/>
       </p:ext>
     </p:extLst>
   </p:cSld>
@@ -7546,57 +7870,6 @@
       </p:sp>
       <p:sp>
         <p:nvSpPr>
-          <p:cNvPr id="13" name="Rectangle 12">
-            <a:extLst>
-              <a:ext uri="{FF2B5EF4-FFF2-40B4-BE49-F238E27FC236}">
-                <a16:creationId xmlns:a16="http://schemas.microsoft.com/office/drawing/2014/main" id="{1742C651-3EC8-44EC-B538-B4ADD849EE5E}"/>
-              </a:ext>
-            </a:extLst>
-          </p:cNvPr>
-          <p:cNvSpPr/>
-          <p:nvPr/>
-        </p:nvSpPr>
-        <p:spPr>
-          <a:xfrm>
-            <a:off x="5243562" y="1934838"/>
-            <a:ext cx="1676741" cy="769441"/>
-          </a:xfrm>
-          <a:prstGeom prst="rect">
-            <a:avLst/>
-          </a:prstGeom>
-          <a:noFill/>
-        </p:spPr>
-        <p:txBody>
-          <a:bodyPr wrap="none" lIns="91440" tIns="45720" rIns="91440" bIns="45720">
-            <a:spAutoFit/>
-            <a:scene3d>
-              <a:camera prst="orthographicFront"/>
-              <a:lightRig rig="harsh" dir="t"/>
-            </a:scene3d>
-            <a:sp3d extrusionH="57150" prstMaterial="matte">
-              <a:bevelT w="63500" h="12700" prst="angle"/>
-              <a:contourClr>
-                <a:schemeClr val="bg1">
-                  <a:lumMod val="65000"/>
-                </a:schemeClr>
-              </a:contourClr>
-            </a:sp3d>
-          </a:bodyPr>
-          <a:lstStyle/>
-          <a:p>
-            <a:pPr algn="ctr"/>
-            <a:r>
-              <a:rPr lang="en-US" sz="4400" b="1" cap="none" spc="0" dirty="0">
-                <a:ln/>
-                <a:effectLst/>
-              </a:rPr>
-              <a:t>LOGIN</a:t>
-            </a:r>
-          </a:p>
-        </p:txBody>
-      </p:sp>
-      <p:sp>
-        <p:nvSpPr>
           <p:cNvPr id="15" name="Rectangle: Rounded Corners 14">
             <a:extLst>
               <a:ext uri="{FF2B5EF4-FFF2-40B4-BE49-F238E27FC236}">
@@ -7658,42 +7931,6 @@
           </a:p>
         </p:txBody>
       </p:sp>
-      <p:pic>
-        <p:nvPicPr>
-          <p:cNvPr id="25" name="Picture 24" descr="A close up of a logo&#10;&#10;Description automatically generated">
-            <a:extLst>
-              <a:ext uri="{FF2B5EF4-FFF2-40B4-BE49-F238E27FC236}">
-                <a16:creationId xmlns:a16="http://schemas.microsoft.com/office/drawing/2014/main" id="{508F26D0-E79A-47CA-9D96-3F7F256CAF38}"/>
-              </a:ext>
-            </a:extLst>
-          </p:cNvPr>
-          <p:cNvPicPr>
-            <a:picLocks noChangeAspect="1"/>
-          </p:cNvPicPr>
-          <p:nvPr/>
-        </p:nvPicPr>
-        <p:blipFill>
-          <a:blip r:embed="rId3">
-            <a:extLst>
-              <a:ext uri="{28A0092B-C50C-407E-A947-70E740481C1C}">
-                <a14:useLocalDpi xmlns:a14="http://schemas.microsoft.com/office/drawing/2010/main" val="0"/>
-              </a:ext>
-            </a:extLst>
-          </a:blip>
-          <a:stretch>
-            <a:fillRect/>
-          </a:stretch>
-        </p:blipFill>
-        <p:spPr>
-          <a:xfrm>
-            <a:off x="4292096" y="1793406"/>
-            <a:ext cx="923330" cy="923330"/>
-          </a:xfrm>
-          <a:prstGeom prst="rect">
-            <a:avLst/>
-          </a:prstGeom>
-        </p:spPr>
-      </p:pic>
     </p:spTree>
     <p:extLst>
       <p:ext uri="{BB962C8B-B14F-4D97-AF65-F5344CB8AC3E}">
@@ -9159,7 +9396,7 @@
                   <a:schemeClr val="tx1"/>
                 </a:solidFill>
               </a:rPr>
-              <a:t> 2019,  WHITE CLOTH</a:t>
+              <a:t> 2019,  WHITE </a:t>
             </a:r>
           </a:p>
         </p:txBody>
@@ -9225,7 +9462,7 @@
                   <a:schemeClr val="tx1"/>
                 </a:solidFill>
               </a:rPr>
-              <a:t>THANKS GIVING</a:t>
+              <a:t>THANKSGIVING</a:t>
             </a:r>
           </a:p>
         </p:txBody>
@@ -9244,7 +9481,7 @@
         </p:nvSpPr>
         <p:spPr>
           <a:xfrm>
-            <a:off x="8460420" y="1270120"/>
+            <a:off x="7809127" y="1312350"/>
             <a:ext cx="501889" cy="337066"/>
           </a:xfrm>
           <a:prstGeom prst="rect">
@@ -11270,8 +11507,8 @@
         </p:nvSpPr>
         <p:spPr>
           <a:xfrm>
-            <a:off x="530087" y="1813279"/>
-            <a:ext cx="11092069" cy="1908663"/>
+            <a:off x="530087" y="1813280"/>
+            <a:ext cx="11092069" cy="1749308"/>
           </a:xfrm>
           <a:prstGeom prst="rect">
             <a:avLst/>
@@ -11327,7 +11564,7 @@
         </p:nvSpPr>
         <p:spPr>
           <a:xfrm>
-            <a:off x="569844" y="2318592"/>
+            <a:off x="569844" y="2193412"/>
             <a:ext cx="11052312" cy="2031325"/>
           </a:xfrm>
           <a:prstGeom prst="rect">
@@ -11465,7 +11702,7 @@
         </p:nvSpPr>
         <p:spPr>
           <a:xfrm flipH="1">
-            <a:off x="569844" y="1988129"/>
+            <a:off x="569844" y="1903477"/>
             <a:ext cx="5732230" cy="369332"/>
           </a:xfrm>
           <a:prstGeom prst="rect">
@@ -12252,7 +12489,7 @@
         </p:nvSpPr>
         <p:spPr>
           <a:xfrm>
-            <a:off x="1086679" y="2384257"/>
+            <a:off x="1086679" y="2200610"/>
             <a:ext cx="1925462" cy="544309"/>
           </a:xfrm>
           <a:prstGeom prst="rect">
@@ -12304,7 +12541,7 @@
         </p:nvSpPr>
         <p:spPr>
           <a:xfrm>
-            <a:off x="1095647" y="2966957"/>
+            <a:off x="1084884" y="2811912"/>
             <a:ext cx="2472306" cy="544309"/>
           </a:xfrm>
           <a:prstGeom prst="rect">
@@ -12485,7 +12722,7 @@
                   <a:schemeClr val="tx1"/>
                 </a:solidFill>
               </a:rPr>
-              <a:t>THANKS GIVING</a:t>
+              <a:t>THANKSGIVING</a:t>
             </a:r>
           </a:p>
         </p:txBody>
@@ -12821,7 +13058,7 @@
         </p:nvSpPr>
         <p:spPr>
           <a:xfrm>
-            <a:off x="3914381" y="430938"/>
+            <a:off x="3914381" y="402803"/>
             <a:ext cx="1815548" cy="530087"/>
           </a:xfrm>
           <a:prstGeom prst="rect">
@@ -12829,8 +13066,8 @@
           </a:prstGeom>
           <a:solidFill>
             <a:schemeClr val="accent6">
-              <a:lumMod val="20000"/>
-              <a:lumOff val="80000"/>
+              <a:lumMod val="60000"/>
+              <a:lumOff val="40000"/>
             </a:schemeClr>
           </a:solidFill>
           <a:ln>
@@ -14709,8 +14946,8 @@
           </a:prstGeom>
           <a:solidFill>
             <a:schemeClr val="accent6">
-              <a:lumMod val="20000"/>
-              <a:lumOff val="80000"/>
+              <a:lumMod val="60000"/>
+              <a:lumOff val="40000"/>
             </a:schemeClr>
           </a:solidFill>
           <a:ln>

</xml_diff>

<commit_message>
Update Navigation Tab indication
</commit_message>
<xml_diff>
--- a/Powerpoints/BannerManagment.pptx
+++ b/Powerpoints/BannerManagment.pptx
@@ -5,7 +5,7 @@
     <p:sldMasterId id="2147483648" r:id="rId1"/>
   </p:sldMasterIdLst>
   <p:notesMasterIdLst>
-    <p:notesMasterId r:id="rId15"/>
+    <p:notesMasterId r:id="rId14"/>
   </p:notesMasterIdLst>
   <p:sldIdLst>
     <p:sldId id="265" r:id="rId2"/>
@@ -17,10 +17,9 @@
     <p:sldId id="267" r:id="rId8"/>
     <p:sldId id="262" r:id="rId9"/>
     <p:sldId id="263" r:id="rId10"/>
-    <p:sldId id="264" r:id="rId11"/>
-    <p:sldId id="269" r:id="rId12"/>
-    <p:sldId id="268" r:id="rId13"/>
-    <p:sldId id="270" r:id="rId14"/>
+    <p:sldId id="269" r:id="rId11"/>
+    <p:sldId id="268" r:id="rId12"/>
+    <p:sldId id="270" r:id="rId13"/>
   </p:sldIdLst>
   <p:sldSz cx="12192000" cy="6858000"/>
   <p:notesSz cx="6858000" cy="9144000"/>
@@ -4328,10 +4327,60 @@
       </p:grpSpPr>
       <p:sp>
         <p:nvSpPr>
-          <p:cNvPr id="7" name="Rectangle 6">
-            <a:extLst>
-              <a:ext uri="{FF2B5EF4-FFF2-40B4-BE49-F238E27FC236}">
-                <a16:creationId xmlns:a16="http://schemas.microsoft.com/office/drawing/2014/main" id="{329D1DFC-0BDC-4C7F-93FB-3A5E3CFD32FE}"/>
+          <p:cNvPr id="2" name="Title 1">
+            <a:extLst>
+              <a:ext uri="{FF2B5EF4-FFF2-40B4-BE49-F238E27FC236}">
+                <a16:creationId xmlns:a16="http://schemas.microsoft.com/office/drawing/2014/main" id="{2ECD397F-68AF-495A-9586-EB61618490ED}"/>
+              </a:ext>
+            </a:extLst>
+          </p:cNvPr>
+          <p:cNvSpPr>
+            <a:spLocks noGrp="1"/>
+          </p:cNvSpPr>
+          <p:nvPr>
+            <p:ph type="title"/>
+          </p:nvPr>
+        </p:nvSpPr>
+        <p:spPr/>
+        <p:txBody>
+          <a:bodyPr/>
+          <a:lstStyle/>
+          <a:p>
+            <a:endParaRPr lang="en-US"/>
+          </a:p>
+        </p:txBody>
+      </p:sp>
+      <p:sp>
+        <p:nvSpPr>
+          <p:cNvPr id="3" name="Content Placeholder 2">
+            <a:extLst>
+              <a:ext uri="{FF2B5EF4-FFF2-40B4-BE49-F238E27FC236}">
+                <a16:creationId xmlns:a16="http://schemas.microsoft.com/office/drawing/2014/main" id="{18D7E4E8-725E-4560-9CFB-AD2362BE4C68}"/>
+              </a:ext>
+            </a:extLst>
+          </p:cNvPr>
+          <p:cNvSpPr>
+            <a:spLocks noGrp="1"/>
+          </p:cNvSpPr>
+          <p:nvPr>
+            <p:ph idx="1"/>
+          </p:nvPr>
+        </p:nvSpPr>
+        <p:spPr/>
+        <p:txBody>
+          <a:bodyPr/>
+          <a:lstStyle/>
+          <a:p>
+            <a:endParaRPr lang="en-US"/>
+          </a:p>
+        </p:txBody>
+      </p:sp>
+      <p:sp>
+        <p:nvSpPr>
+          <p:cNvPr id="4" name="Rectangle 3">
+            <a:extLst>
+              <a:ext uri="{FF2B5EF4-FFF2-40B4-BE49-F238E27FC236}">
+                <a16:creationId xmlns:a16="http://schemas.microsoft.com/office/drawing/2014/main" id="{BB14C61E-F8AC-4217-89A1-1215FD78FD59}"/>
               </a:ext>
             </a:extLst>
           </p:cNvPr>
@@ -4340,23 +4389,21 @@
         </p:nvSpPr>
         <p:spPr>
           <a:xfrm>
-            <a:off x="192258" y="113074"/>
-            <a:ext cx="11807484" cy="6478172"/>
+            <a:off x="192258" y="175845"/>
+            <a:ext cx="11807484" cy="6421902"/>
           </a:xfrm>
           <a:prstGeom prst="rect">
             <a:avLst/>
           </a:prstGeom>
           <a:solidFill>
             <a:schemeClr val="accent6">
-              <a:lumMod val="20000"/>
-              <a:lumOff val="80000"/>
+              <a:lumMod val="40000"/>
+              <a:lumOff val="60000"/>
             </a:schemeClr>
           </a:solidFill>
           <a:ln>
             <a:solidFill>
-              <a:schemeClr val="accent6">
-                <a:lumMod val="75000"/>
-              </a:schemeClr>
+              <a:schemeClr val="tx1"/>
             </a:solidFill>
           </a:ln>
         </p:spPr>
@@ -4387,10 +4434,10 @@
       </p:sp>
       <p:sp>
         <p:nvSpPr>
-          <p:cNvPr id="11" name="Rectangle 10">
-            <a:extLst>
-              <a:ext uri="{FF2B5EF4-FFF2-40B4-BE49-F238E27FC236}">
-                <a16:creationId xmlns:a16="http://schemas.microsoft.com/office/drawing/2014/main" id="{612D8E3D-9A4E-4A6D-A8A7-6F79FC366AAE}"/>
+          <p:cNvPr id="5" name="Rectangle 4">
+            <a:extLst>
+              <a:ext uri="{FF2B5EF4-FFF2-40B4-BE49-F238E27FC236}">
+                <a16:creationId xmlns:a16="http://schemas.microsoft.com/office/drawing/2014/main" id="{85B79A35-6410-4A77-B539-0F8ED3A5A770}"/>
               </a:ext>
             </a:extLst>
           </p:cNvPr>
@@ -4399,23 +4446,359 @@
         </p:nvSpPr>
         <p:spPr>
           <a:xfrm>
-            <a:off x="313081" y="888815"/>
-            <a:ext cx="2000035" cy="523220"/>
-          </a:xfrm>
-          <a:prstGeom prst="rect">
-            <a:avLst/>
-          </a:prstGeom>
-        </p:spPr>
-        <p:txBody>
-          <a:bodyPr wrap="none">
+            <a:off x="520504" y="959458"/>
+            <a:ext cx="2616591" cy="3092037"/>
+          </a:xfrm>
+          <a:prstGeom prst="rect">
+            <a:avLst/>
+          </a:prstGeom>
+          <a:solidFill>
+            <a:schemeClr val="bg1"/>
+          </a:solidFill>
+        </p:spPr>
+        <p:style>
+          <a:lnRef idx="2">
+            <a:schemeClr val="accent1">
+              <a:shade val="50000"/>
+            </a:schemeClr>
+          </a:lnRef>
+          <a:fillRef idx="1">
+            <a:schemeClr val="accent1"/>
+          </a:fillRef>
+          <a:effectRef idx="0">
+            <a:schemeClr val="accent1"/>
+          </a:effectRef>
+          <a:fontRef idx="minor">
+            <a:schemeClr val="lt1"/>
+          </a:fontRef>
+        </p:style>
+        <p:txBody>
+          <a:bodyPr rtlCol="0" anchor="ctr"/>
+          <a:lstStyle/>
+          <a:p>
+            <a:pPr algn="ctr"/>
+            <a:endParaRPr lang="en-US"/>
+          </a:p>
+        </p:txBody>
+      </p:sp>
+      <p:pic>
+        <p:nvPicPr>
+          <p:cNvPr id="6" name="Picture 5" descr="A close up of a sign&#10;&#10;Description automatically generated">
+            <a:extLst>
+              <a:ext uri="{FF2B5EF4-FFF2-40B4-BE49-F238E27FC236}">
+                <a16:creationId xmlns:a16="http://schemas.microsoft.com/office/drawing/2014/main" id="{B0A1FF74-2664-4C2A-AC19-8E7C42278495}"/>
+              </a:ext>
+            </a:extLst>
+          </p:cNvPr>
+          <p:cNvPicPr>
+            <a:picLocks noChangeAspect="1"/>
+          </p:cNvPicPr>
+          <p:nvPr/>
+        </p:nvPicPr>
+        <p:blipFill rotWithShape="1">
+          <a:blip r:embed="rId2">
+            <a:extLst>
+              <a:ext uri="{28A0092B-C50C-407E-A947-70E740481C1C}">
+                <a14:useLocalDpi xmlns:a14="http://schemas.microsoft.com/office/drawing/2010/main" val="0"/>
+              </a:ext>
+            </a:extLst>
+          </a:blip>
+          <a:srcRect l="-206" t="230" r="56299" b="12962"/>
+          <a:stretch/>
+        </p:blipFill>
+        <p:spPr>
+          <a:xfrm>
+            <a:off x="520504" y="959458"/>
+            <a:ext cx="2616591" cy="3306722"/>
+          </a:xfrm>
+          <a:prstGeom prst="rect">
+            <a:avLst/>
+          </a:prstGeom>
+        </p:spPr>
+      </p:pic>
+      <p:sp>
+        <p:nvSpPr>
+          <p:cNvPr id="7" name="TextBox 6">
+            <a:extLst>
+              <a:ext uri="{FF2B5EF4-FFF2-40B4-BE49-F238E27FC236}">
+                <a16:creationId xmlns:a16="http://schemas.microsoft.com/office/drawing/2014/main" id="{5D00A79F-D3C8-4E45-AC4B-F8CC2A98045D}"/>
+              </a:ext>
+            </a:extLst>
+          </p:cNvPr>
+          <p:cNvSpPr txBox="1"/>
+          <p:nvPr/>
+        </p:nvSpPr>
+        <p:spPr>
+          <a:xfrm flipH="1">
+            <a:off x="3479408" y="1237958"/>
+            <a:ext cx="5300004" cy="461665"/>
+          </a:xfrm>
+          <a:prstGeom prst="rect">
+            <a:avLst/>
+          </a:prstGeom>
+          <a:noFill/>
+        </p:spPr>
+        <p:txBody>
+          <a:bodyPr wrap="square" rtlCol="0">
             <a:spAutoFit/>
           </a:bodyPr>
           <a:lstStyle/>
           <a:p>
+            <a:r>
+              <a:rPr lang="en-US" sz="2400" b="1" dirty="0"/>
+              <a:t>BANNER HISTORY:</a:t>
+            </a:r>
+          </a:p>
+        </p:txBody>
+      </p:sp>
+      <p:sp>
+        <p:nvSpPr>
+          <p:cNvPr id="8" name="TextBox 7">
+            <a:extLst>
+              <a:ext uri="{FF2B5EF4-FFF2-40B4-BE49-F238E27FC236}">
+                <a16:creationId xmlns:a16="http://schemas.microsoft.com/office/drawing/2014/main" id="{CCFEE2BA-CB98-4C39-853A-AB4D4F280715}"/>
+              </a:ext>
+            </a:extLst>
+          </p:cNvPr>
+          <p:cNvSpPr txBox="1"/>
+          <p:nvPr/>
+        </p:nvSpPr>
+        <p:spPr>
+          <a:xfrm flipH="1">
+            <a:off x="3445998" y="2450152"/>
+            <a:ext cx="5300004" cy="461665"/>
+          </a:xfrm>
+          <a:prstGeom prst="rect">
+            <a:avLst/>
+          </a:prstGeom>
+          <a:noFill/>
+        </p:spPr>
+        <p:txBody>
+          <a:bodyPr wrap="square" rtlCol="0">
+            <a:spAutoFit/>
+          </a:bodyPr>
+          <a:lstStyle/>
+          <a:p>
+            <a:r>
+              <a:rPr lang="en-US" sz="2400" b="1" dirty="0"/>
+              <a:t>WHERE TO FIND:</a:t>
+            </a:r>
+          </a:p>
+        </p:txBody>
+      </p:sp>
+      <p:sp>
+        <p:nvSpPr>
+          <p:cNvPr id="9" name="TextBox 8">
+            <a:extLst>
+              <a:ext uri="{FF2B5EF4-FFF2-40B4-BE49-F238E27FC236}">
+                <a16:creationId xmlns:a16="http://schemas.microsoft.com/office/drawing/2014/main" id="{FEBB2248-343C-447C-BE65-86761D420470}"/>
+              </a:ext>
+            </a:extLst>
+          </p:cNvPr>
+          <p:cNvSpPr txBox="1"/>
+          <p:nvPr/>
+        </p:nvSpPr>
+        <p:spPr>
+          <a:xfrm flipH="1">
+            <a:off x="3460067" y="1730865"/>
+            <a:ext cx="7535595" cy="923330"/>
+          </a:xfrm>
+          <a:prstGeom prst="rect">
+            <a:avLst/>
+          </a:prstGeom>
+          <a:noFill/>
+        </p:spPr>
+        <p:txBody>
+          <a:bodyPr wrap="square" rtlCol="0">
+            <a:spAutoFit/>
+          </a:bodyPr>
+          <a:lstStyle/>
+          <a:p>
+            <a:pPr marL="285750" indent="-285750">
+              <a:buFont typeface="Arial" panose="020B0604020202020204" pitchFamily="34" charset="0"/>
+              <a:buChar char="•"/>
+            </a:pPr>
+            <a:r>
+              <a:rPr lang="en-US" dirty="0"/>
+              <a:t>IT WAS PRINTED IN THE YEAR 2016</a:t>
+            </a:r>
+          </a:p>
+          <a:p>
+            <a:pPr marL="285750" indent="-285750">
+              <a:buFont typeface="Arial" panose="020B0604020202020204" pitchFamily="34" charset="0"/>
+              <a:buChar char="•"/>
+            </a:pPr>
+            <a:r>
+              <a:rPr lang="en-US" dirty="0"/>
+              <a:t>12*16*19</a:t>
+            </a:r>
+          </a:p>
+          <a:p>
+            <a:endParaRPr lang="en-US" dirty="0"/>
+          </a:p>
+        </p:txBody>
+      </p:sp>
+      <p:sp>
+        <p:nvSpPr>
+          <p:cNvPr id="10" name="TextBox 9">
+            <a:extLst>
+              <a:ext uri="{FF2B5EF4-FFF2-40B4-BE49-F238E27FC236}">
+                <a16:creationId xmlns:a16="http://schemas.microsoft.com/office/drawing/2014/main" id="{E7774734-AB5D-4DA1-B875-C8718F61D36C}"/>
+              </a:ext>
+            </a:extLst>
+          </p:cNvPr>
+          <p:cNvSpPr txBox="1"/>
+          <p:nvPr/>
+        </p:nvSpPr>
+        <p:spPr>
+          <a:xfrm>
+            <a:off x="3479408" y="2957370"/>
+            <a:ext cx="8192088" cy="923330"/>
+          </a:xfrm>
+          <a:prstGeom prst="rect">
+            <a:avLst/>
+          </a:prstGeom>
+          <a:noFill/>
+        </p:spPr>
+        <p:txBody>
+          <a:bodyPr wrap="square" rtlCol="0">
+            <a:spAutoFit/>
+          </a:bodyPr>
+          <a:lstStyle/>
+          <a:p>
+            <a:pPr marL="285750" indent="-285750">
+              <a:buFont typeface="Arial" panose="020B0604020202020204" pitchFamily="34" charset="0"/>
+              <a:buChar char="•"/>
+            </a:pPr>
+            <a:r>
+              <a:rPr lang="en-US" dirty="0"/>
+              <a:t>3</a:t>
+            </a:r>
+            <a:r>
+              <a:rPr lang="en-US" baseline="30000" dirty="0"/>
+              <a:t>RD</a:t>
+            </a:r>
+            <a:r>
+              <a:rPr lang="en-US" dirty="0"/>
+              <a:t> RACK IN THE BASEMENT</a:t>
+            </a:r>
+          </a:p>
+          <a:p>
+            <a:pPr marL="285750" indent="-285750">
+              <a:buFont typeface="Arial" panose="020B0604020202020204" pitchFamily="34" charset="0"/>
+              <a:buChar char="•"/>
+            </a:pPr>
+            <a:r>
+              <a:rPr lang="en-US" dirty="0"/>
+              <a:t>TOP SHELF</a:t>
+            </a:r>
+          </a:p>
+          <a:p>
+            <a:pPr marL="285750" indent="-285750">
+              <a:buFont typeface="Arial" panose="020B0604020202020204" pitchFamily="34" charset="0"/>
+              <a:buChar char="•"/>
+            </a:pPr>
+            <a:r>
+              <a:rPr lang="en-US" dirty="0"/>
+              <a:t>IN THE BLUE ROUND ROLL</a:t>
+            </a:r>
+          </a:p>
+        </p:txBody>
+      </p:sp>
+      <p:sp>
+        <p:nvSpPr>
+          <p:cNvPr id="11" name="Rectangle 10">
+            <a:extLst>
+              <a:ext uri="{FF2B5EF4-FFF2-40B4-BE49-F238E27FC236}">
+                <a16:creationId xmlns:a16="http://schemas.microsoft.com/office/drawing/2014/main" id="{023EADE4-E7CC-43D3-BAEE-4101D2477768}"/>
+              </a:ext>
+            </a:extLst>
+          </p:cNvPr>
+          <p:cNvSpPr/>
+          <p:nvPr/>
+        </p:nvSpPr>
+        <p:spPr>
+          <a:xfrm>
+            <a:off x="520504" y="4266180"/>
+            <a:ext cx="2616591" cy="348819"/>
+          </a:xfrm>
+          <a:prstGeom prst="rect">
+            <a:avLst/>
+          </a:prstGeom>
+          <a:solidFill>
+            <a:schemeClr val="accent6">
+              <a:lumMod val="20000"/>
+              <a:lumOff val="80000"/>
+            </a:schemeClr>
+          </a:solidFill>
+        </p:spPr>
+        <p:style>
+          <a:lnRef idx="2">
+            <a:schemeClr val="accent1">
+              <a:shade val="50000"/>
+            </a:schemeClr>
+          </a:lnRef>
+          <a:fillRef idx="1">
+            <a:schemeClr val="accent1"/>
+          </a:fillRef>
+          <a:effectRef idx="0">
+            <a:schemeClr val="accent1"/>
+          </a:effectRef>
+          <a:fontRef idx="minor">
+            <a:schemeClr val="lt1"/>
+          </a:fontRef>
+        </p:style>
+        <p:txBody>
+          <a:bodyPr rtlCol="0" anchor="ctr"/>
+          <a:lstStyle/>
+          <a:p>
             <a:pPr algn="ctr"/>
             <a:r>
-              <a:rPr lang="en-US" sz="2800" dirty="0">
+              <a:rPr lang="en-US" dirty="0">
+                <a:solidFill>
+                  <a:schemeClr val="tx1"/>
+                </a:solidFill>
+              </a:rPr>
+              <a:t>BANNER CODE : 3TBR</a:t>
+            </a:r>
+          </a:p>
+        </p:txBody>
+      </p:sp>
+      <p:sp>
+        <p:nvSpPr>
+          <p:cNvPr id="12" name="Rectangle 11">
+            <a:extLst>
+              <a:ext uri="{FF2B5EF4-FFF2-40B4-BE49-F238E27FC236}">
+                <a16:creationId xmlns:a16="http://schemas.microsoft.com/office/drawing/2014/main" id="{6AC9F29A-4F99-4825-A3E5-2189E59F10C6}"/>
+              </a:ext>
+            </a:extLst>
+          </p:cNvPr>
+          <p:cNvSpPr/>
+          <p:nvPr/>
+        </p:nvSpPr>
+        <p:spPr>
+          <a:xfrm>
+            <a:off x="3460067" y="3946184"/>
+            <a:ext cx="3177858" cy="461665"/>
+          </a:xfrm>
+          <a:prstGeom prst="rect">
+            <a:avLst/>
+          </a:prstGeom>
+          <a:noFill/>
+        </p:spPr>
+        <p:txBody>
+          <a:bodyPr wrap="none" lIns="91440" tIns="45720" rIns="91440" bIns="45720">
+            <a:spAutoFit/>
+          </a:bodyPr>
+          <a:lstStyle/>
+          <a:p>
+            <a:pPr algn="ctr"/>
+            <a:r>
+              <a:rPr lang="en-US" sz="2400" b="1" cap="none" spc="0" dirty="0">
                 <a:ln w="0"/>
+                <a:solidFill>
+                  <a:schemeClr val="tx1"/>
+                </a:solidFill>
                 <a:effectLst>
                   <a:outerShdw blurRad="38100" dist="19050" dir="2700000" algn="tl" rotWithShape="0">
                     <a:schemeClr val="dk1">
@@ -4424,17 +4807,17 @@
                   </a:outerShdw>
                 </a:effectLst>
               </a:rPr>
-              <a:t>CHRISTMAS:</a:t>
-            </a:r>
-          </a:p>
-        </p:txBody>
-      </p:sp>
-      <p:sp>
-        <p:nvSpPr>
-          <p:cNvPr id="12" name="Arrow: Right 11">
-            <a:extLst>
-              <a:ext uri="{FF2B5EF4-FFF2-40B4-BE49-F238E27FC236}">
-                <a16:creationId xmlns:a16="http://schemas.microsoft.com/office/drawing/2014/main" id="{DBA5F899-39F2-4980-B1A6-3E2E63788B2C}"/>
+              <a:t>SPECIAL INSTRUCTIONS</a:t>
+            </a:r>
+          </a:p>
+        </p:txBody>
+      </p:sp>
+      <p:sp>
+        <p:nvSpPr>
+          <p:cNvPr id="13" name="Rectangle 12">
+            <a:extLst>
+              <a:ext uri="{FF2B5EF4-FFF2-40B4-BE49-F238E27FC236}">
+                <a16:creationId xmlns:a16="http://schemas.microsoft.com/office/drawing/2014/main" id="{544D79AE-4A78-4952-8607-A417CA1810FB}"/>
               </a:ext>
             </a:extLst>
           </p:cNvPr>
@@ -4443,18 +4826,25 @@
         </p:nvSpPr>
         <p:spPr>
           <a:xfrm>
-            <a:off x="10803881" y="3494299"/>
-            <a:ext cx="583096" cy="570964"/>
-          </a:xfrm>
-          <a:prstGeom prst="rightArrow">
+            <a:off x="10125223" y="1651313"/>
+            <a:ext cx="1546273" cy="461665"/>
+          </a:xfrm>
+          <a:prstGeom prst="rect">
             <a:avLst/>
           </a:prstGeom>
           <a:solidFill>
             <a:schemeClr val="accent6">
-              <a:lumMod val="60000"/>
-              <a:lumOff val="40000"/>
+              <a:lumMod val="40000"/>
+              <a:lumOff val="60000"/>
             </a:schemeClr>
           </a:solidFill>
+          <a:ln>
+            <a:solidFill>
+              <a:schemeClr val="accent6">
+                <a:lumMod val="50000"/>
+              </a:schemeClr>
+            </a:solidFill>
+          </a:ln>
         </p:spPr>
         <p:style>
           <a:lnRef idx="2">
@@ -4477,16 +4867,23 @@
           <a:lstStyle/>
           <a:p>
             <a:pPr algn="ctr"/>
-            <a:endParaRPr lang="en-US"/>
-          </a:p>
-        </p:txBody>
-      </p:sp>
-      <p:sp>
-        <p:nvSpPr>
-          <p:cNvPr id="13" name="Arrow: Right 12">
-            <a:extLst>
-              <a:ext uri="{FF2B5EF4-FFF2-40B4-BE49-F238E27FC236}">
-                <a16:creationId xmlns:a16="http://schemas.microsoft.com/office/drawing/2014/main" id="{FA6FDF67-8880-4AF8-8BEC-5D836AB95550}"/>
+            <a:r>
+              <a:rPr lang="en-US" b="1" dirty="0">
+                <a:solidFill>
+                  <a:schemeClr val="tx1"/>
+                </a:solidFill>
+              </a:rPr>
+              <a:t>DELETE</a:t>
+            </a:r>
+          </a:p>
+        </p:txBody>
+      </p:sp>
+      <p:sp>
+        <p:nvSpPr>
+          <p:cNvPr id="14" name="Rectangle 13">
+            <a:extLst>
+              <a:ext uri="{FF2B5EF4-FFF2-40B4-BE49-F238E27FC236}">
+                <a16:creationId xmlns:a16="http://schemas.microsoft.com/office/drawing/2014/main" id="{C45ADF14-A237-4D54-AEAB-D91349108520}"/>
               </a:ext>
             </a:extLst>
           </p:cNvPr>
@@ -4494,19 +4891,24 @@
           <p:nvPr/>
         </p:nvSpPr>
         <p:spPr>
-          <a:xfrm flipH="1">
-            <a:off x="433245" y="3543857"/>
-            <a:ext cx="583096" cy="570964"/>
-          </a:xfrm>
-          <a:prstGeom prst="rightArrow">
+          <a:xfrm>
+            <a:off x="10139291" y="2858119"/>
+            <a:ext cx="1556822" cy="1163352"/>
+          </a:xfrm>
+          <a:prstGeom prst="rect">
             <a:avLst/>
           </a:prstGeom>
           <a:solidFill>
             <a:schemeClr val="accent6">
-              <a:lumMod val="60000"/>
-              <a:lumOff val="40000"/>
+              <a:lumMod val="20000"/>
+              <a:lumOff val="80000"/>
             </a:schemeClr>
           </a:solidFill>
+          <a:ln>
+            <a:solidFill>
+              <a:schemeClr val="tx1"/>
+            </a:solidFill>
+          </a:ln>
         </p:spPr>
         <p:style>
           <a:lnRef idx="2">
@@ -4529,501 +4931,23 @@
           <a:lstStyle/>
           <a:p>
             <a:pPr algn="ctr"/>
-            <a:endParaRPr lang="en-US"/>
-          </a:p>
-        </p:txBody>
-      </p:sp>
-      <p:pic>
-        <p:nvPicPr>
-          <p:cNvPr id="14" name="Picture 13" descr="A close up of a sign&#10;&#10;Description automatically generated">
-            <a:extLst>
-              <a:ext uri="{FF2B5EF4-FFF2-40B4-BE49-F238E27FC236}">
-                <a16:creationId xmlns:a16="http://schemas.microsoft.com/office/drawing/2014/main" id="{EE5EF126-B4E0-48B7-B02B-9138070D8065}"/>
-              </a:ext>
-            </a:extLst>
-          </p:cNvPr>
-          <p:cNvPicPr>
-            <a:picLocks noChangeAspect="1"/>
-          </p:cNvPicPr>
-          <p:nvPr/>
-        </p:nvPicPr>
-        <p:blipFill rotWithShape="1">
-          <a:blip r:embed="rId2">
-            <a:extLst>
-              <a:ext uri="{28A0092B-C50C-407E-A947-70E740481C1C}">
-                <a14:useLocalDpi xmlns:a14="http://schemas.microsoft.com/office/drawing/2010/main" val="0"/>
-              </a:ext>
-            </a:extLst>
-          </a:blip>
-          <a:srcRect l="-206" t="230" r="56299" b="12962"/>
-          <a:stretch/>
-        </p:blipFill>
-        <p:spPr>
-          <a:xfrm>
-            <a:off x="1334394" y="3039112"/>
-            <a:ext cx="1957445" cy="2170574"/>
-          </a:xfrm>
-          <a:prstGeom prst="rect">
-            <a:avLst/>
-          </a:prstGeom>
-        </p:spPr>
-      </p:pic>
-      <p:pic>
-        <p:nvPicPr>
-          <p:cNvPr id="15" name="Picture 14" descr="A close up of a sign&#10;&#10;Description automatically generated">
-            <a:extLst>
-              <a:ext uri="{FF2B5EF4-FFF2-40B4-BE49-F238E27FC236}">
-                <a16:creationId xmlns:a16="http://schemas.microsoft.com/office/drawing/2014/main" id="{466A9B6C-3C1F-4A53-9002-45832CD7C680}"/>
-              </a:ext>
-            </a:extLst>
-          </p:cNvPr>
-          <p:cNvPicPr>
-            <a:picLocks noChangeAspect="1"/>
-          </p:cNvPicPr>
-          <p:nvPr/>
-        </p:nvPicPr>
-        <p:blipFill rotWithShape="1">
-          <a:blip r:embed="rId2">
-            <a:extLst>
-              <a:ext uri="{28A0092B-C50C-407E-A947-70E740481C1C}">
-                <a14:useLocalDpi xmlns:a14="http://schemas.microsoft.com/office/drawing/2010/main" val="0"/>
-              </a:ext>
-            </a:extLst>
-          </a:blip>
-          <a:srcRect l="58785" b="13885"/>
-          <a:stretch/>
-        </p:blipFill>
-        <p:spPr>
-          <a:xfrm>
-            <a:off x="3721022" y="2992901"/>
-            <a:ext cx="1970697" cy="2192800"/>
-          </a:xfrm>
-          <a:prstGeom prst="rect">
-            <a:avLst/>
-          </a:prstGeom>
-        </p:spPr>
-      </p:pic>
-      <p:pic>
-        <p:nvPicPr>
-          <p:cNvPr id="16" name="Picture 15" descr="A close up of a sign&#10;&#10;Description automatically generated">
-            <a:extLst>
-              <a:ext uri="{FF2B5EF4-FFF2-40B4-BE49-F238E27FC236}">
-                <a16:creationId xmlns:a16="http://schemas.microsoft.com/office/drawing/2014/main" id="{7E870CBB-039C-4FF7-BEC5-AEA116A50FAA}"/>
-              </a:ext>
-            </a:extLst>
-          </p:cNvPr>
-          <p:cNvPicPr>
-            <a:picLocks noChangeAspect="1"/>
-          </p:cNvPicPr>
-          <p:nvPr/>
-        </p:nvPicPr>
-        <p:blipFill rotWithShape="1">
-          <a:blip r:embed="rId3">
-            <a:extLst>
-              <a:ext uri="{28A0092B-C50C-407E-A947-70E740481C1C}">
-                <a14:useLocalDpi xmlns:a14="http://schemas.microsoft.com/office/drawing/2010/main" val="0"/>
-              </a:ext>
-            </a:extLst>
-          </a:blip>
-          <a:srcRect l="2229" r="66983"/>
-          <a:stretch/>
-        </p:blipFill>
-        <p:spPr>
-          <a:xfrm>
-            <a:off x="6053004" y="2906485"/>
-            <a:ext cx="1970696" cy="2279082"/>
-          </a:xfrm>
-          <a:prstGeom prst="rect">
-            <a:avLst/>
-          </a:prstGeom>
-        </p:spPr>
-      </p:pic>
-      <p:pic>
-        <p:nvPicPr>
-          <p:cNvPr id="17" name="Picture 16">
-            <a:extLst>
-              <a:ext uri="{FF2B5EF4-FFF2-40B4-BE49-F238E27FC236}">
-                <a16:creationId xmlns:a16="http://schemas.microsoft.com/office/drawing/2014/main" id="{E1D39AB0-3BAD-4890-9EF3-998BCCDBBDF7}"/>
-              </a:ext>
-            </a:extLst>
-          </p:cNvPr>
-          <p:cNvPicPr>
-            <a:picLocks noChangeAspect="1"/>
-          </p:cNvPicPr>
-          <p:nvPr/>
-        </p:nvPicPr>
-        <p:blipFill rotWithShape="1">
-          <a:blip r:embed="rId3">
-            <a:extLst>
-              <a:ext uri="{28A0092B-C50C-407E-A947-70E740481C1C}">
-                <a14:useLocalDpi xmlns:a14="http://schemas.microsoft.com/office/drawing/2010/main" val="0"/>
-              </a:ext>
-            </a:extLst>
-          </a:blip>
-          <a:srcRect l="34123" r="34740"/>
-          <a:stretch/>
-        </p:blipFill>
-        <p:spPr>
-          <a:xfrm>
-            <a:off x="8475397" y="2944194"/>
-            <a:ext cx="1951892" cy="2265491"/>
-          </a:xfrm>
-          <a:prstGeom prst="rect">
-            <a:avLst/>
-          </a:prstGeom>
-        </p:spPr>
-      </p:pic>
-      <p:graphicFrame>
-        <p:nvGraphicFramePr>
-          <p:cNvPr id="18" name="Table 17">
-            <a:extLst>
-              <a:ext uri="{FF2B5EF4-FFF2-40B4-BE49-F238E27FC236}">
-                <a16:creationId xmlns:a16="http://schemas.microsoft.com/office/drawing/2014/main" id="{6D4BED6D-B000-413F-B02D-F1EF60CCC779}"/>
-              </a:ext>
-            </a:extLst>
-          </p:cNvPr>
-          <p:cNvGraphicFramePr>
-            <a:graphicFrameLocks noGrp="1"/>
-          </p:cNvGraphicFramePr>
-          <p:nvPr>
-            <p:extLst>
-              <p:ext uri="{D42A27DB-BD31-4B8C-83A1-F6EECF244321}">
-                <p14:modId xmlns:p14="http://schemas.microsoft.com/office/powerpoint/2010/main" val="1318720372"/>
-              </p:ext>
-            </p:extLst>
-          </p:nvPr>
-        </p:nvGraphicFramePr>
-        <p:xfrm>
-          <a:off x="547358" y="1548705"/>
-          <a:ext cx="10787705" cy="1112520"/>
-        </p:xfrm>
-        <a:graphic>
-          <a:graphicData uri="http://schemas.openxmlformats.org/drawingml/2006/table">
-            <a:tbl>
-              <a:tblPr firstRow="1" bandRow="1">
-                <a:tableStyleId>{5C22544A-7EE6-4342-B048-85BDC9FD1C3A}</a:tableStyleId>
-              </a:tblPr>
-              <a:tblGrid>
-                <a:gridCol w="2157541">
-                  <a:extLst>
-                    <a:ext uri="{9D8B030D-6E8A-4147-A177-3AD203B41FA5}">
-                      <a16:colId xmlns:a16="http://schemas.microsoft.com/office/drawing/2014/main" val="3238167903"/>
-                    </a:ext>
-                  </a:extLst>
-                </a:gridCol>
-                <a:gridCol w="2157541">
-                  <a:extLst>
-                    <a:ext uri="{9D8B030D-6E8A-4147-A177-3AD203B41FA5}">
-                      <a16:colId xmlns:a16="http://schemas.microsoft.com/office/drawing/2014/main" val="263153752"/>
-                    </a:ext>
-                  </a:extLst>
-                </a:gridCol>
-                <a:gridCol w="2157541">
-                  <a:extLst>
-                    <a:ext uri="{9D8B030D-6E8A-4147-A177-3AD203B41FA5}">
-                      <a16:colId xmlns:a16="http://schemas.microsoft.com/office/drawing/2014/main" val="694582284"/>
-                    </a:ext>
-                  </a:extLst>
-                </a:gridCol>
-                <a:gridCol w="2157541">
-                  <a:extLst>
-                    <a:ext uri="{9D8B030D-6E8A-4147-A177-3AD203B41FA5}">
-                      <a16:colId xmlns:a16="http://schemas.microsoft.com/office/drawing/2014/main" val="4271785852"/>
-                    </a:ext>
-                  </a:extLst>
-                </a:gridCol>
-                <a:gridCol w="2157541">
-                  <a:extLst>
-                    <a:ext uri="{9D8B030D-6E8A-4147-A177-3AD203B41FA5}">
-                      <a16:colId xmlns:a16="http://schemas.microsoft.com/office/drawing/2014/main" val="3739566414"/>
-                    </a:ext>
-                  </a:extLst>
-                </a:gridCol>
-              </a:tblGrid>
-              <a:tr h="370840">
-                <a:tc>
-                  <a:txBody>
-                    <a:bodyPr/>
-                    <a:lstStyle/>
-                    <a:p>
-                      <a:r>
-                        <a:rPr lang="en-US" dirty="0"/>
-                        <a:t>DATE</a:t>
-                      </a:r>
-                    </a:p>
-                  </a:txBody>
-                  <a:tcPr/>
-                </a:tc>
-                <a:tc>
-                  <a:txBody>
-                    <a:bodyPr/>
-                    <a:lstStyle/>
-                    <a:p>
-                      <a:r>
-                        <a:rPr lang="en-US" dirty="0"/>
-                        <a:t>FESTIVAL</a:t>
-                      </a:r>
-                    </a:p>
-                  </a:txBody>
-                  <a:tcPr/>
-                </a:tc>
-                <a:tc>
-                  <a:txBody>
-                    <a:bodyPr/>
-                    <a:lstStyle/>
-                    <a:p>
-                      <a:r>
-                        <a:rPr lang="en-US" dirty="0"/>
-                        <a:t>FIRST READING</a:t>
-                      </a:r>
-                    </a:p>
-                  </a:txBody>
-                  <a:tcPr/>
-                </a:tc>
-                <a:tc>
-                  <a:txBody>
-                    <a:bodyPr/>
-                    <a:lstStyle/>
-                    <a:p>
-                      <a:r>
-                        <a:rPr lang="en-US" dirty="0"/>
-                        <a:t>EPISTLE</a:t>
-                      </a:r>
-                    </a:p>
-                  </a:txBody>
-                  <a:tcPr/>
-                </a:tc>
-                <a:tc>
-                  <a:txBody>
-                    <a:bodyPr/>
-                    <a:lstStyle/>
-                    <a:p>
-                      <a:r>
-                        <a:rPr lang="en-US" dirty="0"/>
-                        <a:t>GOSPEL</a:t>
-                      </a:r>
-                    </a:p>
-                  </a:txBody>
-                  <a:tcPr/>
-                </a:tc>
-                <a:extLst>
-                  <a:ext uri="{0D108BD9-81ED-4DB2-BD59-A6C34878D82A}">
-                    <a16:rowId xmlns:a16="http://schemas.microsoft.com/office/drawing/2014/main" val="2348208358"/>
-                  </a:ext>
-                </a:extLst>
-              </a:tr>
-              <a:tr h="370840">
-                <a:tc>
-                  <a:txBody>
-                    <a:bodyPr/>
-                    <a:lstStyle/>
-                    <a:p>
-                      <a:r>
-                        <a:rPr lang="en-US" dirty="0"/>
-                        <a:t>DEC 25</a:t>
-                      </a:r>
-                    </a:p>
-                  </a:txBody>
-                  <a:tcPr/>
-                </a:tc>
-                <a:tc>
-                  <a:txBody>
-                    <a:bodyPr/>
-                    <a:lstStyle/>
-                    <a:p>
-                      <a:r>
-                        <a:rPr lang="en-US" dirty="0"/>
-                        <a:t>CHRISTMAS DAY</a:t>
-                      </a:r>
-                    </a:p>
-                  </a:txBody>
-                  <a:tcPr/>
-                </a:tc>
-                <a:tc>
-                  <a:txBody>
-                    <a:bodyPr/>
-                    <a:lstStyle/>
-                    <a:p>
-                      <a:r>
-                        <a:rPr lang="en-US" dirty="0"/>
-                        <a:t>IS. 52:7-10</a:t>
-                      </a:r>
-                    </a:p>
-                  </a:txBody>
-                  <a:tcPr/>
-                </a:tc>
-                <a:tc>
-                  <a:txBody>
-                    <a:bodyPr/>
-                    <a:lstStyle/>
-                    <a:p>
-                      <a:r>
-                        <a:rPr lang="en-US" dirty="0"/>
-                        <a:t>Heb. 1:1-6(7-12)</a:t>
-                      </a:r>
-                    </a:p>
-                  </a:txBody>
-                  <a:tcPr/>
-                </a:tc>
-                <a:tc>
-                  <a:txBody>
-                    <a:bodyPr/>
-                    <a:lstStyle/>
-                    <a:p>
-                      <a:r>
-                        <a:rPr lang="en-US" dirty="0"/>
-                        <a:t>John 1:1-14(15-18)</a:t>
-                      </a:r>
-                    </a:p>
-                  </a:txBody>
-                  <a:tcPr/>
-                </a:tc>
-                <a:extLst>
-                  <a:ext uri="{0D108BD9-81ED-4DB2-BD59-A6C34878D82A}">
-                    <a16:rowId xmlns:a16="http://schemas.microsoft.com/office/drawing/2014/main" val="4208648788"/>
-                  </a:ext>
-                </a:extLst>
-              </a:tr>
-              <a:tr h="370840">
-                <a:tc>
-                  <a:txBody>
-                    <a:bodyPr/>
-                    <a:lstStyle/>
-                    <a:p>
-                      <a:r>
-                        <a:rPr lang="en-US" dirty="0"/>
-                        <a:t>DEC 30</a:t>
-                      </a:r>
-                    </a:p>
-                  </a:txBody>
-                  <a:tcPr/>
-                </a:tc>
-                <a:tc>
-                  <a:txBody>
-                    <a:bodyPr/>
-                    <a:lstStyle/>
-                    <a:p>
-                      <a:endParaRPr lang="en-US" dirty="0"/>
-                    </a:p>
-                  </a:txBody>
-                  <a:tcPr/>
-                </a:tc>
-                <a:tc>
-                  <a:txBody>
-                    <a:bodyPr/>
-                    <a:lstStyle/>
-                    <a:p>
-                      <a:endParaRPr lang="en-US"/>
-                    </a:p>
-                  </a:txBody>
-                  <a:tcPr/>
-                </a:tc>
-                <a:tc>
-                  <a:txBody>
-                    <a:bodyPr/>
-                    <a:lstStyle/>
-                    <a:p>
-                      <a:endParaRPr lang="en-US"/>
-                    </a:p>
-                  </a:txBody>
-                  <a:tcPr/>
-                </a:tc>
-                <a:tc>
-                  <a:txBody>
-                    <a:bodyPr/>
-                    <a:lstStyle/>
-                    <a:p>
-                      <a:endParaRPr lang="en-US" dirty="0"/>
-                    </a:p>
-                  </a:txBody>
-                  <a:tcPr/>
-                </a:tc>
-                <a:extLst>
-                  <a:ext uri="{0D108BD9-81ED-4DB2-BD59-A6C34878D82A}">
-                    <a16:rowId xmlns:a16="http://schemas.microsoft.com/office/drawing/2014/main" val="2050276933"/>
-                  </a:ext>
-                </a:extLst>
-              </a:tr>
-            </a:tbl>
-          </a:graphicData>
-        </a:graphic>
-      </p:graphicFrame>
-      <p:sp>
-        <p:nvSpPr>
-          <p:cNvPr id="19" name="TextBox 18">
-            <a:extLst>
-              <a:ext uri="{FF2B5EF4-FFF2-40B4-BE49-F238E27FC236}">
-                <a16:creationId xmlns:a16="http://schemas.microsoft.com/office/drawing/2014/main" id="{D5C75D91-B0AA-42DB-B021-D35FB139A524}"/>
-              </a:ext>
-            </a:extLst>
-          </p:cNvPr>
-          <p:cNvSpPr txBox="1"/>
-          <p:nvPr/>
-        </p:nvSpPr>
-        <p:spPr>
-          <a:xfrm>
-            <a:off x="2313116" y="937037"/>
-            <a:ext cx="5561199" cy="400110"/>
-          </a:xfrm>
-          <a:prstGeom prst="rect">
-            <a:avLst/>
-          </a:prstGeom>
-          <a:noFill/>
-        </p:spPr>
-        <p:txBody>
-          <a:bodyPr wrap="square" rtlCol="0">
-            <a:spAutoFit/>
-          </a:bodyPr>
-          <a:lstStyle/>
-          <a:p>
-            <a:r>
-              <a:rPr lang="en-US" sz="2000" b="1" dirty="0"/>
-              <a:t>PARAMENT COLOR: WHITE</a:t>
-            </a:r>
-          </a:p>
-        </p:txBody>
-      </p:sp>
-      <p:pic>
-        <p:nvPicPr>
-          <p:cNvPr id="20" name="Picture 19" descr="A close up of a device&#10;&#10;Description automatically generated">
-            <a:extLst>
-              <a:ext uri="{FF2B5EF4-FFF2-40B4-BE49-F238E27FC236}">
-                <a16:creationId xmlns:a16="http://schemas.microsoft.com/office/drawing/2014/main" id="{0B28FB31-7C0D-4F1D-BEB8-B54D9BD317A7}"/>
-              </a:ext>
-            </a:extLst>
-          </p:cNvPr>
-          <p:cNvPicPr>
-            <a:picLocks noChangeAspect="1"/>
-          </p:cNvPicPr>
-          <p:nvPr/>
-        </p:nvPicPr>
-        <p:blipFill rotWithShape="1">
-          <a:blip r:embed="rId4">
-            <a:extLst>
-              <a:ext uri="{28A0092B-C50C-407E-A947-70E740481C1C}">
-                <a14:useLocalDpi xmlns:a14="http://schemas.microsoft.com/office/drawing/2010/main" val="0"/>
-              </a:ext>
-            </a:extLst>
-          </a:blip>
-          <a:srcRect l="65760" t="12718" r="24721" b="21436"/>
-          <a:stretch/>
-        </p:blipFill>
-        <p:spPr>
-          <a:xfrm>
-            <a:off x="11514391" y="194465"/>
-            <a:ext cx="476773" cy="6375464"/>
-          </a:xfrm>
-          <a:prstGeom prst="rect">
-            <a:avLst/>
-          </a:prstGeom>
-        </p:spPr>
-      </p:pic>
-      <p:sp>
-        <p:nvSpPr>
-          <p:cNvPr id="22" name="Rectangle 21">
-            <a:extLst>
-              <a:ext uri="{FF2B5EF4-FFF2-40B4-BE49-F238E27FC236}">
-                <a16:creationId xmlns:a16="http://schemas.microsoft.com/office/drawing/2014/main" id="{E1C993A9-182D-4EFC-A979-BA9A6D286300}"/>
+            <a:r>
+              <a:rPr lang="en-US" dirty="0">
+                <a:solidFill>
+                  <a:schemeClr val="tx1"/>
+                </a:solidFill>
+              </a:rPr>
+              <a:t>CLICK ME WHEN YOU USE THIS BANNER</a:t>
+            </a:r>
+          </a:p>
+        </p:txBody>
+      </p:sp>
+      <p:sp>
+        <p:nvSpPr>
+          <p:cNvPr id="16" name="Rectangle 15">
+            <a:extLst>
+              <a:ext uri="{FF2B5EF4-FFF2-40B4-BE49-F238E27FC236}">
+                <a16:creationId xmlns:a16="http://schemas.microsoft.com/office/drawing/2014/main" id="{49740F65-FC95-4718-AE39-429421DE80B2}"/>
               </a:ext>
             </a:extLst>
           </p:cNvPr>
@@ -5032,7 +4956,7 @@
         </p:nvSpPr>
         <p:spPr>
           <a:xfrm>
-            <a:off x="5585941" y="274446"/>
+            <a:off x="5932583" y="344468"/>
             <a:ext cx="1815548" cy="530087"/>
           </a:xfrm>
           <a:prstGeom prst="rect">
@@ -5084,10 +5008,10 @@
       </p:sp>
       <p:sp>
         <p:nvSpPr>
-          <p:cNvPr id="23" name="Rectangle 22">
-            <a:extLst>
-              <a:ext uri="{FF2B5EF4-FFF2-40B4-BE49-F238E27FC236}">
-                <a16:creationId xmlns:a16="http://schemas.microsoft.com/office/drawing/2014/main" id="{67D8346F-E123-4738-AABE-D18DE1ECD2FD}"/>
+          <p:cNvPr id="17" name="Rectangle 16">
+            <a:extLst>
+              <a:ext uri="{FF2B5EF4-FFF2-40B4-BE49-F238E27FC236}">
+                <a16:creationId xmlns:a16="http://schemas.microsoft.com/office/drawing/2014/main" id="{AF596BF2-1A1F-4141-B3B2-3004550C87F8}"/>
               </a:ext>
             </a:extLst>
           </p:cNvPr>
@@ -5096,7 +5020,7 @@
         </p:nvSpPr>
         <p:spPr>
           <a:xfrm>
-            <a:off x="7555829" y="277121"/>
+            <a:off x="7902471" y="347143"/>
             <a:ext cx="1815548" cy="530087"/>
           </a:xfrm>
           <a:prstGeom prst="rect">
@@ -5148,10 +5072,10 @@
       </p:sp>
       <p:sp>
         <p:nvSpPr>
-          <p:cNvPr id="24" name="Rectangle 23">
-            <a:extLst>
-              <a:ext uri="{FF2B5EF4-FFF2-40B4-BE49-F238E27FC236}">
-                <a16:creationId xmlns:a16="http://schemas.microsoft.com/office/drawing/2014/main" id="{349FEB91-3F9A-46E1-8CBB-730807A85114}"/>
+          <p:cNvPr id="18" name="Rectangle 17">
+            <a:extLst>
+              <a:ext uri="{FF2B5EF4-FFF2-40B4-BE49-F238E27FC236}">
+                <a16:creationId xmlns:a16="http://schemas.microsoft.com/office/drawing/2014/main" id="{BF9D795C-EA6D-4FBA-A27C-A1CDCCEDBABA}"/>
               </a:ext>
             </a:extLst>
           </p:cNvPr>
@@ -5160,7 +5084,7 @@
         </p:nvSpPr>
         <p:spPr>
           <a:xfrm>
-            <a:off x="9522962" y="260705"/>
+            <a:off x="9869604" y="330727"/>
             <a:ext cx="1815548" cy="530087"/>
           </a:xfrm>
           <a:prstGeom prst="rect">
@@ -5212,10 +5136,10 @@
       </p:sp>
       <p:sp>
         <p:nvSpPr>
-          <p:cNvPr id="25" name="Rectangle 24">
-            <a:extLst>
-              <a:ext uri="{FF2B5EF4-FFF2-40B4-BE49-F238E27FC236}">
-                <a16:creationId xmlns:a16="http://schemas.microsoft.com/office/drawing/2014/main" id="{22B836E9-1A6E-4F55-8C57-F45EF1E4635E}"/>
+          <p:cNvPr id="19" name="Rectangle 18">
+            <a:extLst>
+              <a:ext uri="{FF2B5EF4-FFF2-40B4-BE49-F238E27FC236}">
+                <a16:creationId xmlns:a16="http://schemas.microsoft.com/office/drawing/2014/main" id="{9477E371-4A9E-4208-B01E-0E1B2DF147C7}"/>
               </a:ext>
             </a:extLst>
           </p:cNvPr>
@@ -5224,7 +5148,7 @@
         </p:nvSpPr>
         <p:spPr>
           <a:xfrm>
-            <a:off x="3610040" y="253810"/>
+            <a:off x="3956682" y="323832"/>
             <a:ext cx="1815548" cy="530087"/>
           </a:xfrm>
           <a:prstGeom prst="rect">
@@ -5274,19 +5198,82 @@
           </a:p>
         </p:txBody>
       </p:sp>
+      <p:sp>
+        <p:nvSpPr>
+          <p:cNvPr id="20" name="Rectangle 19">
+            <a:extLst>
+              <a:ext uri="{FF2B5EF4-FFF2-40B4-BE49-F238E27FC236}">
+                <a16:creationId xmlns:a16="http://schemas.microsoft.com/office/drawing/2014/main" id="{A9BE95E5-AB44-42E0-B2EE-C879A19C4F76}"/>
+              </a:ext>
+            </a:extLst>
+          </p:cNvPr>
+          <p:cNvSpPr/>
+          <p:nvPr/>
+        </p:nvSpPr>
+        <p:spPr>
+          <a:xfrm>
+            <a:off x="10139291" y="2228090"/>
+            <a:ext cx="1546273" cy="461665"/>
+          </a:xfrm>
+          <a:prstGeom prst="rect">
+            <a:avLst/>
+          </a:prstGeom>
+          <a:solidFill>
+            <a:schemeClr val="accent6">
+              <a:lumMod val="40000"/>
+              <a:lumOff val="60000"/>
+            </a:schemeClr>
+          </a:solidFill>
+          <a:ln>
+            <a:solidFill>
+              <a:schemeClr val="accent6">
+                <a:lumMod val="50000"/>
+              </a:schemeClr>
+            </a:solidFill>
+          </a:ln>
+        </p:spPr>
+        <p:style>
+          <a:lnRef idx="2">
+            <a:schemeClr val="accent1">
+              <a:shade val="50000"/>
+            </a:schemeClr>
+          </a:lnRef>
+          <a:fillRef idx="1">
+            <a:schemeClr val="accent1"/>
+          </a:fillRef>
+          <a:effectRef idx="0">
+            <a:schemeClr val="accent1"/>
+          </a:effectRef>
+          <a:fontRef idx="minor">
+            <a:schemeClr val="lt1"/>
+          </a:fontRef>
+        </p:style>
+        <p:txBody>
+          <a:bodyPr rtlCol="0" anchor="ctr"/>
+          <a:lstStyle/>
+          <a:p>
+            <a:pPr algn="ctr"/>
+            <a:r>
+              <a:rPr lang="en-US" b="1" dirty="0">
+                <a:solidFill>
+                  <a:schemeClr val="tx1"/>
+                </a:solidFill>
+              </a:rPr>
+              <a:t>EDIT INFO</a:t>
+            </a:r>
+          </a:p>
+        </p:txBody>
+      </p:sp>
     </p:spTree>
     <p:extLst>
       <p:ext uri="{BB962C8B-B14F-4D97-AF65-F5344CB8AC3E}">
-        <p14:creationId xmlns:p14="http://schemas.microsoft.com/office/powerpoint/2010/main" val="3541158594"/>
+        <p14:creationId xmlns:p14="http://schemas.microsoft.com/office/powerpoint/2010/main" val="3076569332"/>
       </p:ext>
     </p:extLst>
   </p:cSld>
   <p:clrMapOvr>
     <a:masterClrMapping/>
   </p:clrMapOvr>
-  <p:transition spd="slow">
-    <p:push dir="u"/>
-  </p:transition>
 </p:sld>
 </file>
 
@@ -5320,60 +5307,10 @@
       </p:grpSpPr>
       <p:sp>
         <p:nvSpPr>
-          <p:cNvPr id="2" name="Title 1">
-            <a:extLst>
-              <a:ext uri="{FF2B5EF4-FFF2-40B4-BE49-F238E27FC236}">
-                <a16:creationId xmlns:a16="http://schemas.microsoft.com/office/drawing/2014/main" id="{2ECD397F-68AF-495A-9586-EB61618490ED}"/>
-              </a:ext>
-            </a:extLst>
-          </p:cNvPr>
-          <p:cNvSpPr>
-            <a:spLocks noGrp="1"/>
-          </p:cNvSpPr>
-          <p:nvPr>
-            <p:ph type="title"/>
-          </p:nvPr>
-        </p:nvSpPr>
-        <p:spPr/>
-        <p:txBody>
-          <a:bodyPr/>
-          <a:lstStyle/>
-          <a:p>
-            <a:endParaRPr lang="en-US"/>
-          </a:p>
-        </p:txBody>
-      </p:sp>
-      <p:sp>
-        <p:nvSpPr>
-          <p:cNvPr id="3" name="Content Placeholder 2">
-            <a:extLst>
-              <a:ext uri="{FF2B5EF4-FFF2-40B4-BE49-F238E27FC236}">
-                <a16:creationId xmlns:a16="http://schemas.microsoft.com/office/drawing/2014/main" id="{18D7E4E8-725E-4560-9CFB-AD2362BE4C68}"/>
-              </a:ext>
-            </a:extLst>
-          </p:cNvPr>
-          <p:cNvSpPr>
-            <a:spLocks noGrp="1"/>
-          </p:cNvSpPr>
-          <p:nvPr>
-            <p:ph idx="1"/>
-          </p:nvPr>
-        </p:nvSpPr>
-        <p:spPr/>
-        <p:txBody>
-          <a:bodyPr/>
-          <a:lstStyle/>
-          <a:p>
-            <a:endParaRPr lang="en-US"/>
-          </a:p>
-        </p:txBody>
-      </p:sp>
-      <p:sp>
-        <p:nvSpPr>
           <p:cNvPr id="4" name="Rectangle 3">
             <a:extLst>
               <a:ext uri="{FF2B5EF4-FFF2-40B4-BE49-F238E27FC236}">
-                <a16:creationId xmlns:a16="http://schemas.microsoft.com/office/drawing/2014/main" id="{BB14C61E-F8AC-4217-89A1-1215FD78FD59}"/>
+                <a16:creationId xmlns:a16="http://schemas.microsoft.com/office/drawing/2014/main" id="{56611CA0-EBE0-4B6E-9EF3-66E2B0CD7394}"/>
               </a:ext>
             </a:extLst>
           </p:cNvPr>
@@ -5382,7 +5319,7 @@
         </p:nvSpPr>
         <p:spPr>
           <a:xfrm>
-            <a:off x="192258" y="175845"/>
+            <a:off x="197532" y="105509"/>
             <a:ext cx="11807484" cy="6421902"/>
           </a:xfrm>
           <a:prstGeom prst="rect">
@@ -5430,7 +5367,7 @@
           <p:cNvPr id="5" name="Rectangle 4">
             <a:extLst>
               <a:ext uri="{FF2B5EF4-FFF2-40B4-BE49-F238E27FC236}">
-                <a16:creationId xmlns:a16="http://schemas.microsoft.com/office/drawing/2014/main" id="{85B79A35-6410-4A77-B539-0F8ED3A5A770}"/>
+                <a16:creationId xmlns:a16="http://schemas.microsoft.com/office/drawing/2014/main" id="{02C84823-3F7D-40E0-B99C-54220487708F}"/>
               </a:ext>
             </a:extLst>
           </p:cNvPr>
@@ -5479,7 +5416,7 @@
           <p:cNvPr id="6" name="Picture 5" descr="A close up of a sign&#10;&#10;Description automatically generated">
             <a:extLst>
               <a:ext uri="{FF2B5EF4-FFF2-40B4-BE49-F238E27FC236}">
-                <a16:creationId xmlns:a16="http://schemas.microsoft.com/office/drawing/2014/main" id="{B0A1FF74-2664-4C2A-AC19-8E7C42278495}"/>
+                <a16:creationId xmlns:a16="http://schemas.microsoft.com/office/drawing/2014/main" id="{3C18DFD9-DB1D-47EA-92DE-C431DB9D86F7}"/>
               </a:ext>
             </a:extLst>
           </p:cNvPr>
@@ -5514,7 +5451,7 @@
           <p:cNvPr id="7" name="TextBox 6">
             <a:extLst>
               <a:ext uri="{FF2B5EF4-FFF2-40B4-BE49-F238E27FC236}">
-                <a16:creationId xmlns:a16="http://schemas.microsoft.com/office/drawing/2014/main" id="{5D00A79F-D3C8-4E45-AC4B-F8CC2A98045D}"/>
+                <a16:creationId xmlns:a16="http://schemas.microsoft.com/office/drawing/2014/main" id="{F3536080-835F-4D0D-9ADA-134EC71B0281}"/>
               </a:ext>
             </a:extLst>
           </p:cNvPr>
@@ -5549,7 +5486,7 @@
           <p:cNvPr id="8" name="TextBox 7">
             <a:extLst>
               <a:ext uri="{FF2B5EF4-FFF2-40B4-BE49-F238E27FC236}">
-                <a16:creationId xmlns:a16="http://schemas.microsoft.com/office/drawing/2014/main" id="{CCFEE2BA-CB98-4C39-853A-AB4D4F280715}"/>
+                <a16:creationId xmlns:a16="http://schemas.microsoft.com/office/drawing/2014/main" id="{F9B138AE-FAFF-4317-8B72-ED1B34E424B7}"/>
               </a:ext>
             </a:extLst>
           </p:cNvPr>
@@ -5584,7 +5521,7 @@
           <p:cNvPr id="9" name="TextBox 8">
             <a:extLst>
               <a:ext uri="{FF2B5EF4-FFF2-40B4-BE49-F238E27FC236}">
-                <a16:creationId xmlns:a16="http://schemas.microsoft.com/office/drawing/2014/main" id="{FEBB2248-343C-447C-BE65-86761D420470}"/>
+                <a16:creationId xmlns:a16="http://schemas.microsoft.com/office/drawing/2014/main" id="{E349BF97-0F75-4AAD-AA83-49266779BF34}"/>
               </a:ext>
             </a:extLst>
           </p:cNvPr>
@@ -5636,7 +5573,7 @@
           <p:cNvPr id="10" name="TextBox 9">
             <a:extLst>
               <a:ext uri="{FF2B5EF4-FFF2-40B4-BE49-F238E27FC236}">
-                <a16:creationId xmlns:a16="http://schemas.microsoft.com/office/drawing/2014/main" id="{E7774734-AB5D-4DA1-B875-C8718F61D36C}"/>
+                <a16:creationId xmlns:a16="http://schemas.microsoft.com/office/drawing/2014/main" id="{CA8F4907-FB0F-44AC-AE31-A98258052CE4}"/>
               </a:ext>
             </a:extLst>
           </p:cNvPr>
@@ -5703,7 +5640,7 @@
           <p:cNvPr id="11" name="Rectangle 10">
             <a:extLst>
               <a:ext uri="{FF2B5EF4-FFF2-40B4-BE49-F238E27FC236}">
-                <a16:creationId xmlns:a16="http://schemas.microsoft.com/office/drawing/2014/main" id="{023EADE4-E7CC-43D3-BAEE-4101D2477768}"/>
+                <a16:creationId xmlns:a16="http://schemas.microsoft.com/office/drawing/2014/main" id="{F137E050-0695-43F9-B99F-5EB8A098B4AF}"/>
               </a:ext>
             </a:extLst>
           </p:cNvPr>
@@ -5762,7 +5699,7 @@
           <p:cNvPr id="12" name="Rectangle 11">
             <a:extLst>
               <a:ext uri="{FF2B5EF4-FFF2-40B4-BE49-F238E27FC236}">
-                <a16:creationId xmlns:a16="http://schemas.microsoft.com/office/drawing/2014/main" id="{6AC9F29A-4F99-4825-A3E5-2189E59F10C6}"/>
+                <a16:creationId xmlns:a16="http://schemas.microsoft.com/office/drawing/2014/main" id="{76CDFF0B-AF2F-471A-9D66-00FF04F0E6D1}"/>
               </a:ext>
             </a:extLst>
           </p:cNvPr>
@@ -5810,7 +5747,7 @@
           <p:cNvPr id="13" name="Rectangle 12">
             <a:extLst>
               <a:ext uri="{FF2B5EF4-FFF2-40B4-BE49-F238E27FC236}">
-                <a16:creationId xmlns:a16="http://schemas.microsoft.com/office/drawing/2014/main" id="{544D79AE-4A78-4952-8607-A417CA1810FB}"/>
+                <a16:creationId xmlns:a16="http://schemas.microsoft.com/office/drawing/2014/main" id="{EFD4CA1E-AA1E-4DD1-95AA-250B791134F5}"/>
               </a:ext>
             </a:extLst>
           </p:cNvPr>
@@ -5873,74 +5810,59 @@
       </p:sp>
       <p:sp>
         <p:nvSpPr>
-          <p:cNvPr id="14" name="Rectangle 13">
-            <a:extLst>
-              <a:ext uri="{FF2B5EF4-FFF2-40B4-BE49-F238E27FC236}">
-                <a16:creationId xmlns:a16="http://schemas.microsoft.com/office/drawing/2014/main" id="{C45ADF14-A237-4D54-AEAB-D91349108520}"/>
-              </a:ext>
-            </a:extLst>
-          </p:cNvPr>
-          <p:cNvSpPr/>
-          <p:nvPr/>
-        </p:nvSpPr>
-        <p:spPr>
-          <a:xfrm>
-            <a:off x="10139291" y="2858119"/>
-            <a:ext cx="1556822" cy="1163352"/>
-          </a:xfrm>
-          <a:prstGeom prst="rect">
-            <a:avLst/>
-          </a:prstGeom>
-          <a:solidFill>
-            <a:schemeClr val="accent6">
-              <a:lumMod val="20000"/>
-              <a:lumOff val="80000"/>
-            </a:schemeClr>
-          </a:solidFill>
-          <a:ln>
-            <a:solidFill>
-              <a:schemeClr val="tx1"/>
-            </a:solidFill>
-          </a:ln>
-        </p:spPr>
-        <p:style>
-          <a:lnRef idx="2">
-            <a:schemeClr val="accent1">
-              <a:shade val="50000"/>
-            </a:schemeClr>
-          </a:lnRef>
-          <a:fillRef idx="1">
-            <a:schemeClr val="accent1"/>
-          </a:fillRef>
-          <a:effectRef idx="0">
-            <a:schemeClr val="accent1"/>
-          </a:effectRef>
-          <a:fontRef idx="minor">
-            <a:schemeClr val="lt1"/>
-          </a:fontRef>
-        </p:style>
-        <p:txBody>
-          <a:bodyPr rtlCol="0" anchor="ctr"/>
-          <a:lstStyle/>
-          <a:p>
-            <a:pPr algn="ctr"/>
-            <a:r>
-              <a:rPr lang="en-US" dirty="0">
-                <a:solidFill>
-                  <a:schemeClr val="tx1"/>
-                </a:solidFill>
-              </a:rPr>
-              <a:t>CLICK ME WHEN YOU USE THIS BANNER</a:t>
-            </a:r>
-          </a:p>
-        </p:txBody>
-      </p:sp>
-      <p:sp>
-        <p:nvSpPr>
-          <p:cNvPr id="16" name="Rectangle 15">
-            <a:extLst>
-              <a:ext uri="{FF2B5EF4-FFF2-40B4-BE49-F238E27FC236}">
-                <a16:creationId xmlns:a16="http://schemas.microsoft.com/office/drawing/2014/main" id="{49740F65-FC95-4718-AE39-429421DE80B2}"/>
+          <p:cNvPr id="16" name="TextBox 15">
+            <a:extLst>
+              <a:ext uri="{FF2B5EF4-FFF2-40B4-BE49-F238E27FC236}">
+                <a16:creationId xmlns:a16="http://schemas.microsoft.com/office/drawing/2014/main" id="{E603B82A-D891-4F78-8459-D42A266B22D6}"/>
+              </a:ext>
+            </a:extLst>
+          </p:cNvPr>
+          <p:cNvSpPr txBox="1"/>
+          <p:nvPr/>
+        </p:nvSpPr>
+        <p:spPr>
+          <a:xfrm>
+            <a:off x="301550" y="4721992"/>
+            <a:ext cx="3177858" cy="707886"/>
+          </a:xfrm>
+          <a:prstGeom prst="rect">
+            <a:avLst/>
+          </a:prstGeom>
+          <a:noFill/>
+        </p:spPr>
+        <p:txBody>
+          <a:bodyPr wrap="square" rtlCol="0">
+            <a:spAutoFit/>
+          </a:bodyPr>
+          <a:lstStyle/>
+          <a:p>
+            <a:pPr marL="285750" indent="-285750">
+              <a:buFont typeface="Wingdings" panose="05000000000000000000" pitchFamily="2" charset="2"/>
+              <a:buChar char="§"/>
+            </a:pPr>
+            <a:r>
+              <a:rPr lang="en-US" sz="2000" b="1" dirty="0"/>
+              <a:t>Used this banner 3 times </a:t>
+            </a:r>
+          </a:p>
+          <a:p>
+            <a:pPr marL="285750" indent="-285750">
+              <a:buFont typeface="Wingdings" panose="05000000000000000000" pitchFamily="2" charset="2"/>
+              <a:buChar char="§"/>
+            </a:pPr>
+            <a:r>
+              <a:rPr lang="en-US" sz="2000" b="1" dirty="0"/>
+              <a:t>Last used on 07/03/2019</a:t>
+            </a:r>
+          </a:p>
+        </p:txBody>
+      </p:sp>
+      <p:sp>
+        <p:nvSpPr>
+          <p:cNvPr id="18" name="Rectangle 17">
+            <a:extLst>
+              <a:ext uri="{FF2B5EF4-FFF2-40B4-BE49-F238E27FC236}">
+                <a16:creationId xmlns:a16="http://schemas.microsoft.com/office/drawing/2014/main" id="{BE094A64-3638-4C66-A783-0DD68822F278}"/>
               </a:ext>
             </a:extLst>
           </p:cNvPr>
@@ -6001,10 +5923,10 @@
       </p:sp>
       <p:sp>
         <p:nvSpPr>
-          <p:cNvPr id="17" name="Rectangle 16">
-            <a:extLst>
-              <a:ext uri="{FF2B5EF4-FFF2-40B4-BE49-F238E27FC236}">
-                <a16:creationId xmlns:a16="http://schemas.microsoft.com/office/drawing/2014/main" id="{AF596BF2-1A1F-4141-B3B2-3004550C87F8}"/>
+          <p:cNvPr id="19" name="Rectangle 18">
+            <a:extLst>
+              <a:ext uri="{FF2B5EF4-FFF2-40B4-BE49-F238E27FC236}">
+                <a16:creationId xmlns:a16="http://schemas.microsoft.com/office/drawing/2014/main" id="{97767237-87FC-46CB-B438-099F16359FCF}"/>
               </a:ext>
             </a:extLst>
           </p:cNvPr>
@@ -6065,10 +5987,10 @@
       </p:sp>
       <p:sp>
         <p:nvSpPr>
-          <p:cNvPr id="18" name="Rectangle 17">
-            <a:extLst>
-              <a:ext uri="{FF2B5EF4-FFF2-40B4-BE49-F238E27FC236}">
-                <a16:creationId xmlns:a16="http://schemas.microsoft.com/office/drawing/2014/main" id="{BF9D795C-EA6D-4FBA-A27C-A1CDCCEDBABA}"/>
+          <p:cNvPr id="20" name="Rectangle 19">
+            <a:extLst>
+              <a:ext uri="{FF2B5EF4-FFF2-40B4-BE49-F238E27FC236}">
+                <a16:creationId xmlns:a16="http://schemas.microsoft.com/office/drawing/2014/main" id="{A399E9DA-4C48-42D1-91FE-E45CC2848EBA}"/>
               </a:ext>
             </a:extLst>
           </p:cNvPr>
@@ -6129,10 +6051,10 @@
       </p:sp>
       <p:sp>
         <p:nvSpPr>
-          <p:cNvPr id="19" name="Rectangle 18">
-            <a:extLst>
-              <a:ext uri="{FF2B5EF4-FFF2-40B4-BE49-F238E27FC236}">
-                <a16:creationId xmlns:a16="http://schemas.microsoft.com/office/drawing/2014/main" id="{9477E371-4A9E-4208-B01E-0E1B2DF147C7}"/>
+          <p:cNvPr id="21" name="Rectangle 20">
+            <a:extLst>
+              <a:ext uri="{FF2B5EF4-FFF2-40B4-BE49-F238E27FC236}">
+                <a16:creationId xmlns:a16="http://schemas.microsoft.com/office/drawing/2014/main" id="{07D742E0-6F6A-406A-B388-F57074A34989}"/>
               </a:ext>
             </a:extLst>
           </p:cNvPr>
@@ -6193,10 +6115,10 @@
       </p:sp>
       <p:sp>
         <p:nvSpPr>
-          <p:cNvPr id="20" name="Rectangle 19">
-            <a:extLst>
-              <a:ext uri="{FF2B5EF4-FFF2-40B4-BE49-F238E27FC236}">
-                <a16:creationId xmlns:a16="http://schemas.microsoft.com/office/drawing/2014/main" id="{A9BE95E5-AB44-42E0-B2EE-C879A19C4F76}"/>
+          <p:cNvPr id="23" name="Rectangle 22">
+            <a:extLst>
+              <a:ext uri="{FF2B5EF4-FFF2-40B4-BE49-F238E27FC236}">
+                <a16:creationId xmlns:a16="http://schemas.microsoft.com/office/drawing/2014/main" id="{E8257804-5C97-4804-BE8E-91AA09134C4C}"/>
               </a:ext>
             </a:extLst>
           </p:cNvPr>
@@ -6257,16 +6179,92 @@
           </a:p>
         </p:txBody>
       </p:sp>
+      <p:sp>
+        <p:nvSpPr>
+          <p:cNvPr id="24" name="Rectangle 23">
+            <a:extLst>
+              <a:ext uri="{FF2B5EF4-FFF2-40B4-BE49-F238E27FC236}">
+                <a16:creationId xmlns:a16="http://schemas.microsoft.com/office/drawing/2014/main" id="{B5C8BCBB-4BB9-45ED-AF6E-5528160F7F17}"/>
+              </a:ext>
+            </a:extLst>
+          </p:cNvPr>
+          <p:cNvSpPr/>
+          <p:nvPr/>
+        </p:nvSpPr>
+        <p:spPr>
+          <a:xfrm>
+            <a:off x="10139291" y="2858119"/>
+            <a:ext cx="1556822" cy="1193376"/>
+          </a:xfrm>
+          <a:prstGeom prst="rect">
+            <a:avLst/>
+          </a:prstGeom>
+          <a:solidFill>
+            <a:schemeClr val="accent6">
+              <a:lumMod val="20000"/>
+              <a:lumOff val="80000"/>
+            </a:schemeClr>
+          </a:solidFill>
+          <a:ln>
+            <a:solidFill>
+              <a:schemeClr val="tx1"/>
+            </a:solidFill>
+          </a:ln>
+        </p:spPr>
+        <p:style>
+          <a:lnRef idx="2">
+            <a:schemeClr val="accent1">
+              <a:shade val="50000"/>
+            </a:schemeClr>
+          </a:lnRef>
+          <a:fillRef idx="1">
+            <a:schemeClr val="accent1"/>
+          </a:fillRef>
+          <a:effectRef idx="0">
+            <a:schemeClr val="accent1"/>
+          </a:effectRef>
+          <a:fontRef idx="minor">
+            <a:schemeClr val="lt1"/>
+          </a:fontRef>
+        </p:style>
+        <p:txBody>
+          <a:bodyPr rtlCol="0" anchor="ctr"/>
+          <a:lstStyle/>
+          <a:p>
+            <a:pPr algn="ctr"/>
+            <a:r>
+              <a:rPr lang="en-US" dirty="0">
+                <a:solidFill>
+                  <a:schemeClr val="tx1"/>
+                </a:solidFill>
+              </a:rPr>
+              <a:t>CLICK ME WHEN YOU USE THIS BANNER</a:t>
+            </a:r>
+          </a:p>
+        </p:txBody>
+      </p:sp>
     </p:spTree>
     <p:extLst>
       <p:ext uri="{BB962C8B-B14F-4D97-AF65-F5344CB8AC3E}">
-        <p14:creationId xmlns:p14="http://schemas.microsoft.com/office/powerpoint/2010/main" val="3076569332"/>
+        <p14:creationId xmlns:p14="http://schemas.microsoft.com/office/powerpoint/2010/main" val="43252568"/>
       </p:ext>
     </p:extLst>
   </p:cSld>
   <p:clrMapOvr>
     <a:masterClrMapping/>
   </p:clrMapOvr>
+  <mc:AlternateContent xmlns:mc="http://schemas.openxmlformats.org/markup-compatibility/2006" xmlns:p14="http://schemas.microsoft.com/office/powerpoint/2010/main">
+    <mc:Choice Requires="p14">
+      <p:transition p14:dur="100">
+        <p:cut/>
+      </p:transition>
+    </mc:Choice>
+    <mc:Fallback xmlns="">
+      <p:transition>
+        <p:cut/>
+      </p:transition>
+    </mc:Fallback>
+  </mc:AlternateContent>
 </p:sld>
 </file>
 
@@ -6303,7 +6301,7 @@
           <p:cNvPr id="4" name="Rectangle 3">
             <a:extLst>
               <a:ext uri="{FF2B5EF4-FFF2-40B4-BE49-F238E27FC236}">
-                <a16:creationId xmlns:a16="http://schemas.microsoft.com/office/drawing/2014/main" id="{56611CA0-EBE0-4B6E-9EF3-66E2B0CD7394}"/>
+                <a16:creationId xmlns:a16="http://schemas.microsoft.com/office/drawing/2014/main" id="{48B82DAB-24DB-4CDE-AECF-03F63ACD3A32}"/>
               </a:ext>
             </a:extLst>
           </p:cNvPr>
@@ -6312,8 +6310,8 @@
         </p:nvSpPr>
         <p:spPr>
           <a:xfrm>
-            <a:off x="197532" y="105509"/>
-            <a:ext cx="11807484" cy="6421902"/>
+            <a:off x="196948" y="126609"/>
+            <a:ext cx="11788726" cy="6541477"/>
           </a:xfrm>
           <a:prstGeom prst="rect">
             <a:avLst/>
@@ -6351,7 +6349,7 @@
           <a:lstStyle/>
           <a:p>
             <a:pPr algn="ctr"/>
-            <a:endParaRPr lang="en-US" dirty="0"/>
+            <a:endParaRPr lang="en-US"/>
           </a:p>
         </p:txBody>
       </p:sp>
@@ -6360,502 +6358,7 @@
           <p:cNvPr id="5" name="Rectangle 4">
             <a:extLst>
               <a:ext uri="{FF2B5EF4-FFF2-40B4-BE49-F238E27FC236}">
-                <a16:creationId xmlns:a16="http://schemas.microsoft.com/office/drawing/2014/main" id="{02C84823-3F7D-40E0-B99C-54220487708F}"/>
-              </a:ext>
-            </a:extLst>
-          </p:cNvPr>
-          <p:cNvSpPr/>
-          <p:nvPr/>
-        </p:nvSpPr>
-        <p:spPr>
-          <a:xfrm>
-            <a:off x="520504" y="959458"/>
-            <a:ext cx="2616591" cy="3092037"/>
-          </a:xfrm>
-          <a:prstGeom prst="rect">
-            <a:avLst/>
-          </a:prstGeom>
-          <a:solidFill>
-            <a:schemeClr val="bg1"/>
-          </a:solidFill>
-        </p:spPr>
-        <p:style>
-          <a:lnRef idx="2">
-            <a:schemeClr val="accent1">
-              <a:shade val="50000"/>
-            </a:schemeClr>
-          </a:lnRef>
-          <a:fillRef idx="1">
-            <a:schemeClr val="accent1"/>
-          </a:fillRef>
-          <a:effectRef idx="0">
-            <a:schemeClr val="accent1"/>
-          </a:effectRef>
-          <a:fontRef idx="minor">
-            <a:schemeClr val="lt1"/>
-          </a:fontRef>
-        </p:style>
-        <p:txBody>
-          <a:bodyPr rtlCol="0" anchor="ctr"/>
-          <a:lstStyle/>
-          <a:p>
-            <a:pPr algn="ctr"/>
-            <a:endParaRPr lang="en-US"/>
-          </a:p>
-        </p:txBody>
-      </p:sp>
-      <p:pic>
-        <p:nvPicPr>
-          <p:cNvPr id="6" name="Picture 5" descr="A close up of a sign&#10;&#10;Description automatically generated">
-            <a:extLst>
-              <a:ext uri="{FF2B5EF4-FFF2-40B4-BE49-F238E27FC236}">
-                <a16:creationId xmlns:a16="http://schemas.microsoft.com/office/drawing/2014/main" id="{3C18DFD9-DB1D-47EA-92DE-C431DB9D86F7}"/>
-              </a:ext>
-            </a:extLst>
-          </p:cNvPr>
-          <p:cNvPicPr>
-            <a:picLocks noChangeAspect="1"/>
-          </p:cNvPicPr>
-          <p:nvPr/>
-        </p:nvPicPr>
-        <p:blipFill rotWithShape="1">
-          <a:blip r:embed="rId2">
-            <a:extLst>
-              <a:ext uri="{28A0092B-C50C-407E-A947-70E740481C1C}">
-                <a14:useLocalDpi xmlns:a14="http://schemas.microsoft.com/office/drawing/2010/main" val="0"/>
-              </a:ext>
-            </a:extLst>
-          </a:blip>
-          <a:srcRect l="-206" t="230" r="56299" b="12962"/>
-          <a:stretch/>
-        </p:blipFill>
-        <p:spPr>
-          <a:xfrm>
-            <a:off x="520504" y="959458"/>
-            <a:ext cx="2616591" cy="3306722"/>
-          </a:xfrm>
-          <a:prstGeom prst="rect">
-            <a:avLst/>
-          </a:prstGeom>
-        </p:spPr>
-      </p:pic>
-      <p:sp>
-        <p:nvSpPr>
-          <p:cNvPr id="7" name="TextBox 6">
-            <a:extLst>
-              <a:ext uri="{FF2B5EF4-FFF2-40B4-BE49-F238E27FC236}">
-                <a16:creationId xmlns:a16="http://schemas.microsoft.com/office/drawing/2014/main" id="{F3536080-835F-4D0D-9ADA-134EC71B0281}"/>
-              </a:ext>
-            </a:extLst>
-          </p:cNvPr>
-          <p:cNvSpPr txBox="1"/>
-          <p:nvPr/>
-        </p:nvSpPr>
-        <p:spPr>
-          <a:xfrm flipH="1">
-            <a:off x="3479408" y="1237958"/>
-            <a:ext cx="5300004" cy="461665"/>
-          </a:xfrm>
-          <a:prstGeom prst="rect">
-            <a:avLst/>
-          </a:prstGeom>
-          <a:noFill/>
-        </p:spPr>
-        <p:txBody>
-          <a:bodyPr wrap="square" rtlCol="0">
-            <a:spAutoFit/>
-          </a:bodyPr>
-          <a:lstStyle/>
-          <a:p>
-            <a:r>
-              <a:rPr lang="en-US" sz="2400" b="1" dirty="0"/>
-              <a:t>BANNER HISTORY:</a:t>
-            </a:r>
-          </a:p>
-        </p:txBody>
-      </p:sp>
-      <p:sp>
-        <p:nvSpPr>
-          <p:cNvPr id="8" name="TextBox 7">
-            <a:extLst>
-              <a:ext uri="{FF2B5EF4-FFF2-40B4-BE49-F238E27FC236}">
-                <a16:creationId xmlns:a16="http://schemas.microsoft.com/office/drawing/2014/main" id="{F9B138AE-FAFF-4317-8B72-ED1B34E424B7}"/>
-              </a:ext>
-            </a:extLst>
-          </p:cNvPr>
-          <p:cNvSpPr txBox="1"/>
-          <p:nvPr/>
-        </p:nvSpPr>
-        <p:spPr>
-          <a:xfrm flipH="1">
-            <a:off x="3445998" y="2450152"/>
-            <a:ext cx="5300004" cy="461665"/>
-          </a:xfrm>
-          <a:prstGeom prst="rect">
-            <a:avLst/>
-          </a:prstGeom>
-          <a:noFill/>
-        </p:spPr>
-        <p:txBody>
-          <a:bodyPr wrap="square" rtlCol="0">
-            <a:spAutoFit/>
-          </a:bodyPr>
-          <a:lstStyle/>
-          <a:p>
-            <a:r>
-              <a:rPr lang="en-US" sz="2400" b="1" dirty="0"/>
-              <a:t>WHERE TO FIND:</a:t>
-            </a:r>
-          </a:p>
-        </p:txBody>
-      </p:sp>
-      <p:sp>
-        <p:nvSpPr>
-          <p:cNvPr id="9" name="TextBox 8">
-            <a:extLst>
-              <a:ext uri="{FF2B5EF4-FFF2-40B4-BE49-F238E27FC236}">
-                <a16:creationId xmlns:a16="http://schemas.microsoft.com/office/drawing/2014/main" id="{E349BF97-0F75-4AAD-AA83-49266779BF34}"/>
-              </a:ext>
-            </a:extLst>
-          </p:cNvPr>
-          <p:cNvSpPr txBox="1"/>
-          <p:nvPr/>
-        </p:nvSpPr>
-        <p:spPr>
-          <a:xfrm flipH="1">
-            <a:off x="3460067" y="1730865"/>
-            <a:ext cx="7535595" cy="923330"/>
-          </a:xfrm>
-          <a:prstGeom prst="rect">
-            <a:avLst/>
-          </a:prstGeom>
-          <a:noFill/>
-        </p:spPr>
-        <p:txBody>
-          <a:bodyPr wrap="square" rtlCol="0">
-            <a:spAutoFit/>
-          </a:bodyPr>
-          <a:lstStyle/>
-          <a:p>
-            <a:pPr marL="285750" indent="-285750">
-              <a:buFont typeface="Arial" panose="020B0604020202020204" pitchFamily="34" charset="0"/>
-              <a:buChar char="•"/>
-            </a:pPr>
-            <a:r>
-              <a:rPr lang="en-US" dirty="0"/>
-              <a:t>IT WAS PRINTED IN THE YEAR 2016</a:t>
-            </a:r>
-          </a:p>
-          <a:p>
-            <a:pPr marL="285750" indent="-285750">
-              <a:buFont typeface="Arial" panose="020B0604020202020204" pitchFamily="34" charset="0"/>
-              <a:buChar char="•"/>
-            </a:pPr>
-            <a:r>
-              <a:rPr lang="en-US" dirty="0"/>
-              <a:t>12*16*19</a:t>
-            </a:r>
-          </a:p>
-          <a:p>
-            <a:endParaRPr lang="en-US" dirty="0"/>
-          </a:p>
-        </p:txBody>
-      </p:sp>
-      <p:sp>
-        <p:nvSpPr>
-          <p:cNvPr id="10" name="TextBox 9">
-            <a:extLst>
-              <a:ext uri="{FF2B5EF4-FFF2-40B4-BE49-F238E27FC236}">
-                <a16:creationId xmlns:a16="http://schemas.microsoft.com/office/drawing/2014/main" id="{CA8F4907-FB0F-44AC-AE31-A98258052CE4}"/>
-              </a:ext>
-            </a:extLst>
-          </p:cNvPr>
-          <p:cNvSpPr txBox="1"/>
-          <p:nvPr/>
-        </p:nvSpPr>
-        <p:spPr>
-          <a:xfrm>
-            <a:off x="3479408" y="2957370"/>
-            <a:ext cx="8192088" cy="923330"/>
-          </a:xfrm>
-          <a:prstGeom prst="rect">
-            <a:avLst/>
-          </a:prstGeom>
-          <a:noFill/>
-        </p:spPr>
-        <p:txBody>
-          <a:bodyPr wrap="square" rtlCol="0">
-            <a:spAutoFit/>
-          </a:bodyPr>
-          <a:lstStyle/>
-          <a:p>
-            <a:pPr marL="285750" indent="-285750">
-              <a:buFont typeface="Arial" panose="020B0604020202020204" pitchFamily="34" charset="0"/>
-              <a:buChar char="•"/>
-            </a:pPr>
-            <a:r>
-              <a:rPr lang="en-US" dirty="0"/>
-              <a:t>3</a:t>
-            </a:r>
-            <a:r>
-              <a:rPr lang="en-US" baseline="30000" dirty="0"/>
-              <a:t>RD</a:t>
-            </a:r>
-            <a:r>
-              <a:rPr lang="en-US" dirty="0"/>
-              <a:t> RACK IN THE BASEMENT</a:t>
-            </a:r>
-          </a:p>
-          <a:p>
-            <a:pPr marL="285750" indent="-285750">
-              <a:buFont typeface="Arial" panose="020B0604020202020204" pitchFamily="34" charset="0"/>
-              <a:buChar char="•"/>
-            </a:pPr>
-            <a:r>
-              <a:rPr lang="en-US" dirty="0"/>
-              <a:t>TOP SHELF</a:t>
-            </a:r>
-          </a:p>
-          <a:p>
-            <a:pPr marL="285750" indent="-285750">
-              <a:buFont typeface="Arial" panose="020B0604020202020204" pitchFamily="34" charset="0"/>
-              <a:buChar char="•"/>
-            </a:pPr>
-            <a:r>
-              <a:rPr lang="en-US" dirty="0"/>
-              <a:t>IN THE BLUE ROUND ROLL</a:t>
-            </a:r>
-          </a:p>
-        </p:txBody>
-      </p:sp>
-      <p:sp>
-        <p:nvSpPr>
-          <p:cNvPr id="11" name="Rectangle 10">
-            <a:extLst>
-              <a:ext uri="{FF2B5EF4-FFF2-40B4-BE49-F238E27FC236}">
-                <a16:creationId xmlns:a16="http://schemas.microsoft.com/office/drawing/2014/main" id="{F137E050-0695-43F9-B99F-5EB8A098B4AF}"/>
-              </a:ext>
-            </a:extLst>
-          </p:cNvPr>
-          <p:cNvSpPr/>
-          <p:nvPr/>
-        </p:nvSpPr>
-        <p:spPr>
-          <a:xfrm>
-            <a:off x="520504" y="4266180"/>
-            <a:ext cx="2616591" cy="348819"/>
-          </a:xfrm>
-          <a:prstGeom prst="rect">
-            <a:avLst/>
-          </a:prstGeom>
-          <a:solidFill>
-            <a:schemeClr val="accent6">
-              <a:lumMod val="20000"/>
-              <a:lumOff val="80000"/>
-            </a:schemeClr>
-          </a:solidFill>
-        </p:spPr>
-        <p:style>
-          <a:lnRef idx="2">
-            <a:schemeClr val="accent1">
-              <a:shade val="50000"/>
-            </a:schemeClr>
-          </a:lnRef>
-          <a:fillRef idx="1">
-            <a:schemeClr val="accent1"/>
-          </a:fillRef>
-          <a:effectRef idx="0">
-            <a:schemeClr val="accent1"/>
-          </a:effectRef>
-          <a:fontRef idx="minor">
-            <a:schemeClr val="lt1"/>
-          </a:fontRef>
-        </p:style>
-        <p:txBody>
-          <a:bodyPr rtlCol="0" anchor="ctr"/>
-          <a:lstStyle/>
-          <a:p>
-            <a:pPr algn="ctr"/>
-            <a:r>
-              <a:rPr lang="en-US" dirty="0">
-                <a:solidFill>
-                  <a:schemeClr val="tx1"/>
-                </a:solidFill>
-              </a:rPr>
-              <a:t>BANNER CODE : 3TBR</a:t>
-            </a:r>
-          </a:p>
-        </p:txBody>
-      </p:sp>
-      <p:sp>
-        <p:nvSpPr>
-          <p:cNvPr id="12" name="Rectangle 11">
-            <a:extLst>
-              <a:ext uri="{FF2B5EF4-FFF2-40B4-BE49-F238E27FC236}">
-                <a16:creationId xmlns:a16="http://schemas.microsoft.com/office/drawing/2014/main" id="{76CDFF0B-AF2F-471A-9D66-00FF04F0E6D1}"/>
-              </a:ext>
-            </a:extLst>
-          </p:cNvPr>
-          <p:cNvSpPr/>
-          <p:nvPr/>
-        </p:nvSpPr>
-        <p:spPr>
-          <a:xfrm>
-            <a:off x="3460067" y="3946184"/>
-            <a:ext cx="3177858" cy="461665"/>
-          </a:xfrm>
-          <a:prstGeom prst="rect">
-            <a:avLst/>
-          </a:prstGeom>
-          <a:noFill/>
-        </p:spPr>
-        <p:txBody>
-          <a:bodyPr wrap="none" lIns="91440" tIns="45720" rIns="91440" bIns="45720">
-            <a:spAutoFit/>
-          </a:bodyPr>
-          <a:lstStyle/>
-          <a:p>
-            <a:pPr algn="ctr"/>
-            <a:r>
-              <a:rPr lang="en-US" sz="2400" b="1" cap="none" spc="0" dirty="0">
-                <a:ln w="0"/>
-                <a:solidFill>
-                  <a:schemeClr val="tx1"/>
-                </a:solidFill>
-                <a:effectLst>
-                  <a:outerShdw blurRad="38100" dist="19050" dir="2700000" algn="tl" rotWithShape="0">
-                    <a:schemeClr val="dk1">
-                      <a:alpha val="40000"/>
-                    </a:schemeClr>
-                  </a:outerShdw>
-                </a:effectLst>
-              </a:rPr>
-              <a:t>SPECIAL INSTRUCTIONS</a:t>
-            </a:r>
-          </a:p>
-        </p:txBody>
-      </p:sp>
-      <p:sp>
-        <p:nvSpPr>
-          <p:cNvPr id="13" name="Rectangle 12">
-            <a:extLst>
-              <a:ext uri="{FF2B5EF4-FFF2-40B4-BE49-F238E27FC236}">
-                <a16:creationId xmlns:a16="http://schemas.microsoft.com/office/drawing/2014/main" id="{EFD4CA1E-AA1E-4DD1-95AA-250B791134F5}"/>
-              </a:ext>
-            </a:extLst>
-          </p:cNvPr>
-          <p:cNvSpPr/>
-          <p:nvPr/>
-        </p:nvSpPr>
-        <p:spPr>
-          <a:xfrm>
-            <a:off x="10125223" y="1651313"/>
-            <a:ext cx="1546273" cy="461665"/>
-          </a:xfrm>
-          <a:prstGeom prst="rect">
-            <a:avLst/>
-          </a:prstGeom>
-          <a:solidFill>
-            <a:schemeClr val="accent6">
-              <a:lumMod val="40000"/>
-              <a:lumOff val="60000"/>
-            </a:schemeClr>
-          </a:solidFill>
-          <a:ln>
-            <a:solidFill>
-              <a:schemeClr val="accent6">
-                <a:lumMod val="50000"/>
-              </a:schemeClr>
-            </a:solidFill>
-          </a:ln>
-        </p:spPr>
-        <p:style>
-          <a:lnRef idx="2">
-            <a:schemeClr val="accent1">
-              <a:shade val="50000"/>
-            </a:schemeClr>
-          </a:lnRef>
-          <a:fillRef idx="1">
-            <a:schemeClr val="accent1"/>
-          </a:fillRef>
-          <a:effectRef idx="0">
-            <a:schemeClr val="accent1"/>
-          </a:effectRef>
-          <a:fontRef idx="minor">
-            <a:schemeClr val="lt1"/>
-          </a:fontRef>
-        </p:style>
-        <p:txBody>
-          <a:bodyPr rtlCol="0" anchor="ctr"/>
-          <a:lstStyle/>
-          <a:p>
-            <a:pPr algn="ctr"/>
-            <a:r>
-              <a:rPr lang="en-US" b="1" dirty="0">
-                <a:solidFill>
-                  <a:schemeClr val="tx1"/>
-                </a:solidFill>
-              </a:rPr>
-              <a:t>DELETE</a:t>
-            </a:r>
-          </a:p>
-        </p:txBody>
-      </p:sp>
-      <p:sp>
-        <p:nvSpPr>
-          <p:cNvPr id="16" name="TextBox 15">
-            <a:extLst>
-              <a:ext uri="{FF2B5EF4-FFF2-40B4-BE49-F238E27FC236}">
-                <a16:creationId xmlns:a16="http://schemas.microsoft.com/office/drawing/2014/main" id="{E603B82A-D891-4F78-8459-D42A266B22D6}"/>
-              </a:ext>
-            </a:extLst>
-          </p:cNvPr>
-          <p:cNvSpPr txBox="1"/>
-          <p:nvPr/>
-        </p:nvSpPr>
-        <p:spPr>
-          <a:xfrm>
-            <a:off x="301550" y="4721992"/>
-            <a:ext cx="3177858" cy="707886"/>
-          </a:xfrm>
-          <a:prstGeom prst="rect">
-            <a:avLst/>
-          </a:prstGeom>
-          <a:noFill/>
-        </p:spPr>
-        <p:txBody>
-          <a:bodyPr wrap="square" rtlCol="0">
-            <a:spAutoFit/>
-          </a:bodyPr>
-          <a:lstStyle/>
-          <a:p>
-            <a:pPr marL="285750" indent="-285750">
-              <a:buFont typeface="Wingdings" panose="05000000000000000000" pitchFamily="2" charset="2"/>
-              <a:buChar char="§"/>
-            </a:pPr>
-            <a:r>
-              <a:rPr lang="en-US" sz="2000" b="1" dirty="0"/>
-              <a:t>Used this banner 3 times </a:t>
-            </a:r>
-          </a:p>
-          <a:p>
-            <a:pPr marL="285750" indent="-285750">
-              <a:buFont typeface="Wingdings" panose="05000000000000000000" pitchFamily="2" charset="2"/>
-              <a:buChar char="§"/>
-            </a:pPr>
-            <a:r>
-              <a:rPr lang="en-US" sz="2000" b="1" dirty="0"/>
-              <a:t>Last used on 07/03/2019</a:t>
-            </a:r>
-          </a:p>
-        </p:txBody>
-      </p:sp>
-      <p:sp>
-        <p:nvSpPr>
-          <p:cNvPr id="18" name="Rectangle 17">
-            <a:extLst>
-              <a:ext uri="{FF2B5EF4-FFF2-40B4-BE49-F238E27FC236}">
-                <a16:creationId xmlns:a16="http://schemas.microsoft.com/office/drawing/2014/main" id="{BE094A64-3638-4C66-A783-0DD68822F278}"/>
+                <a16:creationId xmlns:a16="http://schemas.microsoft.com/office/drawing/2014/main" id="{55A237D0-D07A-43D1-BBCA-45CD6EEADDB3}"/>
               </a:ext>
             </a:extLst>
           </p:cNvPr>
@@ -6916,10 +6419,10 @@
       </p:sp>
       <p:sp>
         <p:nvSpPr>
-          <p:cNvPr id="19" name="Rectangle 18">
-            <a:extLst>
-              <a:ext uri="{FF2B5EF4-FFF2-40B4-BE49-F238E27FC236}">
-                <a16:creationId xmlns:a16="http://schemas.microsoft.com/office/drawing/2014/main" id="{97767237-87FC-46CB-B438-099F16359FCF}"/>
+          <p:cNvPr id="6" name="Rectangle 5">
+            <a:extLst>
+              <a:ext uri="{FF2B5EF4-FFF2-40B4-BE49-F238E27FC236}">
+                <a16:creationId xmlns:a16="http://schemas.microsoft.com/office/drawing/2014/main" id="{9D4B7AB7-88FF-48DF-88BC-0BCDD397E83E}"/>
               </a:ext>
             </a:extLst>
           </p:cNvPr>
@@ -6980,10 +6483,10 @@
       </p:sp>
       <p:sp>
         <p:nvSpPr>
-          <p:cNvPr id="20" name="Rectangle 19">
-            <a:extLst>
-              <a:ext uri="{FF2B5EF4-FFF2-40B4-BE49-F238E27FC236}">
-                <a16:creationId xmlns:a16="http://schemas.microsoft.com/office/drawing/2014/main" id="{A399E9DA-4C48-42D1-91FE-E45CC2848EBA}"/>
+          <p:cNvPr id="7" name="Rectangle 6">
+            <a:extLst>
+              <a:ext uri="{FF2B5EF4-FFF2-40B4-BE49-F238E27FC236}">
+                <a16:creationId xmlns:a16="http://schemas.microsoft.com/office/drawing/2014/main" id="{243D271E-8633-4BAF-BE8E-02BC83A09D25}"/>
               </a:ext>
             </a:extLst>
           </p:cNvPr>
@@ -7000,504 +6503,8 @@
           </a:prstGeom>
           <a:solidFill>
             <a:schemeClr val="accent6">
-              <a:lumMod val="20000"/>
-              <a:lumOff val="80000"/>
-            </a:schemeClr>
-          </a:solidFill>
-          <a:ln>
-            <a:solidFill>
-              <a:schemeClr val="accent6"/>
-            </a:solidFill>
-          </a:ln>
-        </p:spPr>
-        <p:style>
-          <a:lnRef idx="2">
-            <a:schemeClr val="accent1">
-              <a:shade val="50000"/>
-            </a:schemeClr>
-          </a:lnRef>
-          <a:fillRef idx="1">
-            <a:schemeClr val="accent1"/>
-          </a:fillRef>
-          <a:effectRef idx="0">
-            <a:schemeClr val="accent1"/>
-          </a:effectRef>
-          <a:fontRef idx="minor">
-            <a:schemeClr val="lt1"/>
-          </a:fontRef>
-        </p:style>
-        <p:txBody>
-          <a:bodyPr rtlCol="0" anchor="ctr"/>
-          <a:lstStyle/>
-          <a:p>
-            <a:pPr algn="ctr"/>
-            <a:r>
-              <a:rPr lang="en-US" dirty="0">
-                <a:solidFill>
-                  <a:schemeClr val="tx1"/>
-                </a:solidFill>
-              </a:rPr>
-              <a:t>ADMIN PAGE</a:t>
-            </a:r>
-          </a:p>
-        </p:txBody>
-      </p:sp>
-      <p:sp>
-        <p:nvSpPr>
-          <p:cNvPr id="21" name="Rectangle 20">
-            <a:extLst>
-              <a:ext uri="{FF2B5EF4-FFF2-40B4-BE49-F238E27FC236}">
-                <a16:creationId xmlns:a16="http://schemas.microsoft.com/office/drawing/2014/main" id="{07D742E0-6F6A-406A-B388-F57074A34989}"/>
-              </a:ext>
-            </a:extLst>
-          </p:cNvPr>
-          <p:cNvSpPr/>
-          <p:nvPr/>
-        </p:nvSpPr>
-        <p:spPr>
-          <a:xfrm>
-            <a:off x="3956682" y="323832"/>
-            <a:ext cx="1815548" cy="530087"/>
-          </a:xfrm>
-          <a:prstGeom prst="rect">
-            <a:avLst/>
-          </a:prstGeom>
-          <a:solidFill>
-            <a:schemeClr val="accent6">
-              <a:lumMod val="20000"/>
-              <a:lumOff val="80000"/>
-            </a:schemeClr>
-          </a:solidFill>
-          <a:ln>
-            <a:solidFill>
-              <a:schemeClr val="accent6"/>
-            </a:solidFill>
-          </a:ln>
-        </p:spPr>
-        <p:style>
-          <a:lnRef idx="2">
-            <a:schemeClr val="accent1">
-              <a:shade val="50000"/>
-            </a:schemeClr>
-          </a:lnRef>
-          <a:fillRef idx="1">
-            <a:schemeClr val="accent1"/>
-          </a:fillRef>
-          <a:effectRef idx="0">
-            <a:schemeClr val="accent1"/>
-          </a:effectRef>
-          <a:fontRef idx="minor">
-            <a:schemeClr val="lt1"/>
-          </a:fontRef>
-        </p:style>
-        <p:txBody>
-          <a:bodyPr rtlCol="0" anchor="ctr"/>
-          <a:lstStyle/>
-          <a:p>
-            <a:pPr algn="ctr"/>
-            <a:r>
-              <a:rPr lang="en-US" dirty="0">
-                <a:solidFill>
-                  <a:schemeClr val="tx1"/>
-                </a:solidFill>
-              </a:rPr>
-              <a:t>HOME</a:t>
-            </a:r>
-          </a:p>
-        </p:txBody>
-      </p:sp>
-      <p:sp>
-        <p:nvSpPr>
-          <p:cNvPr id="23" name="Rectangle 22">
-            <a:extLst>
-              <a:ext uri="{FF2B5EF4-FFF2-40B4-BE49-F238E27FC236}">
-                <a16:creationId xmlns:a16="http://schemas.microsoft.com/office/drawing/2014/main" id="{E8257804-5C97-4804-BE8E-91AA09134C4C}"/>
-              </a:ext>
-            </a:extLst>
-          </p:cNvPr>
-          <p:cNvSpPr/>
-          <p:nvPr/>
-        </p:nvSpPr>
-        <p:spPr>
-          <a:xfrm>
-            <a:off x="10139291" y="2228090"/>
-            <a:ext cx="1546273" cy="461665"/>
-          </a:xfrm>
-          <a:prstGeom prst="rect">
-            <a:avLst/>
-          </a:prstGeom>
-          <a:solidFill>
-            <a:schemeClr val="accent6">
-              <a:lumMod val="40000"/>
-              <a:lumOff val="60000"/>
-            </a:schemeClr>
-          </a:solidFill>
-          <a:ln>
-            <a:solidFill>
-              <a:schemeClr val="accent6">
-                <a:lumMod val="50000"/>
-              </a:schemeClr>
-            </a:solidFill>
-          </a:ln>
-        </p:spPr>
-        <p:style>
-          <a:lnRef idx="2">
-            <a:schemeClr val="accent1">
-              <a:shade val="50000"/>
-            </a:schemeClr>
-          </a:lnRef>
-          <a:fillRef idx="1">
-            <a:schemeClr val="accent1"/>
-          </a:fillRef>
-          <a:effectRef idx="0">
-            <a:schemeClr val="accent1"/>
-          </a:effectRef>
-          <a:fontRef idx="minor">
-            <a:schemeClr val="lt1"/>
-          </a:fontRef>
-        </p:style>
-        <p:txBody>
-          <a:bodyPr rtlCol="0" anchor="ctr"/>
-          <a:lstStyle/>
-          <a:p>
-            <a:pPr algn="ctr"/>
-            <a:r>
-              <a:rPr lang="en-US" b="1" dirty="0">
-                <a:solidFill>
-                  <a:schemeClr val="tx1"/>
-                </a:solidFill>
-              </a:rPr>
-              <a:t>EDIT INFO</a:t>
-            </a:r>
-          </a:p>
-        </p:txBody>
-      </p:sp>
-      <p:sp>
-        <p:nvSpPr>
-          <p:cNvPr id="24" name="Rectangle 23">
-            <a:extLst>
-              <a:ext uri="{FF2B5EF4-FFF2-40B4-BE49-F238E27FC236}">
-                <a16:creationId xmlns:a16="http://schemas.microsoft.com/office/drawing/2014/main" id="{B5C8BCBB-4BB9-45ED-AF6E-5528160F7F17}"/>
-              </a:ext>
-            </a:extLst>
-          </p:cNvPr>
-          <p:cNvSpPr/>
-          <p:nvPr/>
-        </p:nvSpPr>
-        <p:spPr>
-          <a:xfrm>
-            <a:off x="10139291" y="2858119"/>
-            <a:ext cx="1556822" cy="1193376"/>
-          </a:xfrm>
-          <a:prstGeom prst="rect">
-            <a:avLst/>
-          </a:prstGeom>
-          <a:solidFill>
-            <a:schemeClr val="accent6">
-              <a:lumMod val="20000"/>
-              <a:lumOff val="80000"/>
-            </a:schemeClr>
-          </a:solidFill>
-          <a:ln>
-            <a:solidFill>
-              <a:schemeClr val="tx1"/>
-            </a:solidFill>
-          </a:ln>
-        </p:spPr>
-        <p:style>
-          <a:lnRef idx="2">
-            <a:schemeClr val="accent1">
-              <a:shade val="50000"/>
-            </a:schemeClr>
-          </a:lnRef>
-          <a:fillRef idx="1">
-            <a:schemeClr val="accent1"/>
-          </a:fillRef>
-          <a:effectRef idx="0">
-            <a:schemeClr val="accent1"/>
-          </a:effectRef>
-          <a:fontRef idx="minor">
-            <a:schemeClr val="lt1"/>
-          </a:fontRef>
-        </p:style>
-        <p:txBody>
-          <a:bodyPr rtlCol="0" anchor="ctr"/>
-          <a:lstStyle/>
-          <a:p>
-            <a:pPr algn="ctr"/>
-            <a:r>
-              <a:rPr lang="en-US" dirty="0">
-                <a:solidFill>
-                  <a:schemeClr val="tx1"/>
-                </a:solidFill>
-              </a:rPr>
-              <a:t>CLICK ME WHEN YOU USE THIS BANNER</a:t>
-            </a:r>
-          </a:p>
-        </p:txBody>
-      </p:sp>
-    </p:spTree>
-    <p:extLst>
-      <p:ext uri="{BB962C8B-B14F-4D97-AF65-F5344CB8AC3E}">
-        <p14:creationId xmlns:p14="http://schemas.microsoft.com/office/powerpoint/2010/main" val="43252568"/>
-      </p:ext>
-    </p:extLst>
-  </p:cSld>
-  <p:clrMapOvr>
-    <a:masterClrMapping/>
-  </p:clrMapOvr>
-  <mc:AlternateContent xmlns:mc="http://schemas.openxmlformats.org/markup-compatibility/2006" xmlns:p14="http://schemas.microsoft.com/office/powerpoint/2010/main">
-    <mc:Choice Requires="p14">
-      <p:transition p14:dur="100">
-        <p:cut/>
-      </p:transition>
-    </mc:Choice>
-    <mc:Fallback xmlns="">
-      <p:transition>
-        <p:cut/>
-      </p:transition>
-    </mc:Fallback>
-  </mc:AlternateContent>
-</p:sld>
-</file>
-
-<file path=ppt/slides/slide13.xml><?xml version="1.0" encoding="utf-8"?>
-<p:sld xmlns:a="http://schemas.openxmlformats.org/drawingml/2006/main" xmlns:r="http://schemas.openxmlformats.org/officeDocument/2006/relationships" xmlns:p="http://schemas.openxmlformats.org/presentationml/2006/main">
-  <p:cSld>
-    <p:bg>
-      <p:bgPr>
-        <a:solidFill>
-          <a:schemeClr val="accent6">
-            <a:lumMod val="60000"/>
-            <a:lumOff val="40000"/>
-          </a:schemeClr>
-        </a:solidFill>
-        <a:effectLst/>
-      </p:bgPr>
-    </p:bg>
-    <p:spTree>
-      <p:nvGrpSpPr>
-        <p:cNvPr id="1" name=""/>
-        <p:cNvGrpSpPr/>
-        <p:nvPr/>
-      </p:nvGrpSpPr>
-      <p:grpSpPr>
-        <a:xfrm>
-          <a:off x="0" y="0"/>
-          <a:ext cx="0" cy="0"/>
-          <a:chOff x="0" y="0"/>
-          <a:chExt cx="0" cy="0"/>
-        </a:xfrm>
-      </p:grpSpPr>
-      <p:sp>
-        <p:nvSpPr>
-          <p:cNvPr id="4" name="Rectangle 3">
-            <a:extLst>
-              <a:ext uri="{FF2B5EF4-FFF2-40B4-BE49-F238E27FC236}">
-                <a16:creationId xmlns:a16="http://schemas.microsoft.com/office/drawing/2014/main" id="{48B82DAB-24DB-4CDE-AECF-03F63ACD3A32}"/>
-              </a:ext>
-            </a:extLst>
-          </p:cNvPr>
-          <p:cNvSpPr/>
-          <p:nvPr/>
-        </p:nvSpPr>
-        <p:spPr>
-          <a:xfrm>
-            <a:off x="196948" y="126609"/>
-            <a:ext cx="11788726" cy="6541477"/>
-          </a:xfrm>
-          <a:prstGeom prst="rect">
-            <a:avLst/>
-          </a:prstGeom>
-          <a:solidFill>
-            <a:schemeClr val="accent6">
-              <a:lumMod val="40000"/>
-              <a:lumOff val="60000"/>
-            </a:schemeClr>
-          </a:solidFill>
-          <a:ln>
-            <a:solidFill>
-              <a:schemeClr val="tx1"/>
-            </a:solidFill>
-          </a:ln>
-        </p:spPr>
-        <p:style>
-          <a:lnRef idx="2">
-            <a:schemeClr val="accent1">
-              <a:shade val="50000"/>
-            </a:schemeClr>
-          </a:lnRef>
-          <a:fillRef idx="1">
-            <a:schemeClr val="accent1"/>
-          </a:fillRef>
-          <a:effectRef idx="0">
-            <a:schemeClr val="accent1"/>
-          </a:effectRef>
-          <a:fontRef idx="minor">
-            <a:schemeClr val="lt1"/>
-          </a:fontRef>
-        </p:style>
-        <p:txBody>
-          <a:bodyPr rtlCol="0" anchor="ctr"/>
-          <a:lstStyle/>
-          <a:p>
-            <a:pPr algn="ctr"/>
-            <a:endParaRPr lang="en-US"/>
-          </a:p>
-        </p:txBody>
-      </p:sp>
-      <p:sp>
-        <p:nvSpPr>
-          <p:cNvPr id="5" name="Rectangle 4">
-            <a:extLst>
-              <a:ext uri="{FF2B5EF4-FFF2-40B4-BE49-F238E27FC236}">
-                <a16:creationId xmlns:a16="http://schemas.microsoft.com/office/drawing/2014/main" id="{55A237D0-D07A-43D1-BBCA-45CD6EEADDB3}"/>
-              </a:ext>
-            </a:extLst>
-          </p:cNvPr>
-          <p:cNvSpPr/>
-          <p:nvPr/>
-        </p:nvSpPr>
-        <p:spPr>
-          <a:xfrm>
-            <a:off x="5932583" y="344468"/>
-            <a:ext cx="1815548" cy="530087"/>
-          </a:xfrm>
-          <a:prstGeom prst="rect">
-            <a:avLst/>
-          </a:prstGeom>
-          <a:solidFill>
-            <a:schemeClr val="accent6">
-              <a:lumMod val="20000"/>
-              <a:lumOff val="80000"/>
-            </a:schemeClr>
-          </a:solidFill>
-          <a:ln>
-            <a:solidFill>
-              <a:schemeClr val="accent6"/>
-            </a:solidFill>
-          </a:ln>
-        </p:spPr>
-        <p:style>
-          <a:lnRef idx="2">
-            <a:schemeClr val="accent1">
-              <a:shade val="50000"/>
-            </a:schemeClr>
-          </a:lnRef>
-          <a:fillRef idx="1">
-            <a:schemeClr val="accent1"/>
-          </a:fillRef>
-          <a:effectRef idx="0">
-            <a:schemeClr val="accent1"/>
-          </a:effectRef>
-          <a:fontRef idx="minor">
-            <a:schemeClr val="lt1"/>
-          </a:fontRef>
-        </p:style>
-        <p:txBody>
-          <a:bodyPr rtlCol="0" anchor="ctr"/>
-          <a:lstStyle/>
-          <a:p>
-            <a:pPr algn="ctr"/>
-            <a:r>
-              <a:rPr lang="en-US" dirty="0">
-                <a:solidFill>
-                  <a:schemeClr val="tx1"/>
-                </a:solidFill>
-              </a:rPr>
-              <a:t>ALL SEASONS</a:t>
-            </a:r>
-          </a:p>
-        </p:txBody>
-      </p:sp>
-      <p:sp>
-        <p:nvSpPr>
-          <p:cNvPr id="6" name="Rectangle 5">
-            <a:extLst>
-              <a:ext uri="{FF2B5EF4-FFF2-40B4-BE49-F238E27FC236}">
-                <a16:creationId xmlns:a16="http://schemas.microsoft.com/office/drawing/2014/main" id="{9D4B7AB7-88FF-48DF-88BC-0BCDD397E83E}"/>
-              </a:ext>
-            </a:extLst>
-          </p:cNvPr>
-          <p:cNvSpPr/>
-          <p:nvPr/>
-        </p:nvSpPr>
-        <p:spPr>
-          <a:xfrm>
-            <a:off x="7902471" y="347143"/>
-            <a:ext cx="1815548" cy="530087"/>
-          </a:xfrm>
-          <a:prstGeom prst="rect">
-            <a:avLst/>
-          </a:prstGeom>
-          <a:solidFill>
-            <a:schemeClr val="accent6">
-              <a:lumMod val="20000"/>
-              <a:lumOff val="80000"/>
-            </a:schemeClr>
-          </a:solidFill>
-          <a:ln>
-            <a:solidFill>
-              <a:schemeClr val="accent6"/>
-            </a:solidFill>
-          </a:ln>
-        </p:spPr>
-        <p:style>
-          <a:lnRef idx="2">
-            <a:schemeClr val="accent1">
-              <a:shade val="50000"/>
-            </a:schemeClr>
-          </a:lnRef>
-          <a:fillRef idx="1">
-            <a:schemeClr val="accent1"/>
-          </a:fillRef>
-          <a:effectRef idx="0">
-            <a:schemeClr val="accent1"/>
-          </a:effectRef>
-          <a:fontRef idx="minor">
-            <a:schemeClr val="lt1"/>
-          </a:fontRef>
-        </p:style>
-        <p:txBody>
-          <a:bodyPr rtlCol="0" anchor="ctr"/>
-          <a:lstStyle/>
-          <a:p>
-            <a:pPr algn="ctr"/>
-            <a:r>
-              <a:rPr lang="en-US" dirty="0">
-                <a:solidFill>
-                  <a:schemeClr val="tx1"/>
-                </a:solidFill>
-              </a:rPr>
-              <a:t>MEMEBERS INFO</a:t>
-            </a:r>
-          </a:p>
-        </p:txBody>
-      </p:sp>
-      <p:sp>
-        <p:nvSpPr>
-          <p:cNvPr id="7" name="Rectangle 6">
-            <a:extLst>
-              <a:ext uri="{FF2B5EF4-FFF2-40B4-BE49-F238E27FC236}">
-                <a16:creationId xmlns:a16="http://schemas.microsoft.com/office/drawing/2014/main" id="{243D271E-8633-4BAF-BE8E-02BC83A09D25}"/>
-              </a:ext>
-            </a:extLst>
-          </p:cNvPr>
-          <p:cNvSpPr/>
-          <p:nvPr/>
-        </p:nvSpPr>
-        <p:spPr>
-          <a:xfrm>
-            <a:off x="9869604" y="330727"/>
-            <a:ext cx="1815548" cy="530087"/>
-          </a:xfrm>
-          <a:prstGeom prst="rect">
-            <a:avLst/>
-          </a:prstGeom>
-          <a:solidFill>
-            <a:schemeClr val="accent6">
-              <a:lumMod val="20000"/>
-              <a:lumOff val="80000"/>
+              <a:lumMod val="60000"/>
+              <a:lumOff val="40000"/>
             </a:schemeClr>
           </a:solidFill>
           <a:ln>
@@ -8355,8 +7362,8 @@
           </a:prstGeom>
           <a:solidFill>
             <a:schemeClr val="accent6">
-              <a:lumMod val="20000"/>
-              <a:lumOff val="80000"/>
+              <a:lumMod val="60000"/>
+              <a:lumOff val="40000"/>
             </a:schemeClr>
           </a:solidFill>
           <a:ln>
@@ -14891,7 +13898,7 @@
         </p:nvSpPr>
         <p:spPr>
           <a:xfrm>
-            <a:off x="192258" y="692071"/>
+            <a:off x="192258" y="816291"/>
             <a:ext cx="1468222" cy="523220"/>
           </a:xfrm>
           <a:prstGeom prst="rect">
@@ -14921,53 +13928,6 @@
           </a:p>
         </p:txBody>
       </p:sp>
-      <p:pic>
-        <p:nvPicPr>
-          <p:cNvPr id="1028" name="Picture 4">
-            <a:extLst>
-              <a:ext uri="{FF2B5EF4-FFF2-40B4-BE49-F238E27FC236}">
-                <a16:creationId xmlns:a16="http://schemas.microsoft.com/office/drawing/2014/main" id="{27A4DDFD-5D9D-48F0-BFD1-1B30E7F21AA3}"/>
-              </a:ext>
-            </a:extLst>
-          </p:cNvPr>
-          <p:cNvPicPr>
-            <a:picLocks noChangeAspect="1" noChangeArrowheads="1"/>
-          </p:cNvPicPr>
-          <p:nvPr/>
-        </p:nvPicPr>
-        <p:blipFill>
-          <a:blip r:embed="rId2">
-            <a:extLst>
-              <a:ext uri="{28A0092B-C50C-407E-A947-70E740481C1C}">
-                <a14:useLocalDpi xmlns:a14="http://schemas.microsoft.com/office/drawing/2010/main" val="0"/>
-              </a:ext>
-            </a:extLst>
-          </a:blip>
-          <a:srcRect/>
-          <a:stretch>
-            <a:fillRect/>
-          </a:stretch>
-        </p:blipFill>
-        <p:spPr bwMode="auto">
-          <a:xfrm>
-            <a:off x="376752" y="1368605"/>
-            <a:ext cx="11158756" cy="2950178"/>
-          </a:xfrm>
-          <a:prstGeom prst="rect">
-            <a:avLst/>
-          </a:prstGeom>
-          <a:noFill/>
-          <a:extLst>
-            <a:ext uri="{909E8E84-426E-40DD-AFC4-6F175D3DCCD1}">
-              <a14:hiddenFill xmlns:a14="http://schemas.microsoft.com/office/drawing/2010/main">
-                <a:solidFill>
-                  <a:srgbClr val="FFFFFF"/>
-                </a:solidFill>
-              </a14:hiddenFill>
-            </a:ext>
-          </a:extLst>
-        </p:spPr>
-      </p:pic>
       <p:sp>
         <p:nvSpPr>
           <p:cNvPr id="12" name="Arrow: Right 11">
@@ -14982,7 +13942,7 @@
         </p:nvSpPr>
         <p:spPr>
           <a:xfrm>
-            <a:off x="10645853" y="4964696"/>
+            <a:off x="10645853" y="2137088"/>
             <a:ext cx="583096" cy="570964"/>
           </a:xfrm>
           <a:prstGeom prst="rightArrow">
@@ -15034,7 +13994,7 @@
         </p:nvSpPr>
         <p:spPr>
           <a:xfrm flipH="1">
-            <a:off x="632944" y="4964696"/>
+            <a:off x="632944" y="2137088"/>
             <a:ext cx="583096" cy="570964"/>
           </a:xfrm>
           <a:prstGeom prst="rightArrow">
@@ -15087,7 +14047,7 @@
           <p:nvPr/>
         </p:nvPicPr>
         <p:blipFill rotWithShape="1">
-          <a:blip r:embed="rId3">
+          <a:blip r:embed="rId2">
             <a:extLst>
               <a:ext uri="{28A0092B-C50C-407E-A947-70E740481C1C}">
                 <a14:useLocalDpi xmlns:a14="http://schemas.microsoft.com/office/drawing/2010/main" val="0"/>
@@ -15099,7 +14059,7 @@
         </p:blipFill>
         <p:spPr>
           <a:xfrm>
-            <a:off x="1546147" y="4404108"/>
+            <a:off x="1530302" y="1562094"/>
             <a:ext cx="1957445" cy="2170574"/>
           </a:xfrm>
           <a:prstGeom prst="rect">
@@ -15122,7 +14082,7 @@
           <p:nvPr/>
         </p:nvPicPr>
         <p:blipFill rotWithShape="1">
-          <a:blip r:embed="rId3">
+          <a:blip r:embed="rId2">
             <a:extLst>
               <a:ext uri="{28A0092B-C50C-407E-A947-70E740481C1C}">
                 <a14:useLocalDpi xmlns:a14="http://schemas.microsoft.com/office/drawing/2010/main" val="0"/>
@@ -15134,7 +14094,7 @@
         </p:blipFill>
         <p:spPr>
           <a:xfrm>
-            <a:off x="3769344" y="4399355"/>
+            <a:off x="3769344" y="1571747"/>
             <a:ext cx="1957445" cy="2170574"/>
           </a:xfrm>
           <a:prstGeom prst="rect">
@@ -15157,7 +14117,7 @@
           <p:nvPr/>
         </p:nvPicPr>
         <p:blipFill rotWithShape="1">
-          <a:blip r:embed="rId3">
+          <a:blip r:embed="rId2">
             <a:extLst>
               <a:ext uri="{28A0092B-C50C-407E-A947-70E740481C1C}">
                 <a14:useLocalDpi xmlns:a14="http://schemas.microsoft.com/office/drawing/2010/main" val="0"/>
@@ -15169,7 +14129,7 @@
         </p:blipFill>
         <p:spPr>
           <a:xfrm>
-            <a:off x="5992541" y="4383505"/>
+            <a:off x="5992541" y="1555897"/>
             <a:ext cx="1943381" cy="2202274"/>
           </a:xfrm>
           <a:prstGeom prst="rect">
@@ -15192,7 +14152,7 @@
           <p:nvPr/>
         </p:nvPicPr>
         <p:blipFill rotWithShape="1">
-          <a:blip r:embed="rId3">
+          <a:blip r:embed="rId2">
             <a:extLst>
               <a:ext uri="{28A0092B-C50C-407E-A947-70E740481C1C}">
                 <a14:useLocalDpi xmlns:a14="http://schemas.microsoft.com/office/drawing/2010/main" val="0"/>
@@ -15204,7 +14164,7 @@
         </p:blipFill>
         <p:spPr>
           <a:xfrm>
-            <a:off x="8192849" y="4383505"/>
+            <a:off x="8192849" y="1555897"/>
             <a:ext cx="1929317" cy="2186424"/>
           </a:xfrm>
           <a:prstGeom prst="rect">
@@ -15226,7 +14186,7 @@
         </p:nvSpPr>
         <p:spPr>
           <a:xfrm>
-            <a:off x="1827112" y="756251"/>
+            <a:off x="1835093" y="909611"/>
             <a:ext cx="3019866" cy="369332"/>
           </a:xfrm>
           <a:prstGeom prst="rect">
@@ -15262,7 +14222,7 @@
           <p:nvPr/>
         </p:nvPicPr>
         <p:blipFill rotWithShape="1">
-          <a:blip r:embed="rId4">
+          <a:blip r:embed="rId3">
             <a:extLst>
               <a:ext uri="{28A0092B-C50C-407E-A947-70E740481C1C}">
                 <a14:useLocalDpi xmlns:a14="http://schemas.microsoft.com/office/drawing/2010/main" val="0"/>
@@ -15534,6 +14494,329 @@
                 </a:solidFill>
               </a:rPr>
               <a:t>HOME</a:t>
+            </a:r>
+          </a:p>
+        </p:txBody>
+      </p:sp>
+      <p:sp>
+        <p:nvSpPr>
+          <p:cNvPr id="43" name="Rectangle 42">
+            <a:extLst>
+              <a:ext uri="{FF2B5EF4-FFF2-40B4-BE49-F238E27FC236}">
+                <a16:creationId xmlns:a16="http://schemas.microsoft.com/office/drawing/2014/main" id="{00375151-218C-4B50-ABAD-14C135770F01}"/>
+              </a:ext>
+            </a:extLst>
+          </p:cNvPr>
+          <p:cNvSpPr/>
+          <p:nvPr/>
+        </p:nvSpPr>
+        <p:spPr>
+          <a:xfrm>
+            <a:off x="98475" y="3782316"/>
+            <a:ext cx="2000035" cy="523220"/>
+          </a:xfrm>
+          <a:prstGeom prst="rect">
+            <a:avLst/>
+          </a:prstGeom>
+        </p:spPr>
+        <p:txBody>
+          <a:bodyPr wrap="none">
+            <a:spAutoFit/>
+          </a:bodyPr>
+          <a:lstStyle/>
+          <a:p>
+            <a:pPr algn="ctr"/>
+            <a:r>
+              <a:rPr lang="en-US" sz="2800" dirty="0">
+                <a:ln w="0"/>
+                <a:effectLst>
+                  <a:outerShdw blurRad="38100" dist="19050" dir="2700000" algn="tl" rotWithShape="0">
+                    <a:schemeClr val="dk1">
+                      <a:alpha val="40000"/>
+                    </a:schemeClr>
+                  </a:outerShdw>
+                </a:effectLst>
+              </a:rPr>
+              <a:t>CHRISTMAS:</a:t>
+            </a:r>
+          </a:p>
+        </p:txBody>
+      </p:sp>
+      <p:sp>
+        <p:nvSpPr>
+          <p:cNvPr id="44" name="Arrow: Right 43">
+            <a:extLst>
+              <a:ext uri="{FF2B5EF4-FFF2-40B4-BE49-F238E27FC236}">
+                <a16:creationId xmlns:a16="http://schemas.microsoft.com/office/drawing/2014/main" id="{68FB7BA2-6D1D-4F2D-9AA8-AE1ECB9359F7}"/>
+              </a:ext>
+            </a:extLst>
+          </p:cNvPr>
+          <p:cNvSpPr/>
+          <p:nvPr/>
+        </p:nvSpPr>
+        <p:spPr>
+          <a:xfrm>
+            <a:off x="10857068" y="4810372"/>
+            <a:ext cx="583096" cy="570964"/>
+          </a:xfrm>
+          <a:prstGeom prst="rightArrow">
+            <a:avLst/>
+          </a:prstGeom>
+          <a:solidFill>
+            <a:schemeClr val="accent6">
+              <a:lumMod val="60000"/>
+              <a:lumOff val="40000"/>
+            </a:schemeClr>
+          </a:solidFill>
+        </p:spPr>
+        <p:style>
+          <a:lnRef idx="2">
+            <a:schemeClr val="accent1">
+              <a:shade val="50000"/>
+            </a:schemeClr>
+          </a:lnRef>
+          <a:fillRef idx="1">
+            <a:schemeClr val="accent1"/>
+          </a:fillRef>
+          <a:effectRef idx="0">
+            <a:schemeClr val="accent1"/>
+          </a:effectRef>
+          <a:fontRef idx="minor">
+            <a:schemeClr val="lt1"/>
+          </a:fontRef>
+        </p:style>
+        <p:txBody>
+          <a:bodyPr rtlCol="0" anchor="ctr"/>
+          <a:lstStyle/>
+          <a:p>
+            <a:pPr algn="ctr"/>
+            <a:endParaRPr lang="en-US"/>
+          </a:p>
+        </p:txBody>
+      </p:sp>
+      <p:sp>
+        <p:nvSpPr>
+          <p:cNvPr id="45" name="Arrow: Right 44">
+            <a:extLst>
+              <a:ext uri="{FF2B5EF4-FFF2-40B4-BE49-F238E27FC236}">
+                <a16:creationId xmlns:a16="http://schemas.microsoft.com/office/drawing/2014/main" id="{680FF465-5CDF-4A40-B4DE-F77D93722CBF}"/>
+              </a:ext>
+            </a:extLst>
+          </p:cNvPr>
+          <p:cNvSpPr/>
+          <p:nvPr/>
+        </p:nvSpPr>
+        <p:spPr>
+          <a:xfrm flipH="1">
+            <a:off x="486432" y="4859930"/>
+            <a:ext cx="583096" cy="570964"/>
+          </a:xfrm>
+          <a:prstGeom prst="rightArrow">
+            <a:avLst/>
+          </a:prstGeom>
+          <a:solidFill>
+            <a:schemeClr val="accent6">
+              <a:lumMod val="60000"/>
+              <a:lumOff val="40000"/>
+            </a:schemeClr>
+          </a:solidFill>
+        </p:spPr>
+        <p:style>
+          <a:lnRef idx="2">
+            <a:schemeClr val="accent1">
+              <a:shade val="50000"/>
+            </a:schemeClr>
+          </a:lnRef>
+          <a:fillRef idx="1">
+            <a:schemeClr val="accent1"/>
+          </a:fillRef>
+          <a:effectRef idx="0">
+            <a:schemeClr val="accent1"/>
+          </a:effectRef>
+          <a:fontRef idx="minor">
+            <a:schemeClr val="lt1"/>
+          </a:fontRef>
+        </p:style>
+        <p:txBody>
+          <a:bodyPr rtlCol="0" anchor="ctr"/>
+          <a:lstStyle/>
+          <a:p>
+            <a:pPr algn="ctr"/>
+            <a:endParaRPr lang="en-US"/>
+          </a:p>
+        </p:txBody>
+      </p:sp>
+      <p:pic>
+        <p:nvPicPr>
+          <p:cNvPr id="46" name="Picture 45" descr="A close up of a sign&#10;&#10;Description automatically generated">
+            <a:extLst>
+              <a:ext uri="{FF2B5EF4-FFF2-40B4-BE49-F238E27FC236}">
+                <a16:creationId xmlns:a16="http://schemas.microsoft.com/office/drawing/2014/main" id="{0973EE28-69E0-4379-BBB5-AC20A92D7712}"/>
+              </a:ext>
+            </a:extLst>
+          </p:cNvPr>
+          <p:cNvPicPr>
+            <a:picLocks noChangeAspect="1"/>
+          </p:cNvPicPr>
+          <p:nvPr/>
+        </p:nvPicPr>
+        <p:blipFill rotWithShape="1">
+          <a:blip r:embed="rId4">
+            <a:extLst>
+              <a:ext uri="{28A0092B-C50C-407E-A947-70E740481C1C}">
+                <a14:useLocalDpi xmlns:a14="http://schemas.microsoft.com/office/drawing/2010/main" val="0"/>
+              </a:ext>
+            </a:extLst>
+          </a:blip>
+          <a:srcRect l="-206" t="230" r="56299" b="12962"/>
+          <a:stretch/>
+        </p:blipFill>
+        <p:spPr>
+          <a:xfrm>
+            <a:off x="1387581" y="4355185"/>
+            <a:ext cx="1957445" cy="2170574"/>
+          </a:xfrm>
+          <a:prstGeom prst="rect">
+            <a:avLst/>
+          </a:prstGeom>
+        </p:spPr>
+      </p:pic>
+      <p:pic>
+        <p:nvPicPr>
+          <p:cNvPr id="47" name="Picture 46" descr="A close up of a sign&#10;&#10;Description automatically generated">
+            <a:extLst>
+              <a:ext uri="{FF2B5EF4-FFF2-40B4-BE49-F238E27FC236}">
+                <a16:creationId xmlns:a16="http://schemas.microsoft.com/office/drawing/2014/main" id="{BDEA928A-B733-4A7A-BDC7-86DC2E933DB9}"/>
+              </a:ext>
+            </a:extLst>
+          </p:cNvPr>
+          <p:cNvPicPr>
+            <a:picLocks noChangeAspect="1"/>
+          </p:cNvPicPr>
+          <p:nvPr/>
+        </p:nvPicPr>
+        <p:blipFill rotWithShape="1">
+          <a:blip r:embed="rId4">
+            <a:extLst>
+              <a:ext uri="{28A0092B-C50C-407E-A947-70E740481C1C}">
+                <a14:useLocalDpi xmlns:a14="http://schemas.microsoft.com/office/drawing/2010/main" val="0"/>
+              </a:ext>
+            </a:extLst>
+          </a:blip>
+          <a:srcRect l="58785" b="13885"/>
+          <a:stretch/>
+        </p:blipFill>
+        <p:spPr>
+          <a:xfrm>
+            <a:off x="3774209" y="4308974"/>
+            <a:ext cx="1970697" cy="2192800"/>
+          </a:xfrm>
+          <a:prstGeom prst="rect">
+            <a:avLst/>
+          </a:prstGeom>
+        </p:spPr>
+      </p:pic>
+      <p:pic>
+        <p:nvPicPr>
+          <p:cNvPr id="48" name="Picture 47" descr="A close up of a sign&#10;&#10;Description automatically generated">
+            <a:extLst>
+              <a:ext uri="{FF2B5EF4-FFF2-40B4-BE49-F238E27FC236}">
+                <a16:creationId xmlns:a16="http://schemas.microsoft.com/office/drawing/2014/main" id="{6C3B1B33-FFBD-4442-B048-D69A6EF161DD}"/>
+              </a:ext>
+            </a:extLst>
+          </p:cNvPr>
+          <p:cNvPicPr>
+            <a:picLocks noChangeAspect="1"/>
+          </p:cNvPicPr>
+          <p:nvPr/>
+        </p:nvPicPr>
+        <p:blipFill rotWithShape="1">
+          <a:blip r:embed="rId5">
+            <a:extLst>
+              <a:ext uri="{28A0092B-C50C-407E-A947-70E740481C1C}">
+                <a14:useLocalDpi xmlns:a14="http://schemas.microsoft.com/office/drawing/2010/main" val="0"/>
+              </a:ext>
+            </a:extLst>
+          </a:blip>
+          <a:srcRect l="2229" r="66983"/>
+          <a:stretch/>
+        </p:blipFill>
+        <p:spPr>
+          <a:xfrm>
+            <a:off x="6106191" y="4222558"/>
+            <a:ext cx="1970696" cy="2279082"/>
+          </a:xfrm>
+          <a:prstGeom prst="rect">
+            <a:avLst/>
+          </a:prstGeom>
+        </p:spPr>
+      </p:pic>
+      <p:pic>
+        <p:nvPicPr>
+          <p:cNvPr id="49" name="Picture 48">
+            <a:extLst>
+              <a:ext uri="{FF2B5EF4-FFF2-40B4-BE49-F238E27FC236}">
+                <a16:creationId xmlns:a16="http://schemas.microsoft.com/office/drawing/2014/main" id="{63B614A1-3355-4C11-BD18-EF2A327244AD}"/>
+              </a:ext>
+            </a:extLst>
+          </p:cNvPr>
+          <p:cNvPicPr>
+            <a:picLocks noChangeAspect="1"/>
+          </p:cNvPicPr>
+          <p:nvPr/>
+        </p:nvPicPr>
+        <p:blipFill rotWithShape="1">
+          <a:blip r:embed="rId5">
+            <a:extLst>
+              <a:ext uri="{28A0092B-C50C-407E-A947-70E740481C1C}">
+                <a14:useLocalDpi xmlns:a14="http://schemas.microsoft.com/office/drawing/2010/main" val="0"/>
+              </a:ext>
+            </a:extLst>
+          </a:blip>
+          <a:srcRect l="34123" r="34740"/>
+          <a:stretch/>
+        </p:blipFill>
+        <p:spPr>
+          <a:xfrm>
+            <a:off x="8528584" y="4260267"/>
+            <a:ext cx="1951892" cy="2265491"/>
+          </a:xfrm>
+          <a:prstGeom prst="rect">
+            <a:avLst/>
+          </a:prstGeom>
+        </p:spPr>
+      </p:pic>
+      <p:sp>
+        <p:nvSpPr>
+          <p:cNvPr id="50" name="TextBox 49">
+            <a:extLst>
+              <a:ext uri="{FF2B5EF4-FFF2-40B4-BE49-F238E27FC236}">
+                <a16:creationId xmlns:a16="http://schemas.microsoft.com/office/drawing/2014/main" id="{F46622D5-2534-48EA-8F51-DC82976BDC1B}"/>
+              </a:ext>
+            </a:extLst>
+          </p:cNvPr>
+          <p:cNvSpPr txBox="1"/>
+          <p:nvPr/>
+        </p:nvSpPr>
+        <p:spPr>
+          <a:xfrm>
+            <a:off x="2120618" y="3815262"/>
+            <a:ext cx="5561199" cy="400110"/>
+          </a:xfrm>
+          <a:prstGeom prst="rect">
+            <a:avLst/>
+          </a:prstGeom>
+          <a:noFill/>
+        </p:spPr>
+        <p:txBody>
+          <a:bodyPr wrap="square" rtlCol="0">
+            <a:spAutoFit/>
+          </a:bodyPr>
+          <a:lstStyle/>
+          <a:p>
+            <a:r>
+              <a:rPr lang="en-US" sz="2000" b="1" dirty="0"/>
+              <a:t>PARAMENT COLOR: WHITE</a:t>
             </a:r>
           </a:p>
         </p:txBody>

</xml_diff>